<commit_message>
corrected some copy mistakes
</commit_message>
<xml_diff>
--- a/presentation/heat.pptx
+++ b/presentation/heat.pptx
@@ -4653,14 +4653,14 @@
           <p:nvPr>
             <p:extLst>
               <p:ext uri="{D42A27DB-BD31-4B8C-83A1-F6EECF244321}">
-                <p14:modId xmlns:p14="http://schemas.microsoft.com/office/powerpoint/2010/main" val="1422645994"/>
+                <p14:modId xmlns:p14="http://schemas.microsoft.com/office/powerpoint/2010/main" val="4095726310"/>
               </p:ext>
             </p:extLst>
           </p:nvPr>
         </p:nvGraphicFramePr>
         <p:xfrm>
-          <a:off x="3186675" y="1818322"/>
-          <a:ext cx="5818650" cy="4365944"/>
+          <a:off x="2463800" y="1690688"/>
+          <a:ext cx="9118599" cy="4817613"/>
         </p:xfrm>
         <a:graphic>
           <a:graphicData uri="http://schemas.openxmlformats.org/drawingml/2006/table">
@@ -4669,21 +4669,21 @@
                 <a:tableStyleId>{5940675A-B579-460E-94D1-54222C63F5DA}</a:tableStyleId>
               </a:tblPr>
               <a:tblGrid>
-                <a:gridCol w="1939550">
+                <a:gridCol w="1511300">
                   <a:extLst>
                     <a:ext uri="{9D8B030D-6E8A-4147-A177-3AD203B41FA5}">
                       <a16:colId xmlns:a16="http://schemas.microsoft.com/office/drawing/2014/main" val="1997298528"/>
                     </a:ext>
                   </a:extLst>
                 </a:gridCol>
-                <a:gridCol w="1939550">
+                <a:gridCol w="3251200">
                   <a:extLst>
                     <a:ext uri="{9D8B030D-6E8A-4147-A177-3AD203B41FA5}">
                       <a16:colId xmlns:a16="http://schemas.microsoft.com/office/drawing/2014/main" val="2606793907"/>
                     </a:ext>
                   </a:extLst>
                 </a:gridCol>
-                <a:gridCol w="1939550">
+                <a:gridCol w="4356099">
                   <a:extLst>
                     <a:ext uri="{9D8B030D-6E8A-4147-A177-3AD203B41FA5}">
                       <a16:colId xmlns:a16="http://schemas.microsoft.com/office/drawing/2014/main" val="3193260059"/>
@@ -4691,14 +4691,14 @@
                   </a:extLst>
                 </a:gridCol>
               </a:tblGrid>
-              <a:tr h="202388">
+              <a:tr h="239527">
                 <a:tc>
                   <a:txBody>
                     <a:bodyPr/>
                     <a:lstStyle/>
                     <a:p>
                       <a:r>
-                        <a:rPr lang="de-DE" sz="1000">
+                        <a:rPr lang="de-DE" sz="1600">
                           <a:solidFill>
                             <a:schemeClr val="tx1">
                               <a:lumMod val="50000"/>
@@ -4718,7 +4718,7 @@
                     <a:lstStyle/>
                     <a:p>
                       <a:r>
-                        <a:rPr lang="de-DE" sz="1000">
+                        <a:rPr lang="de-DE" sz="1600">
                           <a:solidFill>
                             <a:schemeClr val="tx1">
                               <a:lumMod val="50000"/>
@@ -4738,7 +4738,7 @@
                     <a:lstStyle/>
                     <a:p>
                       <a:r>
-                        <a:rPr lang="de-DE" sz="1000">
+                        <a:rPr lang="de-DE" sz="1600">
                           <a:solidFill>
                             <a:schemeClr val="tx1">
                               <a:lumMod val="50000"/>
@@ -4758,14 +4758,14 @@
                   </a:ext>
                 </a:extLst>
               </a:tr>
-              <a:tr h="202388">
+              <a:tr h="239527">
                 <a:tc>
                   <a:txBody>
                     <a:bodyPr/>
                     <a:lstStyle/>
                     <a:p>
                       <a:r>
-                        <a:rPr lang="de-DE" sz="1000">
+                        <a:rPr lang="de-DE" sz="1600">
                           <a:solidFill>
                             <a:schemeClr val="tx1">
                               <a:lumMod val="50000"/>
@@ -4785,7 +4785,7 @@
                     <a:lstStyle/>
                     <a:p>
                       <a:r>
-                        <a:rPr lang="de-DE" sz="1000">
+                        <a:rPr lang="de-DE" sz="1600">
                           <a:solidFill>
                             <a:schemeClr val="tx1">
                               <a:lumMod val="50000"/>
@@ -4805,7 +4805,7 @@
                     <a:lstStyle/>
                     <a:p>
                       <a:r>
-                        <a:rPr lang="de-DE" sz="1000">
+                        <a:rPr lang="de-DE" sz="1600">
                           <a:solidFill>
                             <a:schemeClr val="tx1">
                               <a:lumMod val="50000"/>
@@ -4825,14 +4825,14 @@
                   </a:ext>
                 </a:extLst>
               </a:tr>
-              <a:tr h="354179">
+              <a:tr h="2072058">
                 <a:tc>
                   <a:txBody>
                     <a:bodyPr/>
                     <a:lstStyle/>
                     <a:p>
                       <a:r>
-                        <a:rPr lang="de-DE" sz="1000">
+                        <a:rPr lang="de-DE" sz="1600" dirty="0" err="1">
                           <a:solidFill>
                             <a:schemeClr val="tx1">
                               <a:lumMod val="50000"/>
@@ -4840,8 +4840,38 @@
                             </a:schemeClr>
                           </a:solidFill>
                         </a:rPr>
-                        <a:t>heat absorption</a:t>
+                        <a:t>heat</a:t>
                       </a:r>
+                      <a:r>
+                        <a:rPr lang="de-DE" sz="1600" dirty="0">
+                          <a:solidFill>
+                            <a:schemeClr val="tx1">
+                              <a:lumMod val="50000"/>
+                              <a:lumOff val="50000"/>
+                            </a:schemeClr>
+                          </a:solidFill>
+                        </a:rPr>
+                        <a:t> </a:t>
+                      </a:r>
+                      <a:r>
+                        <a:rPr lang="de-DE" sz="1600" dirty="0" err="1">
+                          <a:solidFill>
+                            <a:schemeClr val="tx1">
+                              <a:lumMod val="50000"/>
+                              <a:lumOff val="50000"/>
+                            </a:schemeClr>
+                          </a:solidFill>
+                        </a:rPr>
+                        <a:t>absorption</a:t>
+                      </a:r>
+                      <a:endParaRPr lang="de-DE" sz="1600" dirty="0">
+                        <a:solidFill>
+                          <a:schemeClr val="tx1">
+                            <a:lumMod val="50000"/>
+                            <a:lumOff val="50000"/>
+                          </a:schemeClr>
+                        </a:solidFill>
+                      </a:endParaRPr>
                     </a:p>
                   </a:txBody>
                   <a:tcPr marL="50597" marR="50597" marT="25298" marB="25298" anchor="ctr"/>
@@ -4852,7 +4882,7 @@
                     <a:lstStyle/>
                     <a:p>
                       <a:r>
-                        <a:rPr lang="de-DE" sz="1000">
+                        <a:rPr lang="de-DE" sz="1600" dirty="0" err="1">
                           <a:solidFill>
                             <a:schemeClr val="tx1">
                               <a:lumMod val="50000"/>
@@ -4860,8 +4890,364 @@
                             </a:schemeClr>
                           </a:solidFill>
                         </a:rPr>
-                        <a:t>air that is blown over the heat exchanger by a fan</a:t>
+                        <a:t>air</a:t>
                       </a:r>
+                      <a:r>
+                        <a:rPr lang="de-DE" sz="1600" dirty="0">
+                          <a:solidFill>
+                            <a:schemeClr val="tx1">
+                              <a:lumMod val="50000"/>
+                              <a:lumOff val="50000"/>
+                            </a:schemeClr>
+                          </a:solidFill>
+                        </a:rPr>
+                        <a:t> </a:t>
+                      </a:r>
+                      <a:r>
+                        <a:rPr lang="de-DE" sz="1600" dirty="0" err="1">
+                          <a:solidFill>
+                            <a:schemeClr val="tx1">
+                              <a:lumMod val="50000"/>
+                              <a:lumOff val="50000"/>
+                            </a:schemeClr>
+                          </a:solidFill>
+                        </a:rPr>
+                        <a:t>that</a:t>
+                      </a:r>
+                      <a:r>
+                        <a:rPr lang="de-DE" sz="1600" dirty="0">
+                          <a:solidFill>
+                            <a:schemeClr val="tx1">
+                              <a:lumMod val="50000"/>
+                              <a:lumOff val="50000"/>
+                            </a:schemeClr>
+                          </a:solidFill>
+                        </a:rPr>
+                        <a:t> </a:t>
+                      </a:r>
+                      <a:r>
+                        <a:rPr lang="de-DE" sz="1600" dirty="0" err="1">
+                          <a:solidFill>
+                            <a:schemeClr val="tx1">
+                              <a:lumMod val="50000"/>
+                              <a:lumOff val="50000"/>
+                            </a:schemeClr>
+                          </a:solidFill>
+                        </a:rPr>
+                        <a:t>is</a:t>
+                      </a:r>
+                      <a:r>
+                        <a:rPr lang="de-DE" sz="1600" dirty="0">
+                          <a:solidFill>
+                            <a:schemeClr val="tx1">
+                              <a:lumMod val="50000"/>
+                              <a:lumOff val="50000"/>
+                            </a:schemeClr>
+                          </a:solidFill>
+                        </a:rPr>
+                        <a:t> </a:t>
+                      </a:r>
+                      <a:r>
+                        <a:rPr lang="de-DE" sz="1600" dirty="0" err="1">
+                          <a:solidFill>
+                            <a:schemeClr val="tx1">
+                              <a:lumMod val="50000"/>
+                              <a:lumOff val="50000"/>
+                            </a:schemeClr>
+                          </a:solidFill>
+                        </a:rPr>
+                        <a:t>blown</a:t>
+                      </a:r>
+                      <a:r>
+                        <a:rPr lang="de-DE" sz="1600" dirty="0">
+                          <a:solidFill>
+                            <a:schemeClr val="tx1">
+                              <a:lumMod val="50000"/>
+                              <a:lumOff val="50000"/>
+                            </a:schemeClr>
+                          </a:solidFill>
+                        </a:rPr>
+                        <a:t> </a:t>
+                      </a:r>
+                      <a:r>
+                        <a:rPr lang="de-DE" sz="1600" dirty="0" err="1">
+                          <a:solidFill>
+                            <a:schemeClr val="tx1">
+                              <a:lumMod val="50000"/>
+                              <a:lumOff val="50000"/>
+                            </a:schemeClr>
+                          </a:solidFill>
+                        </a:rPr>
+                        <a:t>over</a:t>
+                      </a:r>
+                      <a:r>
+                        <a:rPr lang="de-DE" sz="1600" dirty="0">
+                          <a:solidFill>
+                            <a:schemeClr val="tx1">
+                              <a:lumMod val="50000"/>
+                              <a:lumOff val="50000"/>
+                            </a:schemeClr>
+                          </a:solidFill>
+                        </a:rPr>
+                        <a:t> </a:t>
+                      </a:r>
+                      <a:r>
+                        <a:rPr lang="de-DE" sz="1600" dirty="0" err="1">
+                          <a:solidFill>
+                            <a:schemeClr val="tx1">
+                              <a:lumMod val="50000"/>
+                              <a:lumOff val="50000"/>
+                            </a:schemeClr>
+                          </a:solidFill>
+                        </a:rPr>
+                        <a:t>the</a:t>
+                      </a:r>
+                      <a:r>
+                        <a:rPr lang="de-DE" sz="1600" dirty="0">
+                          <a:solidFill>
+                            <a:schemeClr val="tx1">
+                              <a:lumMod val="50000"/>
+                              <a:lumOff val="50000"/>
+                            </a:schemeClr>
+                          </a:solidFill>
+                        </a:rPr>
+                        <a:t> </a:t>
+                      </a:r>
+                      <a:r>
+                        <a:rPr lang="de-DE" sz="1600" dirty="0" err="1">
+                          <a:solidFill>
+                            <a:schemeClr val="tx1">
+                              <a:lumMod val="50000"/>
+                              <a:lumOff val="50000"/>
+                            </a:schemeClr>
+                          </a:solidFill>
+                        </a:rPr>
+                        <a:t>heat</a:t>
+                      </a:r>
+                      <a:r>
+                        <a:rPr lang="de-DE" sz="1600" dirty="0">
+                          <a:solidFill>
+                            <a:schemeClr val="tx1">
+                              <a:lumMod val="50000"/>
+                              <a:lumOff val="50000"/>
+                            </a:schemeClr>
+                          </a:solidFill>
+                        </a:rPr>
+                        <a:t> </a:t>
+                      </a:r>
+                      <a:r>
+                        <a:rPr lang="de-DE" sz="1600" dirty="0" err="1">
+                          <a:solidFill>
+                            <a:schemeClr val="tx1">
+                              <a:lumMod val="50000"/>
+                              <a:lumOff val="50000"/>
+                            </a:schemeClr>
+                          </a:solidFill>
+                        </a:rPr>
+                        <a:t>exchanger</a:t>
+                      </a:r>
+                      <a:r>
+                        <a:rPr lang="de-DE" sz="1600" dirty="0">
+                          <a:solidFill>
+                            <a:schemeClr val="tx1">
+                              <a:lumMod val="50000"/>
+                              <a:lumOff val="50000"/>
+                            </a:schemeClr>
+                          </a:solidFill>
+                        </a:rPr>
+                        <a:t> </a:t>
+                      </a:r>
+                      <a:r>
+                        <a:rPr lang="de-DE" sz="1600" dirty="0" err="1">
+                          <a:solidFill>
+                            <a:schemeClr val="tx1">
+                              <a:lumMod val="50000"/>
+                              <a:lumOff val="50000"/>
+                            </a:schemeClr>
+                          </a:solidFill>
+                        </a:rPr>
+                        <a:t>by</a:t>
+                      </a:r>
+                      <a:r>
+                        <a:rPr lang="de-DE" sz="1600" dirty="0">
+                          <a:solidFill>
+                            <a:schemeClr val="tx1">
+                              <a:lumMod val="50000"/>
+                              <a:lumOff val="50000"/>
+                            </a:schemeClr>
+                          </a:solidFill>
+                        </a:rPr>
+                        <a:t> a fan</a:t>
+                      </a:r>
+                    </a:p>
+                    <a:p>
+                      <a:pPr marL="0" marR="0" lvl="0" indent="0" algn="l" defTabSz="914400" rtl="0" eaLnBrk="1" fontAlgn="auto" latinLnBrk="0" hangingPunct="1">
+                        <a:lnSpc>
+                          <a:spcPct val="100000"/>
+                        </a:lnSpc>
+                        <a:spcBef>
+                          <a:spcPts val="0"/>
+                        </a:spcBef>
+                        <a:spcAft>
+                          <a:spcPts val="0"/>
+                        </a:spcAft>
+                        <a:buClrTx/>
+                        <a:buSzTx/>
+                        <a:buFontTx/>
+                        <a:buNone/>
+                        <a:tabLst/>
+                        <a:defRPr/>
+                      </a:pPr>
+                      <a:r>
+                        <a:rPr lang="de-DE" sz="1600" dirty="0">
+                          <a:solidFill>
+                            <a:schemeClr val="tx1">
+                              <a:lumMod val="50000"/>
+                              <a:lumOff val="50000"/>
+                            </a:schemeClr>
+                          </a:solidFill>
+                        </a:rPr>
+                        <a:t>→ </a:t>
+                      </a:r>
+                      <a:r>
+                        <a:rPr lang="de-DE" sz="1600" dirty="0" err="1">
+                          <a:solidFill>
+                            <a:schemeClr val="tx1">
+                              <a:lumMod val="50000"/>
+                              <a:lumOff val="50000"/>
+                            </a:schemeClr>
+                          </a:solidFill>
+                        </a:rPr>
+                        <a:t>usually</a:t>
+                      </a:r>
+                      <a:r>
+                        <a:rPr lang="de-DE" sz="1600" dirty="0">
+                          <a:solidFill>
+                            <a:schemeClr val="tx1">
+                              <a:lumMod val="50000"/>
+                              <a:lumOff val="50000"/>
+                            </a:schemeClr>
+                          </a:solidFill>
+                        </a:rPr>
+                        <a:t> </a:t>
+                      </a:r>
+                      <a:r>
+                        <a:rPr lang="de-DE" sz="1600" dirty="0" err="1">
+                          <a:solidFill>
+                            <a:schemeClr val="tx1">
+                              <a:lumMod val="50000"/>
+                              <a:lumOff val="50000"/>
+                            </a:schemeClr>
+                          </a:solidFill>
+                        </a:rPr>
+                        <a:t>comprise</a:t>
+                      </a:r>
+                      <a:r>
+                        <a:rPr lang="de-DE" sz="1600" dirty="0">
+                          <a:solidFill>
+                            <a:schemeClr val="tx1">
+                              <a:lumMod val="50000"/>
+                              <a:lumOff val="50000"/>
+                            </a:schemeClr>
+                          </a:solidFill>
+                        </a:rPr>
+                        <a:t> a </a:t>
+                      </a:r>
+                      <a:r>
+                        <a:rPr lang="de-DE" sz="1600" dirty="0" err="1">
+                          <a:solidFill>
+                            <a:schemeClr val="tx1">
+                              <a:lumMod val="50000"/>
+                              <a:lumOff val="50000"/>
+                            </a:schemeClr>
+                          </a:solidFill>
+                        </a:rPr>
+                        <a:t>single</a:t>
+                      </a:r>
+                      <a:r>
+                        <a:rPr lang="de-DE" sz="1600" dirty="0">
+                          <a:solidFill>
+                            <a:schemeClr val="tx1">
+                              <a:lumMod val="50000"/>
+                              <a:lumOff val="50000"/>
+                            </a:schemeClr>
+                          </a:solidFill>
+                        </a:rPr>
+                        <a:t>, </a:t>
+                      </a:r>
+                      <a:r>
+                        <a:rPr lang="de-DE" sz="1600" dirty="0" err="1">
+                          <a:solidFill>
+                            <a:schemeClr val="tx1">
+                              <a:lumMod val="50000"/>
+                              <a:lumOff val="50000"/>
+                            </a:schemeClr>
+                          </a:solidFill>
+                        </a:rPr>
+                        <a:t>self-contained</a:t>
+                      </a:r>
+                      <a:r>
+                        <a:rPr lang="de-DE" sz="1600" dirty="0">
+                          <a:solidFill>
+                            <a:schemeClr val="tx1">
+                              <a:lumMod val="50000"/>
+                              <a:lumOff val="50000"/>
+                            </a:schemeClr>
+                          </a:solidFill>
+                        </a:rPr>
+                        <a:t> </a:t>
+                      </a:r>
+                      <a:r>
+                        <a:rPr lang="de-DE" sz="1600" dirty="0" err="1">
+                          <a:solidFill>
+                            <a:schemeClr val="tx1">
+                              <a:lumMod val="50000"/>
+                              <a:lumOff val="50000"/>
+                            </a:schemeClr>
+                          </a:solidFill>
+                        </a:rPr>
+                        <a:t>outdoor</a:t>
+                      </a:r>
+                      <a:r>
+                        <a:rPr lang="de-DE" sz="1600" dirty="0">
+                          <a:solidFill>
+                            <a:schemeClr val="tx1">
+                              <a:lumMod val="50000"/>
+                              <a:lumOff val="50000"/>
+                            </a:schemeClr>
+                          </a:solidFill>
+                        </a:rPr>
+                        <a:t> </a:t>
+                      </a:r>
+                      <a:r>
+                        <a:rPr lang="de-DE" sz="1600" dirty="0" err="1">
+                          <a:solidFill>
+                            <a:schemeClr val="tx1">
+                              <a:lumMod val="50000"/>
+                              <a:lumOff val="50000"/>
+                            </a:schemeClr>
+                          </a:solidFill>
+                        </a:rPr>
+                        <a:t>unit</a:t>
+                      </a:r>
+                      <a:endParaRPr lang="de-DE" sz="1600" dirty="0">
+                        <a:solidFill>
+                          <a:schemeClr val="tx1">
+                            <a:lumMod val="50000"/>
+                            <a:lumOff val="50000"/>
+                          </a:schemeClr>
+                        </a:solidFill>
+                      </a:endParaRPr>
+                    </a:p>
+                    <a:p>
+                      <a:endParaRPr lang="de-DE" sz="1600" dirty="0">
+                        <a:solidFill>
+                          <a:schemeClr val="tx1">
+                            <a:lumMod val="50000"/>
+                            <a:lumOff val="50000"/>
+                          </a:schemeClr>
+                        </a:solidFill>
+                      </a:endParaRPr>
                     </a:p>
                   </a:txBody>
                   <a:tcPr marL="50597" marR="50597" marT="25298" marB="25298" anchor="ctr"/>
@@ -4871,7 +5257,1289 @@
                     <a:bodyPr/>
                     <a:lstStyle/>
                     <a:p>
-                      <a:endParaRPr lang="de-DE" sz="1000">
+                      <a:pPr marL="0" marR="0" lvl="0" indent="0" algn="l" defTabSz="914400" rtl="0" eaLnBrk="1" fontAlgn="auto" latinLnBrk="0" hangingPunct="1">
+                        <a:lnSpc>
+                          <a:spcPct val="100000"/>
+                        </a:lnSpc>
+                        <a:spcBef>
+                          <a:spcPts val="0"/>
+                        </a:spcBef>
+                        <a:spcAft>
+                          <a:spcPts val="0"/>
+                        </a:spcAft>
+                        <a:buClrTx/>
+                        <a:buSzTx/>
+                        <a:buFontTx/>
+                        <a:buNone/>
+                        <a:tabLst/>
+                        <a:defRPr/>
+                      </a:pPr>
+                      <a:r>
+                        <a:rPr lang="de-DE" sz="1600" dirty="0" err="1">
+                          <a:solidFill>
+                            <a:schemeClr val="tx1">
+                              <a:lumMod val="50000"/>
+                              <a:lumOff val="50000"/>
+                            </a:schemeClr>
+                          </a:solidFill>
+                        </a:rPr>
+                        <a:t>by</a:t>
+                      </a:r>
+                      <a:r>
+                        <a:rPr lang="de-DE" sz="1600" dirty="0">
+                          <a:solidFill>
+                            <a:schemeClr val="tx1">
+                              <a:lumMod val="50000"/>
+                              <a:lumOff val="50000"/>
+                            </a:schemeClr>
+                          </a:solidFill>
+                        </a:rPr>
+                        <a:t> </a:t>
+                      </a:r>
+                      <a:r>
+                        <a:rPr lang="de-DE" sz="1600" dirty="0" err="1">
+                          <a:solidFill>
+                            <a:schemeClr val="tx1">
+                              <a:lumMod val="50000"/>
+                              <a:lumOff val="50000"/>
+                            </a:schemeClr>
+                          </a:solidFill>
+                        </a:rPr>
+                        <a:t>refrigerant</a:t>
+                      </a:r>
+                      <a:r>
+                        <a:rPr lang="de-DE" sz="1600" dirty="0">
+                          <a:solidFill>
+                            <a:schemeClr val="tx1">
+                              <a:lumMod val="50000"/>
+                              <a:lumOff val="50000"/>
+                            </a:schemeClr>
+                          </a:solidFill>
+                        </a:rPr>
+                        <a:t> </a:t>
+                      </a:r>
+                      <a:r>
+                        <a:rPr lang="de-DE" sz="1600" dirty="0" err="1">
+                          <a:solidFill>
+                            <a:schemeClr val="tx1">
+                              <a:lumMod val="50000"/>
+                              <a:lumOff val="50000"/>
+                            </a:schemeClr>
+                          </a:solidFill>
+                        </a:rPr>
+                        <a:t>running</a:t>
+                      </a:r>
+                      <a:r>
+                        <a:rPr lang="de-DE" sz="1600" dirty="0">
+                          <a:solidFill>
+                            <a:schemeClr val="tx1">
+                              <a:lumMod val="50000"/>
+                              <a:lumOff val="50000"/>
+                            </a:schemeClr>
+                          </a:solidFill>
+                        </a:rPr>
+                        <a:t> </a:t>
+                      </a:r>
+                      <a:r>
+                        <a:rPr lang="de-DE" sz="1600" dirty="0" err="1">
+                          <a:solidFill>
+                            <a:schemeClr val="tx1">
+                              <a:lumMod val="50000"/>
+                              <a:lumOff val="50000"/>
+                            </a:schemeClr>
+                          </a:solidFill>
+                        </a:rPr>
+                        <a:t>through</a:t>
+                      </a:r>
+                      <a:r>
+                        <a:rPr lang="de-DE" sz="1600" dirty="0">
+                          <a:solidFill>
+                            <a:schemeClr val="tx1">
+                              <a:lumMod val="50000"/>
+                              <a:lumOff val="50000"/>
+                            </a:schemeClr>
+                          </a:solidFill>
+                        </a:rPr>
+                        <a:t> a </a:t>
+                      </a:r>
+                      <a:r>
+                        <a:rPr lang="de-DE" sz="1600" dirty="0" err="1">
+                          <a:solidFill>
+                            <a:schemeClr val="tx1">
+                              <a:lumMod val="50000"/>
+                              <a:lumOff val="50000"/>
+                            </a:schemeClr>
+                          </a:solidFill>
+                        </a:rPr>
+                        <a:t>series</a:t>
+                      </a:r>
+                      <a:r>
+                        <a:rPr lang="de-DE" sz="1600" dirty="0">
+                          <a:solidFill>
+                            <a:schemeClr val="tx1">
+                              <a:lumMod val="50000"/>
+                              <a:lumOff val="50000"/>
+                            </a:schemeClr>
+                          </a:solidFill>
+                        </a:rPr>
+                        <a:t> </a:t>
+                      </a:r>
+                      <a:r>
+                        <a:rPr lang="de-DE" sz="1600" dirty="0" err="1">
+                          <a:solidFill>
+                            <a:schemeClr val="tx1">
+                              <a:lumMod val="50000"/>
+                              <a:lumOff val="50000"/>
+                            </a:schemeClr>
+                          </a:solidFill>
+                        </a:rPr>
+                        <a:t>of</a:t>
+                      </a:r>
+                      <a:r>
+                        <a:rPr lang="de-DE" sz="1600" dirty="0">
+                          <a:solidFill>
+                            <a:schemeClr val="tx1">
+                              <a:lumMod val="50000"/>
+                              <a:lumOff val="50000"/>
+                            </a:schemeClr>
+                          </a:solidFill>
+                        </a:rPr>
+                        <a:t> </a:t>
+                      </a:r>
+                      <a:r>
+                        <a:rPr lang="de-DE" sz="1600" dirty="0" err="1">
+                          <a:solidFill>
+                            <a:schemeClr val="tx1">
+                              <a:lumMod val="50000"/>
+                              <a:lumOff val="50000"/>
+                            </a:schemeClr>
+                          </a:solidFill>
+                        </a:rPr>
+                        <a:t>buried</a:t>
+                      </a:r>
+                      <a:r>
+                        <a:rPr lang="de-DE" sz="1600" dirty="0">
+                          <a:solidFill>
+                            <a:schemeClr val="tx1">
+                              <a:lumMod val="50000"/>
+                              <a:lumOff val="50000"/>
+                            </a:schemeClr>
+                          </a:solidFill>
+                        </a:rPr>
+                        <a:t> </a:t>
+                      </a:r>
+                      <a:r>
+                        <a:rPr lang="de-DE" sz="1600" dirty="0" err="1">
+                          <a:solidFill>
+                            <a:schemeClr val="tx1">
+                              <a:lumMod val="50000"/>
+                              <a:lumOff val="50000"/>
+                            </a:schemeClr>
+                          </a:solidFill>
+                        </a:rPr>
+                        <a:t>pipes</a:t>
+                      </a:r>
+                      <a:endParaRPr lang="de-DE" sz="1600" dirty="0">
+                        <a:solidFill>
+                          <a:schemeClr val="tx1">
+                            <a:lumMod val="50000"/>
+                            <a:lumOff val="50000"/>
+                          </a:schemeClr>
+                        </a:solidFill>
+                      </a:endParaRPr>
+                    </a:p>
+                    <a:p>
+                      <a:pPr marL="0" marR="0" lvl="0" indent="0" algn="l" defTabSz="914400" rtl="0" eaLnBrk="1" fontAlgn="auto" latinLnBrk="0" hangingPunct="1">
+                        <a:lnSpc>
+                          <a:spcPct val="100000"/>
+                        </a:lnSpc>
+                        <a:spcBef>
+                          <a:spcPts val="0"/>
+                        </a:spcBef>
+                        <a:spcAft>
+                          <a:spcPts val="0"/>
+                        </a:spcAft>
+                        <a:buClrTx/>
+                        <a:buSzTx/>
+                        <a:buFontTx/>
+                        <a:buNone/>
+                        <a:tabLst/>
+                        <a:defRPr/>
+                      </a:pPr>
+                      <a:r>
+                        <a:rPr lang="de-DE" sz="1600" dirty="0">
+                          <a:solidFill>
+                            <a:schemeClr val="tx1">
+                              <a:lumMod val="50000"/>
+                              <a:lumOff val="50000"/>
+                            </a:schemeClr>
+                          </a:solidFill>
+                        </a:rPr>
+                        <a:t>→ </a:t>
+                      </a:r>
+                      <a:r>
+                        <a:rPr lang="de-DE" sz="1600" dirty="0" err="1">
+                          <a:solidFill>
+                            <a:schemeClr val="tx1">
+                              <a:lumMod val="50000"/>
+                              <a:lumOff val="50000"/>
+                            </a:schemeClr>
+                          </a:solidFill>
+                        </a:rPr>
+                        <a:t>can</a:t>
+                      </a:r>
+                      <a:r>
+                        <a:rPr lang="de-DE" sz="1600" dirty="0">
+                          <a:solidFill>
+                            <a:schemeClr val="tx1">
+                              <a:lumMod val="50000"/>
+                              <a:lumOff val="50000"/>
+                            </a:schemeClr>
+                          </a:solidFill>
+                        </a:rPr>
+                        <a:t> </a:t>
+                      </a:r>
+                      <a:r>
+                        <a:rPr lang="de-DE" sz="1600" dirty="0" err="1">
+                          <a:solidFill>
+                            <a:schemeClr val="tx1">
+                              <a:lumMod val="50000"/>
+                              <a:lumOff val="50000"/>
+                            </a:schemeClr>
+                          </a:solidFill>
+                        </a:rPr>
+                        <a:t>be</a:t>
+                      </a:r>
+                      <a:r>
+                        <a:rPr lang="de-DE" sz="1600" dirty="0">
+                          <a:solidFill>
+                            <a:schemeClr val="tx1">
+                              <a:lumMod val="50000"/>
+                              <a:lumOff val="50000"/>
+                            </a:schemeClr>
+                          </a:solidFill>
+                        </a:rPr>
+                        <a:t> </a:t>
+                      </a:r>
+                      <a:r>
+                        <a:rPr lang="de-DE" sz="1600" dirty="0" err="1">
+                          <a:solidFill>
+                            <a:schemeClr val="tx1">
+                              <a:lumMod val="50000"/>
+                              <a:lumOff val="50000"/>
+                            </a:schemeClr>
+                          </a:solidFill>
+                        </a:rPr>
+                        <a:t>laid</a:t>
+                      </a:r>
+                      <a:r>
+                        <a:rPr lang="de-DE" sz="1600" dirty="0">
+                          <a:solidFill>
+                            <a:schemeClr val="tx1">
+                              <a:lumMod val="50000"/>
+                              <a:lumOff val="50000"/>
+                            </a:schemeClr>
+                          </a:solidFill>
+                        </a:rPr>
+                        <a:t> </a:t>
+                      </a:r>
+                      <a:r>
+                        <a:rPr lang="de-DE" sz="1600" dirty="0" err="1">
+                          <a:solidFill>
+                            <a:schemeClr val="tx1">
+                              <a:lumMod val="50000"/>
+                              <a:lumOff val="50000"/>
+                            </a:schemeClr>
+                          </a:solidFill>
+                        </a:rPr>
+                        <a:t>horizontally</a:t>
+                      </a:r>
+                      <a:r>
+                        <a:rPr lang="de-DE" sz="1600" dirty="0">
+                          <a:solidFill>
+                            <a:schemeClr val="tx1">
+                              <a:lumMod val="50000"/>
+                              <a:lumOff val="50000"/>
+                            </a:schemeClr>
+                          </a:solidFill>
+                        </a:rPr>
+                        <a:t> and </a:t>
+                      </a:r>
+                      <a:r>
+                        <a:rPr lang="de-DE" sz="1600" dirty="0" err="1">
+                          <a:solidFill>
+                            <a:schemeClr val="tx1">
+                              <a:lumMod val="50000"/>
+                              <a:lumOff val="50000"/>
+                            </a:schemeClr>
+                          </a:solidFill>
+                        </a:rPr>
+                        <a:t>buried</a:t>
+                      </a:r>
+                      <a:r>
+                        <a:rPr lang="de-DE" sz="1600" dirty="0">
+                          <a:solidFill>
+                            <a:schemeClr val="tx1">
+                              <a:lumMod val="50000"/>
+                              <a:lumOff val="50000"/>
+                            </a:schemeClr>
+                          </a:solidFill>
+                        </a:rPr>
+                        <a:t> in </a:t>
+                      </a:r>
+                      <a:r>
+                        <a:rPr lang="de-DE" sz="1600" dirty="0" err="1">
+                          <a:solidFill>
+                            <a:schemeClr val="tx1">
+                              <a:lumMod val="50000"/>
+                              <a:lumOff val="50000"/>
+                            </a:schemeClr>
+                          </a:solidFill>
+                        </a:rPr>
+                        <a:t>trenches</a:t>
+                      </a:r>
+                      <a:r>
+                        <a:rPr lang="de-DE" sz="1600" dirty="0">
+                          <a:solidFill>
+                            <a:schemeClr val="tx1">
+                              <a:lumMod val="50000"/>
+                              <a:lumOff val="50000"/>
+                            </a:schemeClr>
+                          </a:solidFill>
+                        </a:rPr>
+                        <a:t> just </a:t>
+                      </a:r>
+                      <a:r>
+                        <a:rPr lang="de-DE" sz="1600" dirty="0" err="1">
+                          <a:solidFill>
+                            <a:schemeClr val="tx1">
+                              <a:lumMod val="50000"/>
+                              <a:lumOff val="50000"/>
+                            </a:schemeClr>
+                          </a:solidFill>
+                        </a:rPr>
+                        <a:t>over</a:t>
+                      </a:r>
+                      <a:r>
+                        <a:rPr lang="de-DE" sz="1600" dirty="0">
+                          <a:solidFill>
+                            <a:schemeClr val="tx1">
+                              <a:lumMod val="50000"/>
+                              <a:lumOff val="50000"/>
+                            </a:schemeClr>
+                          </a:solidFill>
+                        </a:rPr>
+                        <a:t> a </a:t>
+                      </a:r>
+                      <a:r>
+                        <a:rPr lang="de-DE" sz="1600" dirty="0" err="1">
+                          <a:solidFill>
+                            <a:schemeClr val="tx1">
+                              <a:lumMod val="50000"/>
+                              <a:lumOff val="50000"/>
+                            </a:schemeClr>
+                          </a:solidFill>
+                        </a:rPr>
+                        <a:t>metre</a:t>
+                      </a:r>
+                      <a:r>
+                        <a:rPr lang="de-DE" sz="1600" dirty="0">
+                          <a:solidFill>
+                            <a:schemeClr val="tx1">
+                              <a:lumMod val="50000"/>
+                              <a:lumOff val="50000"/>
+                            </a:schemeClr>
+                          </a:solidFill>
+                        </a:rPr>
+                        <a:t> </a:t>
+                      </a:r>
+                      <a:r>
+                        <a:rPr lang="de-DE" sz="1600" dirty="0" err="1">
+                          <a:solidFill>
+                            <a:schemeClr val="tx1">
+                              <a:lumMod val="50000"/>
+                              <a:lumOff val="50000"/>
+                            </a:schemeClr>
+                          </a:solidFill>
+                        </a:rPr>
+                        <a:t>deep</a:t>
+                      </a:r>
+                      <a:endParaRPr lang="de-DE" sz="1600" dirty="0">
+                        <a:solidFill>
+                          <a:schemeClr val="tx1">
+                            <a:lumMod val="50000"/>
+                            <a:lumOff val="50000"/>
+                          </a:schemeClr>
+                        </a:solidFill>
+                      </a:endParaRPr>
+                    </a:p>
+                    <a:p>
+                      <a:pPr marL="0" marR="0" lvl="0" indent="0" algn="l" defTabSz="914400" rtl="0" eaLnBrk="1" fontAlgn="auto" latinLnBrk="0" hangingPunct="1">
+                        <a:lnSpc>
+                          <a:spcPct val="100000"/>
+                        </a:lnSpc>
+                        <a:spcBef>
+                          <a:spcPts val="0"/>
+                        </a:spcBef>
+                        <a:spcAft>
+                          <a:spcPts val="0"/>
+                        </a:spcAft>
+                        <a:buClrTx/>
+                        <a:buSzTx/>
+                        <a:buFontTx/>
+                        <a:buNone/>
+                        <a:tabLst/>
+                        <a:defRPr/>
+                      </a:pPr>
+                      <a:r>
+                        <a:rPr lang="de-DE" sz="1600" dirty="0">
+                          <a:solidFill>
+                            <a:schemeClr val="tx1">
+                              <a:lumMod val="50000"/>
+                              <a:lumOff val="50000"/>
+                            </a:schemeClr>
+                          </a:solidFill>
+                        </a:rPr>
+                        <a:t>→ </a:t>
+                      </a:r>
+                      <a:r>
+                        <a:rPr lang="de-DE" sz="1600" dirty="0" err="1">
+                          <a:solidFill>
+                            <a:schemeClr val="tx1">
+                              <a:lumMod val="50000"/>
+                              <a:lumOff val="50000"/>
+                            </a:schemeClr>
+                          </a:solidFill>
+                        </a:rPr>
+                        <a:t>can</a:t>
+                      </a:r>
+                      <a:r>
+                        <a:rPr lang="de-DE" sz="1600" dirty="0">
+                          <a:solidFill>
+                            <a:schemeClr val="tx1">
+                              <a:lumMod val="50000"/>
+                              <a:lumOff val="50000"/>
+                            </a:schemeClr>
+                          </a:solidFill>
+                        </a:rPr>
+                        <a:t> also </a:t>
+                      </a:r>
+                      <a:r>
+                        <a:rPr lang="de-DE" sz="1600" dirty="0" err="1">
+                          <a:solidFill>
+                            <a:schemeClr val="tx1">
+                              <a:lumMod val="50000"/>
+                              <a:lumOff val="50000"/>
+                            </a:schemeClr>
+                          </a:solidFill>
+                        </a:rPr>
+                        <a:t>be</a:t>
+                      </a:r>
+                      <a:r>
+                        <a:rPr lang="de-DE" sz="1600" dirty="0">
+                          <a:solidFill>
+                            <a:schemeClr val="tx1">
+                              <a:lumMod val="50000"/>
+                              <a:lumOff val="50000"/>
+                            </a:schemeClr>
+                          </a:solidFill>
+                        </a:rPr>
+                        <a:t> </a:t>
+                      </a:r>
+                      <a:r>
+                        <a:rPr lang="de-DE" sz="1600" dirty="0" err="1">
+                          <a:solidFill>
+                            <a:schemeClr val="tx1">
+                              <a:lumMod val="50000"/>
+                              <a:lumOff val="50000"/>
+                            </a:schemeClr>
+                          </a:solidFill>
+                        </a:rPr>
+                        <a:t>laid</a:t>
+                      </a:r>
+                      <a:r>
+                        <a:rPr lang="de-DE" sz="1600" dirty="0">
+                          <a:solidFill>
+                            <a:schemeClr val="tx1">
+                              <a:lumMod val="50000"/>
+                              <a:lumOff val="50000"/>
+                            </a:schemeClr>
+                          </a:solidFill>
+                        </a:rPr>
+                        <a:t> </a:t>
+                      </a:r>
+                      <a:r>
+                        <a:rPr lang="de-DE" sz="1600" dirty="0" err="1">
+                          <a:solidFill>
+                            <a:schemeClr val="tx1">
+                              <a:lumMod val="50000"/>
+                              <a:lumOff val="50000"/>
+                            </a:schemeClr>
+                          </a:solidFill>
+                        </a:rPr>
+                        <a:t>vertically</a:t>
+                      </a:r>
+                      <a:r>
+                        <a:rPr lang="de-DE" sz="1600" dirty="0">
+                          <a:solidFill>
+                            <a:schemeClr val="tx1">
+                              <a:lumMod val="50000"/>
+                              <a:lumOff val="50000"/>
+                            </a:schemeClr>
+                          </a:solidFill>
+                        </a:rPr>
+                        <a:t> in </a:t>
+                      </a:r>
+                      <a:r>
+                        <a:rPr lang="de-DE" sz="1600" dirty="0" err="1">
+                          <a:solidFill>
+                            <a:schemeClr val="tx1">
+                              <a:lumMod val="50000"/>
+                              <a:lumOff val="50000"/>
+                            </a:schemeClr>
+                          </a:solidFill>
+                        </a:rPr>
+                        <a:t>boreholes</a:t>
+                      </a:r>
+                      <a:endParaRPr lang="de-DE" sz="1600" dirty="0">
+                        <a:solidFill>
+                          <a:schemeClr val="tx1">
+                            <a:lumMod val="50000"/>
+                            <a:lumOff val="50000"/>
+                          </a:schemeClr>
+                        </a:solidFill>
+                      </a:endParaRPr>
+                    </a:p>
+                    <a:p>
+                      <a:pPr marL="0" marR="0" lvl="0" indent="0" algn="l" defTabSz="914400" rtl="0" eaLnBrk="1" fontAlgn="auto" latinLnBrk="0" hangingPunct="1">
+                        <a:lnSpc>
+                          <a:spcPct val="100000"/>
+                        </a:lnSpc>
+                        <a:spcBef>
+                          <a:spcPts val="0"/>
+                        </a:spcBef>
+                        <a:spcAft>
+                          <a:spcPts val="0"/>
+                        </a:spcAft>
+                        <a:buClrTx/>
+                        <a:buSzTx/>
+                        <a:buFontTx/>
+                        <a:buNone/>
+                        <a:tabLst/>
+                        <a:defRPr/>
+                      </a:pPr>
+                      <a:r>
+                        <a:rPr lang="de-DE" sz="1600" dirty="0">
+                          <a:solidFill>
+                            <a:schemeClr val="tx1">
+                              <a:lumMod val="50000"/>
+                              <a:lumOff val="50000"/>
+                            </a:schemeClr>
+                          </a:solidFill>
+                        </a:rPr>
+                        <a:t>a </a:t>
+                      </a:r>
+                      <a:r>
+                        <a:rPr lang="de-DE" sz="1600" dirty="0" err="1">
+                          <a:solidFill>
+                            <a:schemeClr val="tx1">
+                              <a:lumMod val="50000"/>
+                              <a:lumOff val="50000"/>
+                            </a:schemeClr>
+                          </a:solidFill>
+                        </a:rPr>
+                        <a:t>single</a:t>
+                      </a:r>
+                      <a:r>
+                        <a:rPr lang="de-DE" sz="1600" dirty="0">
+                          <a:solidFill>
+                            <a:schemeClr val="tx1">
+                              <a:lumMod val="50000"/>
+                              <a:lumOff val="50000"/>
+                            </a:schemeClr>
+                          </a:solidFill>
+                        </a:rPr>
+                        <a:t> </a:t>
+                      </a:r>
+                      <a:r>
+                        <a:rPr lang="de-DE" sz="1600" dirty="0" err="1">
+                          <a:solidFill>
+                            <a:schemeClr val="tx1">
+                              <a:lumMod val="50000"/>
+                              <a:lumOff val="50000"/>
+                            </a:schemeClr>
+                          </a:solidFill>
+                        </a:rPr>
+                        <a:t>pipe</a:t>
+                      </a:r>
+                      <a:r>
+                        <a:rPr lang="de-DE" sz="1600" dirty="0">
+                          <a:solidFill>
+                            <a:schemeClr val="tx1">
+                              <a:lumMod val="50000"/>
+                              <a:lumOff val="50000"/>
+                            </a:schemeClr>
+                          </a:solidFill>
+                        </a:rPr>
+                        <a:t> loop </a:t>
+                      </a:r>
+                      <a:r>
+                        <a:rPr lang="de-DE" sz="1600" dirty="0" err="1">
+                          <a:solidFill>
+                            <a:schemeClr val="tx1">
+                              <a:lumMod val="50000"/>
+                              <a:lumOff val="50000"/>
+                            </a:schemeClr>
+                          </a:solidFill>
+                        </a:rPr>
+                        <a:t>might</a:t>
+                      </a:r>
+                      <a:r>
+                        <a:rPr lang="de-DE" sz="1600" dirty="0">
+                          <a:solidFill>
+                            <a:schemeClr val="tx1">
+                              <a:lumMod val="50000"/>
+                              <a:lumOff val="50000"/>
+                            </a:schemeClr>
+                          </a:solidFill>
+                        </a:rPr>
+                        <a:t> </a:t>
+                      </a:r>
+                      <a:r>
+                        <a:rPr lang="de-DE" sz="1600" dirty="0" err="1">
+                          <a:solidFill>
+                            <a:schemeClr val="tx1">
+                              <a:lumMod val="50000"/>
+                              <a:lumOff val="50000"/>
+                            </a:schemeClr>
+                          </a:solidFill>
+                        </a:rPr>
+                        <a:t>need</a:t>
+                      </a:r>
+                      <a:r>
+                        <a:rPr lang="de-DE" sz="1600" dirty="0">
+                          <a:solidFill>
+                            <a:schemeClr val="tx1">
+                              <a:lumMod val="50000"/>
+                              <a:lumOff val="50000"/>
+                            </a:schemeClr>
+                          </a:solidFill>
+                        </a:rPr>
+                        <a:t> </a:t>
+                      </a:r>
+                      <a:r>
+                        <a:rPr lang="de-DE" sz="1600" dirty="0" err="1">
+                          <a:solidFill>
+                            <a:schemeClr val="tx1">
+                              <a:lumMod val="50000"/>
+                              <a:lumOff val="50000"/>
+                            </a:schemeClr>
+                          </a:solidFill>
+                        </a:rPr>
+                        <a:t>around</a:t>
+                      </a:r>
+                      <a:r>
+                        <a:rPr lang="de-DE" sz="1600" dirty="0">
+                          <a:solidFill>
+                            <a:schemeClr val="tx1">
+                              <a:lumMod val="50000"/>
+                              <a:lumOff val="50000"/>
+                            </a:schemeClr>
+                          </a:solidFill>
+                        </a:rPr>
+                        <a:t> 600 m^2, larger </a:t>
+                      </a:r>
+                      <a:r>
+                        <a:rPr lang="de-DE" sz="1600" dirty="0" err="1">
+                          <a:solidFill>
+                            <a:schemeClr val="tx1">
+                              <a:lumMod val="50000"/>
+                              <a:lumOff val="50000"/>
+                            </a:schemeClr>
+                          </a:solidFill>
+                        </a:rPr>
+                        <a:t>buildings</a:t>
+                      </a:r>
+                      <a:r>
+                        <a:rPr lang="de-DE" sz="1600" dirty="0">
+                          <a:solidFill>
+                            <a:schemeClr val="tx1">
+                              <a:lumMod val="50000"/>
+                              <a:lumOff val="50000"/>
+                            </a:schemeClr>
+                          </a:solidFill>
+                        </a:rPr>
+                        <a:t> </a:t>
+                      </a:r>
+                      <a:r>
+                        <a:rPr lang="de-DE" sz="1600" dirty="0" err="1">
+                          <a:solidFill>
+                            <a:schemeClr val="tx1">
+                              <a:lumMod val="50000"/>
+                              <a:lumOff val="50000"/>
+                            </a:schemeClr>
+                          </a:solidFill>
+                        </a:rPr>
+                        <a:t>may</a:t>
+                      </a:r>
+                      <a:r>
+                        <a:rPr lang="de-DE" sz="1600" dirty="0">
+                          <a:solidFill>
+                            <a:schemeClr val="tx1">
+                              <a:lumMod val="50000"/>
+                              <a:lumOff val="50000"/>
+                            </a:schemeClr>
+                          </a:solidFill>
+                        </a:rPr>
+                        <a:t> </a:t>
+                      </a:r>
+                      <a:r>
+                        <a:rPr lang="de-DE" sz="1600" dirty="0" err="1">
+                          <a:solidFill>
+                            <a:schemeClr val="tx1">
+                              <a:lumMod val="50000"/>
+                              <a:lumOff val="50000"/>
+                            </a:schemeClr>
+                          </a:solidFill>
+                        </a:rPr>
+                        <a:t>require</a:t>
+                      </a:r>
+                      <a:r>
+                        <a:rPr lang="de-DE" sz="1600" dirty="0">
+                          <a:solidFill>
+                            <a:schemeClr val="tx1">
+                              <a:lumMod val="50000"/>
+                              <a:lumOff val="50000"/>
+                            </a:schemeClr>
+                          </a:solidFill>
+                        </a:rPr>
+                        <a:t> a </a:t>
+                      </a:r>
+                      <a:r>
+                        <a:rPr lang="de-DE" sz="1600" dirty="0" err="1">
+                          <a:solidFill>
+                            <a:schemeClr val="tx1">
+                              <a:lumMod val="50000"/>
+                              <a:lumOff val="50000"/>
+                            </a:schemeClr>
+                          </a:solidFill>
+                        </a:rPr>
+                        <a:t>second</a:t>
+                      </a:r>
+                      <a:r>
+                        <a:rPr lang="de-DE" sz="1600" dirty="0">
+                          <a:solidFill>
+                            <a:schemeClr val="tx1">
+                              <a:lumMod val="50000"/>
+                              <a:lumOff val="50000"/>
+                            </a:schemeClr>
+                          </a:solidFill>
+                        </a:rPr>
+                        <a:t> loop</a:t>
+                      </a:r>
+                    </a:p>
+                    <a:p>
+                      <a:pPr marL="0" marR="0" lvl="0" indent="0" algn="l" defTabSz="914400" rtl="0" eaLnBrk="1" fontAlgn="auto" latinLnBrk="0" hangingPunct="1">
+                        <a:lnSpc>
+                          <a:spcPct val="100000"/>
+                        </a:lnSpc>
+                        <a:spcBef>
+                          <a:spcPts val="0"/>
+                        </a:spcBef>
+                        <a:spcAft>
+                          <a:spcPts val="0"/>
+                        </a:spcAft>
+                        <a:buClrTx/>
+                        <a:buSzTx/>
+                        <a:buFontTx/>
+                        <a:buNone/>
+                        <a:tabLst/>
+                        <a:defRPr/>
+                      </a:pPr>
+                      <a:r>
+                        <a:rPr lang="de-DE" sz="1600" dirty="0">
+                          <a:solidFill>
+                            <a:schemeClr val="tx1">
+                              <a:lumMod val="50000"/>
+                              <a:lumOff val="50000"/>
+                            </a:schemeClr>
+                          </a:solidFill>
+                        </a:rPr>
+                        <a:t>a </a:t>
+                      </a:r>
+                      <a:r>
+                        <a:rPr lang="de-DE" sz="1600" dirty="0" err="1">
+                          <a:solidFill>
+                            <a:schemeClr val="tx1">
+                              <a:lumMod val="50000"/>
+                              <a:lumOff val="50000"/>
+                            </a:schemeClr>
+                          </a:solidFill>
+                        </a:rPr>
+                        <a:t>single</a:t>
+                      </a:r>
+                      <a:r>
+                        <a:rPr lang="de-DE" sz="1600" dirty="0">
+                          <a:solidFill>
+                            <a:schemeClr val="tx1">
+                              <a:lumMod val="50000"/>
+                              <a:lumOff val="50000"/>
+                            </a:schemeClr>
+                          </a:solidFill>
+                        </a:rPr>
+                        <a:t> </a:t>
+                      </a:r>
+                      <a:r>
+                        <a:rPr lang="de-DE" sz="1600" dirty="0" err="1">
+                          <a:solidFill>
+                            <a:schemeClr val="tx1">
+                              <a:lumMod val="50000"/>
+                              <a:lumOff val="50000"/>
+                            </a:schemeClr>
+                          </a:solidFill>
+                        </a:rPr>
+                        <a:t>pipe</a:t>
+                      </a:r>
+                      <a:r>
+                        <a:rPr lang="de-DE" sz="1600" dirty="0">
+                          <a:solidFill>
+                            <a:schemeClr val="tx1">
+                              <a:lumMod val="50000"/>
+                              <a:lumOff val="50000"/>
+                            </a:schemeClr>
+                          </a:solidFill>
+                        </a:rPr>
+                        <a:t> loop </a:t>
+                      </a:r>
+                      <a:r>
+                        <a:rPr lang="de-DE" sz="1600" dirty="0" err="1">
+                          <a:solidFill>
+                            <a:schemeClr val="tx1">
+                              <a:lumMod val="50000"/>
+                              <a:lumOff val="50000"/>
+                            </a:schemeClr>
+                          </a:solidFill>
+                        </a:rPr>
+                        <a:t>might</a:t>
+                      </a:r>
+                      <a:r>
+                        <a:rPr lang="de-DE" sz="1600" dirty="0">
+                          <a:solidFill>
+                            <a:schemeClr val="tx1">
+                              <a:lumMod val="50000"/>
+                              <a:lumOff val="50000"/>
+                            </a:schemeClr>
+                          </a:solidFill>
+                        </a:rPr>
+                        <a:t> </a:t>
+                      </a:r>
+                      <a:r>
+                        <a:rPr lang="de-DE" sz="1600" dirty="0" err="1">
+                          <a:solidFill>
+                            <a:schemeClr val="tx1">
+                              <a:lumMod val="50000"/>
+                              <a:lumOff val="50000"/>
+                            </a:schemeClr>
+                          </a:solidFill>
+                        </a:rPr>
+                        <a:t>need</a:t>
+                      </a:r>
+                      <a:r>
+                        <a:rPr lang="de-DE" sz="1600" dirty="0">
+                          <a:solidFill>
+                            <a:schemeClr val="tx1">
+                              <a:lumMod val="50000"/>
+                              <a:lumOff val="50000"/>
+                            </a:schemeClr>
+                          </a:solidFill>
+                        </a:rPr>
+                        <a:t> </a:t>
+                      </a:r>
+                      <a:r>
+                        <a:rPr lang="de-DE" sz="1600" dirty="0" err="1">
+                          <a:solidFill>
+                            <a:schemeClr val="tx1">
+                              <a:lumMod val="50000"/>
+                              <a:lumOff val="50000"/>
+                            </a:schemeClr>
+                          </a:solidFill>
+                        </a:rPr>
+                        <a:t>around</a:t>
+                      </a:r>
+                      <a:r>
+                        <a:rPr lang="de-DE" sz="1600" dirty="0">
+                          <a:solidFill>
+                            <a:schemeClr val="tx1">
+                              <a:lumMod val="50000"/>
+                              <a:lumOff val="50000"/>
+                            </a:schemeClr>
+                          </a:solidFill>
+                        </a:rPr>
+                        <a:t> 600 m^2, larger </a:t>
+                      </a:r>
+                      <a:r>
+                        <a:rPr lang="de-DE" sz="1600" dirty="0" err="1">
+                          <a:solidFill>
+                            <a:schemeClr val="tx1">
+                              <a:lumMod val="50000"/>
+                              <a:lumOff val="50000"/>
+                            </a:schemeClr>
+                          </a:solidFill>
+                        </a:rPr>
+                        <a:t>buildings</a:t>
+                      </a:r>
+                      <a:r>
+                        <a:rPr lang="de-DE" sz="1600" dirty="0">
+                          <a:solidFill>
+                            <a:schemeClr val="tx1">
+                              <a:lumMod val="50000"/>
+                              <a:lumOff val="50000"/>
+                            </a:schemeClr>
+                          </a:solidFill>
+                        </a:rPr>
+                        <a:t> </a:t>
+                      </a:r>
+                      <a:r>
+                        <a:rPr lang="de-DE" sz="1600" dirty="0" err="1">
+                          <a:solidFill>
+                            <a:schemeClr val="tx1">
+                              <a:lumMod val="50000"/>
+                              <a:lumOff val="50000"/>
+                            </a:schemeClr>
+                          </a:solidFill>
+                        </a:rPr>
+                        <a:t>may</a:t>
+                      </a:r>
+                      <a:r>
+                        <a:rPr lang="de-DE" sz="1600" dirty="0">
+                          <a:solidFill>
+                            <a:schemeClr val="tx1">
+                              <a:lumMod val="50000"/>
+                              <a:lumOff val="50000"/>
+                            </a:schemeClr>
+                          </a:solidFill>
+                        </a:rPr>
+                        <a:t> </a:t>
+                      </a:r>
+                      <a:r>
+                        <a:rPr lang="de-DE" sz="1600" dirty="0" err="1">
+                          <a:solidFill>
+                            <a:schemeClr val="tx1">
+                              <a:lumMod val="50000"/>
+                              <a:lumOff val="50000"/>
+                            </a:schemeClr>
+                          </a:solidFill>
+                        </a:rPr>
+                        <a:t>require</a:t>
+                      </a:r>
+                      <a:r>
+                        <a:rPr lang="de-DE" sz="1600" dirty="0">
+                          <a:solidFill>
+                            <a:schemeClr val="tx1">
+                              <a:lumMod val="50000"/>
+                              <a:lumOff val="50000"/>
+                            </a:schemeClr>
+                          </a:solidFill>
+                        </a:rPr>
+                        <a:t> a </a:t>
+                      </a:r>
+                      <a:r>
+                        <a:rPr lang="de-DE" sz="1600" dirty="0" err="1">
+                          <a:solidFill>
+                            <a:schemeClr val="tx1">
+                              <a:lumMod val="50000"/>
+                              <a:lumOff val="50000"/>
+                            </a:schemeClr>
+                          </a:solidFill>
+                        </a:rPr>
+                        <a:t>second</a:t>
+                      </a:r>
+                      <a:r>
+                        <a:rPr lang="de-DE" sz="1600" dirty="0">
+                          <a:solidFill>
+                            <a:schemeClr val="tx1">
+                              <a:lumMod val="50000"/>
+                              <a:lumOff val="50000"/>
+                            </a:schemeClr>
+                          </a:solidFill>
+                        </a:rPr>
+                        <a:t> loop</a:t>
+                      </a:r>
+                    </a:p>
+                    <a:p>
+                      <a:pPr marL="0" marR="0" lvl="0" indent="0" algn="l" defTabSz="914400" rtl="0" eaLnBrk="1" fontAlgn="auto" latinLnBrk="0" hangingPunct="1">
+                        <a:lnSpc>
+                          <a:spcPct val="100000"/>
+                        </a:lnSpc>
+                        <a:spcBef>
+                          <a:spcPts val="0"/>
+                        </a:spcBef>
+                        <a:spcAft>
+                          <a:spcPts val="0"/>
+                        </a:spcAft>
+                        <a:buClrTx/>
+                        <a:buSzTx/>
+                        <a:buFontTx/>
+                        <a:buNone/>
+                        <a:tabLst/>
+                        <a:defRPr/>
+                      </a:pPr>
+                      <a:r>
+                        <a:rPr lang="de-DE" sz="1600" dirty="0">
+                          <a:solidFill>
+                            <a:schemeClr val="tx1">
+                              <a:lumMod val="50000"/>
+                              <a:lumOff val="50000"/>
+                            </a:schemeClr>
+                          </a:solidFill>
+                        </a:rPr>
+                        <a:t>(/ open loop </a:t>
+                      </a:r>
+                      <a:r>
+                        <a:rPr lang="de-DE" sz="1600" dirty="0" err="1">
+                          <a:solidFill>
+                            <a:schemeClr val="tx1">
+                              <a:lumMod val="50000"/>
+                              <a:lumOff val="50000"/>
+                            </a:schemeClr>
+                          </a:solidFill>
+                        </a:rPr>
+                        <a:t>system</a:t>
+                      </a:r>
+                      <a:r>
+                        <a:rPr lang="de-DE" sz="1600" dirty="0">
+                          <a:solidFill>
+                            <a:schemeClr val="tx1">
+                              <a:lumMod val="50000"/>
+                              <a:lumOff val="50000"/>
+                            </a:schemeClr>
+                          </a:solidFill>
+                        </a:rPr>
+                        <a:t> </a:t>
+                      </a:r>
+                      <a:r>
+                        <a:rPr lang="de-DE" sz="1600" dirty="0" err="1">
+                          <a:solidFill>
+                            <a:schemeClr val="tx1">
+                              <a:lumMod val="50000"/>
+                              <a:lumOff val="50000"/>
+                            </a:schemeClr>
+                          </a:solidFill>
+                        </a:rPr>
+                        <a:t>that</a:t>
+                      </a:r>
+                      <a:r>
+                        <a:rPr lang="de-DE" sz="1600" dirty="0">
+                          <a:solidFill>
+                            <a:schemeClr val="tx1">
+                              <a:lumMod val="50000"/>
+                              <a:lumOff val="50000"/>
+                            </a:schemeClr>
+                          </a:solidFill>
+                        </a:rPr>
+                        <a:t> </a:t>
+                      </a:r>
+                      <a:r>
+                        <a:rPr lang="de-DE" sz="1600" dirty="0" err="1">
+                          <a:solidFill>
+                            <a:schemeClr val="tx1">
+                              <a:lumMod val="50000"/>
+                              <a:lumOff val="50000"/>
+                            </a:schemeClr>
+                          </a:solidFill>
+                        </a:rPr>
+                        <a:t>directly</a:t>
+                      </a:r>
+                      <a:r>
+                        <a:rPr lang="de-DE" sz="1600" dirty="0">
+                          <a:solidFill>
+                            <a:schemeClr val="tx1">
+                              <a:lumMod val="50000"/>
+                              <a:lumOff val="50000"/>
+                            </a:schemeClr>
+                          </a:solidFill>
+                        </a:rPr>
+                        <a:t> </a:t>
+                      </a:r>
+                      <a:r>
+                        <a:rPr lang="de-DE" sz="1600" dirty="0" err="1">
+                          <a:solidFill>
+                            <a:schemeClr val="tx1">
+                              <a:lumMod val="50000"/>
+                              <a:lumOff val="50000"/>
+                            </a:schemeClr>
+                          </a:solidFill>
+                        </a:rPr>
+                        <a:t>extracts</a:t>
+                      </a:r>
+                      <a:r>
+                        <a:rPr lang="de-DE" sz="1600" dirty="0">
+                          <a:solidFill>
+                            <a:schemeClr val="tx1">
+                              <a:lumMod val="50000"/>
+                              <a:lumOff val="50000"/>
+                            </a:schemeClr>
+                          </a:solidFill>
+                        </a:rPr>
+                        <a:t> </a:t>
+                      </a:r>
+                      <a:r>
+                        <a:rPr lang="de-DE" sz="1600" dirty="0" err="1">
+                          <a:solidFill>
+                            <a:schemeClr val="tx1">
+                              <a:lumMod val="50000"/>
+                              <a:lumOff val="50000"/>
+                            </a:schemeClr>
+                          </a:solidFill>
+                        </a:rPr>
+                        <a:t>heat</a:t>
+                      </a:r>
+                      <a:r>
+                        <a:rPr lang="de-DE" sz="1600" dirty="0">
+                          <a:solidFill>
+                            <a:schemeClr val="tx1">
+                              <a:lumMod val="50000"/>
+                              <a:lumOff val="50000"/>
+                            </a:schemeClr>
+                          </a:solidFill>
+                        </a:rPr>
+                        <a:t> </a:t>
+                      </a:r>
+                      <a:r>
+                        <a:rPr lang="de-DE" sz="1600" dirty="0" err="1">
+                          <a:solidFill>
+                            <a:schemeClr val="tx1">
+                              <a:lumMod val="50000"/>
+                              <a:lumOff val="50000"/>
+                            </a:schemeClr>
+                          </a:solidFill>
+                        </a:rPr>
+                        <a:t>from</a:t>
+                      </a:r>
+                      <a:r>
+                        <a:rPr lang="de-DE" sz="1600" dirty="0">
+                          <a:solidFill>
+                            <a:schemeClr val="tx1">
+                              <a:lumMod val="50000"/>
+                              <a:lumOff val="50000"/>
+                            </a:schemeClr>
+                          </a:solidFill>
+                        </a:rPr>
+                        <a:t> a </a:t>
+                      </a:r>
+                      <a:r>
+                        <a:rPr lang="de-DE" sz="1600" dirty="0" err="1">
+                          <a:solidFill>
+                            <a:schemeClr val="tx1">
+                              <a:lumMod val="50000"/>
+                              <a:lumOff val="50000"/>
+                            </a:schemeClr>
+                          </a:solidFill>
+                        </a:rPr>
+                        <a:t>pond</a:t>
+                      </a:r>
+                      <a:r>
+                        <a:rPr lang="de-DE" sz="1600" dirty="0">
+                          <a:solidFill>
+                            <a:schemeClr val="tx1">
+                              <a:lumMod val="50000"/>
+                              <a:lumOff val="50000"/>
+                            </a:schemeClr>
+                          </a:solidFill>
+                        </a:rPr>
+                        <a:t> </a:t>
+                      </a:r>
+                      <a:r>
+                        <a:rPr lang="de-DE" sz="1600" dirty="0" err="1">
+                          <a:solidFill>
+                            <a:schemeClr val="tx1">
+                              <a:lumMod val="50000"/>
+                              <a:lumOff val="50000"/>
+                            </a:schemeClr>
+                          </a:solidFill>
+                        </a:rPr>
+                        <a:t>or</a:t>
+                      </a:r>
+                      <a:r>
+                        <a:rPr lang="de-DE" sz="1600" dirty="0">
+                          <a:solidFill>
+                            <a:schemeClr val="tx1">
+                              <a:lumMod val="50000"/>
+                              <a:lumOff val="50000"/>
+                            </a:schemeClr>
+                          </a:solidFill>
+                        </a:rPr>
+                        <a:t> </a:t>
+                      </a:r>
+                      <a:r>
+                        <a:rPr lang="de-DE" sz="1600" dirty="0" err="1">
+                          <a:solidFill>
+                            <a:schemeClr val="tx1">
+                              <a:lumMod val="50000"/>
+                              <a:lumOff val="50000"/>
+                            </a:schemeClr>
+                          </a:solidFill>
+                        </a:rPr>
+                        <a:t>other</a:t>
+                      </a:r>
+                      <a:r>
+                        <a:rPr lang="de-DE" sz="1600" dirty="0">
+                          <a:solidFill>
+                            <a:schemeClr val="tx1">
+                              <a:lumMod val="50000"/>
+                              <a:lumOff val="50000"/>
+                            </a:schemeClr>
+                          </a:solidFill>
+                        </a:rPr>
+                        <a:t> source </a:t>
+                      </a:r>
+                      <a:r>
+                        <a:rPr lang="de-DE" sz="1600" dirty="0" err="1">
+                          <a:solidFill>
+                            <a:schemeClr val="tx1">
+                              <a:lumMod val="50000"/>
+                              <a:lumOff val="50000"/>
+                            </a:schemeClr>
+                          </a:solidFill>
+                        </a:rPr>
+                        <a:t>of</a:t>
+                      </a:r>
+                      <a:r>
+                        <a:rPr lang="de-DE" sz="1600" dirty="0">
+                          <a:solidFill>
+                            <a:schemeClr val="tx1">
+                              <a:lumMod val="50000"/>
+                              <a:lumOff val="50000"/>
+                            </a:schemeClr>
+                          </a:solidFill>
+                        </a:rPr>
+                        <a:t> </a:t>
+                      </a:r>
+                      <a:r>
+                        <a:rPr lang="de-DE" sz="1600" dirty="0" err="1">
+                          <a:solidFill>
+                            <a:schemeClr val="tx1">
+                              <a:lumMod val="50000"/>
+                              <a:lumOff val="50000"/>
+                            </a:schemeClr>
+                          </a:solidFill>
+                        </a:rPr>
+                        <a:t>water</a:t>
+                      </a:r>
+                      <a:r>
+                        <a:rPr lang="de-DE" sz="1600" dirty="0">
+                          <a:solidFill>
+                            <a:schemeClr val="tx1">
+                              <a:lumMod val="50000"/>
+                              <a:lumOff val="50000"/>
+                            </a:schemeClr>
+                          </a:solidFill>
+                        </a:rPr>
+                        <a:t>)</a:t>
+                      </a:r>
+                    </a:p>
+                    <a:p>
+                      <a:endParaRPr lang="de-DE" sz="1600" dirty="0">
                         <a:solidFill>
                           <a:schemeClr val="tx1">
                             <a:lumMod val="50000"/>
@@ -4889,322 +6557,14 @@
                   </a:ext>
                 </a:extLst>
               </a:tr>
-              <a:tr h="354179">
+              <a:tr h="239527">
                 <a:tc>
                   <a:txBody>
                     <a:bodyPr/>
                     <a:lstStyle/>
                     <a:p>
                       <a:r>
-                        <a:rPr lang="de-DE" sz="1000">
-                          <a:solidFill>
-                            <a:schemeClr val="tx1">
-                              <a:lumMod val="50000"/>
-                              <a:lumOff val="50000"/>
-                            </a:schemeClr>
-                          </a:solidFill>
-                        </a:rPr>
-                        <a:t>→ usually comprise a single, self-contained outdoor unit</a:t>
-                      </a:r>
-                    </a:p>
-                  </a:txBody>
-                  <a:tcPr marL="50597" marR="50597" marT="25298" marB="25298" anchor="ctr"/>
-                </a:tc>
-                <a:tc>
-                  <a:txBody>
-                    <a:bodyPr/>
-                    <a:lstStyle/>
-                    <a:p>
-                      <a:r>
-                        <a:rPr lang="de-DE" sz="1000">
-                          <a:solidFill>
-                            <a:schemeClr val="tx1">
-                              <a:lumMod val="50000"/>
-                              <a:lumOff val="50000"/>
-                            </a:schemeClr>
-                          </a:solidFill>
-                        </a:rPr>
-                        <a:t>by refrigerant running through a series of buried pipes</a:t>
-                      </a:r>
-                    </a:p>
-                  </a:txBody>
-                  <a:tcPr marL="50597" marR="50597" marT="25298" marB="25298" anchor="ctr"/>
-                </a:tc>
-                <a:tc>
-                  <a:txBody>
-                    <a:bodyPr/>
-                    <a:lstStyle/>
-                    <a:p>
-                      <a:endParaRPr lang="de-DE" sz="1000">
-                        <a:solidFill>
-                          <a:schemeClr val="tx1">
-                            <a:lumMod val="50000"/>
-                            <a:lumOff val="50000"/>
-                          </a:schemeClr>
-                        </a:solidFill>
-                      </a:endParaRPr>
-                    </a:p>
-                  </a:txBody>
-                  <a:tcPr marL="50597" marR="50597" marT="25298" marB="25298" anchor="ctr"/>
-                </a:tc>
-                <a:extLst>
-                  <a:ext uri="{0D108BD9-81ED-4DB2-BD59-A6C34878D82A}">
-                    <a16:rowId xmlns:a16="http://schemas.microsoft.com/office/drawing/2014/main" val="2809833343"/>
-                  </a:ext>
-                </a:extLst>
-              </a:tr>
-              <a:tr h="505969">
-                <a:tc>
-                  <a:txBody>
-                    <a:bodyPr/>
-                    <a:lstStyle/>
-                    <a:p>
-                      <a:r>
-                        <a:rPr lang="de-DE" sz="1000">
-                          <a:solidFill>
-                            <a:schemeClr val="tx1">
-                              <a:lumMod val="50000"/>
-                              <a:lumOff val="50000"/>
-                            </a:schemeClr>
-                          </a:solidFill>
-                        </a:rPr>
-                        <a:t>→ can be laid horizontally and buried in trenches just over a metre deep</a:t>
-                      </a:r>
-                    </a:p>
-                  </a:txBody>
-                  <a:tcPr marL="50597" marR="50597" marT="25298" marB="25298" anchor="ctr"/>
-                </a:tc>
-                <a:tc>
-                  <a:txBody>
-                    <a:bodyPr/>
-                    <a:lstStyle/>
-                    <a:p>
-                      <a:endParaRPr lang="de-DE" sz="1000">
-                        <a:solidFill>
-                          <a:schemeClr val="tx1">
-                            <a:lumMod val="50000"/>
-                            <a:lumOff val="50000"/>
-                          </a:schemeClr>
-                        </a:solidFill>
-                      </a:endParaRPr>
-                    </a:p>
-                  </a:txBody>
-                  <a:tcPr marL="50597" marR="50597" marT="25298" marB="25298" anchor="ctr"/>
-                </a:tc>
-                <a:tc>
-                  <a:txBody>
-                    <a:bodyPr/>
-                    <a:lstStyle/>
-                    <a:p>
-                      <a:endParaRPr lang="de-DE" sz="1000">
-                        <a:solidFill>
-                          <a:schemeClr val="tx1">
-                            <a:lumMod val="50000"/>
-                            <a:lumOff val="50000"/>
-                          </a:schemeClr>
-                        </a:solidFill>
-                      </a:endParaRPr>
-                    </a:p>
-                  </a:txBody>
-                  <a:tcPr marL="50597" marR="50597" marT="25298" marB="25298" anchor="ctr"/>
-                </a:tc>
-                <a:extLst>
-                  <a:ext uri="{0D108BD9-81ED-4DB2-BD59-A6C34878D82A}">
-                    <a16:rowId xmlns:a16="http://schemas.microsoft.com/office/drawing/2014/main" val="1444347454"/>
-                  </a:ext>
-                </a:extLst>
-              </a:tr>
-              <a:tr h="354179">
-                <a:tc>
-                  <a:txBody>
-                    <a:bodyPr/>
-                    <a:lstStyle/>
-                    <a:p>
-                      <a:r>
-                        <a:rPr lang="de-DE" sz="1000">
-                          <a:solidFill>
-                            <a:schemeClr val="tx1">
-                              <a:lumMod val="50000"/>
-                              <a:lumOff val="50000"/>
-                            </a:schemeClr>
-                          </a:solidFill>
-                        </a:rPr>
-                        <a:t>→ can also be laid vertically in boreholes</a:t>
-                      </a:r>
-                    </a:p>
-                  </a:txBody>
-                  <a:tcPr marL="50597" marR="50597" marT="25298" marB="25298" anchor="ctr"/>
-                </a:tc>
-                <a:tc>
-                  <a:txBody>
-                    <a:bodyPr/>
-                    <a:lstStyle/>
-                    <a:p>
-                      <a:endParaRPr lang="de-DE" sz="1000">
-                        <a:solidFill>
-                          <a:schemeClr val="tx1">
-                            <a:lumMod val="50000"/>
-                            <a:lumOff val="50000"/>
-                          </a:schemeClr>
-                        </a:solidFill>
-                      </a:endParaRPr>
-                    </a:p>
-                  </a:txBody>
-                  <a:tcPr marL="50597" marR="50597" marT="25298" marB="25298" anchor="ctr"/>
-                </a:tc>
-                <a:tc>
-                  <a:txBody>
-                    <a:bodyPr/>
-                    <a:lstStyle/>
-                    <a:p>
-                      <a:endParaRPr lang="de-DE" sz="1000">
-                        <a:solidFill>
-                          <a:schemeClr val="tx1">
-                            <a:lumMod val="50000"/>
-                            <a:lumOff val="50000"/>
-                          </a:schemeClr>
-                        </a:solidFill>
-                      </a:endParaRPr>
-                    </a:p>
-                  </a:txBody>
-                  <a:tcPr marL="50597" marR="50597" marT="25298" marB="25298" anchor="ctr"/>
-                </a:tc>
-                <a:extLst>
-                  <a:ext uri="{0D108BD9-81ED-4DB2-BD59-A6C34878D82A}">
-                    <a16:rowId xmlns:a16="http://schemas.microsoft.com/office/drawing/2014/main" val="4116781670"/>
-                  </a:ext>
-                </a:extLst>
-              </a:tr>
-              <a:tr h="505969">
-                <a:tc>
-                  <a:txBody>
-                    <a:bodyPr/>
-                    <a:lstStyle/>
-                    <a:p>
-                      <a:r>
-                        <a:rPr lang="de-DE" sz="1000">
-                          <a:solidFill>
-                            <a:schemeClr val="tx1">
-                              <a:lumMod val="50000"/>
-                              <a:lumOff val="50000"/>
-                            </a:schemeClr>
-                          </a:solidFill>
-                        </a:rPr>
-                        <a:t>a single pipe loop might need around 600 m^2, larger buildings may require a second loop</a:t>
-                      </a:r>
-                    </a:p>
-                  </a:txBody>
-                  <a:tcPr marL="50597" marR="50597" marT="25298" marB="25298" anchor="ctr"/>
-                </a:tc>
-                <a:tc>
-                  <a:txBody>
-                    <a:bodyPr/>
-                    <a:lstStyle/>
-                    <a:p>
-                      <a:endParaRPr lang="de-DE" sz="1000">
-                        <a:solidFill>
-                          <a:schemeClr val="tx1">
-                            <a:lumMod val="50000"/>
-                            <a:lumOff val="50000"/>
-                          </a:schemeClr>
-                        </a:solidFill>
-                      </a:endParaRPr>
-                    </a:p>
-                  </a:txBody>
-                  <a:tcPr marL="50597" marR="50597" marT="25298" marB="25298" anchor="ctr"/>
-                </a:tc>
-                <a:tc>
-                  <a:txBody>
-                    <a:bodyPr/>
-                    <a:lstStyle/>
-                    <a:p>
-                      <a:endParaRPr lang="de-DE" sz="1000">
-                        <a:solidFill>
-                          <a:schemeClr val="tx1">
-                            <a:lumMod val="50000"/>
-                            <a:lumOff val="50000"/>
-                          </a:schemeClr>
-                        </a:solidFill>
-                      </a:endParaRPr>
-                    </a:p>
-                  </a:txBody>
-                  <a:tcPr marL="50597" marR="50597" marT="25298" marB="25298" anchor="ctr"/>
-                </a:tc>
-                <a:extLst>
-                  <a:ext uri="{0D108BD9-81ED-4DB2-BD59-A6C34878D82A}">
-                    <a16:rowId xmlns:a16="http://schemas.microsoft.com/office/drawing/2014/main" val="1784049007"/>
-                  </a:ext>
-                </a:extLst>
-              </a:tr>
-              <a:tr h="505969">
-                <a:tc>
-                  <a:txBody>
-                    <a:bodyPr/>
-                    <a:lstStyle/>
-                    <a:p>
-                      <a:r>
-                        <a:rPr lang="de-DE" sz="1000">
-                          <a:solidFill>
-                            <a:schemeClr val="tx1">
-                              <a:lumMod val="50000"/>
-                              <a:lumOff val="50000"/>
-                            </a:schemeClr>
-                          </a:solidFill>
-                        </a:rPr>
-                        <a:t>(/ open loop system that directly extracts heat from a pond or other source of water)</a:t>
-                      </a:r>
-                    </a:p>
-                  </a:txBody>
-                  <a:tcPr marL="50597" marR="50597" marT="25298" marB="25298" anchor="ctr"/>
-                </a:tc>
-                <a:tc>
-                  <a:txBody>
-                    <a:bodyPr/>
-                    <a:lstStyle/>
-                    <a:p>
-                      <a:endParaRPr lang="de-DE" sz="1000">
-                        <a:solidFill>
-                          <a:schemeClr val="tx1">
-                            <a:lumMod val="50000"/>
-                            <a:lumOff val="50000"/>
-                          </a:schemeClr>
-                        </a:solidFill>
-                      </a:endParaRPr>
-                    </a:p>
-                  </a:txBody>
-                  <a:tcPr marL="50597" marR="50597" marT="25298" marB="25298" anchor="ctr"/>
-                </a:tc>
-                <a:tc>
-                  <a:txBody>
-                    <a:bodyPr/>
-                    <a:lstStyle/>
-                    <a:p>
-                      <a:endParaRPr lang="de-DE" sz="1000">
-                        <a:solidFill>
-                          <a:schemeClr val="tx1">
-                            <a:lumMod val="50000"/>
-                            <a:lumOff val="50000"/>
-                          </a:schemeClr>
-                        </a:solidFill>
-                      </a:endParaRPr>
-                    </a:p>
-                  </a:txBody>
-                  <a:tcPr marL="50597" marR="50597" marT="25298" marB="25298" anchor="ctr"/>
-                </a:tc>
-                <a:extLst>
-                  <a:ext uri="{0D108BD9-81ED-4DB2-BD59-A6C34878D82A}">
-                    <a16:rowId xmlns:a16="http://schemas.microsoft.com/office/drawing/2014/main" val="2081135123"/>
-                  </a:ext>
-                </a:extLst>
-              </a:tr>
-              <a:tr h="202388">
-                <a:tc>
-                  <a:txBody>
-                    <a:bodyPr/>
-                    <a:lstStyle/>
-                    <a:p>
-                      <a:r>
-                        <a:rPr lang="de-DE" sz="1000">
+                        <a:rPr lang="de-DE" sz="1600">
                           <a:solidFill>
                             <a:schemeClr val="tx1">
                               <a:lumMod val="50000"/>
@@ -5224,7 +6584,7 @@
                     <a:lstStyle/>
                     <a:p>
                       <a:r>
-                        <a:rPr lang="de-DE" sz="1000">
+                        <a:rPr lang="de-DE" sz="1600">
                           <a:solidFill>
                             <a:schemeClr val="tx1">
                               <a:lumMod val="50000"/>
@@ -5244,7 +6604,7 @@
                     <a:lstStyle/>
                     <a:p>
                       <a:r>
-                        <a:rPr lang="de-DE" sz="1000">
+                        <a:rPr lang="de-DE" sz="1600" dirty="0">
                           <a:solidFill>
                             <a:schemeClr val="tx1">
                               <a:lumMod val="50000"/>
@@ -5264,14 +6624,14 @@
                   </a:ext>
                 </a:extLst>
               </a:tr>
-              <a:tr h="202388">
+              <a:tr h="239527">
                 <a:tc>
                   <a:txBody>
                     <a:bodyPr/>
                     <a:lstStyle/>
                     <a:p>
                       <a:r>
-                        <a:rPr lang="de-DE" sz="1000">
+                        <a:rPr lang="de-DE" sz="1600">
                           <a:solidFill>
                             <a:schemeClr val="tx1">
                               <a:lumMod val="50000"/>
@@ -5291,7 +6651,7 @@
                     <a:lstStyle/>
                     <a:p>
                       <a:r>
-                        <a:rPr lang="de-DE" sz="1000">
+                        <a:rPr lang="de-DE" sz="1600">
                           <a:solidFill>
                             <a:schemeClr val="tx1">
                               <a:lumMod val="50000"/>
@@ -5311,7 +6671,7 @@
                     <a:lstStyle/>
                     <a:p>
                       <a:r>
-                        <a:rPr lang="de-DE" sz="1000">
+                        <a:rPr lang="de-DE" sz="1600" dirty="0" err="1">
                           <a:solidFill>
                             <a:schemeClr val="tx1">
                               <a:lumMod val="50000"/>
@@ -5319,8 +6679,104 @@
                             </a:schemeClr>
                           </a:solidFill>
                         </a:rPr>
-                        <a:t>relatively stable around the year</a:t>
+                        <a:t>relatively</a:t>
                       </a:r>
+                      <a:r>
+                        <a:rPr lang="de-DE" sz="1600" dirty="0">
+                          <a:solidFill>
+                            <a:schemeClr val="tx1">
+                              <a:lumMod val="50000"/>
+                              <a:lumOff val="50000"/>
+                            </a:schemeClr>
+                          </a:solidFill>
+                        </a:rPr>
+                        <a:t> </a:t>
+                      </a:r>
+                      <a:r>
+                        <a:rPr lang="de-DE" sz="1600" dirty="0" err="1">
+                          <a:solidFill>
+                            <a:schemeClr val="tx1">
+                              <a:lumMod val="50000"/>
+                              <a:lumOff val="50000"/>
+                            </a:schemeClr>
+                          </a:solidFill>
+                        </a:rPr>
+                        <a:t>stable</a:t>
+                      </a:r>
+                      <a:r>
+                        <a:rPr lang="de-DE" sz="1600" dirty="0">
+                          <a:solidFill>
+                            <a:schemeClr val="tx1">
+                              <a:lumMod val="50000"/>
+                              <a:lumOff val="50000"/>
+                            </a:schemeClr>
+                          </a:solidFill>
+                        </a:rPr>
+                        <a:t> </a:t>
+                      </a:r>
+                      <a:r>
+                        <a:rPr lang="de-DE" sz="1600" dirty="0" err="1">
+                          <a:solidFill>
+                            <a:schemeClr val="tx1">
+                              <a:lumMod val="50000"/>
+                              <a:lumOff val="50000"/>
+                            </a:schemeClr>
+                          </a:solidFill>
+                        </a:rPr>
+                        <a:t>around</a:t>
+                      </a:r>
+                      <a:r>
+                        <a:rPr lang="de-DE" sz="1600" dirty="0">
+                          <a:solidFill>
+                            <a:schemeClr val="tx1">
+                              <a:lumMod val="50000"/>
+                              <a:lumOff val="50000"/>
+                            </a:schemeClr>
+                          </a:solidFill>
+                        </a:rPr>
+                        <a:t> </a:t>
+                      </a:r>
+                      <a:r>
+                        <a:rPr lang="de-DE" sz="1600" dirty="0" err="1">
+                          <a:solidFill>
+                            <a:schemeClr val="tx1">
+                              <a:lumMod val="50000"/>
+                              <a:lumOff val="50000"/>
+                            </a:schemeClr>
+                          </a:solidFill>
+                        </a:rPr>
+                        <a:t>the</a:t>
+                      </a:r>
+                      <a:r>
+                        <a:rPr lang="de-DE" sz="1600" dirty="0">
+                          <a:solidFill>
+                            <a:schemeClr val="tx1">
+                              <a:lumMod val="50000"/>
+                              <a:lumOff val="50000"/>
+                            </a:schemeClr>
+                          </a:solidFill>
+                        </a:rPr>
+                        <a:t> </a:t>
+                      </a:r>
+                      <a:r>
+                        <a:rPr lang="de-DE" sz="1600" dirty="0" err="1">
+                          <a:solidFill>
+                            <a:schemeClr val="tx1">
+                              <a:lumMod val="50000"/>
+                              <a:lumOff val="50000"/>
+                            </a:schemeClr>
+                          </a:solidFill>
+                        </a:rPr>
+                        <a:t>year</a:t>
+                      </a:r>
+                      <a:endParaRPr lang="de-DE" sz="1600" dirty="0">
+                        <a:solidFill>
+                          <a:schemeClr val="tx1">
+                            <a:lumMod val="50000"/>
+                            <a:lumOff val="50000"/>
+                          </a:schemeClr>
+                        </a:solidFill>
+                      </a:endParaRPr>
                     </a:p>
                   </a:txBody>
                   <a:tcPr marL="50597" marR="50597" marT="25298" marB="25298" anchor="ctr"/>
@@ -5331,14 +6787,14 @@
                   </a:ext>
                 </a:extLst>
               </a:tr>
-              <a:tr h="354179">
+              <a:tr h="419353">
                 <a:tc>
                   <a:txBody>
                     <a:bodyPr/>
                     <a:lstStyle/>
                     <a:p>
                       <a:r>
-                        <a:rPr lang="de-DE" sz="1000">
+                        <a:rPr lang="de-DE" sz="1600">
                           <a:solidFill>
                             <a:schemeClr val="tx1">
                               <a:lumMod val="50000"/>
@@ -5358,7 +6814,7 @@
                     <a:lstStyle/>
                     <a:p>
                       <a:r>
-                        <a:rPr lang="de-DE" sz="1000">
+                        <a:rPr lang="de-DE" sz="1600">
                           <a:solidFill>
                             <a:schemeClr val="tx1">
                               <a:lumMod val="50000"/>
@@ -5378,7 +6834,7 @@
                     <a:lstStyle/>
                     <a:p>
                       <a:r>
-                        <a:rPr lang="de-DE" sz="1000">
+                        <a:rPr lang="de-DE" sz="1600" dirty="0" err="1">
                           <a:solidFill>
                             <a:schemeClr val="tx1">
                               <a:lumMod val="50000"/>
@@ -5386,59 +6842,75 @@
                             </a:schemeClr>
                           </a:solidFill>
                         </a:rPr>
-                        <a:t>generally higher, especially in winter</a:t>
+                        <a:t>generally</a:t>
                       </a:r>
-                    </a:p>
-                  </a:txBody>
-                  <a:tcPr marL="50597" marR="50597" marT="25298" marB="25298" anchor="ctr"/>
-                </a:tc>
-                <a:extLst>
-                  <a:ext uri="{0D108BD9-81ED-4DB2-BD59-A6C34878D82A}">
-                    <a16:rowId xmlns:a16="http://schemas.microsoft.com/office/drawing/2014/main" val="158859923"/>
-                  </a:ext>
-                </a:extLst>
-              </a:tr>
-              <a:tr h="202388">
-                <a:tc>
-                  <a:txBody>
-                    <a:bodyPr/>
-                    <a:lstStyle/>
-                    <a:p>
-                      <a:endParaRPr lang="de-DE" sz="1000">
-                        <a:solidFill>
-                          <a:schemeClr val="tx1">
-                            <a:lumMod val="50000"/>
-                            <a:lumOff val="50000"/>
-                          </a:schemeClr>
-                        </a:solidFill>
-                      </a:endParaRPr>
-                    </a:p>
-                  </a:txBody>
-                  <a:tcPr marL="50597" marR="50597" marT="25298" marB="25298" anchor="ctr"/>
-                </a:tc>
-                <a:tc>
-                  <a:txBody>
-                    <a:bodyPr/>
-                    <a:lstStyle/>
-                    <a:p>
-                      <a:endParaRPr lang="de-DE" sz="1000">
-                        <a:solidFill>
-                          <a:schemeClr val="tx1">
-                            <a:lumMod val="50000"/>
-                            <a:lumOff val="50000"/>
-                          </a:schemeClr>
-                        </a:solidFill>
-                      </a:endParaRPr>
-                    </a:p>
-                  </a:txBody>
-                  <a:tcPr marL="50597" marR="50597" marT="25298" marB="25298" anchor="ctr"/>
-                </a:tc>
-                <a:tc>
-                  <a:txBody>
-                    <a:bodyPr/>
-                    <a:lstStyle/>
-                    <a:p>
-                      <a:endParaRPr lang="de-DE" sz="1000">
+                      <a:r>
+                        <a:rPr lang="de-DE" sz="1600" dirty="0">
+                          <a:solidFill>
+                            <a:schemeClr val="tx1">
+                              <a:lumMod val="50000"/>
+                              <a:lumOff val="50000"/>
+                            </a:schemeClr>
+                          </a:solidFill>
+                        </a:rPr>
+                        <a:t> </a:t>
+                      </a:r>
+                      <a:r>
+                        <a:rPr lang="de-DE" sz="1600" dirty="0" err="1">
+                          <a:solidFill>
+                            <a:schemeClr val="tx1">
+                              <a:lumMod val="50000"/>
+                              <a:lumOff val="50000"/>
+                            </a:schemeClr>
+                          </a:solidFill>
+                        </a:rPr>
+                        <a:t>higher</a:t>
+                      </a:r>
+                      <a:r>
+                        <a:rPr lang="de-DE" sz="1600" dirty="0">
+                          <a:solidFill>
+                            <a:schemeClr val="tx1">
+                              <a:lumMod val="50000"/>
+                              <a:lumOff val="50000"/>
+                            </a:schemeClr>
+                          </a:solidFill>
+                        </a:rPr>
+                        <a:t>, </a:t>
+                      </a:r>
+                      <a:r>
+                        <a:rPr lang="de-DE" sz="1600" dirty="0" err="1">
+                          <a:solidFill>
+                            <a:schemeClr val="tx1">
+                              <a:lumMod val="50000"/>
+                              <a:lumOff val="50000"/>
+                            </a:schemeClr>
+                          </a:solidFill>
+                        </a:rPr>
+                        <a:t>especially</a:t>
+                      </a:r>
+                      <a:r>
+                        <a:rPr lang="de-DE" sz="1600" dirty="0">
+                          <a:solidFill>
+                            <a:schemeClr val="tx1">
+                              <a:lumMod val="50000"/>
+                              <a:lumOff val="50000"/>
+                            </a:schemeClr>
+                          </a:solidFill>
+                        </a:rPr>
+                        <a:t> in </a:t>
+                      </a:r>
+                      <a:r>
+                        <a:rPr lang="de-DE" sz="1600" dirty="0" err="1">
+                          <a:solidFill>
+                            <a:schemeClr val="tx1">
+                              <a:lumMod val="50000"/>
+                              <a:lumOff val="50000"/>
+                            </a:schemeClr>
+                          </a:solidFill>
+                        </a:rPr>
+                        <a:t>winter</a:t>
+                      </a:r>
+                      <a:endParaRPr lang="de-DE" sz="1600" dirty="0">
                         <a:solidFill>
                           <a:schemeClr val="tx1">
                             <a:lumMod val="50000"/>
@@ -5452,123 +6924,7 @@
                 </a:tc>
                 <a:extLst>
                   <a:ext uri="{0D108BD9-81ED-4DB2-BD59-A6C34878D82A}">
-                    <a16:rowId xmlns:a16="http://schemas.microsoft.com/office/drawing/2014/main" val="3503766844"/>
-                  </a:ext>
-                </a:extLst>
-              </a:tr>
-              <a:tr h="202388">
-                <a:tc>
-                  <a:txBody>
-                    <a:bodyPr/>
-                    <a:lstStyle/>
-                    <a:p>
-                      <a:endParaRPr lang="de-DE" sz="1000">
-                        <a:solidFill>
-                          <a:schemeClr val="tx1">
-                            <a:lumMod val="50000"/>
-                            <a:lumOff val="50000"/>
-                          </a:schemeClr>
-                        </a:solidFill>
-                      </a:endParaRPr>
-                    </a:p>
-                  </a:txBody>
-                  <a:tcPr marL="50597" marR="50597" marT="25298" marB="25298" anchor="ctr"/>
-                </a:tc>
-                <a:tc>
-                  <a:txBody>
-                    <a:bodyPr/>
-                    <a:lstStyle/>
-                    <a:p>
-                      <a:endParaRPr lang="de-DE" sz="1000">
-                        <a:solidFill>
-                          <a:schemeClr val="tx1">
-                            <a:lumMod val="50000"/>
-                            <a:lumOff val="50000"/>
-                          </a:schemeClr>
-                        </a:solidFill>
-                      </a:endParaRPr>
-                    </a:p>
-                  </a:txBody>
-                  <a:tcPr marL="50597" marR="50597" marT="25298" marB="25298" anchor="ctr"/>
-                </a:tc>
-                <a:tc>
-                  <a:txBody>
-                    <a:bodyPr/>
-                    <a:lstStyle/>
-                    <a:p>
-                      <a:endParaRPr lang="de-DE" sz="1000">
-                        <a:solidFill>
-                          <a:schemeClr val="tx1">
-                            <a:lumMod val="50000"/>
-                            <a:lumOff val="50000"/>
-                          </a:schemeClr>
-                        </a:solidFill>
-                      </a:endParaRPr>
-                    </a:p>
-                  </a:txBody>
-                  <a:tcPr marL="50597" marR="50597" marT="25298" marB="25298" anchor="ctr"/>
-                </a:tc>
-                <a:extLst>
-                  <a:ext uri="{0D108BD9-81ED-4DB2-BD59-A6C34878D82A}">
-                    <a16:rowId xmlns:a16="http://schemas.microsoft.com/office/drawing/2014/main" val="3835188853"/>
-                  </a:ext>
-                </a:extLst>
-              </a:tr>
-              <a:tr h="202388">
-                <a:tc>
-                  <a:txBody>
-                    <a:bodyPr/>
-                    <a:lstStyle/>
-                    <a:p>
-                      <a:endParaRPr lang="de-DE" sz="1000">
-                        <a:solidFill>
-                          <a:schemeClr val="tx1">
-                            <a:lumMod val="50000"/>
-                            <a:lumOff val="50000"/>
-                          </a:schemeClr>
-                        </a:solidFill>
-                      </a:endParaRPr>
-                    </a:p>
-                  </a:txBody>
-                  <a:tcPr marL="50597" marR="50597" marT="25298" marB="25298" anchor="ctr"/>
-                </a:tc>
-                <a:tc>
-                  <a:txBody>
-                    <a:bodyPr/>
-                    <a:lstStyle/>
-                    <a:p>
-                      <a:endParaRPr lang="de-DE" sz="1000">
-                        <a:solidFill>
-                          <a:schemeClr val="tx1">
-                            <a:lumMod val="50000"/>
-                            <a:lumOff val="50000"/>
-                          </a:schemeClr>
-                        </a:solidFill>
-                      </a:endParaRPr>
-                    </a:p>
-                  </a:txBody>
-                  <a:tcPr marL="50597" marR="50597" marT="25298" marB="25298" anchor="ctr"/>
-                </a:tc>
-                <a:tc>
-                  <a:txBody>
-                    <a:bodyPr/>
-                    <a:lstStyle/>
-                    <a:p>
-                      <a:endParaRPr lang="de-DE" sz="1000" dirty="0">
-                        <a:solidFill>
-                          <a:schemeClr val="tx1">
-                            <a:lumMod val="50000"/>
-                            <a:lumOff val="50000"/>
-                          </a:schemeClr>
-                        </a:solidFill>
-                      </a:endParaRPr>
-                    </a:p>
-                  </a:txBody>
-                  <a:tcPr marL="50597" marR="50597" marT="25298" marB="25298" anchor="ctr"/>
-                </a:tc>
-                <a:extLst>
-                  <a:ext uri="{0D108BD9-81ED-4DB2-BD59-A6C34878D82A}">
-                    <a16:rowId xmlns:a16="http://schemas.microsoft.com/office/drawing/2014/main" val="2324735977"/>
+                    <a16:rowId xmlns:a16="http://schemas.microsoft.com/office/drawing/2014/main" val="158859923"/>
                   </a:ext>
                 </a:extLst>
               </a:tr>

</xml_diff>

<commit_message>
added suggestions for house types and weather scenarios
</commit_message>
<xml_diff>
--- a/presentation/heat.pptx
+++ b/presentation/heat.pptx
@@ -11036,6 +11036,151 @@
               <a:t>. </a:t>
             </a:r>
           </a:p>
+          <a:p>
+            <a:r>
+              <a:rPr lang="de-DE" dirty="0">
+                <a:solidFill>
+                  <a:schemeClr val="tx1">
+                    <a:lumMod val="50000"/>
+                    <a:lumOff val="50000"/>
+                  </a:schemeClr>
+                </a:solidFill>
+              </a:rPr>
+              <a:t>Suggestion: Maybe find </a:t>
+            </a:r>
+            <a:r>
+              <a:rPr lang="de-DE" dirty="0" err="1">
+                <a:solidFill>
+                  <a:schemeClr val="tx1">
+                    <a:lumMod val="50000"/>
+                    <a:lumOff val="50000"/>
+                  </a:schemeClr>
+                </a:solidFill>
+              </a:rPr>
+              <a:t>data</a:t>
+            </a:r>
+            <a:r>
+              <a:rPr lang="de-DE" dirty="0">
+                <a:solidFill>
+                  <a:schemeClr val="tx1">
+                    <a:lumMod val="50000"/>
+                    <a:lumOff val="50000"/>
+                  </a:schemeClr>
+                </a:solidFill>
+              </a:rPr>
+              <a:t> </a:t>
+            </a:r>
+            <a:r>
+              <a:rPr lang="de-DE" dirty="0" err="1">
+                <a:solidFill>
+                  <a:schemeClr val="tx1">
+                    <a:lumMod val="50000"/>
+                    <a:lumOff val="50000"/>
+                  </a:schemeClr>
+                </a:solidFill>
+              </a:rPr>
+              <a:t>for</a:t>
+            </a:r>
+            <a:r>
+              <a:rPr lang="de-DE" dirty="0">
+                <a:solidFill>
+                  <a:schemeClr val="tx1">
+                    <a:lumMod val="50000"/>
+                    <a:lumOff val="50000"/>
+                  </a:schemeClr>
+                </a:solidFill>
+              </a:rPr>
+              <a:t> </a:t>
+            </a:r>
+            <a:r>
+              <a:rPr lang="de-DE" dirty="0" err="1">
+                <a:solidFill>
+                  <a:schemeClr val="tx1">
+                    <a:lumMod val="50000"/>
+                    <a:lumOff val="50000"/>
+                  </a:schemeClr>
+                </a:solidFill>
+              </a:rPr>
+              <a:t>cold</a:t>
+            </a:r>
+            <a:r>
+              <a:rPr lang="de-DE" dirty="0">
+                <a:solidFill>
+                  <a:schemeClr val="tx1">
+                    <a:lumMod val="50000"/>
+                    <a:lumOff val="50000"/>
+                  </a:schemeClr>
+                </a:solidFill>
+              </a:rPr>
+              <a:t> and warm </a:t>
+            </a:r>
+            <a:r>
+              <a:rPr lang="de-DE" dirty="0" err="1">
+                <a:solidFill>
+                  <a:schemeClr val="tx1">
+                    <a:lumMod val="50000"/>
+                    <a:lumOff val="50000"/>
+                  </a:schemeClr>
+                </a:solidFill>
+              </a:rPr>
+              <a:t>winter</a:t>
+            </a:r>
+            <a:r>
+              <a:rPr lang="de-DE" dirty="0">
+                <a:solidFill>
+                  <a:schemeClr val="tx1">
+                    <a:lumMod val="50000"/>
+                    <a:lumOff val="50000"/>
+                  </a:schemeClr>
+                </a:solidFill>
+              </a:rPr>
+              <a:t> / </a:t>
+            </a:r>
+            <a:r>
+              <a:rPr lang="de-DE" dirty="0" err="1">
+                <a:solidFill>
+                  <a:schemeClr val="tx1">
+                    <a:lumMod val="50000"/>
+                    <a:lumOff val="50000"/>
+                  </a:schemeClr>
+                </a:solidFill>
+              </a:rPr>
+              <a:t>heating</a:t>
+            </a:r>
+            <a:r>
+              <a:rPr lang="de-DE" dirty="0">
+                <a:solidFill>
+                  <a:schemeClr val="tx1">
+                    <a:lumMod val="50000"/>
+                    <a:lumOff val="50000"/>
+                  </a:schemeClr>
+                </a:solidFill>
+              </a:rPr>
+              <a:t> </a:t>
+            </a:r>
+            <a:r>
+              <a:rPr lang="de-DE" dirty="0" err="1">
+                <a:solidFill>
+                  <a:schemeClr val="tx1">
+                    <a:lumMod val="50000"/>
+                    <a:lumOff val="50000"/>
+                  </a:schemeClr>
+                </a:solidFill>
+              </a:rPr>
+              <a:t>period</a:t>
+            </a:r>
+            <a:r>
+              <a:rPr lang="de-DE" dirty="0">
+                <a:solidFill>
+                  <a:schemeClr val="tx1">
+                    <a:lumMod val="50000"/>
+                    <a:lumOff val="50000"/>
+                  </a:schemeClr>
+                </a:solidFill>
+              </a:rPr>
+              <a:t>?</a:t>
+            </a:r>
+          </a:p>
         </p:txBody>
       </p:sp>
     </p:spTree>
@@ -20678,6 +20823,9 @@
           <a:bodyPr/>
           <a:lstStyle/>
           <a:p>
+            <a:pPr marL="0" indent="0">
+              <a:buNone/>
+            </a:pPr>
             <a:r>
               <a:rPr lang="de-DE" dirty="0" err="1"/>
               <a:t>Based</a:t>
@@ -20742,6 +20890,351 @@
               <a:rPr lang="de-DE" dirty="0"/>
               <a:t>:</a:t>
             </a:r>
+          </a:p>
+          <a:p>
+            <a:pPr marL="0" indent="0">
+              <a:buNone/>
+            </a:pPr>
+            <a:r>
+              <a:rPr lang="de-DE" dirty="0" err="1">
+                <a:solidFill>
+                  <a:schemeClr val="tx1">
+                    <a:lumMod val="50000"/>
+                    <a:lumOff val="50000"/>
+                  </a:schemeClr>
+                </a:solidFill>
+              </a:rPr>
+              <a:t>My</a:t>
+            </a:r>
+            <a:r>
+              <a:rPr lang="de-DE" dirty="0">
+                <a:solidFill>
+                  <a:schemeClr val="tx1">
+                    <a:lumMod val="50000"/>
+                    <a:lumOff val="50000"/>
+                  </a:schemeClr>
+                </a:solidFill>
+              </a:rPr>
+              <a:t> </a:t>
+            </a:r>
+            <a:r>
+              <a:rPr lang="de-DE" dirty="0" err="1">
+                <a:solidFill>
+                  <a:schemeClr val="tx1">
+                    <a:lumMod val="50000"/>
+                    <a:lumOff val="50000"/>
+                  </a:schemeClr>
+                </a:solidFill>
+              </a:rPr>
+              <a:t>suggestion</a:t>
+            </a:r>
+            <a:r>
+              <a:rPr lang="de-DE" dirty="0">
+                <a:solidFill>
+                  <a:schemeClr val="tx1">
+                    <a:lumMod val="50000"/>
+                    <a:lumOff val="50000"/>
+                  </a:schemeClr>
+                </a:solidFill>
+              </a:rPr>
+              <a:t>: </a:t>
+            </a:r>
+          </a:p>
+          <a:p>
+            <a:pPr>
+              <a:buFont typeface="Arial" panose="020B0604020202020204" pitchFamily="34" charset="0"/>
+              <a:buChar char="•"/>
+            </a:pPr>
+            <a:r>
+              <a:rPr lang="de-DE" dirty="0">
+                <a:solidFill>
+                  <a:schemeClr val="tx1">
+                    <a:lumMod val="50000"/>
+                    <a:lumOff val="50000"/>
+                  </a:schemeClr>
+                </a:solidFill>
+              </a:rPr>
+              <a:t>25% </a:t>
+            </a:r>
+            <a:r>
+              <a:rPr lang="de-DE" dirty="0" err="1">
+                <a:solidFill>
+                  <a:schemeClr val="tx1">
+                    <a:lumMod val="50000"/>
+                    <a:lumOff val="50000"/>
+                  </a:schemeClr>
+                </a:solidFill>
+              </a:rPr>
+              <a:t>before</a:t>
+            </a:r>
+            <a:r>
+              <a:rPr lang="de-DE" dirty="0">
+                <a:solidFill>
+                  <a:schemeClr val="tx1">
+                    <a:lumMod val="50000"/>
+                    <a:lumOff val="50000"/>
+                  </a:schemeClr>
+                </a:solidFill>
+              </a:rPr>
+              <a:t> 1946 (Dena)→ Tabula </a:t>
+            </a:r>
+            <a:r>
+              <a:rPr lang="de-DE" dirty="0" err="1">
+                <a:solidFill>
+                  <a:schemeClr val="tx1">
+                    <a:lumMod val="50000"/>
+                    <a:lumOff val="50000"/>
+                  </a:schemeClr>
+                </a:solidFill>
+              </a:rPr>
+              <a:t>data</a:t>
+            </a:r>
+            <a:r>
+              <a:rPr lang="de-DE" dirty="0">
+                <a:solidFill>
+                  <a:schemeClr val="tx1">
+                    <a:lumMod val="50000"/>
+                    <a:lumOff val="50000"/>
+                  </a:schemeClr>
+                </a:solidFill>
+              </a:rPr>
+              <a:t> </a:t>
+            </a:r>
+            <a:r>
+              <a:rPr lang="de-DE" dirty="0" err="1">
+                <a:solidFill>
+                  <a:schemeClr val="tx1">
+                    <a:lumMod val="50000"/>
+                    <a:lumOff val="50000"/>
+                  </a:schemeClr>
+                </a:solidFill>
+              </a:rPr>
+              <a:t>for</a:t>
+            </a:r>
+            <a:r>
+              <a:rPr lang="de-DE" dirty="0">
+                <a:solidFill>
+                  <a:schemeClr val="tx1">
+                    <a:lumMod val="50000"/>
+                    <a:lumOff val="50000"/>
+                  </a:schemeClr>
+                </a:solidFill>
+              </a:rPr>
+              <a:t> 1919 - 1948</a:t>
+            </a:r>
+          </a:p>
+          <a:p>
+            <a:pPr>
+              <a:buFont typeface="Arial" panose="020B0604020202020204" pitchFamily="34" charset="0"/>
+              <a:buChar char="•"/>
+            </a:pPr>
+            <a:r>
+              <a:rPr lang="de-DE" dirty="0">
+                <a:solidFill>
+                  <a:schemeClr val="tx1">
+                    <a:lumMod val="50000"/>
+                    <a:lumOff val="50000"/>
+                  </a:schemeClr>
+                </a:solidFill>
+              </a:rPr>
+              <a:t>35% </a:t>
+            </a:r>
+            <a:r>
+              <a:rPr lang="de-DE" dirty="0" err="1">
+                <a:solidFill>
+                  <a:schemeClr val="tx1">
+                    <a:lumMod val="50000"/>
+                    <a:lumOff val="50000"/>
+                  </a:schemeClr>
+                </a:solidFill>
+              </a:rPr>
+              <a:t>before</a:t>
+            </a:r>
+            <a:r>
+              <a:rPr lang="de-DE" dirty="0">
+                <a:solidFill>
+                  <a:schemeClr val="tx1">
+                    <a:lumMod val="50000"/>
+                    <a:lumOff val="50000"/>
+                  </a:schemeClr>
+                </a:solidFill>
+              </a:rPr>
+              <a:t> 1977 (Dena)→ Tabula </a:t>
+            </a:r>
+            <a:r>
+              <a:rPr lang="de-DE" dirty="0" err="1">
+                <a:solidFill>
+                  <a:schemeClr val="tx1">
+                    <a:lumMod val="50000"/>
+                    <a:lumOff val="50000"/>
+                  </a:schemeClr>
+                </a:solidFill>
+              </a:rPr>
+              <a:t>data</a:t>
+            </a:r>
+            <a:r>
+              <a:rPr lang="de-DE" dirty="0">
+                <a:solidFill>
+                  <a:schemeClr val="tx1">
+                    <a:lumMod val="50000"/>
+                    <a:lumOff val="50000"/>
+                  </a:schemeClr>
+                </a:solidFill>
+              </a:rPr>
+              <a:t> </a:t>
+            </a:r>
+            <a:r>
+              <a:rPr lang="de-DE" dirty="0" err="1">
+                <a:solidFill>
+                  <a:schemeClr val="tx1">
+                    <a:lumMod val="50000"/>
+                    <a:lumOff val="50000"/>
+                  </a:schemeClr>
+                </a:solidFill>
+              </a:rPr>
+              <a:t>for</a:t>
+            </a:r>
+            <a:r>
+              <a:rPr lang="de-DE" dirty="0">
+                <a:solidFill>
+                  <a:schemeClr val="tx1">
+                    <a:lumMod val="50000"/>
+                    <a:lumOff val="50000"/>
+                  </a:schemeClr>
+                </a:solidFill>
+              </a:rPr>
+              <a:t> 1958 - 1968</a:t>
+            </a:r>
+          </a:p>
+          <a:p>
+            <a:pPr>
+              <a:buFont typeface="Arial" panose="020B0604020202020204" pitchFamily="34" charset="0"/>
+              <a:buChar char="•"/>
+            </a:pPr>
+            <a:r>
+              <a:rPr lang="de-DE" dirty="0">
+                <a:solidFill>
+                  <a:schemeClr val="tx1">
+                    <a:lumMod val="50000"/>
+                    <a:lumOff val="50000"/>
+                  </a:schemeClr>
+                </a:solidFill>
+              </a:rPr>
+              <a:t>and </a:t>
+            </a:r>
+            <a:r>
+              <a:rPr lang="de-DE" dirty="0" err="1">
+                <a:solidFill>
+                  <a:schemeClr val="tx1">
+                    <a:lumMod val="50000"/>
+                    <a:lumOff val="50000"/>
+                  </a:schemeClr>
+                </a:solidFill>
+              </a:rPr>
+              <a:t>of</a:t>
+            </a:r>
+            <a:r>
+              <a:rPr lang="de-DE" dirty="0">
+                <a:solidFill>
+                  <a:schemeClr val="tx1">
+                    <a:lumMod val="50000"/>
+                    <a:lumOff val="50000"/>
+                  </a:schemeClr>
+                </a:solidFill>
+              </a:rPr>
+              <a:t> </a:t>
+            </a:r>
+            <a:r>
+              <a:rPr lang="de-DE" dirty="0" err="1">
+                <a:solidFill>
+                  <a:schemeClr val="tx1">
+                    <a:lumMod val="50000"/>
+                    <a:lumOff val="50000"/>
+                  </a:schemeClr>
+                </a:solidFill>
+              </a:rPr>
+              <a:t>course</a:t>
+            </a:r>
+            <a:r>
+              <a:rPr lang="de-DE" dirty="0">
+                <a:solidFill>
+                  <a:schemeClr val="tx1">
+                    <a:lumMod val="50000"/>
+                    <a:lumOff val="50000"/>
+                  </a:schemeClr>
+                </a:solidFill>
+              </a:rPr>
+              <a:t> a modern </a:t>
+            </a:r>
+            <a:r>
+              <a:rPr lang="de-DE" dirty="0" err="1">
+                <a:solidFill>
+                  <a:schemeClr val="tx1">
+                    <a:lumMod val="50000"/>
+                    <a:lumOff val="50000"/>
+                  </a:schemeClr>
+                </a:solidFill>
+              </a:rPr>
+              <a:t>one</a:t>
+            </a:r>
+            <a:r>
+              <a:rPr lang="de-DE" dirty="0">
+                <a:solidFill>
+                  <a:schemeClr val="tx1">
+                    <a:lumMod val="50000"/>
+                    <a:lumOff val="50000"/>
+                  </a:schemeClr>
+                </a:solidFill>
+              </a:rPr>
+              <a:t> → Tabula </a:t>
+            </a:r>
+            <a:r>
+              <a:rPr lang="de-DE" dirty="0" err="1">
+                <a:solidFill>
+                  <a:schemeClr val="tx1">
+                    <a:lumMod val="50000"/>
+                    <a:lumOff val="50000"/>
+                  </a:schemeClr>
+                </a:solidFill>
+              </a:rPr>
+              <a:t>data</a:t>
+            </a:r>
+            <a:r>
+              <a:rPr lang="de-DE" dirty="0">
+                <a:solidFill>
+                  <a:schemeClr val="tx1">
+                    <a:lumMod val="50000"/>
+                    <a:lumOff val="50000"/>
+                  </a:schemeClr>
+                </a:solidFill>
+              </a:rPr>
+              <a:t> </a:t>
+            </a:r>
+            <a:r>
+              <a:rPr lang="de-DE" dirty="0" err="1">
+                <a:solidFill>
+                  <a:schemeClr val="tx1">
+                    <a:lumMod val="50000"/>
+                    <a:lumOff val="50000"/>
+                  </a:schemeClr>
+                </a:solidFill>
+              </a:rPr>
+              <a:t>for</a:t>
+            </a:r>
+            <a:r>
+              <a:rPr lang="de-DE" dirty="0">
+                <a:solidFill>
+                  <a:schemeClr val="tx1">
+                    <a:lumMod val="50000"/>
+                    <a:lumOff val="50000"/>
+                  </a:schemeClr>
+                </a:solidFill>
+              </a:rPr>
+              <a:t> 2016</a:t>
+            </a:r>
+          </a:p>
+          <a:p>
+            <a:endParaRPr lang="de-DE" dirty="0"/>
           </a:p>
         </p:txBody>
       </p:sp>

</xml_diff>

<commit_message>
test run of 1919-1948 house
</commit_message>
<xml_diff>
--- a/presentation/heat.pptx
+++ b/presentation/heat.pptx
@@ -5,7 +5,7 @@
     <p:sldMasterId id="2147483648" r:id="rId1"/>
   </p:sldMasterIdLst>
   <p:notesMasterIdLst>
-    <p:notesMasterId r:id="rId27"/>
+    <p:notesMasterId r:id="rId28"/>
   </p:notesMasterIdLst>
   <p:sldIdLst>
     <p:sldId id="256" r:id="rId2"/>
@@ -26,13 +26,14 @@
     <p:sldId id="260" r:id="rId17"/>
     <p:sldId id="261" r:id="rId18"/>
     <p:sldId id="262" r:id="rId19"/>
-    <p:sldId id="266" r:id="rId20"/>
-    <p:sldId id="267" r:id="rId21"/>
-    <p:sldId id="268" r:id="rId22"/>
-    <p:sldId id="263" r:id="rId23"/>
-    <p:sldId id="264" r:id="rId24"/>
-    <p:sldId id="269" r:id="rId25"/>
-    <p:sldId id="265" r:id="rId26"/>
+    <p:sldId id="281" r:id="rId20"/>
+    <p:sldId id="266" r:id="rId21"/>
+    <p:sldId id="267" r:id="rId22"/>
+    <p:sldId id="268" r:id="rId23"/>
+    <p:sldId id="263" r:id="rId24"/>
+    <p:sldId id="264" r:id="rId25"/>
+    <p:sldId id="269" r:id="rId26"/>
+    <p:sldId id="265" r:id="rId27"/>
   </p:sldIdLst>
   <p:sldSz cx="12192000" cy="6858000"/>
   <p:notesSz cx="6858000" cy="9144000"/>
@@ -221,7 +222,7 @@
           <a:p>
             <a:fld id="{286B95F3-0557-304F-A425-74B74408DC2F}" type="datetimeFigureOut">
               <a:rPr lang="de-DE" smtClean="0"/>
-              <a:t>19.06.25</a:t>
+              <a:t>21.06.2025</a:t>
             </a:fld>
             <a:endParaRPr lang="de-DE"/>
           </a:p>
@@ -379,7 +380,7 @@
           <a:p>
             <a:fld id="{B19B2BFA-58D9-ED43-8040-25821433DD5C}" type="slidenum">
               <a:rPr lang="de-DE" smtClean="0"/>
-              <a:t>‹Nr.›</a:t>
+              <a:t>‹#›</a:t>
             </a:fld>
             <a:endParaRPr lang="de-DE"/>
           </a:p>
@@ -1238,7 +1239,7 @@
           <a:p>
             <a:fld id="{04AD105E-1681-4427-A2A6-BE19936FDE9F}" type="datetimeFigureOut">
               <a:rPr lang="de-DE" smtClean="0"/>
-              <a:t>19.06.25</a:t>
+              <a:t>21.06.2025</a:t>
             </a:fld>
             <a:endParaRPr lang="de-DE"/>
           </a:p>
@@ -1292,7 +1293,7 @@
           <a:p>
             <a:fld id="{F2D7D816-B1EE-490B-A103-4A569B3CE5B5}" type="slidenum">
               <a:rPr lang="de-DE" smtClean="0"/>
-              <a:t>‹Nr.›</a:t>
+              <a:t>‹#›</a:t>
             </a:fld>
             <a:endParaRPr lang="de-DE"/>
           </a:p>
@@ -1436,7 +1437,7 @@
           <a:p>
             <a:fld id="{04AD105E-1681-4427-A2A6-BE19936FDE9F}" type="datetimeFigureOut">
               <a:rPr lang="de-DE" smtClean="0"/>
-              <a:t>19.06.25</a:t>
+              <a:t>21.06.2025</a:t>
             </a:fld>
             <a:endParaRPr lang="de-DE"/>
           </a:p>
@@ -1490,7 +1491,7 @@
           <a:p>
             <a:fld id="{F2D7D816-B1EE-490B-A103-4A569B3CE5B5}" type="slidenum">
               <a:rPr lang="de-DE" smtClean="0"/>
-              <a:t>‹Nr.›</a:t>
+              <a:t>‹#›</a:t>
             </a:fld>
             <a:endParaRPr lang="de-DE"/>
           </a:p>
@@ -1644,7 +1645,7 @@
           <a:p>
             <a:fld id="{04AD105E-1681-4427-A2A6-BE19936FDE9F}" type="datetimeFigureOut">
               <a:rPr lang="de-DE" smtClean="0"/>
-              <a:t>19.06.25</a:t>
+              <a:t>21.06.2025</a:t>
             </a:fld>
             <a:endParaRPr lang="de-DE"/>
           </a:p>
@@ -1698,7 +1699,7 @@
           <a:p>
             <a:fld id="{F2D7D816-B1EE-490B-A103-4A569B3CE5B5}" type="slidenum">
               <a:rPr lang="de-DE" smtClean="0"/>
-              <a:t>‹Nr.›</a:t>
+              <a:t>‹#›</a:t>
             </a:fld>
             <a:endParaRPr lang="de-DE"/>
           </a:p>
@@ -1842,7 +1843,7 @@
           <a:p>
             <a:fld id="{04AD105E-1681-4427-A2A6-BE19936FDE9F}" type="datetimeFigureOut">
               <a:rPr lang="de-DE" smtClean="0"/>
-              <a:t>19.06.25</a:t>
+              <a:t>21.06.2025</a:t>
             </a:fld>
             <a:endParaRPr lang="de-DE"/>
           </a:p>
@@ -1896,7 +1897,7 @@
           <a:p>
             <a:fld id="{F2D7D816-B1EE-490B-A103-4A569B3CE5B5}" type="slidenum">
               <a:rPr lang="de-DE" smtClean="0"/>
-              <a:t>‹Nr.›</a:t>
+              <a:t>‹#›</a:t>
             </a:fld>
             <a:endParaRPr lang="de-DE"/>
           </a:p>
@@ -2117,7 +2118,7 @@
           <a:p>
             <a:fld id="{04AD105E-1681-4427-A2A6-BE19936FDE9F}" type="datetimeFigureOut">
               <a:rPr lang="de-DE" smtClean="0"/>
-              <a:t>19.06.25</a:t>
+              <a:t>21.06.2025</a:t>
             </a:fld>
             <a:endParaRPr lang="de-DE"/>
           </a:p>
@@ -2171,7 +2172,7 @@
           <a:p>
             <a:fld id="{F2D7D816-B1EE-490B-A103-4A569B3CE5B5}" type="slidenum">
               <a:rPr lang="de-DE" smtClean="0"/>
-              <a:t>‹Nr.›</a:t>
+              <a:t>‹#›</a:t>
             </a:fld>
             <a:endParaRPr lang="de-DE"/>
           </a:p>
@@ -2382,7 +2383,7 @@
           <a:p>
             <a:fld id="{04AD105E-1681-4427-A2A6-BE19936FDE9F}" type="datetimeFigureOut">
               <a:rPr lang="de-DE" smtClean="0"/>
-              <a:t>19.06.25</a:t>
+              <a:t>21.06.2025</a:t>
             </a:fld>
             <a:endParaRPr lang="de-DE"/>
           </a:p>
@@ -2436,7 +2437,7 @@
           <a:p>
             <a:fld id="{F2D7D816-B1EE-490B-A103-4A569B3CE5B5}" type="slidenum">
               <a:rPr lang="de-DE" smtClean="0"/>
-              <a:t>‹Nr.›</a:t>
+              <a:t>‹#›</a:t>
             </a:fld>
             <a:endParaRPr lang="de-DE"/>
           </a:p>
@@ -2794,7 +2795,7 @@
           <a:p>
             <a:fld id="{04AD105E-1681-4427-A2A6-BE19936FDE9F}" type="datetimeFigureOut">
               <a:rPr lang="de-DE" smtClean="0"/>
-              <a:t>19.06.25</a:t>
+              <a:t>21.06.2025</a:t>
             </a:fld>
             <a:endParaRPr lang="de-DE"/>
           </a:p>
@@ -2848,7 +2849,7 @@
           <a:p>
             <a:fld id="{F2D7D816-B1EE-490B-A103-4A569B3CE5B5}" type="slidenum">
               <a:rPr lang="de-DE" smtClean="0"/>
-              <a:t>‹Nr.›</a:t>
+              <a:t>‹#›</a:t>
             </a:fld>
             <a:endParaRPr lang="de-DE"/>
           </a:p>
@@ -2935,7 +2936,7 @@
           <a:p>
             <a:fld id="{04AD105E-1681-4427-A2A6-BE19936FDE9F}" type="datetimeFigureOut">
               <a:rPr lang="de-DE" smtClean="0"/>
-              <a:t>19.06.25</a:t>
+              <a:t>21.06.2025</a:t>
             </a:fld>
             <a:endParaRPr lang="de-DE"/>
           </a:p>
@@ -2989,7 +2990,7 @@
           <a:p>
             <a:fld id="{F2D7D816-B1EE-490B-A103-4A569B3CE5B5}" type="slidenum">
               <a:rPr lang="de-DE" smtClean="0"/>
-              <a:t>‹Nr.›</a:t>
+              <a:t>‹#›</a:t>
             </a:fld>
             <a:endParaRPr lang="de-DE"/>
           </a:p>
@@ -3048,7 +3049,7 @@
           <a:p>
             <a:fld id="{04AD105E-1681-4427-A2A6-BE19936FDE9F}" type="datetimeFigureOut">
               <a:rPr lang="de-DE" smtClean="0"/>
-              <a:t>19.06.25</a:t>
+              <a:t>21.06.2025</a:t>
             </a:fld>
             <a:endParaRPr lang="de-DE"/>
           </a:p>
@@ -3102,7 +3103,7 @@
           <a:p>
             <a:fld id="{F2D7D816-B1EE-490B-A103-4A569B3CE5B5}" type="slidenum">
               <a:rPr lang="de-DE" smtClean="0"/>
-              <a:t>‹Nr.›</a:t>
+              <a:t>‹#›</a:t>
             </a:fld>
             <a:endParaRPr lang="de-DE"/>
           </a:p>
@@ -3359,7 +3360,7 @@
           <a:p>
             <a:fld id="{04AD105E-1681-4427-A2A6-BE19936FDE9F}" type="datetimeFigureOut">
               <a:rPr lang="de-DE" smtClean="0"/>
-              <a:t>19.06.25</a:t>
+              <a:t>21.06.2025</a:t>
             </a:fld>
             <a:endParaRPr lang="de-DE"/>
           </a:p>
@@ -3413,7 +3414,7 @@
           <a:p>
             <a:fld id="{F2D7D816-B1EE-490B-A103-4A569B3CE5B5}" type="slidenum">
               <a:rPr lang="de-DE" smtClean="0"/>
-              <a:t>‹Nr.›</a:t>
+              <a:t>‹#›</a:t>
             </a:fld>
             <a:endParaRPr lang="de-DE"/>
           </a:p>
@@ -3647,7 +3648,7 @@
           <a:p>
             <a:fld id="{04AD105E-1681-4427-A2A6-BE19936FDE9F}" type="datetimeFigureOut">
               <a:rPr lang="de-DE" smtClean="0"/>
-              <a:t>19.06.25</a:t>
+              <a:t>21.06.2025</a:t>
             </a:fld>
             <a:endParaRPr lang="de-DE"/>
           </a:p>
@@ -3701,7 +3702,7 @@
           <a:p>
             <a:fld id="{F2D7D816-B1EE-490B-A103-4A569B3CE5B5}" type="slidenum">
               <a:rPr lang="de-DE" smtClean="0"/>
-              <a:t>‹Nr.›</a:t>
+              <a:t>‹#›</a:t>
             </a:fld>
             <a:endParaRPr lang="de-DE"/>
           </a:p>
@@ -3888,7 +3889,7 @@
           <a:p>
             <a:fld id="{04AD105E-1681-4427-A2A6-BE19936FDE9F}" type="datetimeFigureOut">
               <a:rPr lang="de-DE" smtClean="0"/>
-              <a:t>19.06.25</a:t>
+              <a:t>21.06.2025</a:t>
             </a:fld>
             <a:endParaRPr lang="de-DE"/>
           </a:p>
@@ -3978,7 +3979,7 @@
           <a:p>
             <a:fld id="{F2D7D816-B1EE-490B-A103-4A569B3CE5B5}" type="slidenum">
               <a:rPr lang="de-DE" smtClean="0"/>
-              <a:t>‹Nr.›</a:t>
+              <a:t>‹#›</a:t>
             </a:fld>
             <a:endParaRPr lang="de-DE"/>
           </a:p>
@@ -11750,7 +11751,7 @@
           <p:cNvPr id="2" name="Titel 1">
             <a:extLst>
               <a:ext uri="{FF2B5EF4-FFF2-40B4-BE49-F238E27FC236}">
-                <a16:creationId xmlns:a16="http://schemas.microsoft.com/office/drawing/2014/main" id="{3CF21DF8-C972-CE41-240B-79F10EC03D3A}"/>
+                <a16:creationId xmlns:a16="http://schemas.microsoft.com/office/drawing/2014/main" id="{2B6204BF-A39F-9F67-5574-5EB00A3EC4AA}"/>
               </a:ext>
             </a:extLst>
           </p:cNvPr>
@@ -11766,7 +11767,22 @@
           <a:bodyPr/>
           <a:lstStyle/>
           <a:p>
-            <a:endParaRPr lang="de-DE"/>
+            <a:r>
+              <a:rPr lang="de-DE" dirty="0" err="1"/>
+              <a:t>Comparisons</a:t>
+            </a:r>
+            <a:r>
+              <a:rPr lang="de-DE" dirty="0"/>
+              <a:t> </a:t>
+            </a:r>
+            <a:r>
+              <a:rPr lang="de-DE" dirty="0" err="1"/>
+              <a:t>between</a:t>
+            </a:r>
+            <a:r>
+              <a:rPr lang="de-DE" dirty="0"/>
+              <a:t> Scenarios</a:t>
+            </a:r>
           </a:p>
         </p:txBody>
       </p:sp>
@@ -11775,7 +11791,7 @@
           <p:cNvPr id="3" name="Inhaltsplatzhalter 2">
             <a:extLst>
               <a:ext uri="{FF2B5EF4-FFF2-40B4-BE49-F238E27FC236}">
-                <a16:creationId xmlns:a16="http://schemas.microsoft.com/office/drawing/2014/main" id="{D2DB145A-C9D4-66BE-6727-756FD3CFF969}"/>
+                <a16:creationId xmlns:a16="http://schemas.microsoft.com/office/drawing/2014/main" id="{6603635D-F04A-01DD-14F5-A66936E3D38C}"/>
               </a:ext>
             </a:extLst>
           </p:cNvPr>
@@ -11788,17 +11804,2044 @@
         </p:nvSpPr>
         <p:spPr/>
         <p:txBody>
-          <a:bodyPr/>
+          <a:bodyPr>
+            <a:normAutofit/>
+          </a:bodyPr>
           <a:lstStyle/>
           <a:p>
-            <a:endParaRPr lang="de-DE"/>
+            <a:r>
+              <a:rPr lang="de-DE" dirty="0"/>
+              <a:t>25% </a:t>
+            </a:r>
+            <a:r>
+              <a:rPr lang="de-DE" dirty="0" err="1"/>
+              <a:t>before</a:t>
+            </a:r>
+            <a:r>
+              <a:rPr lang="de-DE" dirty="0"/>
+              <a:t> 1946 (Dena)→ Tabula </a:t>
+            </a:r>
+            <a:r>
+              <a:rPr lang="de-DE" dirty="0" err="1"/>
+              <a:t>data</a:t>
+            </a:r>
+            <a:r>
+              <a:rPr lang="de-DE" dirty="0"/>
+              <a:t> </a:t>
+            </a:r>
+            <a:r>
+              <a:rPr lang="de-DE" dirty="0" err="1"/>
+              <a:t>for</a:t>
+            </a:r>
+            <a:r>
+              <a:rPr lang="de-DE" dirty="0"/>
+              <a:t> 1919 – 1948 (</a:t>
+            </a:r>
+            <a:r>
+              <a:rPr lang="de-DE" dirty="0">
+                <a:hlinkClick r:id="rId2"/>
+              </a:rPr>
+              <a:t>https://webtool.building-typology.eu/?c=de#bd</a:t>
+            </a:r>
+            <a:r>
+              <a:rPr lang="de-DE" dirty="0"/>
+              <a:t>)</a:t>
+            </a:r>
+          </a:p>
+          <a:p>
+            <a:endParaRPr lang="de-DE" dirty="0"/>
+          </a:p>
+          <a:p>
+            <a:endParaRPr lang="de-DE" dirty="0">
+              <a:hlinkClick r:id=""/>
+            </a:endParaRPr>
+          </a:p>
+          <a:p>
+            <a:endParaRPr lang="de-DE" dirty="0">
+              <a:hlinkClick r:id=""/>
+            </a:endParaRPr>
+          </a:p>
+          <a:p>
+            <a:endParaRPr lang="de-DE" dirty="0">
+              <a:hlinkClick r:id=""/>
+            </a:endParaRPr>
+          </a:p>
+          <a:p>
+            <a:endParaRPr lang="de-DE" dirty="0">
+              <a:hlinkClick r:id=""/>
+            </a:endParaRPr>
+          </a:p>
+          <a:p>
+            <a:endParaRPr lang="de-DE" dirty="0">
+              <a:hlinkClick r:id=""/>
+            </a:endParaRPr>
+          </a:p>
+          <a:p>
+            <a:endParaRPr lang="de-DE" dirty="0">
+              <a:hlinkClick r:id=""/>
+            </a:endParaRPr>
+          </a:p>
+          <a:p>
+            <a:endParaRPr lang="de-DE" dirty="0"/>
+          </a:p>
+          <a:p>
+            <a:endParaRPr lang="de-DE" dirty="0"/>
           </a:p>
         </p:txBody>
       </p:sp>
+      <p:graphicFrame>
+        <p:nvGraphicFramePr>
+          <p:cNvPr id="4" name="Content Placeholder 3">
+            <a:extLst>
+              <a:ext uri="{FF2B5EF4-FFF2-40B4-BE49-F238E27FC236}">
+                <a16:creationId xmlns:a16="http://schemas.microsoft.com/office/drawing/2014/main" id="{A927E123-AA9B-14AD-36BE-A8BE3DB035FC}"/>
+              </a:ext>
+            </a:extLst>
+          </p:cNvPr>
+          <p:cNvGraphicFramePr>
+            <a:graphicFrameLocks/>
+          </p:cNvGraphicFramePr>
+          <p:nvPr>
+            <p:extLst>
+              <p:ext uri="{D42A27DB-BD31-4B8C-83A1-F6EECF244321}">
+                <p14:modId xmlns:p14="http://schemas.microsoft.com/office/powerpoint/2010/main" val="3455838941"/>
+              </p:ext>
+            </p:extLst>
+          </p:nvPr>
+        </p:nvGraphicFramePr>
+        <p:xfrm>
+          <a:off x="166991" y="2817984"/>
+          <a:ext cx="4901119" cy="3624036"/>
+        </p:xfrm>
+        <a:graphic>
+          <a:graphicData uri="http://schemas.openxmlformats.org/drawingml/2006/table">
+            <a:tbl>
+              <a:tblPr/>
+              <a:tblGrid>
+                <a:gridCol w="603320">
+                  <a:extLst>
+                    <a:ext uri="{9D8B030D-6E8A-4147-A177-3AD203B41FA5}">
+                      <a16:colId xmlns:a16="http://schemas.microsoft.com/office/drawing/2014/main" val="533957170"/>
+                    </a:ext>
+                  </a:extLst>
+                </a:gridCol>
+                <a:gridCol w="1847241">
+                  <a:extLst>
+                    <a:ext uri="{9D8B030D-6E8A-4147-A177-3AD203B41FA5}">
+                      <a16:colId xmlns:a16="http://schemas.microsoft.com/office/drawing/2014/main" val="1697000662"/>
+                    </a:ext>
+                  </a:extLst>
+                </a:gridCol>
+                <a:gridCol w="1225279">
+                  <a:extLst>
+                    <a:ext uri="{9D8B030D-6E8A-4147-A177-3AD203B41FA5}">
+                      <a16:colId xmlns:a16="http://schemas.microsoft.com/office/drawing/2014/main" val="2151934338"/>
+                    </a:ext>
+                  </a:extLst>
+                </a:gridCol>
+                <a:gridCol w="1225279">
+                  <a:extLst>
+                    <a:ext uri="{9D8B030D-6E8A-4147-A177-3AD203B41FA5}">
+                      <a16:colId xmlns:a16="http://schemas.microsoft.com/office/drawing/2014/main" val="2951295620"/>
+                    </a:ext>
+                  </a:extLst>
+                </a:gridCol>
+              </a:tblGrid>
+              <a:tr h="278815">
+                <a:tc gridSpan="2">
+                  <a:txBody>
+                    <a:bodyPr/>
+                    <a:lstStyle/>
+                    <a:p>
+                      <a:r>
+                        <a:rPr lang="de-DE" sz="1100"/>
+                        <a:t> </a:t>
+                      </a:r>
+                    </a:p>
+                  </a:txBody>
+                  <a:tcPr marL="2003" marR="2003" marT="2003" marB="2003" anchor="ctr">
+                    <a:lnL>
+                      <a:noFill/>
+                    </a:lnL>
+                    <a:lnR>
+                      <a:noFill/>
+                    </a:lnR>
+                    <a:lnT>
+                      <a:noFill/>
+                    </a:lnT>
+                    <a:lnB>
+                      <a:noFill/>
+                    </a:lnB>
+                    <a:noFill/>
+                  </a:tcPr>
+                </a:tc>
+                <a:tc hMerge="1">
+                  <a:txBody>
+                    <a:bodyPr/>
+                    <a:lstStyle/>
+                    <a:p>
+                      <a:endParaRPr lang="de-DE"/>
+                    </a:p>
+                  </a:txBody>
+                  <a:tcPr/>
+                </a:tc>
+                <a:tc>
+                  <a:txBody>
+                    <a:bodyPr/>
+                    <a:lstStyle/>
+                    <a:p>
+                      <a:pPr algn="ctr"/>
+                      <a:r>
+                        <a:rPr lang="de-DE" sz="1100"/>
+                        <a:t>Existing state</a:t>
+                      </a:r>
+                    </a:p>
+                  </a:txBody>
+                  <a:tcPr marL="2003" marR="2003" marT="2003" marB="2003" anchor="ctr">
+                    <a:lnL>
+                      <a:noFill/>
+                    </a:lnL>
+                    <a:lnR>
+                      <a:noFill/>
+                    </a:lnR>
+                    <a:lnT>
+                      <a:noFill/>
+                    </a:lnT>
+                    <a:lnB>
+                      <a:noFill/>
+                    </a:lnB>
+                    <a:noFill/>
+                  </a:tcPr>
+                </a:tc>
+                <a:tc>
+                  <a:txBody>
+                    <a:bodyPr/>
+                    <a:lstStyle/>
+                    <a:p>
+                      <a:pPr algn="ctr"/>
+                      <a:r>
+                        <a:rPr lang="de-DE" sz="1100"/>
+                        <a:t>Usual Refurbishment</a:t>
+                      </a:r>
+                    </a:p>
+                  </a:txBody>
+                  <a:tcPr marL="2003" marR="2003" marT="2003" marB="2003" anchor="ctr">
+                    <a:lnL>
+                      <a:noFill/>
+                    </a:lnL>
+                    <a:lnR>
+                      <a:noFill/>
+                    </a:lnR>
+                    <a:lnT>
+                      <a:noFill/>
+                    </a:lnT>
+                    <a:lnB>
+                      <a:noFill/>
+                    </a:lnB>
+                    <a:noFill/>
+                  </a:tcPr>
+                </a:tc>
+                <a:extLst>
+                  <a:ext uri="{0D108BD9-81ED-4DB2-BD59-A6C34878D82A}">
+                    <a16:rowId xmlns:a16="http://schemas.microsoft.com/office/drawing/2014/main" val="1559117082"/>
+                  </a:ext>
+                </a:extLst>
+              </a:tr>
+              <a:tr h="143842">
+                <a:tc rowSpan="4">
+                  <a:txBody>
+                    <a:bodyPr/>
+                    <a:lstStyle/>
+                    <a:p>
+                      <a:pPr algn="ctr"/>
+                      <a:r>
+                        <a:rPr lang="de-DE" sz="1100" dirty="0"/>
+                        <a:t>Roof 1</a:t>
+                      </a:r>
+                    </a:p>
+                  </a:txBody>
+                  <a:tcPr marL="2003" marR="2003" marT="2003" marB="2003" anchor="ctr">
+                    <a:lnL>
+                      <a:noFill/>
+                    </a:lnL>
+                    <a:lnR>
+                      <a:noFill/>
+                    </a:lnR>
+                    <a:lnT>
+                      <a:noFill/>
+                    </a:lnT>
+                    <a:lnB>
+                      <a:noFill/>
+                    </a:lnB>
+                    <a:noFill/>
+                  </a:tcPr>
+                </a:tc>
+                <a:tc>
+                  <a:txBody>
+                    <a:bodyPr/>
+                    <a:lstStyle/>
+                    <a:p>
+                      <a:pPr algn="ctr"/>
+                      <a:r>
+                        <a:rPr lang="de-DE" sz="1100"/>
+                        <a:t>surface area</a:t>
+                      </a:r>
+                    </a:p>
+                  </a:txBody>
+                  <a:tcPr marL="2003" marR="2003" marT="2003" marB="2003" anchor="ctr">
+                    <a:lnL>
+                      <a:noFill/>
+                    </a:lnL>
+                    <a:lnR>
+                      <a:noFill/>
+                    </a:lnR>
+                    <a:lnT>
+                      <a:noFill/>
+                    </a:lnT>
+                    <a:lnB>
+                      <a:noFill/>
+                    </a:lnB>
+                    <a:noFill/>
+                  </a:tcPr>
+                </a:tc>
+                <a:tc>
+                  <a:txBody>
+                    <a:bodyPr/>
+                    <a:lstStyle/>
+                    <a:p>
+                      <a:pPr algn="ctr"/>
+                      <a:r>
+                        <a:rPr lang="de-DE" sz="1100"/>
+                        <a:t>214.0m</a:t>
+                      </a:r>
+                      <a:r>
+                        <a:rPr lang="de-DE" sz="1100" baseline="30000"/>
+                        <a:t>2</a:t>
+                      </a:r>
+                      <a:endParaRPr lang="de-DE" sz="1100"/>
+                    </a:p>
+                  </a:txBody>
+                  <a:tcPr marL="2003" marR="2003" marT="2003" marB="2003">
+                    <a:lnL>
+                      <a:noFill/>
+                    </a:lnL>
+                    <a:lnR>
+                      <a:noFill/>
+                    </a:lnR>
+                    <a:lnT>
+                      <a:noFill/>
+                    </a:lnT>
+                    <a:lnB>
+                      <a:noFill/>
+                    </a:lnB>
+                    <a:noFill/>
+                  </a:tcPr>
+                </a:tc>
+                <a:tc>
+                  <a:txBody>
+                    <a:bodyPr/>
+                    <a:lstStyle/>
+                    <a:p>
+                      <a:pPr algn="ctr"/>
+                      <a:r>
+                        <a:rPr lang="de-DE" sz="1100"/>
+                        <a:t>214.0 m</a:t>
+                      </a:r>
+                      <a:r>
+                        <a:rPr lang="de-DE" sz="1100" baseline="30000"/>
+                        <a:t>2</a:t>
+                      </a:r>
+                      <a:endParaRPr lang="de-DE" sz="1100"/>
+                    </a:p>
+                  </a:txBody>
+                  <a:tcPr marL="2003" marR="2003" marT="2003" marB="2003">
+                    <a:lnL>
+                      <a:noFill/>
+                    </a:lnL>
+                    <a:lnR>
+                      <a:noFill/>
+                    </a:lnR>
+                    <a:lnT>
+                      <a:noFill/>
+                    </a:lnT>
+                    <a:lnB>
+                      <a:noFill/>
+                    </a:lnB>
+                    <a:noFill/>
+                  </a:tcPr>
+                </a:tc>
+                <a:extLst>
+                  <a:ext uri="{0D108BD9-81ED-4DB2-BD59-A6C34878D82A}">
+                    <a16:rowId xmlns:a16="http://schemas.microsoft.com/office/drawing/2014/main" val="1739913806"/>
+                  </a:ext>
+                </a:extLst>
+              </a:tr>
+              <a:tr h="207718">
+                <a:tc vMerge="1">
+                  <a:txBody>
+                    <a:bodyPr/>
+                    <a:lstStyle/>
+                    <a:p>
+                      <a:endParaRPr lang="de-DE"/>
+                    </a:p>
+                  </a:txBody>
+                  <a:tcPr/>
+                </a:tc>
+                <a:tc>
+                  <a:txBody>
+                    <a:bodyPr/>
+                    <a:lstStyle/>
+                    <a:p>
+                      <a:pPr algn="ctr"/>
+                      <a:endParaRPr lang="en-US" sz="1100" dirty="0"/>
+                    </a:p>
+                  </a:txBody>
+                  <a:tcPr marL="2003" marR="2003" marT="2003" marB="2003" anchor="ctr">
+                    <a:lnL>
+                      <a:noFill/>
+                    </a:lnL>
+                    <a:lnR>
+                      <a:noFill/>
+                    </a:lnR>
+                    <a:lnT>
+                      <a:noFill/>
+                    </a:lnT>
+                    <a:lnB>
+                      <a:noFill/>
+                    </a:lnB>
+                    <a:noFill/>
+                  </a:tcPr>
+                </a:tc>
+                <a:tc>
+                  <a:txBody>
+                    <a:bodyPr/>
+                    <a:lstStyle/>
+                    <a:p>
+                      <a:pPr algn="ctr"/>
+                      <a:endParaRPr lang="de-DE" sz="1100" dirty="0"/>
+                    </a:p>
+                  </a:txBody>
+                  <a:tcPr marL="2003" marR="2003" marT="2003" marB="2003">
+                    <a:lnL>
+                      <a:noFill/>
+                    </a:lnL>
+                    <a:lnR>
+                      <a:noFill/>
+                    </a:lnR>
+                    <a:lnT>
+                      <a:noFill/>
+                    </a:lnT>
+                    <a:lnB>
+                      <a:noFill/>
+                    </a:lnB>
+                    <a:noFill/>
+                  </a:tcPr>
+                </a:tc>
+                <a:tc>
+                  <a:txBody>
+                    <a:bodyPr/>
+                    <a:lstStyle/>
+                    <a:p>
+                      <a:pPr algn="ctr"/>
+                      <a:endParaRPr lang="de-DE" sz="1100" dirty="0"/>
+                    </a:p>
+                  </a:txBody>
+                  <a:tcPr marL="2003" marR="2003" marT="2003" marB="2003">
+                    <a:lnL>
+                      <a:noFill/>
+                    </a:lnL>
+                    <a:lnR>
+                      <a:noFill/>
+                    </a:lnR>
+                    <a:lnT>
+                      <a:noFill/>
+                    </a:lnT>
+                    <a:lnB>
+                      <a:noFill/>
+                    </a:lnB>
+                    <a:noFill/>
+                  </a:tcPr>
+                </a:tc>
+                <a:extLst>
+                  <a:ext uri="{0D108BD9-81ED-4DB2-BD59-A6C34878D82A}">
+                    <a16:rowId xmlns:a16="http://schemas.microsoft.com/office/drawing/2014/main" val="2579081682"/>
+                  </a:ext>
+                </a:extLst>
+              </a:tr>
+              <a:tr h="143842">
+                <a:tc vMerge="1">
+                  <a:txBody>
+                    <a:bodyPr/>
+                    <a:lstStyle/>
+                    <a:p>
+                      <a:endParaRPr lang="de-DE"/>
+                    </a:p>
+                  </a:txBody>
+                  <a:tcPr/>
+                </a:tc>
+                <a:tc>
+                  <a:txBody>
+                    <a:bodyPr/>
+                    <a:lstStyle/>
+                    <a:p>
+                      <a:pPr algn="ctr"/>
+                      <a:r>
+                        <a:rPr lang="de-DE" sz="1100"/>
+                        <a:t>picture</a:t>
+                      </a:r>
+                    </a:p>
+                  </a:txBody>
+                  <a:tcPr marL="2003" marR="2003" marT="2003" marB="2003" anchor="ctr">
+                    <a:lnL>
+                      <a:noFill/>
+                    </a:lnL>
+                    <a:lnR>
+                      <a:noFill/>
+                    </a:lnR>
+                    <a:lnT>
+                      <a:noFill/>
+                    </a:lnT>
+                    <a:lnB>
+                      <a:noFill/>
+                    </a:lnB>
+                    <a:noFill/>
+                  </a:tcPr>
+                </a:tc>
+                <a:tc>
+                  <a:txBody>
+                    <a:bodyPr/>
+                    <a:lstStyle/>
+                    <a:p>
+                      <a:pPr algn="ctr"/>
+                      <a:endParaRPr lang="de-DE" sz="1100"/>
+                    </a:p>
+                  </a:txBody>
+                  <a:tcPr marL="2003" marR="2003" marT="2003" marB="2003">
+                    <a:lnL>
+                      <a:noFill/>
+                    </a:lnL>
+                    <a:lnR>
+                      <a:noFill/>
+                    </a:lnR>
+                    <a:lnT>
+                      <a:noFill/>
+                    </a:lnT>
+                    <a:lnB>
+                      <a:noFill/>
+                    </a:lnB>
+                    <a:noFill/>
+                  </a:tcPr>
+                </a:tc>
+                <a:tc>
+                  <a:txBody>
+                    <a:bodyPr/>
+                    <a:lstStyle/>
+                    <a:p>
+                      <a:pPr algn="ctr"/>
+                      <a:endParaRPr lang="de-DE" sz="1100"/>
+                    </a:p>
+                  </a:txBody>
+                  <a:tcPr marL="2003" marR="2003" marT="2003" marB="2003">
+                    <a:lnL>
+                      <a:noFill/>
+                    </a:lnL>
+                    <a:lnR>
+                      <a:noFill/>
+                    </a:lnR>
+                    <a:lnT>
+                      <a:noFill/>
+                    </a:lnT>
+                    <a:lnB>
+                      <a:noFill/>
+                    </a:lnB>
+                    <a:noFill/>
+                  </a:tcPr>
+                </a:tc>
+                <a:extLst>
+                  <a:ext uri="{0D108BD9-81ED-4DB2-BD59-A6C34878D82A}">
+                    <a16:rowId xmlns:a16="http://schemas.microsoft.com/office/drawing/2014/main" val="2520153653"/>
+                  </a:ext>
+                </a:extLst>
+              </a:tr>
+              <a:tr h="143842">
+                <a:tc vMerge="1">
+                  <a:txBody>
+                    <a:bodyPr/>
+                    <a:lstStyle/>
+                    <a:p>
+                      <a:endParaRPr lang="de-DE"/>
+                    </a:p>
+                  </a:txBody>
+                  <a:tcPr/>
+                </a:tc>
+                <a:tc>
+                  <a:txBody>
+                    <a:bodyPr/>
+                    <a:lstStyle/>
+                    <a:p>
+                      <a:pPr algn="ctr"/>
+                      <a:r>
+                        <a:rPr lang="de-DE" sz="1100"/>
+                        <a:t>U-value</a:t>
+                      </a:r>
+                    </a:p>
+                  </a:txBody>
+                  <a:tcPr marL="2003" marR="2003" marT="2003" marB="2003" anchor="ctr">
+                    <a:lnL>
+                      <a:noFill/>
+                    </a:lnL>
+                    <a:lnR>
+                      <a:noFill/>
+                    </a:lnR>
+                    <a:lnT>
+                      <a:noFill/>
+                    </a:lnT>
+                    <a:lnB>
+                      <a:noFill/>
+                    </a:lnB>
+                    <a:noFill/>
+                  </a:tcPr>
+                </a:tc>
+                <a:tc>
+                  <a:txBody>
+                    <a:bodyPr/>
+                    <a:lstStyle/>
+                    <a:p>
+                      <a:pPr algn="ctr">
+                        <a:buNone/>
+                      </a:pPr>
+                      <a:r>
+                        <a:rPr lang="de-DE" sz="1100"/>
+                        <a:t>1.40 W/(m</a:t>
+                      </a:r>
+                      <a:r>
+                        <a:rPr lang="de-DE" sz="1100" baseline="30000"/>
+                        <a:t>2</a:t>
+                      </a:r>
+                      <a:r>
+                        <a:rPr lang="de-DE" sz="1100"/>
+                        <a:t>K)</a:t>
+                      </a:r>
+                    </a:p>
+                  </a:txBody>
+                  <a:tcPr marL="2003" marR="2003" marT="2003" marB="2003" anchor="ctr">
+                    <a:lnL>
+                      <a:noFill/>
+                    </a:lnL>
+                    <a:lnR>
+                      <a:noFill/>
+                    </a:lnR>
+                    <a:lnT>
+                      <a:noFill/>
+                    </a:lnT>
+                    <a:lnB>
+                      <a:noFill/>
+                    </a:lnB>
+                    <a:noFill/>
+                  </a:tcPr>
+                </a:tc>
+                <a:tc>
+                  <a:txBody>
+                    <a:bodyPr/>
+                    <a:lstStyle/>
+                    <a:p>
+                      <a:pPr algn="ctr">
+                        <a:buNone/>
+                      </a:pPr>
+                      <a:r>
+                        <a:rPr lang="de-DE" sz="1100"/>
+                        <a:t>0.41 W/(m</a:t>
+                      </a:r>
+                      <a:r>
+                        <a:rPr lang="de-DE" sz="1100" baseline="30000"/>
+                        <a:t>2</a:t>
+                      </a:r>
+                      <a:r>
+                        <a:rPr lang="de-DE" sz="1100"/>
+                        <a:t>K)</a:t>
+                      </a:r>
+                    </a:p>
+                  </a:txBody>
+                  <a:tcPr marL="2003" marR="2003" marT="2003" marB="2003" anchor="ctr">
+                    <a:lnL>
+                      <a:noFill/>
+                    </a:lnL>
+                    <a:lnR>
+                      <a:noFill/>
+                    </a:lnR>
+                    <a:lnT>
+                      <a:noFill/>
+                    </a:lnT>
+                    <a:lnB>
+                      <a:noFill/>
+                    </a:lnB>
+                    <a:noFill/>
+                  </a:tcPr>
+                </a:tc>
+                <a:extLst>
+                  <a:ext uri="{0D108BD9-81ED-4DB2-BD59-A6C34878D82A}">
+                    <a16:rowId xmlns:a16="http://schemas.microsoft.com/office/drawing/2014/main" val="27739838"/>
+                  </a:ext>
+                </a:extLst>
+              </a:tr>
+              <a:tr h="345001">
+                <a:tc rowSpan="4">
+                  <a:txBody>
+                    <a:bodyPr/>
+                    <a:lstStyle/>
+                    <a:p>
+                      <a:pPr algn="ctr"/>
+                      <a:r>
+                        <a:rPr lang="de-DE" sz="1100"/>
+                        <a:t>Wall 1</a:t>
+                      </a:r>
+                    </a:p>
+                  </a:txBody>
+                  <a:tcPr marL="2003" marR="2003" marT="2003" marB="2003" anchor="ctr">
+                    <a:lnL>
+                      <a:noFill/>
+                    </a:lnL>
+                    <a:lnR>
+                      <a:noFill/>
+                    </a:lnR>
+                    <a:lnT>
+                      <a:noFill/>
+                    </a:lnT>
+                    <a:lnB>
+                      <a:noFill/>
+                    </a:lnB>
+                    <a:noFill/>
+                  </a:tcPr>
+                </a:tc>
+                <a:tc>
+                  <a:txBody>
+                    <a:bodyPr/>
+                    <a:lstStyle/>
+                    <a:p>
+                      <a:pPr algn="ctr"/>
+                      <a:r>
+                        <a:rPr lang="de-DE" sz="1100" dirty="0" err="1"/>
+                        <a:t>surface</a:t>
+                      </a:r>
+                      <a:r>
+                        <a:rPr lang="de-DE" sz="1100" dirty="0"/>
+                        <a:t> </a:t>
+                      </a:r>
+                      <a:r>
+                        <a:rPr lang="de-DE" sz="1100" dirty="0" err="1"/>
+                        <a:t>area</a:t>
+                      </a:r>
+                      <a:endParaRPr lang="de-DE" sz="1100" dirty="0"/>
+                    </a:p>
+                  </a:txBody>
+                  <a:tcPr marL="2003" marR="2003" marT="2003" marB="2003" anchor="ctr">
+                    <a:lnL>
+                      <a:noFill/>
+                    </a:lnL>
+                    <a:lnR>
+                      <a:noFill/>
+                    </a:lnR>
+                    <a:lnT>
+                      <a:noFill/>
+                    </a:lnT>
+                    <a:lnB>
+                      <a:noFill/>
+                    </a:lnB>
+                    <a:noFill/>
+                  </a:tcPr>
+                </a:tc>
+                <a:tc>
+                  <a:txBody>
+                    <a:bodyPr/>
+                    <a:lstStyle/>
+                    <a:p>
+                      <a:pPr algn="ctr"/>
+                      <a:r>
+                        <a:rPr lang="de-DE" sz="1100"/>
+                        <a:t>235.3m</a:t>
+                      </a:r>
+                      <a:r>
+                        <a:rPr lang="de-DE" sz="1100" baseline="30000"/>
+                        <a:t>2</a:t>
+                      </a:r>
+                      <a:endParaRPr lang="de-DE" sz="1100"/>
+                    </a:p>
+                  </a:txBody>
+                  <a:tcPr marL="2003" marR="2003" marT="2003" marB="2003">
+                    <a:lnL>
+                      <a:noFill/>
+                    </a:lnL>
+                    <a:lnR>
+                      <a:noFill/>
+                    </a:lnR>
+                    <a:lnT>
+                      <a:noFill/>
+                    </a:lnT>
+                    <a:lnB>
+                      <a:noFill/>
+                    </a:lnB>
+                    <a:noFill/>
+                  </a:tcPr>
+                </a:tc>
+                <a:tc>
+                  <a:txBody>
+                    <a:bodyPr/>
+                    <a:lstStyle/>
+                    <a:p>
+                      <a:pPr algn="ctr"/>
+                      <a:r>
+                        <a:rPr lang="de-DE" sz="1100"/>
+                        <a:t>235.3 m</a:t>
+                      </a:r>
+                      <a:r>
+                        <a:rPr lang="de-DE" sz="1100" baseline="30000"/>
+                        <a:t>2</a:t>
+                      </a:r>
+                      <a:endParaRPr lang="de-DE" sz="1100"/>
+                    </a:p>
+                  </a:txBody>
+                  <a:tcPr marL="2003" marR="2003" marT="2003" marB="2003">
+                    <a:lnL>
+                      <a:noFill/>
+                    </a:lnL>
+                    <a:lnR>
+                      <a:noFill/>
+                    </a:lnR>
+                    <a:lnT>
+                      <a:noFill/>
+                    </a:lnT>
+                    <a:lnB>
+                      <a:noFill/>
+                    </a:lnB>
+                    <a:noFill/>
+                  </a:tcPr>
+                </a:tc>
+                <a:extLst>
+                  <a:ext uri="{0D108BD9-81ED-4DB2-BD59-A6C34878D82A}">
+                    <a16:rowId xmlns:a16="http://schemas.microsoft.com/office/drawing/2014/main" val="2459924008"/>
+                  </a:ext>
+                </a:extLst>
+              </a:tr>
+              <a:tr h="269946">
+                <a:tc vMerge="1">
+                  <a:txBody>
+                    <a:bodyPr/>
+                    <a:lstStyle/>
+                    <a:p>
+                      <a:endParaRPr lang="de-DE"/>
+                    </a:p>
+                  </a:txBody>
+                  <a:tcPr/>
+                </a:tc>
+                <a:tc>
+                  <a:txBody>
+                    <a:bodyPr/>
+                    <a:lstStyle/>
+                    <a:p>
+                      <a:pPr algn="ctr"/>
+                      <a:endParaRPr lang="en-US" sz="1100" dirty="0"/>
+                    </a:p>
+                  </a:txBody>
+                  <a:tcPr marL="2003" marR="2003" marT="2003" marB="2003" anchor="ctr">
+                    <a:lnL>
+                      <a:noFill/>
+                    </a:lnL>
+                    <a:lnR>
+                      <a:noFill/>
+                    </a:lnR>
+                    <a:lnT>
+                      <a:noFill/>
+                    </a:lnT>
+                    <a:lnB>
+                      <a:noFill/>
+                    </a:lnB>
+                    <a:noFill/>
+                  </a:tcPr>
+                </a:tc>
+                <a:tc>
+                  <a:txBody>
+                    <a:bodyPr/>
+                    <a:lstStyle/>
+                    <a:p>
+                      <a:pPr algn="ctr"/>
+                      <a:endParaRPr lang="de-DE" sz="1100" dirty="0"/>
+                    </a:p>
+                  </a:txBody>
+                  <a:tcPr marL="2003" marR="2003" marT="2003" marB="2003">
+                    <a:lnL>
+                      <a:noFill/>
+                    </a:lnL>
+                    <a:lnR>
+                      <a:noFill/>
+                    </a:lnR>
+                    <a:lnT>
+                      <a:noFill/>
+                    </a:lnT>
+                    <a:lnB>
+                      <a:noFill/>
+                    </a:lnB>
+                    <a:noFill/>
+                  </a:tcPr>
+                </a:tc>
+                <a:tc>
+                  <a:txBody>
+                    <a:bodyPr/>
+                    <a:lstStyle/>
+                    <a:p>
+                      <a:pPr algn="ctr"/>
+                      <a:endParaRPr lang="de-DE" sz="1100" dirty="0"/>
+                    </a:p>
+                  </a:txBody>
+                  <a:tcPr marL="2003" marR="2003" marT="2003" marB="2003">
+                    <a:lnL>
+                      <a:noFill/>
+                    </a:lnL>
+                    <a:lnR>
+                      <a:noFill/>
+                    </a:lnR>
+                    <a:lnT>
+                      <a:noFill/>
+                    </a:lnT>
+                    <a:lnB>
+                      <a:noFill/>
+                    </a:lnB>
+                    <a:noFill/>
+                  </a:tcPr>
+                </a:tc>
+                <a:extLst>
+                  <a:ext uri="{0D108BD9-81ED-4DB2-BD59-A6C34878D82A}">
+                    <a16:rowId xmlns:a16="http://schemas.microsoft.com/office/drawing/2014/main" val="175086480"/>
+                  </a:ext>
+                </a:extLst>
+              </a:tr>
+              <a:tr h="143842">
+                <a:tc vMerge="1">
+                  <a:txBody>
+                    <a:bodyPr/>
+                    <a:lstStyle/>
+                    <a:p>
+                      <a:endParaRPr lang="de-DE"/>
+                    </a:p>
+                  </a:txBody>
+                  <a:tcPr/>
+                </a:tc>
+                <a:tc>
+                  <a:txBody>
+                    <a:bodyPr/>
+                    <a:lstStyle/>
+                    <a:p>
+                      <a:pPr algn="ctr"/>
+                      <a:r>
+                        <a:rPr lang="de-DE" sz="1100"/>
+                        <a:t>picture</a:t>
+                      </a:r>
+                    </a:p>
+                  </a:txBody>
+                  <a:tcPr marL="2003" marR="2003" marT="2003" marB="2003" anchor="ctr">
+                    <a:lnL>
+                      <a:noFill/>
+                    </a:lnL>
+                    <a:lnR>
+                      <a:noFill/>
+                    </a:lnR>
+                    <a:lnT>
+                      <a:noFill/>
+                    </a:lnT>
+                    <a:lnB>
+                      <a:noFill/>
+                    </a:lnB>
+                    <a:noFill/>
+                  </a:tcPr>
+                </a:tc>
+                <a:tc>
+                  <a:txBody>
+                    <a:bodyPr/>
+                    <a:lstStyle/>
+                    <a:p>
+                      <a:pPr algn="ctr"/>
+                      <a:endParaRPr lang="de-DE" sz="1100"/>
+                    </a:p>
+                  </a:txBody>
+                  <a:tcPr marL="2003" marR="2003" marT="2003" marB="2003">
+                    <a:lnL>
+                      <a:noFill/>
+                    </a:lnL>
+                    <a:lnR>
+                      <a:noFill/>
+                    </a:lnR>
+                    <a:lnT>
+                      <a:noFill/>
+                    </a:lnT>
+                    <a:lnB>
+                      <a:noFill/>
+                    </a:lnB>
+                    <a:noFill/>
+                  </a:tcPr>
+                </a:tc>
+                <a:tc>
+                  <a:txBody>
+                    <a:bodyPr/>
+                    <a:lstStyle/>
+                    <a:p>
+                      <a:pPr algn="ctr"/>
+                      <a:endParaRPr lang="de-DE" sz="1100"/>
+                    </a:p>
+                  </a:txBody>
+                  <a:tcPr marL="2003" marR="2003" marT="2003" marB="2003">
+                    <a:lnL>
+                      <a:noFill/>
+                    </a:lnL>
+                    <a:lnR>
+                      <a:noFill/>
+                    </a:lnR>
+                    <a:lnT>
+                      <a:noFill/>
+                    </a:lnT>
+                    <a:lnB>
+                      <a:noFill/>
+                    </a:lnB>
+                    <a:noFill/>
+                  </a:tcPr>
+                </a:tc>
+                <a:extLst>
+                  <a:ext uri="{0D108BD9-81ED-4DB2-BD59-A6C34878D82A}">
+                    <a16:rowId xmlns:a16="http://schemas.microsoft.com/office/drawing/2014/main" val="3422927936"/>
+                  </a:ext>
+                </a:extLst>
+              </a:tr>
+              <a:tr h="143842">
+                <a:tc vMerge="1">
+                  <a:txBody>
+                    <a:bodyPr/>
+                    <a:lstStyle/>
+                    <a:p>
+                      <a:endParaRPr lang="de-DE"/>
+                    </a:p>
+                  </a:txBody>
+                  <a:tcPr/>
+                </a:tc>
+                <a:tc>
+                  <a:txBody>
+                    <a:bodyPr/>
+                    <a:lstStyle/>
+                    <a:p>
+                      <a:pPr algn="ctr"/>
+                      <a:r>
+                        <a:rPr lang="de-DE" sz="1100"/>
+                        <a:t>U-value</a:t>
+                      </a:r>
+                    </a:p>
+                  </a:txBody>
+                  <a:tcPr marL="2003" marR="2003" marT="2003" marB="2003" anchor="ctr">
+                    <a:lnL>
+                      <a:noFill/>
+                    </a:lnL>
+                    <a:lnR>
+                      <a:noFill/>
+                    </a:lnR>
+                    <a:lnT>
+                      <a:noFill/>
+                    </a:lnT>
+                    <a:lnB>
+                      <a:noFill/>
+                    </a:lnB>
+                    <a:noFill/>
+                  </a:tcPr>
+                </a:tc>
+                <a:tc>
+                  <a:txBody>
+                    <a:bodyPr/>
+                    <a:lstStyle/>
+                    <a:p>
+                      <a:pPr algn="ctr">
+                        <a:buNone/>
+                      </a:pPr>
+                      <a:r>
+                        <a:rPr lang="de-DE" sz="1100"/>
+                        <a:t>1.70 W/(m</a:t>
+                      </a:r>
+                      <a:r>
+                        <a:rPr lang="de-DE" sz="1100" baseline="30000"/>
+                        <a:t>2</a:t>
+                      </a:r>
+                      <a:r>
+                        <a:rPr lang="de-DE" sz="1100"/>
+                        <a:t>K)</a:t>
+                      </a:r>
+                    </a:p>
+                  </a:txBody>
+                  <a:tcPr marL="2003" marR="2003" marT="2003" marB="2003" anchor="ctr">
+                    <a:lnL>
+                      <a:noFill/>
+                    </a:lnL>
+                    <a:lnR>
+                      <a:noFill/>
+                    </a:lnR>
+                    <a:lnT>
+                      <a:noFill/>
+                    </a:lnT>
+                    <a:lnB>
+                      <a:noFill/>
+                    </a:lnB>
+                    <a:noFill/>
+                  </a:tcPr>
+                </a:tc>
+                <a:tc>
+                  <a:txBody>
+                    <a:bodyPr/>
+                    <a:lstStyle/>
+                    <a:p>
+                      <a:pPr algn="ctr">
+                        <a:buNone/>
+                      </a:pPr>
+                      <a:r>
+                        <a:rPr lang="de-DE" sz="1100"/>
+                        <a:t>0.25 W/(m</a:t>
+                      </a:r>
+                      <a:r>
+                        <a:rPr lang="de-DE" sz="1100" baseline="30000"/>
+                        <a:t>2</a:t>
+                      </a:r>
+                      <a:r>
+                        <a:rPr lang="de-DE" sz="1100"/>
+                        <a:t>K)</a:t>
+                      </a:r>
+                    </a:p>
+                  </a:txBody>
+                  <a:tcPr marL="2003" marR="2003" marT="2003" marB="2003" anchor="ctr">
+                    <a:lnL>
+                      <a:noFill/>
+                    </a:lnL>
+                    <a:lnR>
+                      <a:noFill/>
+                    </a:lnR>
+                    <a:lnT>
+                      <a:noFill/>
+                    </a:lnT>
+                    <a:lnB>
+                      <a:noFill/>
+                    </a:lnB>
+                    <a:noFill/>
+                  </a:tcPr>
+                </a:tc>
+                <a:extLst>
+                  <a:ext uri="{0D108BD9-81ED-4DB2-BD59-A6C34878D82A}">
+                    <a16:rowId xmlns:a16="http://schemas.microsoft.com/office/drawing/2014/main" val="255475145"/>
+                  </a:ext>
+                </a:extLst>
+              </a:tr>
+              <a:tr h="146126">
+                <a:tc rowSpan="4">
+                  <a:txBody>
+                    <a:bodyPr/>
+                    <a:lstStyle/>
+                    <a:p>
+                      <a:pPr algn="ctr"/>
+                      <a:r>
+                        <a:rPr lang="de-DE" sz="1100"/>
+                        <a:t>Floor 1</a:t>
+                      </a:r>
+                    </a:p>
+                  </a:txBody>
+                  <a:tcPr marL="2003" marR="2003" marT="2003" marB="2003" anchor="ctr">
+                    <a:lnL>
+                      <a:noFill/>
+                    </a:lnL>
+                    <a:lnR>
+                      <a:noFill/>
+                    </a:lnR>
+                    <a:lnT>
+                      <a:noFill/>
+                    </a:lnT>
+                    <a:lnB>
+                      <a:noFill/>
+                    </a:lnB>
+                    <a:noFill/>
+                  </a:tcPr>
+                </a:tc>
+                <a:tc>
+                  <a:txBody>
+                    <a:bodyPr/>
+                    <a:lstStyle/>
+                    <a:p>
+                      <a:pPr algn="ctr"/>
+                      <a:r>
+                        <a:rPr lang="de-DE" sz="1100"/>
+                        <a:t>surface area</a:t>
+                      </a:r>
+                    </a:p>
+                  </a:txBody>
+                  <a:tcPr marL="2003" marR="2003" marT="2003" marB="2003" anchor="ctr">
+                    <a:lnL>
+                      <a:noFill/>
+                    </a:lnL>
+                    <a:lnR>
+                      <a:noFill/>
+                    </a:lnR>
+                    <a:lnT>
+                      <a:noFill/>
+                    </a:lnT>
+                    <a:lnB>
+                      <a:noFill/>
+                    </a:lnB>
+                    <a:noFill/>
+                  </a:tcPr>
+                </a:tc>
+                <a:tc>
+                  <a:txBody>
+                    <a:bodyPr/>
+                    <a:lstStyle/>
+                    <a:p>
+                      <a:pPr algn="ctr"/>
+                      <a:r>
+                        <a:rPr lang="de-DE" sz="1100"/>
+                        <a:t>144.9m</a:t>
+                      </a:r>
+                      <a:r>
+                        <a:rPr lang="de-DE" sz="1100" baseline="30000"/>
+                        <a:t>2</a:t>
+                      </a:r>
+                      <a:endParaRPr lang="de-DE" sz="1100"/>
+                    </a:p>
+                  </a:txBody>
+                  <a:tcPr marL="2003" marR="2003" marT="2003" marB="2003">
+                    <a:lnL>
+                      <a:noFill/>
+                    </a:lnL>
+                    <a:lnR>
+                      <a:noFill/>
+                    </a:lnR>
+                    <a:lnT>
+                      <a:noFill/>
+                    </a:lnT>
+                    <a:lnB>
+                      <a:noFill/>
+                    </a:lnB>
+                    <a:noFill/>
+                  </a:tcPr>
+                </a:tc>
+                <a:tc>
+                  <a:txBody>
+                    <a:bodyPr/>
+                    <a:lstStyle/>
+                    <a:p>
+                      <a:pPr algn="ctr"/>
+                      <a:r>
+                        <a:rPr lang="de-DE" sz="1100"/>
+                        <a:t>144.9 m</a:t>
+                      </a:r>
+                      <a:r>
+                        <a:rPr lang="de-DE" sz="1100" baseline="30000"/>
+                        <a:t>2</a:t>
+                      </a:r>
+                      <a:endParaRPr lang="de-DE" sz="1100"/>
+                    </a:p>
+                  </a:txBody>
+                  <a:tcPr marL="2003" marR="2003" marT="2003" marB="2003">
+                    <a:lnL>
+                      <a:noFill/>
+                    </a:lnL>
+                    <a:lnR>
+                      <a:noFill/>
+                    </a:lnR>
+                    <a:lnT>
+                      <a:noFill/>
+                    </a:lnT>
+                    <a:lnB>
+                      <a:noFill/>
+                    </a:lnB>
+                    <a:noFill/>
+                  </a:tcPr>
+                </a:tc>
+                <a:extLst>
+                  <a:ext uri="{0D108BD9-81ED-4DB2-BD59-A6C34878D82A}">
+                    <a16:rowId xmlns:a16="http://schemas.microsoft.com/office/drawing/2014/main" val="283437127"/>
+                  </a:ext>
+                </a:extLst>
+              </a:tr>
+              <a:tr h="265695">
+                <a:tc vMerge="1">
+                  <a:txBody>
+                    <a:bodyPr/>
+                    <a:lstStyle/>
+                    <a:p>
+                      <a:endParaRPr lang="de-DE"/>
+                    </a:p>
+                  </a:txBody>
+                  <a:tcPr/>
+                </a:tc>
+                <a:tc>
+                  <a:txBody>
+                    <a:bodyPr/>
+                    <a:lstStyle/>
+                    <a:p>
+                      <a:pPr algn="ctr"/>
+                      <a:endParaRPr lang="en-US" sz="1100" dirty="0"/>
+                    </a:p>
+                  </a:txBody>
+                  <a:tcPr marL="2003" marR="2003" marT="2003" marB="2003" anchor="ctr">
+                    <a:lnL>
+                      <a:noFill/>
+                    </a:lnL>
+                    <a:lnR>
+                      <a:noFill/>
+                    </a:lnR>
+                    <a:lnT>
+                      <a:noFill/>
+                    </a:lnT>
+                    <a:lnB>
+                      <a:noFill/>
+                    </a:lnB>
+                    <a:noFill/>
+                  </a:tcPr>
+                </a:tc>
+                <a:tc>
+                  <a:txBody>
+                    <a:bodyPr/>
+                    <a:lstStyle/>
+                    <a:p>
+                      <a:pPr algn="ctr"/>
+                      <a:endParaRPr lang="de-DE" sz="1100" dirty="0"/>
+                    </a:p>
+                  </a:txBody>
+                  <a:tcPr marL="2003" marR="2003" marT="2003" marB="2003">
+                    <a:lnL>
+                      <a:noFill/>
+                    </a:lnL>
+                    <a:lnR>
+                      <a:noFill/>
+                    </a:lnR>
+                    <a:lnT>
+                      <a:noFill/>
+                    </a:lnT>
+                    <a:lnB>
+                      <a:noFill/>
+                    </a:lnB>
+                    <a:noFill/>
+                  </a:tcPr>
+                </a:tc>
+                <a:tc>
+                  <a:txBody>
+                    <a:bodyPr/>
+                    <a:lstStyle/>
+                    <a:p>
+                      <a:pPr algn="ctr"/>
+                      <a:endParaRPr lang="de-DE" sz="1100" dirty="0"/>
+                    </a:p>
+                  </a:txBody>
+                  <a:tcPr marL="2003" marR="2003" marT="2003" marB="2003">
+                    <a:lnL>
+                      <a:noFill/>
+                    </a:lnL>
+                    <a:lnR>
+                      <a:noFill/>
+                    </a:lnR>
+                    <a:lnT>
+                      <a:noFill/>
+                    </a:lnT>
+                    <a:lnB>
+                      <a:noFill/>
+                    </a:lnB>
+                    <a:noFill/>
+                  </a:tcPr>
+                </a:tc>
+                <a:extLst>
+                  <a:ext uri="{0D108BD9-81ED-4DB2-BD59-A6C34878D82A}">
+                    <a16:rowId xmlns:a16="http://schemas.microsoft.com/office/drawing/2014/main" val="701907204"/>
+                  </a:ext>
+                </a:extLst>
+              </a:tr>
+              <a:tr h="143842">
+                <a:tc vMerge="1">
+                  <a:txBody>
+                    <a:bodyPr/>
+                    <a:lstStyle/>
+                    <a:p>
+                      <a:endParaRPr lang="de-DE"/>
+                    </a:p>
+                  </a:txBody>
+                  <a:tcPr/>
+                </a:tc>
+                <a:tc>
+                  <a:txBody>
+                    <a:bodyPr/>
+                    <a:lstStyle/>
+                    <a:p>
+                      <a:pPr algn="ctr"/>
+                      <a:r>
+                        <a:rPr lang="de-DE" sz="1100"/>
+                        <a:t>picture</a:t>
+                      </a:r>
+                    </a:p>
+                  </a:txBody>
+                  <a:tcPr marL="2003" marR="2003" marT="2003" marB="2003" anchor="ctr">
+                    <a:lnL>
+                      <a:noFill/>
+                    </a:lnL>
+                    <a:lnR>
+                      <a:noFill/>
+                    </a:lnR>
+                    <a:lnT>
+                      <a:noFill/>
+                    </a:lnT>
+                    <a:lnB>
+                      <a:noFill/>
+                    </a:lnB>
+                    <a:noFill/>
+                  </a:tcPr>
+                </a:tc>
+                <a:tc>
+                  <a:txBody>
+                    <a:bodyPr/>
+                    <a:lstStyle/>
+                    <a:p>
+                      <a:pPr algn="ctr"/>
+                      <a:endParaRPr lang="de-DE" sz="1100"/>
+                    </a:p>
+                  </a:txBody>
+                  <a:tcPr marL="2003" marR="2003" marT="2003" marB="2003">
+                    <a:lnL>
+                      <a:noFill/>
+                    </a:lnL>
+                    <a:lnR>
+                      <a:noFill/>
+                    </a:lnR>
+                    <a:lnT>
+                      <a:noFill/>
+                    </a:lnT>
+                    <a:lnB>
+                      <a:noFill/>
+                    </a:lnB>
+                    <a:noFill/>
+                  </a:tcPr>
+                </a:tc>
+                <a:tc>
+                  <a:txBody>
+                    <a:bodyPr/>
+                    <a:lstStyle/>
+                    <a:p>
+                      <a:pPr algn="ctr"/>
+                      <a:endParaRPr lang="de-DE" sz="1100"/>
+                    </a:p>
+                  </a:txBody>
+                  <a:tcPr marL="2003" marR="2003" marT="2003" marB="2003">
+                    <a:lnL>
+                      <a:noFill/>
+                    </a:lnL>
+                    <a:lnR>
+                      <a:noFill/>
+                    </a:lnR>
+                    <a:lnT>
+                      <a:noFill/>
+                    </a:lnT>
+                    <a:lnB>
+                      <a:noFill/>
+                    </a:lnB>
+                    <a:noFill/>
+                  </a:tcPr>
+                </a:tc>
+                <a:extLst>
+                  <a:ext uri="{0D108BD9-81ED-4DB2-BD59-A6C34878D82A}">
+                    <a16:rowId xmlns:a16="http://schemas.microsoft.com/office/drawing/2014/main" val="3950332576"/>
+                  </a:ext>
+                </a:extLst>
+              </a:tr>
+              <a:tr h="143842">
+                <a:tc vMerge="1">
+                  <a:txBody>
+                    <a:bodyPr/>
+                    <a:lstStyle/>
+                    <a:p>
+                      <a:endParaRPr lang="de-DE"/>
+                    </a:p>
+                  </a:txBody>
+                  <a:tcPr/>
+                </a:tc>
+                <a:tc>
+                  <a:txBody>
+                    <a:bodyPr/>
+                    <a:lstStyle/>
+                    <a:p>
+                      <a:pPr algn="ctr"/>
+                      <a:r>
+                        <a:rPr lang="de-DE" sz="1100"/>
+                        <a:t>U-value</a:t>
+                      </a:r>
+                    </a:p>
+                  </a:txBody>
+                  <a:tcPr marL="2003" marR="2003" marT="2003" marB="2003" anchor="ctr">
+                    <a:lnL>
+                      <a:noFill/>
+                    </a:lnL>
+                    <a:lnR>
+                      <a:noFill/>
+                    </a:lnR>
+                    <a:lnT>
+                      <a:noFill/>
+                    </a:lnT>
+                    <a:lnB>
+                      <a:noFill/>
+                    </a:lnB>
+                    <a:noFill/>
+                  </a:tcPr>
+                </a:tc>
+                <a:tc>
+                  <a:txBody>
+                    <a:bodyPr/>
+                    <a:lstStyle/>
+                    <a:p>
+                      <a:pPr algn="ctr">
+                        <a:buNone/>
+                      </a:pPr>
+                      <a:r>
+                        <a:rPr lang="de-DE" sz="1100"/>
+                        <a:t>0.77 W/(m</a:t>
+                      </a:r>
+                      <a:r>
+                        <a:rPr lang="de-DE" sz="1100" baseline="30000"/>
+                        <a:t>2</a:t>
+                      </a:r>
+                      <a:r>
+                        <a:rPr lang="de-DE" sz="1100"/>
+                        <a:t>K)</a:t>
+                      </a:r>
+                    </a:p>
+                  </a:txBody>
+                  <a:tcPr marL="2003" marR="2003" marT="2003" marB="2003" anchor="ctr">
+                    <a:lnL>
+                      <a:noFill/>
+                    </a:lnL>
+                    <a:lnR>
+                      <a:noFill/>
+                    </a:lnR>
+                    <a:lnT>
+                      <a:noFill/>
+                    </a:lnT>
+                    <a:lnB>
+                      <a:noFill/>
+                    </a:lnB>
+                    <a:noFill/>
+                  </a:tcPr>
+                </a:tc>
+                <a:tc>
+                  <a:txBody>
+                    <a:bodyPr/>
+                    <a:lstStyle/>
+                    <a:p>
+                      <a:pPr algn="ctr">
+                        <a:buNone/>
+                      </a:pPr>
+                      <a:r>
+                        <a:rPr lang="de-DE" sz="1100"/>
+                        <a:t>0.28 W/(m</a:t>
+                      </a:r>
+                      <a:r>
+                        <a:rPr lang="de-DE" sz="1100" baseline="30000"/>
+                        <a:t>2</a:t>
+                      </a:r>
+                      <a:r>
+                        <a:rPr lang="de-DE" sz="1100"/>
+                        <a:t>K)</a:t>
+                      </a:r>
+                    </a:p>
+                  </a:txBody>
+                  <a:tcPr marL="2003" marR="2003" marT="2003" marB="2003" anchor="ctr">
+                    <a:lnL>
+                      <a:noFill/>
+                    </a:lnL>
+                    <a:lnR>
+                      <a:noFill/>
+                    </a:lnR>
+                    <a:lnT>
+                      <a:noFill/>
+                    </a:lnT>
+                    <a:lnB>
+                      <a:noFill/>
+                    </a:lnB>
+                    <a:noFill/>
+                  </a:tcPr>
+                </a:tc>
+                <a:extLst>
+                  <a:ext uri="{0D108BD9-81ED-4DB2-BD59-A6C34878D82A}">
+                    <a16:rowId xmlns:a16="http://schemas.microsoft.com/office/drawing/2014/main" val="3467682781"/>
+                  </a:ext>
+                </a:extLst>
+              </a:tr>
+              <a:tr h="140709">
+                <a:tc rowSpan="4">
+                  <a:txBody>
+                    <a:bodyPr/>
+                    <a:lstStyle/>
+                    <a:p>
+                      <a:pPr algn="ctr"/>
+                      <a:r>
+                        <a:rPr lang="de-DE" sz="1100"/>
+                        <a:t>Window 1</a:t>
+                      </a:r>
+                    </a:p>
+                  </a:txBody>
+                  <a:tcPr marL="2003" marR="2003" marT="2003" marB="2003" anchor="ctr">
+                    <a:lnL>
+                      <a:noFill/>
+                    </a:lnL>
+                    <a:lnR>
+                      <a:noFill/>
+                    </a:lnR>
+                    <a:lnT>
+                      <a:noFill/>
+                    </a:lnT>
+                    <a:lnB>
+                      <a:noFill/>
+                    </a:lnB>
+                    <a:noFill/>
+                  </a:tcPr>
+                </a:tc>
+                <a:tc>
+                  <a:txBody>
+                    <a:bodyPr/>
+                    <a:lstStyle/>
+                    <a:p>
+                      <a:pPr algn="ctr"/>
+                      <a:r>
+                        <a:rPr lang="de-DE" sz="1100"/>
+                        <a:t>surface area</a:t>
+                      </a:r>
+                    </a:p>
+                  </a:txBody>
+                  <a:tcPr marL="2003" marR="2003" marT="2003" marB="2003" anchor="ctr">
+                    <a:lnL>
+                      <a:noFill/>
+                    </a:lnL>
+                    <a:lnR>
+                      <a:noFill/>
+                    </a:lnR>
+                    <a:lnT>
+                      <a:noFill/>
+                    </a:lnT>
+                    <a:lnB>
+                      <a:noFill/>
+                    </a:lnB>
+                    <a:noFill/>
+                  </a:tcPr>
+                </a:tc>
+                <a:tc>
+                  <a:txBody>
+                    <a:bodyPr/>
+                    <a:lstStyle/>
+                    <a:p>
+                      <a:pPr algn="ctr"/>
+                      <a:r>
+                        <a:rPr lang="de-DE" sz="1100"/>
+                        <a:t>52.4m</a:t>
+                      </a:r>
+                      <a:r>
+                        <a:rPr lang="de-DE" sz="1100" baseline="30000"/>
+                        <a:t>2</a:t>
+                      </a:r>
+                      <a:endParaRPr lang="de-DE" sz="1100"/>
+                    </a:p>
+                  </a:txBody>
+                  <a:tcPr marL="2003" marR="2003" marT="2003" marB="2003">
+                    <a:lnL>
+                      <a:noFill/>
+                    </a:lnL>
+                    <a:lnR>
+                      <a:noFill/>
+                    </a:lnR>
+                    <a:lnT>
+                      <a:noFill/>
+                    </a:lnT>
+                    <a:lnB>
+                      <a:noFill/>
+                    </a:lnB>
+                    <a:noFill/>
+                  </a:tcPr>
+                </a:tc>
+                <a:tc>
+                  <a:txBody>
+                    <a:bodyPr/>
+                    <a:lstStyle/>
+                    <a:p>
+                      <a:pPr algn="ctr"/>
+                      <a:r>
+                        <a:rPr lang="de-DE" sz="1100"/>
+                        <a:t>52.4 m</a:t>
+                      </a:r>
+                      <a:r>
+                        <a:rPr lang="de-DE" sz="1100" baseline="30000"/>
+                        <a:t>2</a:t>
+                      </a:r>
+                      <a:endParaRPr lang="de-DE" sz="1100"/>
+                    </a:p>
+                  </a:txBody>
+                  <a:tcPr marL="2003" marR="2003" marT="2003" marB="2003">
+                    <a:lnL>
+                      <a:noFill/>
+                    </a:lnL>
+                    <a:lnR>
+                      <a:noFill/>
+                    </a:lnR>
+                    <a:lnT>
+                      <a:noFill/>
+                    </a:lnT>
+                    <a:lnB>
+                      <a:noFill/>
+                    </a:lnB>
+                    <a:noFill/>
+                  </a:tcPr>
+                </a:tc>
+                <a:extLst>
+                  <a:ext uri="{0D108BD9-81ED-4DB2-BD59-A6C34878D82A}">
+                    <a16:rowId xmlns:a16="http://schemas.microsoft.com/office/drawing/2014/main" val="2767907182"/>
+                  </a:ext>
+                </a:extLst>
+              </a:tr>
+              <a:tr h="302388">
+                <a:tc vMerge="1">
+                  <a:txBody>
+                    <a:bodyPr/>
+                    <a:lstStyle/>
+                    <a:p>
+                      <a:endParaRPr lang="de-DE"/>
+                    </a:p>
+                  </a:txBody>
+                  <a:tcPr/>
+                </a:tc>
+                <a:tc>
+                  <a:txBody>
+                    <a:bodyPr/>
+                    <a:lstStyle/>
+                    <a:p>
+                      <a:pPr algn="ctr"/>
+                      <a:endParaRPr lang="en-US" sz="1100" dirty="0"/>
+                    </a:p>
+                  </a:txBody>
+                  <a:tcPr marL="2003" marR="2003" marT="2003" marB="2003" anchor="ctr">
+                    <a:lnL>
+                      <a:noFill/>
+                    </a:lnL>
+                    <a:lnR>
+                      <a:noFill/>
+                    </a:lnR>
+                    <a:lnT>
+                      <a:noFill/>
+                    </a:lnT>
+                    <a:lnB>
+                      <a:noFill/>
+                    </a:lnB>
+                    <a:noFill/>
+                  </a:tcPr>
+                </a:tc>
+                <a:tc>
+                  <a:txBody>
+                    <a:bodyPr/>
+                    <a:lstStyle/>
+                    <a:p>
+                      <a:pPr algn="ctr"/>
+                      <a:endParaRPr lang="de-DE" sz="1100" dirty="0"/>
+                    </a:p>
+                  </a:txBody>
+                  <a:tcPr marL="2003" marR="2003" marT="2003" marB="2003">
+                    <a:lnL>
+                      <a:noFill/>
+                    </a:lnL>
+                    <a:lnR>
+                      <a:noFill/>
+                    </a:lnR>
+                    <a:lnT>
+                      <a:noFill/>
+                    </a:lnT>
+                    <a:lnB>
+                      <a:noFill/>
+                    </a:lnB>
+                    <a:noFill/>
+                  </a:tcPr>
+                </a:tc>
+                <a:tc>
+                  <a:txBody>
+                    <a:bodyPr/>
+                    <a:lstStyle/>
+                    <a:p>
+                      <a:pPr algn="ctr"/>
+                      <a:endParaRPr lang="de-DE" sz="1100" dirty="0"/>
+                    </a:p>
+                  </a:txBody>
+                  <a:tcPr marL="2003" marR="2003" marT="2003" marB="2003">
+                    <a:lnL>
+                      <a:noFill/>
+                    </a:lnL>
+                    <a:lnR>
+                      <a:noFill/>
+                    </a:lnR>
+                    <a:lnT>
+                      <a:noFill/>
+                    </a:lnT>
+                    <a:lnB>
+                      <a:noFill/>
+                    </a:lnB>
+                    <a:noFill/>
+                  </a:tcPr>
+                </a:tc>
+                <a:extLst>
+                  <a:ext uri="{0D108BD9-81ED-4DB2-BD59-A6C34878D82A}">
+                    <a16:rowId xmlns:a16="http://schemas.microsoft.com/office/drawing/2014/main" val="2599787355"/>
+                  </a:ext>
+                </a:extLst>
+              </a:tr>
+              <a:tr h="143842">
+                <a:tc vMerge="1">
+                  <a:txBody>
+                    <a:bodyPr/>
+                    <a:lstStyle/>
+                    <a:p>
+                      <a:endParaRPr lang="de-DE"/>
+                    </a:p>
+                  </a:txBody>
+                  <a:tcPr/>
+                </a:tc>
+                <a:tc>
+                  <a:txBody>
+                    <a:bodyPr/>
+                    <a:lstStyle/>
+                    <a:p>
+                      <a:pPr algn="ctr"/>
+                      <a:r>
+                        <a:rPr lang="de-DE" sz="1100"/>
+                        <a:t>picture</a:t>
+                      </a:r>
+                    </a:p>
+                  </a:txBody>
+                  <a:tcPr marL="2003" marR="2003" marT="2003" marB="2003" anchor="ctr">
+                    <a:lnL>
+                      <a:noFill/>
+                    </a:lnL>
+                    <a:lnR>
+                      <a:noFill/>
+                    </a:lnR>
+                    <a:lnT>
+                      <a:noFill/>
+                    </a:lnT>
+                    <a:lnB>
+                      <a:noFill/>
+                    </a:lnB>
+                    <a:noFill/>
+                  </a:tcPr>
+                </a:tc>
+                <a:tc>
+                  <a:txBody>
+                    <a:bodyPr/>
+                    <a:lstStyle/>
+                    <a:p>
+                      <a:pPr algn="ctr"/>
+                      <a:endParaRPr lang="de-DE" sz="1100"/>
+                    </a:p>
+                  </a:txBody>
+                  <a:tcPr marL="2003" marR="2003" marT="2003" marB="2003">
+                    <a:lnL>
+                      <a:noFill/>
+                    </a:lnL>
+                    <a:lnR>
+                      <a:noFill/>
+                    </a:lnR>
+                    <a:lnT>
+                      <a:noFill/>
+                    </a:lnT>
+                    <a:lnB>
+                      <a:noFill/>
+                    </a:lnB>
+                    <a:noFill/>
+                  </a:tcPr>
+                </a:tc>
+                <a:tc>
+                  <a:txBody>
+                    <a:bodyPr/>
+                    <a:lstStyle/>
+                    <a:p>
+                      <a:pPr algn="ctr"/>
+                      <a:endParaRPr lang="de-DE" sz="1100"/>
+                    </a:p>
+                  </a:txBody>
+                  <a:tcPr marL="2003" marR="2003" marT="2003" marB="2003">
+                    <a:lnL>
+                      <a:noFill/>
+                    </a:lnL>
+                    <a:lnR>
+                      <a:noFill/>
+                    </a:lnR>
+                    <a:lnT>
+                      <a:noFill/>
+                    </a:lnT>
+                    <a:lnB>
+                      <a:noFill/>
+                    </a:lnB>
+                    <a:noFill/>
+                  </a:tcPr>
+                </a:tc>
+                <a:extLst>
+                  <a:ext uri="{0D108BD9-81ED-4DB2-BD59-A6C34878D82A}">
+                    <a16:rowId xmlns:a16="http://schemas.microsoft.com/office/drawing/2014/main" val="2369459430"/>
+                  </a:ext>
+                </a:extLst>
+              </a:tr>
+              <a:tr h="177542">
+                <a:tc vMerge="1">
+                  <a:txBody>
+                    <a:bodyPr/>
+                    <a:lstStyle/>
+                    <a:p>
+                      <a:endParaRPr lang="de-DE"/>
+                    </a:p>
+                  </a:txBody>
+                  <a:tcPr/>
+                </a:tc>
+                <a:tc>
+                  <a:txBody>
+                    <a:bodyPr/>
+                    <a:lstStyle/>
+                    <a:p>
+                      <a:pPr algn="ctr"/>
+                      <a:r>
+                        <a:rPr lang="de-DE" sz="1100"/>
+                        <a:t>U-value</a:t>
+                      </a:r>
+                    </a:p>
+                  </a:txBody>
+                  <a:tcPr marL="2003" marR="2003" marT="2003" marB="2003" anchor="ctr">
+                    <a:lnL>
+                      <a:noFill/>
+                    </a:lnL>
+                    <a:lnR>
+                      <a:noFill/>
+                    </a:lnR>
+                    <a:lnT>
+                      <a:noFill/>
+                    </a:lnT>
+                    <a:lnB>
+                      <a:noFill/>
+                    </a:lnB>
+                    <a:noFill/>
+                  </a:tcPr>
+                </a:tc>
+                <a:tc>
+                  <a:txBody>
+                    <a:bodyPr/>
+                    <a:lstStyle/>
+                    <a:p>
+                      <a:pPr algn="ctr">
+                        <a:buNone/>
+                      </a:pPr>
+                      <a:r>
+                        <a:rPr lang="de-DE" sz="1100"/>
+                        <a:t>2.80 W/(m</a:t>
+                      </a:r>
+                      <a:r>
+                        <a:rPr lang="de-DE" sz="1100" baseline="30000"/>
+                        <a:t>2</a:t>
+                      </a:r>
+                      <a:r>
+                        <a:rPr lang="de-DE" sz="1100"/>
+                        <a:t>K)</a:t>
+                      </a:r>
+                    </a:p>
+                  </a:txBody>
+                  <a:tcPr marL="2003" marR="2003" marT="2003" marB="2003" anchor="ctr">
+                    <a:lnL>
+                      <a:noFill/>
+                    </a:lnL>
+                    <a:lnR>
+                      <a:noFill/>
+                    </a:lnR>
+                    <a:lnT>
+                      <a:noFill/>
+                    </a:lnT>
+                    <a:lnB>
+                      <a:noFill/>
+                    </a:lnB>
+                    <a:noFill/>
+                  </a:tcPr>
+                </a:tc>
+                <a:tc>
+                  <a:txBody>
+                    <a:bodyPr/>
+                    <a:lstStyle/>
+                    <a:p>
+                      <a:pPr algn="ctr">
+                        <a:buNone/>
+                      </a:pPr>
+                      <a:r>
+                        <a:rPr lang="de-DE" sz="1100" dirty="0"/>
+                        <a:t>1.30 W/(m</a:t>
+                      </a:r>
+                      <a:r>
+                        <a:rPr lang="de-DE" sz="1100" baseline="30000" dirty="0"/>
+                        <a:t>2</a:t>
+                      </a:r>
+                      <a:r>
+                        <a:rPr lang="de-DE" sz="1100" dirty="0"/>
+                        <a:t>K)</a:t>
+                      </a:r>
+                    </a:p>
+                  </a:txBody>
+                  <a:tcPr marL="2003" marR="2003" marT="2003" marB="2003" anchor="ctr">
+                    <a:lnL>
+                      <a:noFill/>
+                    </a:lnL>
+                    <a:lnR>
+                      <a:noFill/>
+                    </a:lnR>
+                    <a:lnT>
+                      <a:noFill/>
+                    </a:lnT>
+                    <a:lnB>
+                      <a:noFill/>
+                    </a:lnB>
+                    <a:noFill/>
+                  </a:tcPr>
+                </a:tc>
+                <a:extLst>
+                  <a:ext uri="{0D108BD9-81ED-4DB2-BD59-A6C34878D82A}">
+                    <a16:rowId xmlns:a16="http://schemas.microsoft.com/office/drawing/2014/main" val="3612338842"/>
+                  </a:ext>
+                </a:extLst>
+              </a:tr>
+            </a:tbl>
+          </a:graphicData>
+        </a:graphic>
+      </p:graphicFrame>
+      <p:pic>
+        <p:nvPicPr>
+          <p:cNvPr id="6" name="Picture 5">
+            <a:extLst>
+              <a:ext uri="{FF2B5EF4-FFF2-40B4-BE49-F238E27FC236}">
+                <a16:creationId xmlns:a16="http://schemas.microsoft.com/office/drawing/2014/main" id="{65F594CA-2575-85CC-111D-DC00600FEFD9}"/>
+              </a:ext>
+            </a:extLst>
+          </p:cNvPr>
+          <p:cNvPicPr>
+            <a:picLocks noChangeAspect="1"/>
+          </p:cNvPicPr>
+          <p:nvPr/>
+        </p:nvPicPr>
+        <p:blipFill>
+          <a:blip r:embed="rId3"/>
+          <a:stretch>
+            <a:fillRect/>
+          </a:stretch>
+        </p:blipFill>
+        <p:spPr>
+          <a:xfrm>
+            <a:off x="4725908" y="2751815"/>
+            <a:ext cx="7466091" cy="3690205"/>
+          </a:xfrm>
+          <a:prstGeom prst="rect">
+            <a:avLst/>
+          </a:prstGeom>
+        </p:spPr>
+      </p:pic>
     </p:spTree>
     <p:extLst>
       <p:ext uri="{BB962C8B-B14F-4D97-AF65-F5344CB8AC3E}">
-        <p14:creationId xmlns:p14="http://schemas.microsoft.com/office/powerpoint/2010/main" val="321713422"/>
+        <p14:creationId xmlns:p14="http://schemas.microsoft.com/office/powerpoint/2010/main" val="2766896664"/>
       </p:ext>
     </p:extLst>
   </p:cSld>
@@ -13358,6 +15401,86 @@
           <p:cNvPr id="2" name="Titel 1">
             <a:extLst>
               <a:ext uri="{FF2B5EF4-FFF2-40B4-BE49-F238E27FC236}">
+                <a16:creationId xmlns:a16="http://schemas.microsoft.com/office/drawing/2014/main" id="{3CF21DF8-C972-CE41-240B-79F10EC03D3A}"/>
+              </a:ext>
+            </a:extLst>
+          </p:cNvPr>
+          <p:cNvSpPr>
+            <a:spLocks noGrp="1"/>
+          </p:cNvSpPr>
+          <p:nvPr>
+            <p:ph type="title"/>
+          </p:nvPr>
+        </p:nvSpPr>
+        <p:spPr/>
+        <p:txBody>
+          <a:bodyPr/>
+          <a:lstStyle/>
+          <a:p>
+            <a:endParaRPr lang="de-DE"/>
+          </a:p>
+        </p:txBody>
+      </p:sp>
+      <p:sp>
+        <p:nvSpPr>
+          <p:cNvPr id="3" name="Inhaltsplatzhalter 2">
+            <a:extLst>
+              <a:ext uri="{FF2B5EF4-FFF2-40B4-BE49-F238E27FC236}">
+                <a16:creationId xmlns:a16="http://schemas.microsoft.com/office/drawing/2014/main" id="{D2DB145A-C9D4-66BE-6727-756FD3CFF969}"/>
+              </a:ext>
+            </a:extLst>
+          </p:cNvPr>
+          <p:cNvSpPr>
+            <a:spLocks noGrp="1"/>
+          </p:cNvSpPr>
+          <p:nvPr>
+            <p:ph idx="1"/>
+          </p:nvPr>
+        </p:nvSpPr>
+        <p:spPr/>
+        <p:txBody>
+          <a:bodyPr/>
+          <a:lstStyle/>
+          <a:p>
+            <a:endParaRPr lang="de-DE"/>
+          </a:p>
+        </p:txBody>
+      </p:sp>
+    </p:spTree>
+    <p:extLst>
+      <p:ext uri="{BB962C8B-B14F-4D97-AF65-F5344CB8AC3E}">
+        <p14:creationId xmlns:p14="http://schemas.microsoft.com/office/powerpoint/2010/main" val="321713422"/>
+      </p:ext>
+    </p:extLst>
+  </p:cSld>
+  <p:clrMapOvr>
+    <a:masterClrMapping/>
+  </p:clrMapOvr>
+</p:sld>
+</file>
+
+<file path=ppt/slides/slide21.xml><?xml version="1.0" encoding="utf-8"?>
+<p:sld xmlns:a="http://schemas.openxmlformats.org/drawingml/2006/main" xmlns:r="http://schemas.openxmlformats.org/officeDocument/2006/relationships" xmlns:p="http://schemas.openxmlformats.org/presentationml/2006/main">
+  <p:cSld>
+    <p:spTree>
+      <p:nvGrpSpPr>
+        <p:cNvPr id="1" name=""/>
+        <p:cNvGrpSpPr/>
+        <p:nvPr/>
+      </p:nvGrpSpPr>
+      <p:grpSpPr>
+        <a:xfrm>
+          <a:off x="0" y="0"/>
+          <a:ext cx="0" cy="0"/>
+          <a:chOff x="0" y="0"/>
+          <a:chExt cx="0" cy="0"/>
+        </a:xfrm>
+      </p:grpSpPr>
+      <p:sp>
+        <p:nvSpPr>
+          <p:cNvPr id="2" name="Titel 1">
+            <a:extLst>
+              <a:ext uri="{FF2B5EF4-FFF2-40B4-BE49-F238E27FC236}">
                 <a16:creationId xmlns:a16="http://schemas.microsoft.com/office/drawing/2014/main" id="{03ABC854-3852-C444-B5D8-943D204B4B40}"/>
               </a:ext>
             </a:extLst>
@@ -13423,7 +15546,7 @@
 </p:sld>
 </file>
 
-<file path=ppt/slides/slide21.xml><?xml version="1.0" encoding="utf-8"?>
+<file path=ppt/slides/slide22.xml><?xml version="1.0" encoding="utf-8"?>
 <p:sld xmlns:a="http://schemas.openxmlformats.org/drawingml/2006/main" xmlns:r="http://schemas.openxmlformats.org/officeDocument/2006/relationships" xmlns:p="http://schemas.openxmlformats.org/presentationml/2006/main">
   <p:cSld>
     <p:spTree>
@@ -13526,7 +15649,7 @@
 </p:sld>
 </file>
 
-<file path=ppt/slides/slide22.xml><?xml version="1.0" encoding="utf-8"?>
+<file path=ppt/slides/slide23.xml><?xml version="1.0" encoding="utf-8"?>
 <p:sld xmlns:a="http://schemas.openxmlformats.org/drawingml/2006/main" xmlns:r="http://schemas.openxmlformats.org/officeDocument/2006/relationships" xmlns:p="http://schemas.openxmlformats.org/presentationml/2006/main">
   <p:cSld>
     <p:spTree>
@@ -13638,7 +15761,7 @@
 </p:sld>
 </file>
 
-<file path=ppt/slides/slide23.xml><?xml version="1.0" encoding="utf-8"?>
+<file path=ppt/slides/slide24.xml><?xml version="1.0" encoding="utf-8"?>
 <p:sld xmlns:a="http://schemas.openxmlformats.org/drawingml/2006/main" xmlns:r="http://schemas.openxmlformats.org/officeDocument/2006/relationships" xmlns:p="http://schemas.openxmlformats.org/presentationml/2006/main">
   <p:cSld>
     <p:spTree>
@@ -13745,7 +15868,7 @@
 </p:sld>
 </file>
 
-<file path=ppt/slides/slide24.xml><?xml version="1.0" encoding="utf-8"?>
+<file path=ppt/slides/slide25.xml><?xml version="1.0" encoding="utf-8"?>
 <p:sld xmlns:a="http://schemas.openxmlformats.org/drawingml/2006/main" xmlns:r="http://schemas.openxmlformats.org/officeDocument/2006/relationships" xmlns:p="http://schemas.openxmlformats.org/presentationml/2006/main">
   <p:cSld>
     <p:spTree>
@@ -13860,7 +15983,7 @@
 </p:sld>
 </file>
 
-<file path=ppt/slides/slide25.xml><?xml version="1.0" encoding="utf-8"?>
+<file path=ppt/slides/slide26.xml><?xml version="1.0" encoding="utf-8"?>
 <p:sld xmlns:a="http://schemas.openxmlformats.org/drawingml/2006/main" xmlns:r="http://schemas.openxmlformats.org/officeDocument/2006/relationships" xmlns:p="http://schemas.openxmlformats.org/presentationml/2006/main">
   <p:cSld>
     <p:spTree>
@@ -20820,7 +22943,9 @@
         </p:nvSpPr>
         <p:spPr/>
         <p:txBody>
-          <a:bodyPr/>
+          <a:bodyPr>
+            <a:normAutofit lnSpcReduction="10000"/>
+          </a:bodyPr>
           <a:lstStyle/>
           <a:p>
             <a:pPr marL="0" indent="0">
@@ -21231,6 +23356,61 @@
                 </a:solidFill>
               </a:rPr>
               <a:t> 2016</a:t>
+            </a:r>
+          </a:p>
+          <a:p>
+            <a:pPr marL="0" indent="0">
+              <a:buNone/>
+            </a:pPr>
+            <a:endParaRPr lang="de-DE" dirty="0"/>
+          </a:p>
+          <a:p>
+            <a:pPr marL="0" indent="0">
+              <a:buNone/>
+            </a:pPr>
+            <a:r>
+              <a:rPr lang="de-DE" dirty="0"/>
+              <a:t>The </a:t>
+            </a:r>
+            <a:r>
+              <a:rPr lang="de-DE" dirty="0" err="1"/>
+              <a:t>heating</a:t>
+            </a:r>
+            <a:r>
+              <a:rPr lang="de-DE" dirty="0"/>
+              <a:t> </a:t>
+            </a:r>
+            <a:r>
+              <a:rPr lang="de-DE" dirty="0" err="1"/>
+              <a:t>season</a:t>
+            </a:r>
+            <a:r>
+              <a:rPr lang="de-DE" dirty="0"/>
+              <a:t> in Germany </a:t>
+            </a:r>
+            <a:r>
+              <a:rPr lang="de-DE" dirty="0" err="1"/>
+              <a:t>is</a:t>
+            </a:r>
+            <a:r>
+              <a:rPr lang="de-DE" dirty="0"/>
+              <a:t> 200 </a:t>
+            </a:r>
+            <a:r>
+              <a:rPr lang="de-DE" dirty="0" err="1"/>
+              <a:t>days</a:t>
+            </a:r>
+            <a:r>
+              <a:rPr lang="de-DE" dirty="0"/>
+              <a:t> per </a:t>
+            </a:r>
+            <a:r>
+              <a:rPr lang="de-DE" dirty="0" err="1"/>
+              <a:t>year</a:t>
+            </a:r>
+            <a:r>
+              <a:rPr lang="de-DE" dirty="0"/>
+              <a:t> (https://s2.building-typology.eu/abpdf/DE_N_01_EPISCOPE_CaseStudy_TABULA_National.pdf)</a:t>
             </a:r>
           </a:p>
           <a:p>

</xml_diff>

<commit_message>
window and building parameters
</commit_message>
<xml_diff>
--- a/presentation/heat.pptx
+++ b/presentation/heat.pptx
@@ -5,7 +5,7 @@
     <p:sldMasterId id="2147483648" r:id="rId1"/>
   </p:sldMasterIdLst>
   <p:notesMasterIdLst>
-    <p:notesMasterId r:id="rId28"/>
+    <p:notesMasterId r:id="rId29"/>
   </p:notesMasterIdLst>
   <p:sldIdLst>
     <p:sldId id="256" r:id="rId2"/>
@@ -28,12 +28,13 @@
     <p:sldId id="262" r:id="rId19"/>
     <p:sldId id="281" r:id="rId20"/>
     <p:sldId id="266" r:id="rId21"/>
-    <p:sldId id="267" r:id="rId22"/>
-    <p:sldId id="268" r:id="rId23"/>
-    <p:sldId id="263" r:id="rId24"/>
-    <p:sldId id="264" r:id="rId25"/>
-    <p:sldId id="269" r:id="rId26"/>
-    <p:sldId id="265" r:id="rId27"/>
+    <p:sldId id="282" r:id="rId22"/>
+    <p:sldId id="267" r:id="rId23"/>
+    <p:sldId id="268" r:id="rId24"/>
+    <p:sldId id="263" r:id="rId25"/>
+    <p:sldId id="264" r:id="rId26"/>
+    <p:sldId id="269" r:id="rId27"/>
+    <p:sldId id="265" r:id="rId28"/>
   </p:sldIdLst>
   <p:sldSz cx="12192000" cy="6858000"/>
   <p:notesSz cx="6858000" cy="9144000"/>
@@ -11853,32 +11854,32 @@
           </a:p>
           <a:p>
             <a:endParaRPr lang="de-DE" dirty="0">
-              <a:hlinkClick r:id=""/>
+              <a:hlinkClick r:id="" action="ppaction://noaction"/>
             </a:endParaRPr>
           </a:p>
           <a:p>
             <a:endParaRPr lang="de-DE" dirty="0">
-              <a:hlinkClick r:id=""/>
+              <a:hlinkClick r:id="" action="ppaction://noaction"/>
             </a:endParaRPr>
           </a:p>
           <a:p>
             <a:endParaRPr lang="de-DE" dirty="0">
-              <a:hlinkClick r:id=""/>
+              <a:hlinkClick r:id="" action="ppaction://noaction"/>
             </a:endParaRPr>
           </a:p>
           <a:p>
             <a:endParaRPr lang="de-DE" dirty="0">
-              <a:hlinkClick r:id=""/>
+              <a:hlinkClick r:id="" action="ppaction://noaction"/>
             </a:endParaRPr>
           </a:p>
           <a:p>
             <a:endParaRPr lang="de-DE" dirty="0">
-              <a:hlinkClick r:id=""/>
+              <a:hlinkClick r:id="" action="ppaction://noaction"/>
             </a:endParaRPr>
           </a:p>
           <a:p>
             <a:endParaRPr lang="de-DE" dirty="0">
-              <a:hlinkClick r:id=""/>
+              <a:hlinkClick r:id="" action="ppaction://noaction"/>
             </a:endParaRPr>
           </a:p>
           <a:p>
@@ -15414,38 +15415,1813 @@
         </p:nvSpPr>
         <p:spPr/>
         <p:txBody>
-          <a:bodyPr/>
+          <a:bodyPr>
+            <a:normAutofit fontScale="90000"/>
+          </a:bodyPr>
           <a:lstStyle/>
           <a:p>
-            <a:endParaRPr lang="de-DE"/>
+            <a:r>
+              <a:rPr lang="de-DE" dirty="0">
+                <a:solidFill>
+                  <a:schemeClr val="tx1">
+                    <a:lumMod val="50000"/>
+                    <a:lumOff val="50000"/>
+                  </a:schemeClr>
+                </a:solidFill>
+              </a:rPr>
+              <a:t>35% </a:t>
+            </a:r>
+            <a:r>
+              <a:rPr lang="de-DE" dirty="0" err="1">
+                <a:solidFill>
+                  <a:schemeClr val="tx1">
+                    <a:lumMod val="50000"/>
+                    <a:lumOff val="50000"/>
+                  </a:schemeClr>
+                </a:solidFill>
+              </a:rPr>
+              <a:t>before</a:t>
+            </a:r>
+            <a:r>
+              <a:rPr lang="de-DE" dirty="0">
+                <a:solidFill>
+                  <a:schemeClr val="tx1">
+                    <a:lumMod val="50000"/>
+                    <a:lumOff val="50000"/>
+                  </a:schemeClr>
+                </a:solidFill>
+              </a:rPr>
+              <a:t> 1977 (Dena)→ Tabula </a:t>
+            </a:r>
+            <a:r>
+              <a:rPr lang="de-DE" dirty="0" err="1">
+                <a:solidFill>
+                  <a:schemeClr val="tx1">
+                    <a:lumMod val="50000"/>
+                    <a:lumOff val="50000"/>
+                  </a:schemeClr>
+                </a:solidFill>
+              </a:rPr>
+              <a:t>data</a:t>
+            </a:r>
+            <a:r>
+              <a:rPr lang="de-DE" dirty="0">
+                <a:solidFill>
+                  <a:schemeClr val="tx1">
+                    <a:lumMod val="50000"/>
+                    <a:lumOff val="50000"/>
+                  </a:schemeClr>
+                </a:solidFill>
+              </a:rPr>
+              <a:t> </a:t>
+            </a:r>
+            <a:r>
+              <a:rPr lang="de-DE" dirty="0" err="1">
+                <a:solidFill>
+                  <a:schemeClr val="tx1">
+                    <a:lumMod val="50000"/>
+                    <a:lumOff val="50000"/>
+                  </a:schemeClr>
+                </a:solidFill>
+              </a:rPr>
+              <a:t>for</a:t>
+            </a:r>
+            <a:r>
+              <a:rPr lang="de-DE" dirty="0">
+                <a:solidFill>
+                  <a:schemeClr val="tx1">
+                    <a:lumMod val="50000"/>
+                    <a:lumOff val="50000"/>
+                  </a:schemeClr>
+                </a:solidFill>
+              </a:rPr>
+              <a:t> 1958 - 1968</a:t>
+            </a:r>
+            <a:br>
+              <a:rPr lang="de-DE" dirty="0">
+                <a:solidFill>
+                  <a:schemeClr val="tx1">
+                    <a:lumMod val="50000"/>
+                    <a:lumOff val="50000"/>
+                  </a:schemeClr>
+                </a:solidFill>
+              </a:rPr>
+            </a:br>
+            <a:endParaRPr lang="de-DE" dirty="0"/>
           </a:p>
         </p:txBody>
       </p:sp>
-      <p:sp>
-        <p:nvSpPr>
-          <p:cNvPr id="3" name="Inhaltsplatzhalter 2">
+      <p:graphicFrame>
+        <p:nvGraphicFramePr>
+          <p:cNvPr id="4" name="Content Placeholder 3">
             <a:extLst>
               <a:ext uri="{FF2B5EF4-FFF2-40B4-BE49-F238E27FC236}">
-                <a16:creationId xmlns:a16="http://schemas.microsoft.com/office/drawing/2014/main" id="{D2DB145A-C9D4-66BE-6727-756FD3CFF969}"/>
+                <a16:creationId xmlns:a16="http://schemas.microsoft.com/office/drawing/2014/main" id="{B89F2B84-EA76-A39A-E5D6-922238E97EE6}"/>
               </a:ext>
             </a:extLst>
           </p:cNvPr>
-          <p:cNvSpPr>
-            <a:spLocks noGrp="1"/>
-          </p:cNvSpPr>
+          <p:cNvGraphicFramePr>
+            <a:graphicFrameLocks noGrp="1"/>
+          </p:cNvGraphicFramePr>
           <p:nvPr>
             <p:ph idx="1"/>
+            <p:extLst>
+              <p:ext uri="{D42A27DB-BD31-4B8C-83A1-F6EECF244321}">
+                <p14:modId xmlns:p14="http://schemas.microsoft.com/office/powerpoint/2010/main" val="2204620412"/>
+              </p:ext>
+            </p:extLst>
           </p:nvPr>
-        </p:nvSpPr>
-        <p:spPr/>
-        <p:txBody>
-          <a:bodyPr/>
-          <a:lstStyle/>
-          <a:p>
-            <a:endParaRPr lang="de-DE"/>
-          </a:p>
-        </p:txBody>
-      </p:sp>
+        </p:nvGraphicFramePr>
+        <p:xfrm>
+          <a:off x="5914231" y="1887197"/>
+          <a:ext cx="3588544" cy="3468579"/>
+        </p:xfrm>
+        <a:graphic>
+          <a:graphicData uri="http://schemas.openxmlformats.org/drawingml/2006/table">
+            <a:tbl>
+              <a:tblPr/>
+              <a:tblGrid>
+                <a:gridCol w="1238148">
+                  <a:extLst>
+                    <a:ext uri="{9D8B030D-6E8A-4147-A177-3AD203B41FA5}">
+                      <a16:colId xmlns:a16="http://schemas.microsoft.com/office/drawing/2014/main" val="708977181"/>
+                    </a:ext>
+                  </a:extLst>
+                </a:gridCol>
+                <a:gridCol w="1238148">
+                  <a:extLst>
+                    <a:ext uri="{9D8B030D-6E8A-4147-A177-3AD203B41FA5}">
+                      <a16:colId xmlns:a16="http://schemas.microsoft.com/office/drawing/2014/main" val="3510200545"/>
+                    </a:ext>
+                  </a:extLst>
+                </a:gridCol>
+                <a:gridCol w="1112248">
+                  <a:extLst>
+                    <a:ext uri="{9D8B030D-6E8A-4147-A177-3AD203B41FA5}">
+                      <a16:colId xmlns:a16="http://schemas.microsoft.com/office/drawing/2014/main" val="771396892"/>
+                    </a:ext>
+                  </a:extLst>
+                </a:gridCol>
+              </a:tblGrid>
+              <a:tr h="149536">
+                <a:tc>
+                  <a:txBody>
+                    <a:bodyPr/>
+                    <a:lstStyle/>
+                    <a:p>
+                      <a:pPr algn="ctr"/>
+                      <a:r>
+                        <a:rPr lang="de-DE" sz="1000" dirty="0"/>
+                        <a:t>Roof</a:t>
+                      </a:r>
+                    </a:p>
+                  </a:txBody>
+                  <a:tcPr marL="175" marR="175" marT="175" marB="175">
+                    <a:lnL>
+                      <a:noFill/>
+                    </a:lnL>
+                    <a:lnR>
+                      <a:noFill/>
+                    </a:lnR>
+                    <a:lnT>
+                      <a:noFill/>
+                    </a:lnT>
+                    <a:lnB>
+                      <a:noFill/>
+                    </a:lnB>
+                    <a:noFill/>
+                  </a:tcPr>
+                </a:tc>
+                <a:tc>
+                  <a:txBody>
+                    <a:bodyPr/>
+                    <a:lstStyle/>
+                    <a:p>
+                      <a:pPr algn="ctr"/>
+                      <a:r>
+                        <a:rPr lang="de-DE" sz="1000"/>
+                        <a:t>168.9 m</a:t>
+                      </a:r>
+                      <a:r>
+                        <a:rPr lang="de-DE" sz="1000" baseline="30000"/>
+                        <a:t>2</a:t>
+                      </a:r>
+                      <a:endParaRPr lang="de-DE" sz="1000"/>
+                    </a:p>
+                  </a:txBody>
+                  <a:tcPr marL="175" marR="175" marT="175" marB="175">
+                    <a:lnL>
+                      <a:noFill/>
+                    </a:lnL>
+                    <a:lnR>
+                      <a:noFill/>
+                    </a:lnR>
+                    <a:lnT>
+                      <a:noFill/>
+                    </a:lnT>
+                    <a:lnB>
+                      <a:noFill/>
+                    </a:lnB>
+                    <a:noFill/>
+                  </a:tcPr>
+                </a:tc>
+                <a:tc>
+                  <a:txBody>
+                    <a:bodyPr/>
+                    <a:lstStyle/>
+                    <a:p>
+                      <a:pPr algn="ctr"/>
+                      <a:r>
+                        <a:rPr lang="de-DE" sz="1000"/>
+                        <a:t>168.9m</a:t>
+                      </a:r>
+                      <a:r>
+                        <a:rPr lang="de-DE" sz="1000" baseline="30000"/>
+                        <a:t>2</a:t>
+                      </a:r>
+                      <a:endParaRPr lang="de-DE" sz="1000"/>
+                    </a:p>
+                  </a:txBody>
+                  <a:tcPr marL="175" marR="175" marT="175" marB="175">
+                    <a:lnL>
+                      <a:noFill/>
+                    </a:lnL>
+                    <a:lnR>
+                      <a:noFill/>
+                    </a:lnR>
+                    <a:lnT>
+                      <a:noFill/>
+                    </a:lnT>
+                    <a:lnB>
+                      <a:noFill/>
+                    </a:lnB>
+                    <a:noFill/>
+                  </a:tcPr>
+                </a:tc>
+                <a:extLst>
+                  <a:ext uri="{0D108BD9-81ED-4DB2-BD59-A6C34878D82A}">
+                    <a16:rowId xmlns:a16="http://schemas.microsoft.com/office/drawing/2014/main" val="305611027"/>
+                  </a:ext>
+                </a:extLst>
+              </a:tr>
+              <a:tr h="148243">
+                <a:tc>
+                  <a:txBody>
+                    <a:bodyPr/>
+                    <a:lstStyle/>
+                    <a:p>
+                      <a:pPr algn="ctr"/>
+                      <a:endParaRPr lang="en-US" sz="1000" dirty="0"/>
+                    </a:p>
+                  </a:txBody>
+                  <a:tcPr marL="175" marR="175" marT="175" marB="175" anchor="ctr">
+                    <a:lnL>
+                      <a:noFill/>
+                    </a:lnL>
+                    <a:lnR>
+                      <a:noFill/>
+                    </a:lnR>
+                    <a:lnT>
+                      <a:noFill/>
+                    </a:lnT>
+                    <a:lnB>
+                      <a:noFill/>
+                    </a:lnB>
+                    <a:noFill/>
+                  </a:tcPr>
+                </a:tc>
+                <a:tc>
+                  <a:txBody>
+                    <a:bodyPr/>
+                    <a:lstStyle/>
+                    <a:p>
+                      <a:pPr algn="ctr"/>
+                      <a:endParaRPr lang="en-US" sz="1000"/>
+                    </a:p>
+                  </a:txBody>
+                  <a:tcPr marL="175" marR="175" marT="175" marB="175">
+                    <a:lnL>
+                      <a:noFill/>
+                    </a:lnL>
+                    <a:lnR>
+                      <a:noFill/>
+                    </a:lnR>
+                    <a:lnT>
+                      <a:noFill/>
+                    </a:lnT>
+                    <a:lnB>
+                      <a:noFill/>
+                    </a:lnB>
+                    <a:noFill/>
+                  </a:tcPr>
+                </a:tc>
+                <a:tc>
+                  <a:txBody>
+                    <a:bodyPr/>
+                    <a:lstStyle/>
+                    <a:p>
+                      <a:pPr algn="ctr"/>
+                      <a:endParaRPr lang="de-DE" sz="1000" dirty="0"/>
+                    </a:p>
+                  </a:txBody>
+                  <a:tcPr marL="175" marR="175" marT="175" marB="175">
+                    <a:lnL>
+                      <a:noFill/>
+                    </a:lnL>
+                    <a:lnR>
+                      <a:noFill/>
+                    </a:lnR>
+                    <a:lnT>
+                      <a:noFill/>
+                    </a:lnT>
+                    <a:lnB>
+                      <a:noFill/>
+                    </a:lnB>
+                    <a:noFill/>
+                  </a:tcPr>
+                </a:tc>
+                <a:extLst>
+                  <a:ext uri="{0D108BD9-81ED-4DB2-BD59-A6C34878D82A}">
+                    <a16:rowId xmlns:a16="http://schemas.microsoft.com/office/drawing/2014/main" val="1498780541"/>
+                  </a:ext>
+                </a:extLst>
+              </a:tr>
+              <a:tr h="148243">
+                <a:tc>
+                  <a:txBody>
+                    <a:bodyPr/>
+                    <a:lstStyle/>
+                    <a:p>
+                      <a:pPr algn="ctr"/>
+                      <a:r>
+                        <a:rPr lang="de-DE" sz="1000" dirty="0"/>
+                        <a:t>Picture</a:t>
+                      </a:r>
+                    </a:p>
+                  </a:txBody>
+                  <a:tcPr marL="175" marR="175" marT="175" marB="175" anchor="ctr">
+                    <a:lnL>
+                      <a:noFill/>
+                    </a:lnL>
+                    <a:lnR>
+                      <a:noFill/>
+                    </a:lnR>
+                    <a:lnT>
+                      <a:noFill/>
+                    </a:lnT>
+                    <a:lnB>
+                      <a:noFill/>
+                    </a:lnB>
+                    <a:noFill/>
+                  </a:tcPr>
+                </a:tc>
+                <a:tc>
+                  <a:txBody>
+                    <a:bodyPr/>
+                    <a:lstStyle/>
+                    <a:p>
+                      <a:pPr algn="ctr"/>
+                      <a:endParaRPr lang="de-DE" sz="1000"/>
+                    </a:p>
+                  </a:txBody>
+                  <a:tcPr marL="175" marR="175" marT="175" marB="175">
+                    <a:lnL>
+                      <a:noFill/>
+                    </a:lnL>
+                    <a:lnR>
+                      <a:noFill/>
+                    </a:lnR>
+                    <a:lnT>
+                      <a:noFill/>
+                    </a:lnT>
+                    <a:lnB>
+                      <a:noFill/>
+                    </a:lnB>
+                    <a:noFill/>
+                  </a:tcPr>
+                </a:tc>
+                <a:tc>
+                  <a:txBody>
+                    <a:bodyPr/>
+                    <a:lstStyle/>
+                    <a:p>
+                      <a:pPr algn="ctr"/>
+                      <a:endParaRPr lang="de-DE" sz="1000"/>
+                    </a:p>
+                  </a:txBody>
+                  <a:tcPr marL="175" marR="175" marT="175" marB="175">
+                    <a:lnL>
+                      <a:noFill/>
+                    </a:lnL>
+                    <a:lnR>
+                      <a:noFill/>
+                    </a:lnR>
+                    <a:lnT>
+                      <a:noFill/>
+                    </a:lnT>
+                    <a:lnB>
+                      <a:noFill/>
+                    </a:lnB>
+                    <a:noFill/>
+                  </a:tcPr>
+                </a:tc>
+                <a:extLst>
+                  <a:ext uri="{0D108BD9-81ED-4DB2-BD59-A6C34878D82A}">
+                    <a16:rowId xmlns:a16="http://schemas.microsoft.com/office/drawing/2014/main" val="3801926917"/>
+                  </a:ext>
+                </a:extLst>
+              </a:tr>
+              <a:tr h="148243">
+                <a:tc>
+                  <a:txBody>
+                    <a:bodyPr/>
+                    <a:lstStyle/>
+                    <a:p>
+                      <a:pPr algn="ctr"/>
+                      <a:r>
+                        <a:rPr lang="de-DE" sz="1000" dirty="0"/>
+                        <a:t>U-</a:t>
+                      </a:r>
+                      <a:r>
+                        <a:rPr lang="de-DE" sz="1000" dirty="0" err="1"/>
+                        <a:t>value</a:t>
+                      </a:r>
+                      <a:endParaRPr lang="de-DE" sz="1000" dirty="0"/>
+                    </a:p>
+                  </a:txBody>
+                  <a:tcPr marL="175" marR="175" marT="175" marB="175" anchor="ctr">
+                    <a:lnL>
+                      <a:noFill/>
+                    </a:lnL>
+                    <a:lnR>
+                      <a:noFill/>
+                    </a:lnR>
+                    <a:lnT>
+                      <a:noFill/>
+                    </a:lnT>
+                    <a:lnB>
+                      <a:noFill/>
+                    </a:lnB>
+                    <a:noFill/>
+                  </a:tcPr>
+                </a:tc>
+                <a:tc>
+                  <a:txBody>
+                    <a:bodyPr/>
+                    <a:lstStyle/>
+                    <a:p>
+                      <a:pPr algn="ctr">
+                        <a:buNone/>
+                      </a:pPr>
+                      <a:r>
+                        <a:rPr lang="de-DE" sz="1000"/>
+                        <a:t>0.80 W/(m</a:t>
+                      </a:r>
+                      <a:r>
+                        <a:rPr lang="de-DE" sz="1000" baseline="30000"/>
+                        <a:t>2</a:t>
+                      </a:r>
+                      <a:r>
+                        <a:rPr lang="de-DE" sz="1000"/>
+                        <a:t>K)</a:t>
+                      </a:r>
+                    </a:p>
+                  </a:txBody>
+                  <a:tcPr marL="175" marR="175" marT="175" marB="175" anchor="ctr">
+                    <a:lnL>
+                      <a:noFill/>
+                    </a:lnL>
+                    <a:lnR>
+                      <a:noFill/>
+                    </a:lnR>
+                    <a:lnT>
+                      <a:noFill/>
+                    </a:lnT>
+                    <a:lnB>
+                      <a:noFill/>
+                    </a:lnB>
+                    <a:noFill/>
+                  </a:tcPr>
+                </a:tc>
+                <a:tc>
+                  <a:txBody>
+                    <a:bodyPr/>
+                    <a:lstStyle/>
+                    <a:p>
+                      <a:pPr algn="ctr">
+                        <a:buNone/>
+                      </a:pPr>
+                      <a:r>
+                        <a:rPr lang="de-DE" sz="1000"/>
+                        <a:t>0.41 W/(m</a:t>
+                      </a:r>
+                      <a:r>
+                        <a:rPr lang="de-DE" sz="1000" baseline="30000"/>
+                        <a:t>2</a:t>
+                      </a:r>
+                      <a:r>
+                        <a:rPr lang="de-DE" sz="1000"/>
+                        <a:t>K)</a:t>
+                      </a:r>
+                    </a:p>
+                  </a:txBody>
+                  <a:tcPr marL="175" marR="175" marT="175" marB="175" anchor="ctr">
+                    <a:lnL>
+                      <a:noFill/>
+                    </a:lnL>
+                    <a:lnR>
+                      <a:noFill/>
+                    </a:lnR>
+                    <a:lnT>
+                      <a:noFill/>
+                    </a:lnT>
+                    <a:lnB>
+                      <a:noFill/>
+                    </a:lnB>
+                    <a:noFill/>
+                  </a:tcPr>
+                </a:tc>
+                <a:extLst>
+                  <a:ext uri="{0D108BD9-81ED-4DB2-BD59-A6C34878D82A}">
+                    <a16:rowId xmlns:a16="http://schemas.microsoft.com/office/drawing/2014/main" val="3819316049"/>
+                  </a:ext>
+                </a:extLst>
+              </a:tr>
+              <a:tr h="148243">
+                <a:tc rowSpan="4">
+                  <a:txBody>
+                    <a:bodyPr/>
+                    <a:lstStyle/>
+                    <a:p>
+                      <a:pPr algn="ctr"/>
+                      <a:r>
+                        <a:rPr lang="de-DE" sz="1000" dirty="0"/>
+                        <a:t>Wall 1</a:t>
+                      </a:r>
+                    </a:p>
+                  </a:txBody>
+                  <a:tcPr marL="175" marR="175" marT="175" marB="175" anchor="ctr">
+                    <a:lnL>
+                      <a:noFill/>
+                    </a:lnL>
+                    <a:lnR>
+                      <a:noFill/>
+                    </a:lnR>
+                    <a:lnT>
+                      <a:noFill/>
+                    </a:lnT>
+                    <a:lnB>
+                      <a:noFill/>
+                    </a:lnB>
+                    <a:noFill/>
+                  </a:tcPr>
+                </a:tc>
+                <a:tc>
+                  <a:txBody>
+                    <a:bodyPr/>
+                    <a:lstStyle/>
+                    <a:p>
+                      <a:pPr algn="ctr"/>
+                      <a:r>
+                        <a:rPr lang="de-DE" sz="1000"/>
+                        <a:t>surface area</a:t>
+                      </a:r>
+                    </a:p>
+                  </a:txBody>
+                  <a:tcPr marL="175" marR="175" marT="175" marB="175" anchor="ctr">
+                    <a:lnL>
+                      <a:noFill/>
+                    </a:lnL>
+                    <a:lnR>
+                      <a:noFill/>
+                    </a:lnR>
+                    <a:lnT>
+                      <a:noFill/>
+                    </a:lnT>
+                    <a:lnB>
+                      <a:noFill/>
+                    </a:lnB>
+                    <a:noFill/>
+                  </a:tcPr>
+                </a:tc>
+                <a:tc>
+                  <a:txBody>
+                    <a:bodyPr/>
+                    <a:lstStyle/>
+                    <a:p>
+                      <a:pPr algn="ctr"/>
+                      <a:r>
+                        <a:rPr lang="de-DE" sz="1000" dirty="0"/>
+                        <a:t>141.2m</a:t>
+                      </a:r>
+                      <a:r>
+                        <a:rPr lang="de-DE" sz="1000" baseline="30000" dirty="0"/>
+                        <a:t>2</a:t>
+                      </a:r>
+                      <a:endParaRPr lang="de-DE" sz="1000" dirty="0"/>
+                    </a:p>
+                  </a:txBody>
+                  <a:tcPr marL="175" marR="175" marT="175" marB="175">
+                    <a:lnL>
+                      <a:noFill/>
+                    </a:lnL>
+                    <a:lnR>
+                      <a:noFill/>
+                    </a:lnR>
+                    <a:lnT>
+                      <a:noFill/>
+                    </a:lnT>
+                    <a:lnB>
+                      <a:noFill/>
+                    </a:lnB>
+                    <a:noFill/>
+                  </a:tcPr>
+                </a:tc>
+                <a:extLst>
+                  <a:ext uri="{0D108BD9-81ED-4DB2-BD59-A6C34878D82A}">
+                    <a16:rowId xmlns:a16="http://schemas.microsoft.com/office/drawing/2014/main" val="2126366399"/>
+                  </a:ext>
+                </a:extLst>
+              </a:tr>
+              <a:tr h="148243">
+                <a:tc vMerge="1">
+                  <a:txBody>
+                    <a:bodyPr/>
+                    <a:lstStyle/>
+                    <a:p>
+                      <a:endParaRPr lang="de-DE"/>
+                    </a:p>
+                  </a:txBody>
+                  <a:tcPr/>
+                </a:tc>
+                <a:tc>
+                  <a:txBody>
+                    <a:bodyPr/>
+                    <a:lstStyle/>
+                    <a:p>
+                      <a:pPr algn="ctr"/>
+                      <a:endParaRPr lang="en-US" sz="1000" dirty="0"/>
+                    </a:p>
+                  </a:txBody>
+                  <a:tcPr marL="175" marR="175" marT="175" marB="175" anchor="ctr">
+                    <a:lnL>
+                      <a:noFill/>
+                    </a:lnL>
+                    <a:lnR>
+                      <a:noFill/>
+                    </a:lnR>
+                    <a:lnT>
+                      <a:noFill/>
+                    </a:lnT>
+                    <a:lnB>
+                      <a:noFill/>
+                    </a:lnB>
+                    <a:noFill/>
+                  </a:tcPr>
+                </a:tc>
+                <a:tc>
+                  <a:txBody>
+                    <a:bodyPr/>
+                    <a:lstStyle/>
+                    <a:p>
+                      <a:pPr algn="ctr"/>
+                      <a:endParaRPr lang="de-DE" sz="1000" dirty="0"/>
+                    </a:p>
+                  </a:txBody>
+                  <a:tcPr marL="175" marR="175" marT="175" marB="175">
+                    <a:lnL>
+                      <a:noFill/>
+                    </a:lnL>
+                    <a:lnR>
+                      <a:noFill/>
+                    </a:lnR>
+                    <a:lnT>
+                      <a:noFill/>
+                    </a:lnT>
+                    <a:lnB>
+                      <a:noFill/>
+                    </a:lnB>
+                    <a:noFill/>
+                  </a:tcPr>
+                </a:tc>
+                <a:extLst>
+                  <a:ext uri="{0D108BD9-81ED-4DB2-BD59-A6C34878D82A}">
+                    <a16:rowId xmlns:a16="http://schemas.microsoft.com/office/drawing/2014/main" val="3796607507"/>
+                  </a:ext>
+                </a:extLst>
+              </a:tr>
+              <a:tr h="148243">
+                <a:tc vMerge="1">
+                  <a:txBody>
+                    <a:bodyPr/>
+                    <a:lstStyle/>
+                    <a:p>
+                      <a:endParaRPr lang="de-DE"/>
+                    </a:p>
+                  </a:txBody>
+                  <a:tcPr/>
+                </a:tc>
+                <a:tc>
+                  <a:txBody>
+                    <a:bodyPr/>
+                    <a:lstStyle/>
+                    <a:p>
+                      <a:pPr algn="ctr"/>
+                      <a:r>
+                        <a:rPr lang="de-DE" sz="1000" dirty="0" err="1"/>
+                        <a:t>picture</a:t>
+                      </a:r>
+                      <a:endParaRPr lang="de-DE" sz="1000" dirty="0"/>
+                    </a:p>
+                  </a:txBody>
+                  <a:tcPr marL="175" marR="175" marT="175" marB="175" anchor="ctr">
+                    <a:lnL>
+                      <a:noFill/>
+                    </a:lnL>
+                    <a:lnR>
+                      <a:noFill/>
+                    </a:lnR>
+                    <a:lnT>
+                      <a:noFill/>
+                    </a:lnT>
+                    <a:lnB>
+                      <a:noFill/>
+                    </a:lnB>
+                    <a:noFill/>
+                  </a:tcPr>
+                </a:tc>
+                <a:tc>
+                  <a:txBody>
+                    <a:bodyPr/>
+                    <a:lstStyle/>
+                    <a:p>
+                      <a:pPr algn="ctr"/>
+                      <a:endParaRPr lang="de-DE" sz="1000" dirty="0"/>
+                    </a:p>
+                  </a:txBody>
+                  <a:tcPr marL="175" marR="175" marT="175" marB="175">
+                    <a:lnL>
+                      <a:noFill/>
+                    </a:lnL>
+                    <a:lnR>
+                      <a:noFill/>
+                    </a:lnR>
+                    <a:lnT>
+                      <a:noFill/>
+                    </a:lnT>
+                    <a:lnB>
+                      <a:noFill/>
+                    </a:lnB>
+                    <a:noFill/>
+                  </a:tcPr>
+                </a:tc>
+                <a:extLst>
+                  <a:ext uri="{0D108BD9-81ED-4DB2-BD59-A6C34878D82A}">
+                    <a16:rowId xmlns:a16="http://schemas.microsoft.com/office/drawing/2014/main" val="1024505900"/>
+                  </a:ext>
+                </a:extLst>
+              </a:tr>
+              <a:tr h="148243">
+                <a:tc vMerge="1">
+                  <a:txBody>
+                    <a:bodyPr/>
+                    <a:lstStyle/>
+                    <a:p>
+                      <a:endParaRPr lang="de-DE"/>
+                    </a:p>
+                  </a:txBody>
+                  <a:tcPr/>
+                </a:tc>
+                <a:tc>
+                  <a:txBody>
+                    <a:bodyPr/>
+                    <a:lstStyle/>
+                    <a:p>
+                      <a:pPr algn="ctr"/>
+                      <a:r>
+                        <a:rPr lang="de-DE" sz="1000"/>
+                        <a:t>U-value</a:t>
+                      </a:r>
+                    </a:p>
+                  </a:txBody>
+                  <a:tcPr marL="175" marR="175" marT="175" marB="175" anchor="ctr">
+                    <a:lnL>
+                      <a:noFill/>
+                    </a:lnL>
+                    <a:lnR>
+                      <a:noFill/>
+                    </a:lnR>
+                    <a:lnT>
+                      <a:noFill/>
+                    </a:lnT>
+                    <a:lnB>
+                      <a:noFill/>
+                    </a:lnB>
+                    <a:noFill/>
+                  </a:tcPr>
+                </a:tc>
+                <a:tc>
+                  <a:txBody>
+                    <a:bodyPr/>
+                    <a:lstStyle/>
+                    <a:p>
+                      <a:pPr algn="ctr">
+                        <a:buNone/>
+                      </a:pPr>
+                      <a:r>
+                        <a:rPr lang="de-DE" sz="1000" dirty="0"/>
+                        <a:t>1.20 W/(m</a:t>
+                      </a:r>
+                      <a:r>
+                        <a:rPr lang="de-DE" sz="1000" baseline="30000" dirty="0"/>
+                        <a:t>2</a:t>
+                      </a:r>
+                      <a:r>
+                        <a:rPr lang="de-DE" sz="1000" dirty="0"/>
+                        <a:t>K)</a:t>
+                      </a:r>
+                    </a:p>
+                  </a:txBody>
+                  <a:tcPr marL="175" marR="175" marT="175" marB="175" anchor="ctr">
+                    <a:lnL>
+                      <a:noFill/>
+                    </a:lnL>
+                    <a:lnR>
+                      <a:noFill/>
+                    </a:lnR>
+                    <a:lnT>
+                      <a:noFill/>
+                    </a:lnT>
+                    <a:lnB>
+                      <a:noFill/>
+                    </a:lnB>
+                    <a:noFill/>
+                  </a:tcPr>
+                </a:tc>
+                <a:extLst>
+                  <a:ext uri="{0D108BD9-81ED-4DB2-BD59-A6C34878D82A}">
+                    <a16:rowId xmlns:a16="http://schemas.microsoft.com/office/drawing/2014/main" val="1490733988"/>
+                  </a:ext>
+                </a:extLst>
+              </a:tr>
+              <a:tr h="148243">
+                <a:tc rowSpan="4">
+                  <a:txBody>
+                    <a:bodyPr/>
+                    <a:lstStyle/>
+                    <a:p>
+                      <a:pPr algn="ctr"/>
+                      <a:r>
+                        <a:rPr lang="de-DE" sz="1000"/>
+                        <a:t>Wall 2</a:t>
+                      </a:r>
+                    </a:p>
+                  </a:txBody>
+                  <a:tcPr marL="175" marR="175" marT="175" marB="175" anchor="ctr">
+                    <a:lnL>
+                      <a:noFill/>
+                    </a:lnL>
+                    <a:lnR>
+                      <a:noFill/>
+                    </a:lnR>
+                    <a:lnT>
+                      <a:noFill/>
+                    </a:lnT>
+                    <a:lnB>
+                      <a:noFill/>
+                    </a:lnB>
+                    <a:noFill/>
+                  </a:tcPr>
+                </a:tc>
+                <a:tc>
+                  <a:txBody>
+                    <a:bodyPr/>
+                    <a:lstStyle/>
+                    <a:p>
+                      <a:pPr algn="ctr"/>
+                      <a:r>
+                        <a:rPr lang="de-DE" sz="1000"/>
+                        <a:t>surface area</a:t>
+                      </a:r>
+                    </a:p>
+                  </a:txBody>
+                  <a:tcPr marL="175" marR="175" marT="175" marB="175" anchor="ctr">
+                    <a:lnL>
+                      <a:noFill/>
+                    </a:lnL>
+                    <a:lnR>
+                      <a:noFill/>
+                    </a:lnR>
+                    <a:lnT>
+                      <a:noFill/>
+                    </a:lnT>
+                    <a:lnB>
+                      <a:noFill/>
+                    </a:lnB>
+                    <a:noFill/>
+                  </a:tcPr>
+                </a:tc>
+                <a:tc>
+                  <a:txBody>
+                    <a:bodyPr/>
+                    <a:lstStyle/>
+                    <a:p>
+                      <a:pPr algn="ctr"/>
+                      <a:r>
+                        <a:rPr lang="de-DE" sz="1000" dirty="0"/>
+                        <a:t>8.7m</a:t>
+                      </a:r>
+                      <a:r>
+                        <a:rPr lang="de-DE" sz="1000" baseline="30000" dirty="0"/>
+                        <a:t>2</a:t>
+                      </a:r>
+                      <a:endParaRPr lang="de-DE" sz="1000" dirty="0"/>
+                    </a:p>
+                  </a:txBody>
+                  <a:tcPr marL="175" marR="175" marT="175" marB="175">
+                    <a:lnL>
+                      <a:noFill/>
+                    </a:lnL>
+                    <a:lnR>
+                      <a:noFill/>
+                    </a:lnR>
+                    <a:lnT>
+                      <a:noFill/>
+                    </a:lnT>
+                    <a:lnB>
+                      <a:noFill/>
+                    </a:lnB>
+                    <a:noFill/>
+                  </a:tcPr>
+                </a:tc>
+                <a:extLst>
+                  <a:ext uri="{0D108BD9-81ED-4DB2-BD59-A6C34878D82A}">
+                    <a16:rowId xmlns:a16="http://schemas.microsoft.com/office/drawing/2014/main" val="1829033268"/>
+                  </a:ext>
+                </a:extLst>
+              </a:tr>
+              <a:tr h="236034">
+                <a:tc vMerge="1">
+                  <a:txBody>
+                    <a:bodyPr/>
+                    <a:lstStyle/>
+                    <a:p>
+                      <a:endParaRPr lang="de-DE"/>
+                    </a:p>
+                  </a:txBody>
+                  <a:tcPr/>
+                </a:tc>
+                <a:tc>
+                  <a:txBody>
+                    <a:bodyPr/>
+                    <a:lstStyle/>
+                    <a:p>
+                      <a:pPr algn="ctr"/>
+                      <a:endParaRPr lang="en-US" sz="1000" dirty="0"/>
+                    </a:p>
+                  </a:txBody>
+                  <a:tcPr marL="175" marR="175" marT="175" marB="175" anchor="ctr">
+                    <a:lnL>
+                      <a:noFill/>
+                    </a:lnL>
+                    <a:lnR>
+                      <a:noFill/>
+                    </a:lnR>
+                    <a:lnT>
+                      <a:noFill/>
+                    </a:lnT>
+                    <a:lnB>
+                      <a:noFill/>
+                    </a:lnB>
+                    <a:noFill/>
+                  </a:tcPr>
+                </a:tc>
+                <a:tc>
+                  <a:txBody>
+                    <a:bodyPr/>
+                    <a:lstStyle/>
+                    <a:p>
+                      <a:pPr algn="ctr"/>
+                      <a:endParaRPr lang="de-DE" sz="1000" dirty="0"/>
+                    </a:p>
+                  </a:txBody>
+                  <a:tcPr marL="175" marR="175" marT="175" marB="175">
+                    <a:lnL>
+                      <a:noFill/>
+                    </a:lnL>
+                    <a:lnR>
+                      <a:noFill/>
+                    </a:lnR>
+                    <a:lnT>
+                      <a:noFill/>
+                    </a:lnT>
+                    <a:lnB>
+                      <a:noFill/>
+                    </a:lnB>
+                    <a:noFill/>
+                  </a:tcPr>
+                </a:tc>
+                <a:extLst>
+                  <a:ext uri="{0D108BD9-81ED-4DB2-BD59-A6C34878D82A}">
+                    <a16:rowId xmlns:a16="http://schemas.microsoft.com/office/drawing/2014/main" val="901643382"/>
+                  </a:ext>
+                </a:extLst>
+              </a:tr>
+              <a:tr h="148243">
+                <a:tc vMerge="1">
+                  <a:txBody>
+                    <a:bodyPr/>
+                    <a:lstStyle/>
+                    <a:p>
+                      <a:endParaRPr lang="de-DE"/>
+                    </a:p>
+                  </a:txBody>
+                  <a:tcPr/>
+                </a:tc>
+                <a:tc>
+                  <a:txBody>
+                    <a:bodyPr/>
+                    <a:lstStyle/>
+                    <a:p>
+                      <a:pPr algn="ctr"/>
+                      <a:r>
+                        <a:rPr lang="de-DE" sz="1000"/>
+                        <a:t>picture</a:t>
+                      </a:r>
+                    </a:p>
+                  </a:txBody>
+                  <a:tcPr marL="175" marR="175" marT="175" marB="175" anchor="ctr">
+                    <a:lnL>
+                      <a:noFill/>
+                    </a:lnL>
+                    <a:lnR>
+                      <a:noFill/>
+                    </a:lnR>
+                    <a:lnT>
+                      <a:noFill/>
+                    </a:lnT>
+                    <a:lnB>
+                      <a:noFill/>
+                    </a:lnB>
+                    <a:noFill/>
+                  </a:tcPr>
+                </a:tc>
+                <a:tc>
+                  <a:txBody>
+                    <a:bodyPr/>
+                    <a:lstStyle/>
+                    <a:p>
+                      <a:pPr algn="ctr"/>
+                      <a:endParaRPr lang="de-DE" sz="1000"/>
+                    </a:p>
+                  </a:txBody>
+                  <a:tcPr marL="175" marR="175" marT="175" marB="175">
+                    <a:lnL>
+                      <a:noFill/>
+                    </a:lnL>
+                    <a:lnR>
+                      <a:noFill/>
+                    </a:lnR>
+                    <a:lnT>
+                      <a:noFill/>
+                    </a:lnT>
+                    <a:lnB>
+                      <a:noFill/>
+                    </a:lnB>
+                    <a:noFill/>
+                  </a:tcPr>
+                </a:tc>
+                <a:extLst>
+                  <a:ext uri="{0D108BD9-81ED-4DB2-BD59-A6C34878D82A}">
+                    <a16:rowId xmlns:a16="http://schemas.microsoft.com/office/drawing/2014/main" val="3405159125"/>
+                  </a:ext>
+                </a:extLst>
+              </a:tr>
+              <a:tr h="148243">
+                <a:tc vMerge="1">
+                  <a:txBody>
+                    <a:bodyPr/>
+                    <a:lstStyle/>
+                    <a:p>
+                      <a:endParaRPr lang="de-DE"/>
+                    </a:p>
+                  </a:txBody>
+                  <a:tcPr/>
+                </a:tc>
+                <a:tc>
+                  <a:txBody>
+                    <a:bodyPr/>
+                    <a:lstStyle/>
+                    <a:p>
+                      <a:pPr algn="ctr"/>
+                      <a:r>
+                        <a:rPr lang="de-DE" sz="1000"/>
+                        <a:t>U-value</a:t>
+                      </a:r>
+                    </a:p>
+                  </a:txBody>
+                  <a:tcPr marL="175" marR="175" marT="175" marB="175" anchor="ctr">
+                    <a:lnL>
+                      <a:noFill/>
+                    </a:lnL>
+                    <a:lnR>
+                      <a:noFill/>
+                    </a:lnR>
+                    <a:lnT>
+                      <a:noFill/>
+                    </a:lnT>
+                    <a:lnB>
+                      <a:noFill/>
+                    </a:lnB>
+                    <a:noFill/>
+                  </a:tcPr>
+                </a:tc>
+                <a:tc>
+                  <a:txBody>
+                    <a:bodyPr/>
+                    <a:lstStyle/>
+                    <a:p>
+                      <a:pPr algn="ctr">
+                        <a:buNone/>
+                      </a:pPr>
+                      <a:r>
+                        <a:rPr lang="de-DE" sz="1000"/>
+                        <a:t>0.80 W/(m</a:t>
+                      </a:r>
+                      <a:r>
+                        <a:rPr lang="de-DE" sz="1000" baseline="30000"/>
+                        <a:t>2</a:t>
+                      </a:r>
+                      <a:r>
+                        <a:rPr lang="de-DE" sz="1000"/>
+                        <a:t>K)</a:t>
+                      </a:r>
+                    </a:p>
+                  </a:txBody>
+                  <a:tcPr marL="175" marR="175" marT="175" marB="175" anchor="ctr">
+                    <a:lnL>
+                      <a:noFill/>
+                    </a:lnL>
+                    <a:lnR>
+                      <a:noFill/>
+                    </a:lnR>
+                    <a:lnT>
+                      <a:noFill/>
+                    </a:lnT>
+                    <a:lnB>
+                      <a:noFill/>
+                    </a:lnB>
+                    <a:noFill/>
+                  </a:tcPr>
+                </a:tc>
+                <a:extLst>
+                  <a:ext uri="{0D108BD9-81ED-4DB2-BD59-A6C34878D82A}">
+                    <a16:rowId xmlns:a16="http://schemas.microsoft.com/office/drawing/2014/main" val="2440184351"/>
+                  </a:ext>
+                </a:extLst>
+              </a:tr>
+              <a:tr h="148243">
+                <a:tc rowSpan="4">
+                  <a:txBody>
+                    <a:bodyPr/>
+                    <a:lstStyle/>
+                    <a:p>
+                      <a:pPr algn="ctr"/>
+                      <a:r>
+                        <a:rPr lang="de-DE" sz="1000"/>
+                        <a:t>Floor 1</a:t>
+                      </a:r>
+                    </a:p>
+                  </a:txBody>
+                  <a:tcPr marL="175" marR="175" marT="175" marB="175" anchor="ctr">
+                    <a:lnL>
+                      <a:noFill/>
+                    </a:lnL>
+                    <a:lnR>
+                      <a:noFill/>
+                    </a:lnR>
+                    <a:lnT>
+                      <a:noFill/>
+                    </a:lnT>
+                    <a:lnB>
+                      <a:noFill/>
+                    </a:lnB>
+                    <a:noFill/>
+                  </a:tcPr>
+                </a:tc>
+                <a:tc>
+                  <a:txBody>
+                    <a:bodyPr/>
+                    <a:lstStyle/>
+                    <a:p>
+                      <a:pPr algn="ctr"/>
+                      <a:r>
+                        <a:rPr lang="de-DE" sz="1000"/>
+                        <a:t>surface area</a:t>
+                      </a:r>
+                    </a:p>
+                  </a:txBody>
+                  <a:tcPr marL="175" marR="175" marT="175" marB="175" anchor="ctr">
+                    <a:lnL>
+                      <a:noFill/>
+                    </a:lnL>
+                    <a:lnR>
+                      <a:noFill/>
+                    </a:lnR>
+                    <a:lnT>
+                      <a:noFill/>
+                    </a:lnT>
+                    <a:lnB>
+                      <a:noFill/>
+                    </a:lnB>
+                    <a:noFill/>
+                  </a:tcPr>
+                </a:tc>
+                <a:tc>
+                  <a:txBody>
+                    <a:bodyPr/>
+                    <a:lstStyle/>
+                    <a:p>
+                      <a:pPr algn="ctr"/>
+                      <a:r>
+                        <a:rPr lang="de-DE" sz="1000"/>
+                        <a:t>115.8m</a:t>
+                      </a:r>
+                      <a:r>
+                        <a:rPr lang="de-DE" sz="1000" baseline="30000"/>
+                        <a:t>2</a:t>
+                      </a:r>
+                      <a:endParaRPr lang="de-DE" sz="1000"/>
+                    </a:p>
+                  </a:txBody>
+                  <a:tcPr marL="175" marR="175" marT="175" marB="175">
+                    <a:lnL>
+                      <a:noFill/>
+                    </a:lnL>
+                    <a:lnR>
+                      <a:noFill/>
+                    </a:lnR>
+                    <a:lnT>
+                      <a:noFill/>
+                    </a:lnT>
+                    <a:lnB>
+                      <a:noFill/>
+                    </a:lnB>
+                    <a:noFill/>
+                  </a:tcPr>
+                </a:tc>
+                <a:extLst>
+                  <a:ext uri="{0D108BD9-81ED-4DB2-BD59-A6C34878D82A}">
+                    <a16:rowId xmlns:a16="http://schemas.microsoft.com/office/drawing/2014/main" val="3406390501"/>
+                  </a:ext>
+                </a:extLst>
+              </a:tr>
+              <a:tr h="267056">
+                <a:tc vMerge="1">
+                  <a:txBody>
+                    <a:bodyPr/>
+                    <a:lstStyle/>
+                    <a:p>
+                      <a:endParaRPr lang="de-DE"/>
+                    </a:p>
+                  </a:txBody>
+                  <a:tcPr/>
+                </a:tc>
+                <a:tc>
+                  <a:txBody>
+                    <a:bodyPr/>
+                    <a:lstStyle/>
+                    <a:p>
+                      <a:pPr algn="ctr"/>
+                      <a:endParaRPr lang="en-US" sz="1000" dirty="0"/>
+                    </a:p>
+                  </a:txBody>
+                  <a:tcPr marL="175" marR="175" marT="175" marB="175" anchor="ctr">
+                    <a:lnL>
+                      <a:noFill/>
+                    </a:lnL>
+                    <a:lnR>
+                      <a:noFill/>
+                    </a:lnR>
+                    <a:lnT>
+                      <a:noFill/>
+                    </a:lnT>
+                    <a:lnB>
+                      <a:noFill/>
+                    </a:lnB>
+                    <a:noFill/>
+                  </a:tcPr>
+                </a:tc>
+                <a:tc>
+                  <a:txBody>
+                    <a:bodyPr/>
+                    <a:lstStyle/>
+                    <a:p>
+                      <a:pPr algn="ctr"/>
+                      <a:endParaRPr lang="de-DE" sz="1000" dirty="0"/>
+                    </a:p>
+                  </a:txBody>
+                  <a:tcPr marL="175" marR="175" marT="175" marB="175">
+                    <a:lnL>
+                      <a:noFill/>
+                    </a:lnL>
+                    <a:lnR>
+                      <a:noFill/>
+                    </a:lnR>
+                    <a:lnT>
+                      <a:noFill/>
+                    </a:lnT>
+                    <a:lnB>
+                      <a:noFill/>
+                    </a:lnB>
+                    <a:noFill/>
+                  </a:tcPr>
+                </a:tc>
+                <a:extLst>
+                  <a:ext uri="{0D108BD9-81ED-4DB2-BD59-A6C34878D82A}">
+                    <a16:rowId xmlns:a16="http://schemas.microsoft.com/office/drawing/2014/main" val="617245304"/>
+                  </a:ext>
+                </a:extLst>
+              </a:tr>
+              <a:tr h="148243">
+                <a:tc vMerge="1">
+                  <a:txBody>
+                    <a:bodyPr/>
+                    <a:lstStyle/>
+                    <a:p>
+                      <a:endParaRPr lang="de-DE"/>
+                    </a:p>
+                  </a:txBody>
+                  <a:tcPr/>
+                </a:tc>
+                <a:tc>
+                  <a:txBody>
+                    <a:bodyPr/>
+                    <a:lstStyle/>
+                    <a:p>
+                      <a:pPr algn="ctr"/>
+                      <a:r>
+                        <a:rPr lang="de-DE" sz="1000"/>
+                        <a:t>picture</a:t>
+                      </a:r>
+                    </a:p>
+                  </a:txBody>
+                  <a:tcPr marL="175" marR="175" marT="175" marB="175" anchor="ctr">
+                    <a:lnL>
+                      <a:noFill/>
+                    </a:lnL>
+                    <a:lnR>
+                      <a:noFill/>
+                    </a:lnR>
+                    <a:lnT>
+                      <a:noFill/>
+                    </a:lnT>
+                    <a:lnB>
+                      <a:noFill/>
+                    </a:lnB>
+                    <a:noFill/>
+                  </a:tcPr>
+                </a:tc>
+                <a:tc>
+                  <a:txBody>
+                    <a:bodyPr/>
+                    <a:lstStyle/>
+                    <a:p>
+                      <a:pPr algn="ctr"/>
+                      <a:endParaRPr lang="de-DE" sz="1000"/>
+                    </a:p>
+                  </a:txBody>
+                  <a:tcPr marL="175" marR="175" marT="175" marB="175">
+                    <a:lnL>
+                      <a:noFill/>
+                    </a:lnL>
+                    <a:lnR>
+                      <a:noFill/>
+                    </a:lnR>
+                    <a:lnT>
+                      <a:noFill/>
+                    </a:lnT>
+                    <a:lnB>
+                      <a:noFill/>
+                    </a:lnB>
+                    <a:noFill/>
+                  </a:tcPr>
+                </a:tc>
+                <a:extLst>
+                  <a:ext uri="{0D108BD9-81ED-4DB2-BD59-A6C34878D82A}">
+                    <a16:rowId xmlns:a16="http://schemas.microsoft.com/office/drawing/2014/main" val="462515652"/>
+                  </a:ext>
+                </a:extLst>
+              </a:tr>
+              <a:tr h="148243">
+                <a:tc vMerge="1">
+                  <a:txBody>
+                    <a:bodyPr/>
+                    <a:lstStyle/>
+                    <a:p>
+                      <a:endParaRPr lang="de-DE"/>
+                    </a:p>
+                  </a:txBody>
+                  <a:tcPr/>
+                </a:tc>
+                <a:tc>
+                  <a:txBody>
+                    <a:bodyPr/>
+                    <a:lstStyle/>
+                    <a:p>
+                      <a:pPr algn="ctr"/>
+                      <a:r>
+                        <a:rPr lang="de-DE" sz="1000"/>
+                        <a:t>U-value</a:t>
+                      </a:r>
+                    </a:p>
+                  </a:txBody>
+                  <a:tcPr marL="175" marR="175" marT="175" marB="175" anchor="ctr">
+                    <a:lnL>
+                      <a:noFill/>
+                    </a:lnL>
+                    <a:lnR>
+                      <a:noFill/>
+                    </a:lnR>
+                    <a:lnT>
+                      <a:noFill/>
+                    </a:lnT>
+                    <a:lnB>
+                      <a:noFill/>
+                    </a:lnB>
+                    <a:noFill/>
+                  </a:tcPr>
+                </a:tc>
+                <a:tc>
+                  <a:txBody>
+                    <a:bodyPr/>
+                    <a:lstStyle/>
+                    <a:p>
+                      <a:pPr algn="ctr">
+                        <a:buNone/>
+                      </a:pPr>
+                      <a:r>
+                        <a:rPr lang="de-DE" sz="1000"/>
+                        <a:t>1.08 W/(m</a:t>
+                      </a:r>
+                      <a:r>
+                        <a:rPr lang="de-DE" sz="1000" baseline="30000"/>
+                        <a:t>2</a:t>
+                      </a:r>
+                      <a:r>
+                        <a:rPr lang="de-DE" sz="1000"/>
+                        <a:t>K)</a:t>
+                      </a:r>
+                    </a:p>
+                  </a:txBody>
+                  <a:tcPr marL="175" marR="175" marT="175" marB="175" anchor="ctr">
+                    <a:lnL>
+                      <a:noFill/>
+                    </a:lnL>
+                    <a:lnR>
+                      <a:noFill/>
+                    </a:lnR>
+                    <a:lnT>
+                      <a:noFill/>
+                    </a:lnT>
+                    <a:lnB>
+                      <a:noFill/>
+                    </a:lnB>
+                    <a:noFill/>
+                  </a:tcPr>
+                </a:tc>
+                <a:extLst>
+                  <a:ext uri="{0D108BD9-81ED-4DB2-BD59-A6C34878D82A}">
+                    <a16:rowId xmlns:a16="http://schemas.microsoft.com/office/drawing/2014/main" val="1266199987"/>
+                  </a:ext>
+                </a:extLst>
+              </a:tr>
+              <a:tr h="368739">
+                <a:tc rowSpan="4">
+                  <a:txBody>
+                    <a:bodyPr/>
+                    <a:lstStyle/>
+                    <a:p>
+                      <a:pPr algn="ctr"/>
+                      <a:r>
+                        <a:rPr lang="de-DE" sz="1000"/>
+                        <a:t>Window 1</a:t>
+                      </a:r>
+                    </a:p>
+                  </a:txBody>
+                  <a:tcPr marL="175" marR="175" marT="175" marB="175" anchor="ctr">
+                    <a:lnL>
+                      <a:noFill/>
+                    </a:lnL>
+                    <a:lnR>
+                      <a:noFill/>
+                    </a:lnR>
+                    <a:lnT>
+                      <a:noFill/>
+                    </a:lnT>
+                    <a:lnB>
+                      <a:noFill/>
+                    </a:lnB>
+                    <a:noFill/>
+                  </a:tcPr>
+                </a:tc>
+                <a:tc>
+                  <a:txBody>
+                    <a:bodyPr/>
+                    <a:lstStyle/>
+                    <a:p>
+                      <a:pPr algn="ctr"/>
+                      <a:r>
+                        <a:rPr lang="de-DE" sz="1000"/>
+                        <a:t>surface area</a:t>
+                      </a:r>
+                    </a:p>
+                  </a:txBody>
+                  <a:tcPr marL="175" marR="175" marT="175" marB="175" anchor="ctr">
+                    <a:lnL>
+                      <a:noFill/>
+                    </a:lnL>
+                    <a:lnR>
+                      <a:noFill/>
+                    </a:lnR>
+                    <a:lnT>
+                      <a:noFill/>
+                    </a:lnT>
+                    <a:lnB>
+                      <a:noFill/>
+                    </a:lnB>
+                    <a:noFill/>
+                  </a:tcPr>
+                </a:tc>
+                <a:tc>
+                  <a:txBody>
+                    <a:bodyPr/>
+                    <a:lstStyle/>
+                    <a:p>
+                      <a:pPr algn="ctr"/>
+                      <a:r>
+                        <a:rPr lang="de-DE" sz="1000"/>
+                        <a:t>27.1m</a:t>
+                      </a:r>
+                      <a:r>
+                        <a:rPr lang="de-DE" sz="1000" baseline="30000"/>
+                        <a:t>2</a:t>
+                      </a:r>
+                      <a:endParaRPr lang="de-DE" sz="1000"/>
+                    </a:p>
+                  </a:txBody>
+                  <a:tcPr marL="175" marR="175" marT="175" marB="175">
+                    <a:lnL>
+                      <a:noFill/>
+                    </a:lnL>
+                    <a:lnR>
+                      <a:noFill/>
+                    </a:lnR>
+                    <a:lnT>
+                      <a:noFill/>
+                    </a:lnT>
+                    <a:lnB>
+                      <a:noFill/>
+                    </a:lnB>
+                    <a:noFill/>
+                  </a:tcPr>
+                </a:tc>
+                <a:extLst>
+                  <a:ext uri="{0D108BD9-81ED-4DB2-BD59-A6C34878D82A}">
+                    <a16:rowId xmlns:a16="http://schemas.microsoft.com/office/drawing/2014/main" val="2907841251"/>
+                  </a:ext>
+                </a:extLst>
+              </a:tr>
+              <a:tr h="148243">
+                <a:tc vMerge="1">
+                  <a:txBody>
+                    <a:bodyPr/>
+                    <a:lstStyle/>
+                    <a:p>
+                      <a:endParaRPr lang="de-DE"/>
+                    </a:p>
+                  </a:txBody>
+                  <a:tcPr/>
+                </a:tc>
+                <a:tc>
+                  <a:txBody>
+                    <a:bodyPr/>
+                    <a:lstStyle/>
+                    <a:p>
+                      <a:pPr algn="ctr"/>
+                      <a:endParaRPr lang="en-US" sz="1000" dirty="0"/>
+                    </a:p>
+                  </a:txBody>
+                  <a:tcPr marL="175" marR="175" marT="175" marB="175" anchor="ctr">
+                    <a:lnL>
+                      <a:noFill/>
+                    </a:lnL>
+                    <a:lnR>
+                      <a:noFill/>
+                    </a:lnR>
+                    <a:lnT>
+                      <a:noFill/>
+                    </a:lnT>
+                    <a:lnB>
+                      <a:noFill/>
+                    </a:lnB>
+                    <a:noFill/>
+                  </a:tcPr>
+                </a:tc>
+                <a:tc>
+                  <a:txBody>
+                    <a:bodyPr/>
+                    <a:lstStyle/>
+                    <a:p>
+                      <a:pPr algn="ctr"/>
+                      <a:endParaRPr lang="de-DE" sz="1000" dirty="0"/>
+                    </a:p>
+                  </a:txBody>
+                  <a:tcPr marL="175" marR="175" marT="175" marB="175">
+                    <a:lnL>
+                      <a:noFill/>
+                    </a:lnL>
+                    <a:lnR>
+                      <a:noFill/>
+                    </a:lnR>
+                    <a:lnT>
+                      <a:noFill/>
+                    </a:lnT>
+                    <a:lnB>
+                      <a:noFill/>
+                    </a:lnB>
+                    <a:noFill/>
+                  </a:tcPr>
+                </a:tc>
+                <a:extLst>
+                  <a:ext uri="{0D108BD9-81ED-4DB2-BD59-A6C34878D82A}">
+                    <a16:rowId xmlns:a16="http://schemas.microsoft.com/office/drawing/2014/main" val="1004028915"/>
+                  </a:ext>
+                </a:extLst>
+              </a:tr>
+              <a:tr h="148243">
+                <a:tc vMerge="1">
+                  <a:txBody>
+                    <a:bodyPr/>
+                    <a:lstStyle/>
+                    <a:p>
+                      <a:endParaRPr lang="de-DE"/>
+                    </a:p>
+                  </a:txBody>
+                  <a:tcPr/>
+                </a:tc>
+                <a:tc>
+                  <a:txBody>
+                    <a:bodyPr/>
+                    <a:lstStyle/>
+                    <a:p>
+                      <a:pPr algn="ctr"/>
+                      <a:r>
+                        <a:rPr lang="de-DE" sz="1000" dirty="0" err="1"/>
+                        <a:t>picture</a:t>
+                      </a:r>
+                      <a:endParaRPr lang="de-DE" sz="1000" dirty="0"/>
+                    </a:p>
+                  </a:txBody>
+                  <a:tcPr marL="175" marR="175" marT="175" marB="175" anchor="ctr">
+                    <a:lnL>
+                      <a:noFill/>
+                    </a:lnL>
+                    <a:lnR>
+                      <a:noFill/>
+                    </a:lnR>
+                    <a:lnT>
+                      <a:noFill/>
+                    </a:lnT>
+                    <a:lnB>
+                      <a:noFill/>
+                    </a:lnB>
+                    <a:noFill/>
+                  </a:tcPr>
+                </a:tc>
+                <a:tc>
+                  <a:txBody>
+                    <a:bodyPr/>
+                    <a:lstStyle/>
+                    <a:p>
+                      <a:pPr algn="ctr"/>
+                      <a:endParaRPr lang="de-DE" sz="1000"/>
+                    </a:p>
+                  </a:txBody>
+                  <a:tcPr marL="175" marR="175" marT="175" marB="175">
+                    <a:lnL>
+                      <a:noFill/>
+                    </a:lnL>
+                    <a:lnR>
+                      <a:noFill/>
+                    </a:lnR>
+                    <a:lnT>
+                      <a:noFill/>
+                    </a:lnT>
+                    <a:lnB>
+                      <a:noFill/>
+                    </a:lnB>
+                    <a:noFill/>
+                  </a:tcPr>
+                </a:tc>
+                <a:extLst>
+                  <a:ext uri="{0D108BD9-81ED-4DB2-BD59-A6C34878D82A}">
+                    <a16:rowId xmlns:a16="http://schemas.microsoft.com/office/drawing/2014/main" val="2979433074"/>
+                  </a:ext>
+                </a:extLst>
+              </a:tr>
+              <a:tr h="148243">
+                <a:tc vMerge="1">
+                  <a:txBody>
+                    <a:bodyPr/>
+                    <a:lstStyle/>
+                    <a:p>
+                      <a:endParaRPr lang="de-DE"/>
+                    </a:p>
+                  </a:txBody>
+                  <a:tcPr/>
+                </a:tc>
+                <a:tc>
+                  <a:txBody>
+                    <a:bodyPr/>
+                    <a:lstStyle/>
+                    <a:p>
+                      <a:pPr algn="ctr"/>
+                      <a:r>
+                        <a:rPr lang="de-DE" sz="1000" dirty="0"/>
+                        <a:t>U-</a:t>
+                      </a:r>
+                      <a:r>
+                        <a:rPr lang="de-DE" sz="1000" dirty="0" err="1"/>
+                        <a:t>value</a:t>
+                      </a:r>
+                      <a:endParaRPr lang="de-DE" sz="1000" dirty="0"/>
+                    </a:p>
+                  </a:txBody>
+                  <a:tcPr marL="175" marR="175" marT="175" marB="175" anchor="ctr">
+                    <a:lnL>
+                      <a:noFill/>
+                    </a:lnL>
+                    <a:lnR>
+                      <a:noFill/>
+                    </a:lnR>
+                    <a:lnT>
+                      <a:noFill/>
+                    </a:lnT>
+                    <a:lnB>
+                      <a:noFill/>
+                    </a:lnB>
+                    <a:noFill/>
+                  </a:tcPr>
+                </a:tc>
+                <a:tc>
+                  <a:txBody>
+                    <a:bodyPr/>
+                    <a:lstStyle/>
+                    <a:p>
+                      <a:pPr algn="ctr">
+                        <a:buNone/>
+                      </a:pPr>
+                      <a:r>
+                        <a:rPr lang="de-DE" sz="1000" dirty="0"/>
+                        <a:t>2.80 W/(m</a:t>
+                      </a:r>
+                      <a:r>
+                        <a:rPr lang="de-DE" sz="1000" baseline="30000" dirty="0"/>
+                        <a:t>2</a:t>
+                      </a:r>
+                      <a:r>
+                        <a:rPr lang="de-DE" sz="1000" dirty="0"/>
+                        <a:t>K)</a:t>
+                      </a:r>
+                    </a:p>
+                  </a:txBody>
+                  <a:tcPr marL="175" marR="175" marT="175" marB="175" anchor="ctr">
+                    <a:lnL>
+                      <a:noFill/>
+                    </a:lnL>
+                    <a:lnR>
+                      <a:noFill/>
+                    </a:lnR>
+                    <a:lnT>
+                      <a:noFill/>
+                    </a:lnT>
+                    <a:lnB>
+                      <a:noFill/>
+                    </a:lnB>
+                    <a:noFill/>
+                  </a:tcPr>
+                </a:tc>
+                <a:extLst>
+                  <a:ext uri="{0D108BD9-81ED-4DB2-BD59-A6C34878D82A}">
+                    <a16:rowId xmlns:a16="http://schemas.microsoft.com/office/drawing/2014/main" val="829078152"/>
+                  </a:ext>
+                </a:extLst>
+              </a:tr>
+            </a:tbl>
+          </a:graphicData>
+        </a:graphic>
+      </p:graphicFrame>
     </p:spTree>
     <p:extLst>
       <p:ext uri="{BB962C8B-B14F-4D97-AF65-F5344CB8AC3E}">
@@ -15460,6 +17236,2290 @@
 </file>
 
 <file path=ppt/slides/slide21.xml><?xml version="1.0" encoding="utf-8"?>
+<p:sld xmlns:a="http://schemas.openxmlformats.org/drawingml/2006/main" xmlns:r="http://schemas.openxmlformats.org/officeDocument/2006/relationships" xmlns:p="http://schemas.openxmlformats.org/presentationml/2006/main">
+  <p:cSld>
+    <p:spTree>
+      <p:nvGrpSpPr>
+        <p:cNvPr id="1" name=""/>
+        <p:cNvGrpSpPr/>
+        <p:nvPr/>
+      </p:nvGrpSpPr>
+      <p:grpSpPr>
+        <a:xfrm>
+          <a:off x="0" y="0"/>
+          <a:ext cx="0" cy="0"/>
+          <a:chOff x="0" y="0"/>
+          <a:chExt cx="0" cy="0"/>
+        </a:xfrm>
+      </p:grpSpPr>
+      <p:sp>
+        <p:nvSpPr>
+          <p:cNvPr id="2" name="Title 1">
+            <a:extLst>
+              <a:ext uri="{FF2B5EF4-FFF2-40B4-BE49-F238E27FC236}">
+                <a16:creationId xmlns:a16="http://schemas.microsoft.com/office/drawing/2014/main" id="{A8FFFBA8-09D6-D655-F42E-F65E114DC860}"/>
+              </a:ext>
+            </a:extLst>
+          </p:cNvPr>
+          <p:cNvSpPr>
+            <a:spLocks noGrp="1"/>
+          </p:cNvSpPr>
+          <p:nvPr>
+            <p:ph type="title"/>
+          </p:nvPr>
+        </p:nvSpPr>
+        <p:spPr/>
+        <p:txBody>
+          <a:bodyPr/>
+          <a:lstStyle/>
+          <a:p>
+            <a:r>
+              <a:rPr lang="de-DE" dirty="0"/>
+              <a:t>modern</a:t>
+            </a:r>
+          </a:p>
+        </p:txBody>
+      </p:sp>
+      <p:graphicFrame>
+        <p:nvGraphicFramePr>
+          <p:cNvPr id="4" name="Content Placeholder 3">
+            <a:extLst>
+              <a:ext uri="{FF2B5EF4-FFF2-40B4-BE49-F238E27FC236}">
+                <a16:creationId xmlns:a16="http://schemas.microsoft.com/office/drawing/2014/main" id="{69A70DBA-BDCB-FCE3-D310-B4C1B0F859CC}"/>
+              </a:ext>
+            </a:extLst>
+          </p:cNvPr>
+          <p:cNvGraphicFramePr>
+            <a:graphicFrameLocks noGrp="1"/>
+          </p:cNvGraphicFramePr>
+          <p:nvPr>
+            <p:ph idx="1"/>
+            <p:extLst>
+              <p:ext uri="{D42A27DB-BD31-4B8C-83A1-F6EECF244321}">
+                <p14:modId xmlns:p14="http://schemas.microsoft.com/office/powerpoint/2010/main" val="3725768470"/>
+              </p:ext>
+            </p:extLst>
+          </p:nvPr>
+        </p:nvGraphicFramePr>
+        <p:xfrm>
+          <a:off x="4381500" y="3352800"/>
+          <a:ext cx="5667251" cy="2446784"/>
+        </p:xfrm>
+        <a:graphic>
+          <a:graphicData uri="http://schemas.openxmlformats.org/drawingml/2006/table">
+            <a:tbl>
+              <a:tblPr/>
+              <a:tblGrid>
+                <a:gridCol w="623051">
+                  <a:extLst>
+                    <a:ext uri="{9D8B030D-6E8A-4147-A177-3AD203B41FA5}">
+                      <a16:colId xmlns:a16="http://schemas.microsoft.com/office/drawing/2014/main" val="3756685258"/>
+                    </a:ext>
+                  </a:extLst>
+                </a:gridCol>
+                <a:gridCol w="1869134">
+                  <a:extLst>
+                    <a:ext uri="{9D8B030D-6E8A-4147-A177-3AD203B41FA5}">
+                      <a16:colId xmlns:a16="http://schemas.microsoft.com/office/drawing/2014/main" val="965737958"/>
+                    </a:ext>
+                  </a:extLst>
+                </a:gridCol>
+                <a:gridCol w="1869134">
+                  <a:extLst>
+                    <a:ext uri="{9D8B030D-6E8A-4147-A177-3AD203B41FA5}">
+                      <a16:colId xmlns:a16="http://schemas.microsoft.com/office/drawing/2014/main" val="1887536846"/>
+                    </a:ext>
+                  </a:extLst>
+                </a:gridCol>
+                <a:gridCol w="745061">
+                  <a:extLst>
+                    <a:ext uri="{9D8B030D-6E8A-4147-A177-3AD203B41FA5}">
+                      <a16:colId xmlns:a16="http://schemas.microsoft.com/office/drawing/2014/main" val="846676962"/>
+                    </a:ext>
+                  </a:extLst>
+                </a:gridCol>
+                <a:gridCol w="560871">
+                  <a:extLst>
+                    <a:ext uri="{9D8B030D-6E8A-4147-A177-3AD203B41FA5}">
+                      <a16:colId xmlns:a16="http://schemas.microsoft.com/office/drawing/2014/main" val="2557751187"/>
+                    </a:ext>
+                  </a:extLst>
+                </a:gridCol>
+              </a:tblGrid>
+              <a:tr h="53333">
+                <a:tc rowSpan="4">
+                  <a:txBody>
+                    <a:bodyPr/>
+                    <a:lstStyle/>
+                    <a:p>
+                      <a:pPr algn="ctr"/>
+                      <a:r>
+                        <a:rPr lang="de-DE" sz="1000"/>
+                        <a:t>Roof 1</a:t>
+                      </a:r>
+                    </a:p>
+                  </a:txBody>
+                  <a:tcPr marL="262" marR="262" marT="262" marB="262" anchor="ctr">
+                    <a:lnL>
+                      <a:noFill/>
+                    </a:lnL>
+                    <a:lnR>
+                      <a:noFill/>
+                    </a:lnR>
+                    <a:lnT>
+                      <a:noFill/>
+                    </a:lnT>
+                    <a:lnB>
+                      <a:noFill/>
+                    </a:lnB>
+                    <a:noFill/>
+                  </a:tcPr>
+                </a:tc>
+                <a:tc>
+                  <a:txBody>
+                    <a:bodyPr/>
+                    <a:lstStyle/>
+                    <a:p>
+                      <a:pPr algn="ctr"/>
+                      <a:r>
+                        <a:rPr lang="de-DE" sz="1000"/>
+                        <a:t>surface area</a:t>
+                      </a:r>
+                    </a:p>
+                  </a:txBody>
+                  <a:tcPr marL="262" marR="262" marT="262" marB="262" anchor="ctr">
+                    <a:lnL>
+                      <a:noFill/>
+                    </a:lnL>
+                    <a:lnR>
+                      <a:noFill/>
+                    </a:lnR>
+                    <a:lnT>
+                      <a:noFill/>
+                    </a:lnT>
+                    <a:lnB>
+                      <a:noFill/>
+                    </a:lnB>
+                    <a:noFill/>
+                  </a:tcPr>
+                </a:tc>
+                <a:tc>
+                  <a:txBody>
+                    <a:bodyPr/>
+                    <a:lstStyle/>
+                    <a:p>
+                      <a:pPr algn="ctr"/>
+                      <a:r>
+                        <a:rPr lang="de-DE" sz="1000"/>
+                        <a:t>131.9m</a:t>
+                      </a:r>
+                      <a:r>
+                        <a:rPr lang="de-DE" sz="1000" baseline="30000"/>
+                        <a:t>2</a:t>
+                      </a:r>
+                      <a:endParaRPr lang="de-DE" sz="1000"/>
+                    </a:p>
+                  </a:txBody>
+                  <a:tcPr marL="262" marR="262" marT="262" marB="262">
+                    <a:lnL>
+                      <a:noFill/>
+                    </a:lnL>
+                    <a:lnR>
+                      <a:noFill/>
+                    </a:lnR>
+                    <a:lnT>
+                      <a:noFill/>
+                    </a:lnT>
+                    <a:lnB>
+                      <a:noFill/>
+                    </a:lnB>
+                    <a:noFill/>
+                  </a:tcPr>
+                </a:tc>
+                <a:tc>
+                  <a:txBody>
+                    <a:bodyPr/>
+                    <a:lstStyle/>
+                    <a:p>
+                      <a:pPr algn="ctr"/>
+                      <a:r>
+                        <a:rPr lang="de-DE" sz="1000"/>
+                        <a:t>131.9 m</a:t>
+                      </a:r>
+                      <a:r>
+                        <a:rPr lang="de-DE" sz="1000" baseline="30000"/>
+                        <a:t>2</a:t>
+                      </a:r>
+                      <a:endParaRPr lang="de-DE" sz="1000"/>
+                    </a:p>
+                  </a:txBody>
+                  <a:tcPr marL="262" marR="262" marT="262" marB="262">
+                    <a:lnL>
+                      <a:noFill/>
+                    </a:lnL>
+                    <a:lnR>
+                      <a:noFill/>
+                    </a:lnR>
+                    <a:lnT>
+                      <a:noFill/>
+                    </a:lnT>
+                    <a:lnB>
+                      <a:noFill/>
+                    </a:lnB>
+                    <a:noFill/>
+                  </a:tcPr>
+                </a:tc>
+                <a:tc>
+                  <a:txBody>
+                    <a:bodyPr/>
+                    <a:lstStyle/>
+                    <a:p>
+                      <a:pPr algn="ctr"/>
+                      <a:endParaRPr lang="de-DE" sz="1000" dirty="0"/>
+                    </a:p>
+                  </a:txBody>
+                  <a:tcPr marL="262" marR="262" marT="262" marB="262">
+                    <a:lnL>
+                      <a:noFill/>
+                    </a:lnL>
+                    <a:lnR>
+                      <a:noFill/>
+                    </a:lnR>
+                    <a:lnT>
+                      <a:noFill/>
+                    </a:lnT>
+                    <a:lnB>
+                      <a:noFill/>
+                    </a:lnB>
+                    <a:noFill/>
+                  </a:tcPr>
+                </a:tc>
+                <a:extLst>
+                  <a:ext uri="{0D108BD9-81ED-4DB2-BD59-A6C34878D82A}">
+                    <a16:rowId xmlns:a16="http://schemas.microsoft.com/office/drawing/2014/main" val="4210133131"/>
+                  </a:ext>
+                </a:extLst>
+              </a:tr>
+              <a:tr h="87893">
+                <a:tc vMerge="1">
+                  <a:txBody>
+                    <a:bodyPr/>
+                    <a:lstStyle/>
+                    <a:p>
+                      <a:endParaRPr lang="de-DE"/>
+                    </a:p>
+                  </a:txBody>
+                  <a:tcPr/>
+                </a:tc>
+                <a:tc>
+                  <a:txBody>
+                    <a:bodyPr/>
+                    <a:lstStyle/>
+                    <a:p>
+                      <a:pPr algn="ctr"/>
+                      <a:endParaRPr lang="en-US" sz="1000" dirty="0"/>
+                    </a:p>
+                  </a:txBody>
+                  <a:tcPr marL="262" marR="262" marT="262" marB="262" anchor="ctr">
+                    <a:lnL>
+                      <a:noFill/>
+                    </a:lnL>
+                    <a:lnR>
+                      <a:noFill/>
+                    </a:lnR>
+                    <a:lnT>
+                      <a:noFill/>
+                    </a:lnT>
+                    <a:lnB>
+                      <a:noFill/>
+                    </a:lnB>
+                    <a:noFill/>
+                  </a:tcPr>
+                </a:tc>
+                <a:tc>
+                  <a:txBody>
+                    <a:bodyPr/>
+                    <a:lstStyle/>
+                    <a:p>
+                      <a:pPr algn="ctr"/>
+                      <a:endParaRPr lang="de-DE" sz="1000" dirty="0"/>
+                    </a:p>
+                  </a:txBody>
+                  <a:tcPr marL="262" marR="262" marT="262" marB="262">
+                    <a:lnL>
+                      <a:noFill/>
+                    </a:lnL>
+                    <a:lnR>
+                      <a:noFill/>
+                    </a:lnR>
+                    <a:lnT>
+                      <a:noFill/>
+                    </a:lnT>
+                    <a:lnB>
+                      <a:noFill/>
+                    </a:lnB>
+                    <a:noFill/>
+                  </a:tcPr>
+                </a:tc>
+                <a:tc>
+                  <a:txBody>
+                    <a:bodyPr/>
+                    <a:lstStyle/>
+                    <a:p>
+                      <a:pPr algn="ctr"/>
+                      <a:endParaRPr lang="de-DE" sz="1000" dirty="0"/>
+                    </a:p>
+                  </a:txBody>
+                  <a:tcPr marL="262" marR="262" marT="262" marB="262">
+                    <a:lnL>
+                      <a:noFill/>
+                    </a:lnL>
+                    <a:lnR>
+                      <a:noFill/>
+                    </a:lnR>
+                    <a:lnT>
+                      <a:noFill/>
+                    </a:lnT>
+                    <a:lnB>
+                      <a:noFill/>
+                    </a:lnB>
+                    <a:noFill/>
+                  </a:tcPr>
+                </a:tc>
+                <a:tc>
+                  <a:txBody>
+                    <a:bodyPr/>
+                    <a:lstStyle/>
+                    <a:p>
+                      <a:pPr algn="ctr"/>
+                      <a:endParaRPr lang="de-DE" sz="1000" dirty="0"/>
+                    </a:p>
+                  </a:txBody>
+                  <a:tcPr marL="262" marR="262" marT="262" marB="262">
+                    <a:lnL>
+                      <a:noFill/>
+                    </a:lnL>
+                    <a:lnR>
+                      <a:noFill/>
+                    </a:lnR>
+                    <a:lnT>
+                      <a:noFill/>
+                    </a:lnT>
+                    <a:lnB>
+                      <a:noFill/>
+                    </a:lnB>
+                    <a:noFill/>
+                  </a:tcPr>
+                </a:tc>
+                <a:extLst>
+                  <a:ext uri="{0D108BD9-81ED-4DB2-BD59-A6C34878D82A}">
+                    <a16:rowId xmlns:a16="http://schemas.microsoft.com/office/drawing/2014/main" val="3820258408"/>
+                  </a:ext>
+                </a:extLst>
+              </a:tr>
+              <a:tr h="0">
+                <a:tc vMerge="1">
+                  <a:txBody>
+                    <a:bodyPr/>
+                    <a:lstStyle/>
+                    <a:p>
+                      <a:endParaRPr lang="de-DE"/>
+                    </a:p>
+                  </a:txBody>
+                  <a:tcPr/>
+                </a:tc>
+                <a:tc>
+                  <a:txBody>
+                    <a:bodyPr/>
+                    <a:lstStyle/>
+                    <a:p>
+                      <a:pPr algn="ctr"/>
+                      <a:r>
+                        <a:rPr lang="de-DE" sz="1000"/>
+                        <a:t>picture</a:t>
+                      </a:r>
+                    </a:p>
+                  </a:txBody>
+                  <a:tcPr marL="262" marR="262" marT="262" marB="262" anchor="ctr">
+                    <a:lnL>
+                      <a:noFill/>
+                    </a:lnL>
+                    <a:lnR>
+                      <a:noFill/>
+                    </a:lnR>
+                    <a:lnT>
+                      <a:noFill/>
+                    </a:lnT>
+                    <a:lnB>
+                      <a:noFill/>
+                    </a:lnB>
+                    <a:noFill/>
+                  </a:tcPr>
+                </a:tc>
+                <a:tc>
+                  <a:txBody>
+                    <a:bodyPr/>
+                    <a:lstStyle/>
+                    <a:p>
+                      <a:pPr algn="ctr"/>
+                      <a:endParaRPr lang="de-DE" sz="1000"/>
+                    </a:p>
+                  </a:txBody>
+                  <a:tcPr marL="262" marR="262" marT="262" marB="262">
+                    <a:lnL>
+                      <a:noFill/>
+                    </a:lnL>
+                    <a:lnR>
+                      <a:noFill/>
+                    </a:lnR>
+                    <a:lnT>
+                      <a:noFill/>
+                    </a:lnT>
+                    <a:lnB>
+                      <a:noFill/>
+                    </a:lnB>
+                    <a:noFill/>
+                  </a:tcPr>
+                </a:tc>
+                <a:tc>
+                  <a:txBody>
+                    <a:bodyPr/>
+                    <a:lstStyle/>
+                    <a:p>
+                      <a:pPr algn="ctr"/>
+                      <a:endParaRPr lang="de-DE" sz="1000"/>
+                    </a:p>
+                  </a:txBody>
+                  <a:tcPr marL="262" marR="262" marT="262" marB="262">
+                    <a:lnL>
+                      <a:noFill/>
+                    </a:lnL>
+                    <a:lnR>
+                      <a:noFill/>
+                    </a:lnR>
+                    <a:lnT>
+                      <a:noFill/>
+                    </a:lnT>
+                    <a:lnB>
+                      <a:noFill/>
+                    </a:lnB>
+                    <a:noFill/>
+                  </a:tcPr>
+                </a:tc>
+                <a:tc>
+                  <a:txBody>
+                    <a:bodyPr/>
+                    <a:lstStyle/>
+                    <a:p>
+                      <a:pPr algn="ctr"/>
+                      <a:endParaRPr lang="de-DE" sz="1000"/>
+                    </a:p>
+                  </a:txBody>
+                  <a:tcPr marL="262" marR="262" marT="262" marB="262">
+                    <a:lnL>
+                      <a:noFill/>
+                    </a:lnL>
+                    <a:lnR>
+                      <a:noFill/>
+                    </a:lnR>
+                    <a:lnT>
+                      <a:noFill/>
+                    </a:lnT>
+                    <a:lnB>
+                      <a:noFill/>
+                    </a:lnB>
+                    <a:noFill/>
+                  </a:tcPr>
+                </a:tc>
+                <a:extLst>
+                  <a:ext uri="{0D108BD9-81ED-4DB2-BD59-A6C34878D82A}">
+                    <a16:rowId xmlns:a16="http://schemas.microsoft.com/office/drawing/2014/main" val="435209337"/>
+                  </a:ext>
+                </a:extLst>
+              </a:tr>
+              <a:tr h="80996">
+                <a:tc vMerge="1">
+                  <a:txBody>
+                    <a:bodyPr/>
+                    <a:lstStyle/>
+                    <a:p>
+                      <a:endParaRPr lang="de-DE"/>
+                    </a:p>
+                  </a:txBody>
+                  <a:tcPr/>
+                </a:tc>
+                <a:tc>
+                  <a:txBody>
+                    <a:bodyPr/>
+                    <a:lstStyle/>
+                    <a:p>
+                      <a:pPr algn="ctr"/>
+                      <a:r>
+                        <a:rPr lang="de-DE" sz="1000"/>
+                        <a:t>U-value</a:t>
+                      </a:r>
+                    </a:p>
+                  </a:txBody>
+                  <a:tcPr marL="262" marR="262" marT="262" marB="262" anchor="ctr">
+                    <a:lnL>
+                      <a:noFill/>
+                    </a:lnL>
+                    <a:lnR>
+                      <a:noFill/>
+                    </a:lnR>
+                    <a:lnT>
+                      <a:noFill/>
+                    </a:lnT>
+                    <a:lnB>
+                      <a:noFill/>
+                    </a:lnB>
+                    <a:noFill/>
+                  </a:tcPr>
+                </a:tc>
+                <a:tc>
+                  <a:txBody>
+                    <a:bodyPr/>
+                    <a:lstStyle/>
+                    <a:p>
+                      <a:pPr algn="ctr">
+                        <a:buNone/>
+                      </a:pPr>
+                      <a:r>
+                        <a:rPr lang="de-DE" sz="1000"/>
+                        <a:t>0.15 W/(m</a:t>
+                      </a:r>
+                      <a:r>
+                        <a:rPr lang="de-DE" sz="1000" baseline="30000"/>
+                        <a:t>2</a:t>
+                      </a:r>
+                      <a:r>
+                        <a:rPr lang="de-DE" sz="1000"/>
+                        <a:t>K)</a:t>
+                      </a:r>
+                    </a:p>
+                  </a:txBody>
+                  <a:tcPr marL="262" marR="262" marT="262" marB="262" anchor="ctr">
+                    <a:lnL>
+                      <a:noFill/>
+                    </a:lnL>
+                    <a:lnR>
+                      <a:noFill/>
+                    </a:lnR>
+                    <a:lnT>
+                      <a:noFill/>
+                    </a:lnT>
+                    <a:lnB>
+                      <a:noFill/>
+                    </a:lnB>
+                    <a:noFill/>
+                  </a:tcPr>
+                </a:tc>
+                <a:tc>
+                  <a:txBody>
+                    <a:bodyPr/>
+                    <a:lstStyle/>
+                    <a:p>
+                      <a:pPr algn="ctr">
+                        <a:buNone/>
+                      </a:pPr>
+                      <a:r>
+                        <a:rPr lang="de-DE" sz="1000"/>
+                        <a:t>0.13 W/(m</a:t>
+                      </a:r>
+                      <a:r>
+                        <a:rPr lang="de-DE" sz="1000" baseline="30000"/>
+                        <a:t>2</a:t>
+                      </a:r>
+                      <a:r>
+                        <a:rPr lang="de-DE" sz="1000"/>
+                        <a:t>K)</a:t>
+                      </a:r>
+                    </a:p>
+                  </a:txBody>
+                  <a:tcPr marL="262" marR="262" marT="262" marB="262" anchor="ctr">
+                    <a:lnL>
+                      <a:noFill/>
+                    </a:lnL>
+                    <a:lnR>
+                      <a:noFill/>
+                    </a:lnR>
+                    <a:lnT>
+                      <a:noFill/>
+                    </a:lnT>
+                    <a:lnB>
+                      <a:noFill/>
+                    </a:lnB>
+                    <a:noFill/>
+                  </a:tcPr>
+                </a:tc>
+                <a:tc>
+                  <a:txBody>
+                    <a:bodyPr/>
+                    <a:lstStyle/>
+                    <a:p>
+                      <a:pPr algn="ctr">
+                        <a:buNone/>
+                      </a:pPr>
+                      <a:endParaRPr lang="de-DE" sz="1000" dirty="0"/>
+                    </a:p>
+                  </a:txBody>
+                  <a:tcPr marL="262" marR="262" marT="262" marB="262" anchor="ctr">
+                    <a:lnL>
+                      <a:noFill/>
+                    </a:lnL>
+                    <a:lnR>
+                      <a:noFill/>
+                    </a:lnR>
+                    <a:lnT>
+                      <a:noFill/>
+                    </a:lnT>
+                    <a:lnB>
+                      <a:noFill/>
+                    </a:lnB>
+                    <a:noFill/>
+                  </a:tcPr>
+                </a:tc>
+                <a:extLst>
+                  <a:ext uri="{0D108BD9-81ED-4DB2-BD59-A6C34878D82A}">
+                    <a16:rowId xmlns:a16="http://schemas.microsoft.com/office/drawing/2014/main" val="126606243"/>
+                  </a:ext>
+                </a:extLst>
+              </a:tr>
+              <a:tr h="53333">
+                <a:tc rowSpan="4">
+                  <a:txBody>
+                    <a:bodyPr/>
+                    <a:lstStyle/>
+                    <a:p>
+                      <a:pPr algn="ctr"/>
+                      <a:r>
+                        <a:rPr lang="de-DE" sz="1000"/>
+                        <a:t>Wall 1</a:t>
+                      </a:r>
+                    </a:p>
+                  </a:txBody>
+                  <a:tcPr marL="262" marR="262" marT="262" marB="262" anchor="ctr">
+                    <a:lnL>
+                      <a:noFill/>
+                    </a:lnL>
+                    <a:lnR>
+                      <a:noFill/>
+                    </a:lnR>
+                    <a:lnT>
+                      <a:noFill/>
+                    </a:lnT>
+                    <a:lnB>
+                      <a:noFill/>
+                    </a:lnB>
+                    <a:noFill/>
+                  </a:tcPr>
+                </a:tc>
+                <a:tc>
+                  <a:txBody>
+                    <a:bodyPr/>
+                    <a:lstStyle/>
+                    <a:p>
+                      <a:pPr algn="ctr"/>
+                      <a:r>
+                        <a:rPr lang="de-DE" sz="1000"/>
+                        <a:t>surface area</a:t>
+                      </a:r>
+                    </a:p>
+                  </a:txBody>
+                  <a:tcPr marL="262" marR="262" marT="262" marB="262" anchor="ctr">
+                    <a:lnL>
+                      <a:noFill/>
+                    </a:lnL>
+                    <a:lnR>
+                      <a:noFill/>
+                    </a:lnR>
+                    <a:lnT>
+                      <a:noFill/>
+                    </a:lnT>
+                    <a:lnB>
+                      <a:noFill/>
+                    </a:lnB>
+                    <a:noFill/>
+                  </a:tcPr>
+                </a:tc>
+                <a:tc>
+                  <a:txBody>
+                    <a:bodyPr/>
+                    <a:lstStyle/>
+                    <a:p>
+                      <a:pPr algn="ctr"/>
+                      <a:r>
+                        <a:rPr lang="de-DE" sz="1000"/>
+                        <a:t>227.6m</a:t>
+                      </a:r>
+                      <a:r>
+                        <a:rPr lang="de-DE" sz="1000" baseline="30000"/>
+                        <a:t>2</a:t>
+                      </a:r>
+                      <a:endParaRPr lang="de-DE" sz="1000"/>
+                    </a:p>
+                  </a:txBody>
+                  <a:tcPr marL="262" marR="262" marT="262" marB="262">
+                    <a:lnL>
+                      <a:noFill/>
+                    </a:lnL>
+                    <a:lnR>
+                      <a:noFill/>
+                    </a:lnR>
+                    <a:lnT>
+                      <a:noFill/>
+                    </a:lnT>
+                    <a:lnB>
+                      <a:noFill/>
+                    </a:lnB>
+                    <a:noFill/>
+                  </a:tcPr>
+                </a:tc>
+                <a:tc>
+                  <a:txBody>
+                    <a:bodyPr/>
+                    <a:lstStyle/>
+                    <a:p>
+                      <a:pPr algn="ctr"/>
+                      <a:r>
+                        <a:rPr lang="de-DE" sz="1000"/>
+                        <a:t>227.6 m</a:t>
+                      </a:r>
+                      <a:r>
+                        <a:rPr lang="de-DE" sz="1000" baseline="30000"/>
+                        <a:t>2</a:t>
+                      </a:r>
+                      <a:endParaRPr lang="de-DE" sz="1000"/>
+                    </a:p>
+                  </a:txBody>
+                  <a:tcPr marL="262" marR="262" marT="262" marB="262">
+                    <a:lnL>
+                      <a:noFill/>
+                    </a:lnL>
+                    <a:lnR>
+                      <a:noFill/>
+                    </a:lnR>
+                    <a:lnT>
+                      <a:noFill/>
+                    </a:lnT>
+                    <a:lnB>
+                      <a:noFill/>
+                    </a:lnB>
+                    <a:noFill/>
+                  </a:tcPr>
+                </a:tc>
+                <a:tc>
+                  <a:txBody>
+                    <a:bodyPr/>
+                    <a:lstStyle/>
+                    <a:p>
+                      <a:pPr algn="ctr"/>
+                      <a:endParaRPr lang="de-DE" sz="1000"/>
+                    </a:p>
+                  </a:txBody>
+                  <a:tcPr marL="262" marR="262" marT="262" marB="262">
+                    <a:lnL>
+                      <a:noFill/>
+                    </a:lnL>
+                    <a:lnR>
+                      <a:noFill/>
+                    </a:lnR>
+                    <a:lnT>
+                      <a:noFill/>
+                    </a:lnT>
+                    <a:lnB>
+                      <a:noFill/>
+                    </a:lnB>
+                    <a:noFill/>
+                  </a:tcPr>
+                </a:tc>
+                <a:extLst>
+                  <a:ext uri="{0D108BD9-81ED-4DB2-BD59-A6C34878D82A}">
+                    <a16:rowId xmlns:a16="http://schemas.microsoft.com/office/drawing/2014/main" val="657889295"/>
+                  </a:ext>
+                </a:extLst>
+              </a:tr>
+              <a:tr h="59388">
+                <a:tc vMerge="1">
+                  <a:txBody>
+                    <a:bodyPr/>
+                    <a:lstStyle/>
+                    <a:p>
+                      <a:endParaRPr lang="de-DE"/>
+                    </a:p>
+                  </a:txBody>
+                  <a:tcPr/>
+                </a:tc>
+                <a:tc>
+                  <a:txBody>
+                    <a:bodyPr/>
+                    <a:lstStyle/>
+                    <a:p>
+                      <a:pPr algn="ctr"/>
+                      <a:endParaRPr lang="en-US" sz="1000" dirty="0"/>
+                    </a:p>
+                  </a:txBody>
+                  <a:tcPr marL="262" marR="262" marT="262" marB="262" anchor="ctr">
+                    <a:lnL>
+                      <a:noFill/>
+                    </a:lnL>
+                    <a:lnR>
+                      <a:noFill/>
+                    </a:lnR>
+                    <a:lnT>
+                      <a:noFill/>
+                    </a:lnT>
+                    <a:lnB>
+                      <a:noFill/>
+                    </a:lnB>
+                    <a:noFill/>
+                  </a:tcPr>
+                </a:tc>
+                <a:tc>
+                  <a:txBody>
+                    <a:bodyPr/>
+                    <a:lstStyle/>
+                    <a:p>
+                      <a:pPr algn="ctr"/>
+                      <a:endParaRPr lang="de-DE" sz="1000" dirty="0"/>
+                    </a:p>
+                  </a:txBody>
+                  <a:tcPr marL="262" marR="262" marT="262" marB="262">
+                    <a:lnL>
+                      <a:noFill/>
+                    </a:lnL>
+                    <a:lnR>
+                      <a:noFill/>
+                    </a:lnR>
+                    <a:lnT>
+                      <a:noFill/>
+                    </a:lnT>
+                    <a:lnB>
+                      <a:noFill/>
+                    </a:lnB>
+                    <a:noFill/>
+                  </a:tcPr>
+                </a:tc>
+                <a:tc>
+                  <a:txBody>
+                    <a:bodyPr/>
+                    <a:lstStyle/>
+                    <a:p>
+                      <a:pPr algn="ctr"/>
+                      <a:endParaRPr lang="de-DE" sz="1000" dirty="0"/>
+                    </a:p>
+                  </a:txBody>
+                  <a:tcPr marL="262" marR="262" marT="262" marB="262">
+                    <a:lnL>
+                      <a:noFill/>
+                    </a:lnL>
+                    <a:lnR>
+                      <a:noFill/>
+                    </a:lnR>
+                    <a:lnT>
+                      <a:noFill/>
+                    </a:lnT>
+                    <a:lnB>
+                      <a:noFill/>
+                    </a:lnB>
+                    <a:noFill/>
+                  </a:tcPr>
+                </a:tc>
+                <a:tc>
+                  <a:txBody>
+                    <a:bodyPr/>
+                    <a:lstStyle/>
+                    <a:p>
+                      <a:pPr algn="ctr"/>
+                      <a:endParaRPr lang="de-DE" sz="1000" dirty="0"/>
+                    </a:p>
+                  </a:txBody>
+                  <a:tcPr marL="262" marR="262" marT="262" marB="262">
+                    <a:lnL>
+                      <a:noFill/>
+                    </a:lnL>
+                    <a:lnR>
+                      <a:noFill/>
+                    </a:lnR>
+                    <a:lnT>
+                      <a:noFill/>
+                    </a:lnT>
+                    <a:lnB>
+                      <a:noFill/>
+                    </a:lnB>
+                    <a:noFill/>
+                  </a:tcPr>
+                </a:tc>
+                <a:extLst>
+                  <a:ext uri="{0D108BD9-81ED-4DB2-BD59-A6C34878D82A}">
+                    <a16:rowId xmlns:a16="http://schemas.microsoft.com/office/drawing/2014/main" val="3588934523"/>
+                  </a:ext>
+                </a:extLst>
+              </a:tr>
+              <a:tr h="0">
+                <a:tc vMerge="1">
+                  <a:txBody>
+                    <a:bodyPr/>
+                    <a:lstStyle/>
+                    <a:p>
+                      <a:endParaRPr lang="de-DE"/>
+                    </a:p>
+                  </a:txBody>
+                  <a:tcPr/>
+                </a:tc>
+                <a:tc>
+                  <a:txBody>
+                    <a:bodyPr/>
+                    <a:lstStyle/>
+                    <a:p>
+                      <a:pPr algn="ctr"/>
+                      <a:r>
+                        <a:rPr lang="de-DE" sz="1000"/>
+                        <a:t>picture</a:t>
+                      </a:r>
+                    </a:p>
+                  </a:txBody>
+                  <a:tcPr marL="262" marR="262" marT="262" marB="262" anchor="ctr">
+                    <a:lnL>
+                      <a:noFill/>
+                    </a:lnL>
+                    <a:lnR>
+                      <a:noFill/>
+                    </a:lnR>
+                    <a:lnT>
+                      <a:noFill/>
+                    </a:lnT>
+                    <a:lnB>
+                      <a:noFill/>
+                    </a:lnB>
+                    <a:noFill/>
+                  </a:tcPr>
+                </a:tc>
+                <a:tc>
+                  <a:txBody>
+                    <a:bodyPr/>
+                    <a:lstStyle/>
+                    <a:p>
+                      <a:pPr algn="ctr"/>
+                      <a:endParaRPr lang="de-DE" sz="1000" dirty="0"/>
+                    </a:p>
+                  </a:txBody>
+                  <a:tcPr marL="262" marR="262" marT="262" marB="262">
+                    <a:lnL>
+                      <a:noFill/>
+                    </a:lnL>
+                    <a:lnR>
+                      <a:noFill/>
+                    </a:lnR>
+                    <a:lnT>
+                      <a:noFill/>
+                    </a:lnT>
+                    <a:lnB>
+                      <a:noFill/>
+                    </a:lnB>
+                    <a:noFill/>
+                  </a:tcPr>
+                </a:tc>
+                <a:tc>
+                  <a:txBody>
+                    <a:bodyPr/>
+                    <a:lstStyle/>
+                    <a:p>
+                      <a:pPr algn="ctr"/>
+                      <a:endParaRPr lang="de-DE" sz="1000" dirty="0"/>
+                    </a:p>
+                  </a:txBody>
+                  <a:tcPr marL="262" marR="262" marT="262" marB="262">
+                    <a:lnL>
+                      <a:noFill/>
+                    </a:lnL>
+                    <a:lnR>
+                      <a:noFill/>
+                    </a:lnR>
+                    <a:lnT>
+                      <a:noFill/>
+                    </a:lnT>
+                    <a:lnB>
+                      <a:noFill/>
+                    </a:lnB>
+                    <a:noFill/>
+                  </a:tcPr>
+                </a:tc>
+                <a:tc>
+                  <a:txBody>
+                    <a:bodyPr/>
+                    <a:lstStyle/>
+                    <a:p>
+                      <a:pPr algn="ctr"/>
+                      <a:endParaRPr lang="de-DE" sz="1000" dirty="0"/>
+                    </a:p>
+                  </a:txBody>
+                  <a:tcPr marL="262" marR="262" marT="262" marB="262">
+                    <a:lnL>
+                      <a:noFill/>
+                    </a:lnL>
+                    <a:lnR>
+                      <a:noFill/>
+                    </a:lnR>
+                    <a:lnT>
+                      <a:noFill/>
+                    </a:lnT>
+                    <a:lnB>
+                      <a:noFill/>
+                    </a:lnB>
+                    <a:noFill/>
+                  </a:tcPr>
+                </a:tc>
+                <a:extLst>
+                  <a:ext uri="{0D108BD9-81ED-4DB2-BD59-A6C34878D82A}">
+                    <a16:rowId xmlns:a16="http://schemas.microsoft.com/office/drawing/2014/main" val="1237531224"/>
+                  </a:ext>
+                </a:extLst>
+              </a:tr>
+              <a:tr h="80996">
+                <a:tc vMerge="1">
+                  <a:txBody>
+                    <a:bodyPr/>
+                    <a:lstStyle/>
+                    <a:p>
+                      <a:endParaRPr lang="de-DE"/>
+                    </a:p>
+                  </a:txBody>
+                  <a:tcPr/>
+                </a:tc>
+                <a:tc>
+                  <a:txBody>
+                    <a:bodyPr/>
+                    <a:lstStyle/>
+                    <a:p>
+                      <a:pPr algn="ctr"/>
+                      <a:r>
+                        <a:rPr lang="de-DE" sz="1000"/>
+                        <a:t>U-value</a:t>
+                      </a:r>
+                    </a:p>
+                  </a:txBody>
+                  <a:tcPr marL="262" marR="262" marT="262" marB="262" anchor="ctr">
+                    <a:lnL>
+                      <a:noFill/>
+                    </a:lnL>
+                    <a:lnR>
+                      <a:noFill/>
+                    </a:lnR>
+                    <a:lnT>
+                      <a:noFill/>
+                    </a:lnT>
+                    <a:lnB>
+                      <a:noFill/>
+                    </a:lnB>
+                    <a:noFill/>
+                  </a:tcPr>
+                </a:tc>
+                <a:tc>
+                  <a:txBody>
+                    <a:bodyPr/>
+                    <a:lstStyle/>
+                    <a:p>
+                      <a:pPr algn="ctr">
+                        <a:buNone/>
+                      </a:pPr>
+                      <a:r>
+                        <a:rPr lang="de-DE" sz="1000"/>
+                        <a:t>0.17 W/(m</a:t>
+                      </a:r>
+                      <a:r>
+                        <a:rPr lang="de-DE" sz="1000" baseline="30000"/>
+                        <a:t>2</a:t>
+                      </a:r>
+                      <a:r>
+                        <a:rPr lang="de-DE" sz="1000"/>
+                        <a:t>K)</a:t>
+                      </a:r>
+                    </a:p>
+                  </a:txBody>
+                  <a:tcPr marL="262" marR="262" marT="262" marB="262" anchor="ctr">
+                    <a:lnL>
+                      <a:noFill/>
+                    </a:lnL>
+                    <a:lnR>
+                      <a:noFill/>
+                    </a:lnR>
+                    <a:lnT>
+                      <a:noFill/>
+                    </a:lnT>
+                    <a:lnB>
+                      <a:noFill/>
+                    </a:lnB>
+                    <a:noFill/>
+                  </a:tcPr>
+                </a:tc>
+                <a:tc>
+                  <a:txBody>
+                    <a:bodyPr/>
+                    <a:lstStyle/>
+                    <a:p>
+                      <a:pPr algn="ctr">
+                        <a:buNone/>
+                      </a:pPr>
+                      <a:r>
+                        <a:rPr lang="de-DE" sz="1000" dirty="0"/>
+                        <a:t>0.15 W/(m</a:t>
+                      </a:r>
+                      <a:r>
+                        <a:rPr lang="de-DE" sz="1000" baseline="30000" dirty="0"/>
+                        <a:t>2</a:t>
+                      </a:r>
+                      <a:r>
+                        <a:rPr lang="de-DE" sz="1000" dirty="0"/>
+                        <a:t>K)</a:t>
+                      </a:r>
+                    </a:p>
+                  </a:txBody>
+                  <a:tcPr marL="262" marR="262" marT="262" marB="262" anchor="ctr">
+                    <a:lnL>
+                      <a:noFill/>
+                    </a:lnL>
+                    <a:lnR>
+                      <a:noFill/>
+                    </a:lnR>
+                    <a:lnT>
+                      <a:noFill/>
+                    </a:lnT>
+                    <a:lnB>
+                      <a:noFill/>
+                    </a:lnB>
+                    <a:noFill/>
+                  </a:tcPr>
+                </a:tc>
+                <a:tc>
+                  <a:txBody>
+                    <a:bodyPr/>
+                    <a:lstStyle/>
+                    <a:p>
+                      <a:pPr algn="ctr">
+                        <a:buNone/>
+                      </a:pPr>
+                      <a:endParaRPr lang="de-DE" sz="1000" dirty="0"/>
+                    </a:p>
+                  </a:txBody>
+                  <a:tcPr marL="262" marR="262" marT="262" marB="262" anchor="ctr">
+                    <a:lnL>
+                      <a:noFill/>
+                    </a:lnL>
+                    <a:lnR>
+                      <a:noFill/>
+                    </a:lnR>
+                    <a:lnT>
+                      <a:noFill/>
+                    </a:lnT>
+                    <a:lnB>
+                      <a:noFill/>
+                    </a:lnB>
+                    <a:noFill/>
+                  </a:tcPr>
+                </a:tc>
+                <a:extLst>
+                  <a:ext uri="{0D108BD9-81ED-4DB2-BD59-A6C34878D82A}">
+                    <a16:rowId xmlns:a16="http://schemas.microsoft.com/office/drawing/2014/main" val="1517488543"/>
+                  </a:ext>
+                </a:extLst>
+              </a:tr>
+              <a:tr h="53333">
+                <a:tc rowSpan="4">
+                  <a:txBody>
+                    <a:bodyPr/>
+                    <a:lstStyle/>
+                    <a:p>
+                      <a:pPr algn="ctr"/>
+                      <a:r>
+                        <a:rPr lang="de-DE" sz="1000"/>
+                        <a:t>Floor 2</a:t>
+                      </a:r>
+                    </a:p>
+                  </a:txBody>
+                  <a:tcPr marL="262" marR="262" marT="262" marB="262" anchor="ctr">
+                    <a:lnL>
+                      <a:noFill/>
+                    </a:lnL>
+                    <a:lnR>
+                      <a:noFill/>
+                    </a:lnR>
+                    <a:lnT>
+                      <a:noFill/>
+                    </a:lnT>
+                    <a:lnB>
+                      <a:noFill/>
+                    </a:lnB>
+                    <a:noFill/>
+                  </a:tcPr>
+                </a:tc>
+                <a:tc>
+                  <a:txBody>
+                    <a:bodyPr/>
+                    <a:lstStyle/>
+                    <a:p>
+                      <a:pPr algn="ctr"/>
+                      <a:r>
+                        <a:rPr lang="de-DE" sz="1000"/>
+                        <a:t>surface area</a:t>
+                      </a:r>
+                    </a:p>
+                  </a:txBody>
+                  <a:tcPr marL="262" marR="262" marT="262" marB="262" anchor="ctr">
+                    <a:lnL>
+                      <a:noFill/>
+                    </a:lnL>
+                    <a:lnR>
+                      <a:noFill/>
+                    </a:lnR>
+                    <a:lnT>
+                      <a:noFill/>
+                    </a:lnT>
+                    <a:lnB>
+                      <a:noFill/>
+                    </a:lnB>
+                    <a:noFill/>
+                  </a:tcPr>
+                </a:tc>
+                <a:tc>
+                  <a:txBody>
+                    <a:bodyPr/>
+                    <a:lstStyle/>
+                    <a:p>
+                      <a:pPr algn="ctr"/>
+                      <a:r>
+                        <a:rPr lang="de-DE" sz="1000"/>
+                        <a:t>107.8m</a:t>
+                      </a:r>
+                      <a:r>
+                        <a:rPr lang="de-DE" sz="1000" baseline="30000"/>
+                        <a:t>2</a:t>
+                      </a:r>
+                      <a:endParaRPr lang="de-DE" sz="1000"/>
+                    </a:p>
+                  </a:txBody>
+                  <a:tcPr marL="262" marR="262" marT="262" marB="262">
+                    <a:lnL>
+                      <a:noFill/>
+                    </a:lnL>
+                    <a:lnR>
+                      <a:noFill/>
+                    </a:lnR>
+                    <a:lnT>
+                      <a:noFill/>
+                    </a:lnT>
+                    <a:lnB>
+                      <a:noFill/>
+                    </a:lnB>
+                    <a:noFill/>
+                  </a:tcPr>
+                </a:tc>
+                <a:tc>
+                  <a:txBody>
+                    <a:bodyPr/>
+                    <a:lstStyle/>
+                    <a:p>
+                      <a:pPr algn="ctr"/>
+                      <a:r>
+                        <a:rPr lang="de-DE" sz="1000"/>
+                        <a:t>107.8 m</a:t>
+                      </a:r>
+                      <a:r>
+                        <a:rPr lang="de-DE" sz="1000" baseline="30000"/>
+                        <a:t>2</a:t>
+                      </a:r>
+                      <a:endParaRPr lang="de-DE" sz="1000"/>
+                    </a:p>
+                  </a:txBody>
+                  <a:tcPr marL="262" marR="262" marT="262" marB="262">
+                    <a:lnL>
+                      <a:noFill/>
+                    </a:lnL>
+                    <a:lnR>
+                      <a:noFill/>
+                    </a:lnR>
+                    <a:lnT>
+                      <a:noFill/>
+                    </a:lnT>
+                    <a:lnB>
+                      <a:noFill/>
+                    </a:lnB>
+                    <a:noFill/>
+                  </a:tcPr>
+                </a:tc>
+                <a:tc>
+                  <a:txBody>
+                    <a:bodyPr/>
+                    <a:lstStyle/>
+                    <a:p>
+                      <a:pPr algn="ctr"/>
+                      <a:endParaRPr lang="de-DE" sz="1000"/>
+                    </a:p>
+                  </a:txBody>
+                  <a:tcPr marL="262" marR="262" marT="262" marB="262">
+                    <a:lnL>
+                      <a:noFill/>
+                    </a:lnL>
+                    <a:lnR>
+                      <a:noFill/>
+                    </a:lnR>
+                    <a:lnT>
+                      <a:noFill/>
+                    </a:lnT>
+                    <a:lnB>
+                      <a:noFill/>
+                    </a:lnB>
+                    <a:noFill/>
+                  </a:tcPr>
+                </a:tc>
+                <a:extLst>
+                  <a:ext uri="{0D108BD9-81ED-4DB2-BD59-A6C34878D82A}">
+                    <a16:rowId xmlns:a16="http://schemas.microsoft.com/office/drawing/2014/main" val="3170070244"/>
+                  </a:ext>
+                </a:extLst>
+              </a:tr>
+              <a:tr h="121801">
+                <a:tc vMerge="1">
+                  <a:txBody>
+                    <a:bodyPr/>
+                    <a:lstStyle/>
+                    <a:p>
+                      <a:endParaRPr lang="de-DE"/>
+                    </a:p>
+                  </a:txBody>
+                  <a:tcPr/>
+                </a:tc>
+                <a:tc>
+                  <a:txBody>
+                    <a:bodyPr/>
+                    <a:lstStyle/>
+                    <a:p>
+                      <a:pPr algn="ctr"/>
+                      <a:endParaRPr lang="en-US" sz="1000" dirty="0"/>
+                    </a:p>
+                  </a:txBody>
+                  <a:tcPr marL="262" marR="262" marT="262" marB="262" anchor="ctr">
+                    <a:lnL>
+                      <a:noFill/>
+                    </a:lnL>
+                    <a:lnR>
+                      <a:noFill/>
+                    </a:lnR>
+                    <a:lnT>
+                      <a:noFill/>
+                    </a:lnT>
+                    <a:lnB>
+                      <a:noFill/>
+                    </a:lnB>
+                    <a:noFill/>
+                  </a:tcPr>
+                </a:tc>
+                <a:tc>
+                  <a:txBody>
+                    <a:bodyPr/>
+                    <a:lstStyle/>
+                    <a:p>
+                      <a:pPr algn="ctr"/>
+                      <a:endParaRPr lang="de-DE" sz="1000" dirty="0"/>
+                    </a:p>
+                  </a:txBody>
+                  <a:tcPr marL="262" marR="262" marT="262" marB="262">
+                    <a:lnL>
+                      <a:noFill/>
+                    </a:lnL>
+                    <a:lnR>
+                      <a:noFill/>
+                    </a:lnR>
+                    <a:lnT>
+                      <a:noFill/>
+                    </a:lnT>
+                    <a:lnB>
+                      <a:noFill/>
+                    </a:lnB>
+                    <a:noFill/>
+                  </a:tcPr>
+                </a:tc>
+                <a:tc>
+                  <a:txBody>
+                    <a:bodyPr/>
+                    <a:lstStyle/>
+                    <a:p>
+                      <a:pPr algn="ctr"/>
+                      <a:endParaRPr lang="de-DE" sz="1000" dirty="0"/>
+                    </a:p>
+                  </a:txBody>
+                  <a:tcPr marL="262" marR="262" marT="262" marB="262">
+                    <a:lnL>
+                      <a:noFill/>
+                    </a:lnL>
+                    <a:lnR>
+                      <a:noFill/>
+                    </a:lnR>
+                    <a:lnT>
+                      <a:noFill/>
+                    </a:lnT>
+                    <a:lnB>
+                      <a:noFill/>
+                    </a:lnB>
+                    <a:noFill/>
+                  </a:tcPr>
+                </a:tc>
+                <a:tc>
+                  <a:txBody>
+                    <a:bodyPr/>
+                    <a:lstStyle/>
+                    <a:p>
+                      <a:pPr algn="ctr"/>
+                      <a:endParaRPr lang="de-DE" sz="1000" dirty="0"/>
+                    </a:p>
+                  </a:txBody>
+                  <a:tcPr marL="262" marR="262" marT="262" marB="262">
+                    <a:lnL>
+                      <a:noFill/>
+                    </a:lnL>
+                    <a:lnR>
+                      <a:noFill/>
+                    </a:lnR>
+                    <a:lnT>
+                      <a:noFill/>
+                    </a:lnT>
+                    <a:lnB>
+                      <a:noFill/>
+                    </a:lnB>
+                    <a:noFill/>
+                  </a:tcPr>
+                </a:tc>
+                <a:extLst>
+                  <a:ext uri="{0D108BD9-81ED-4DB2-BD59-A6C34878D82A}">
+                    <a16:rowId xmlns:a16="http://schemas.microsoft.com/office/drawing/2014/main" val="1379521745"/>
+                  </a:ext>
+                </a:extLst>
+              </a:tr>
+              <a:tr h="0">
+                <a:tc vMerge="1">
+                  <a:txBody>
+                    <a:bodyPr/>
+                    <a:lstStyle/>
+                    <a:p>
+                      <a:endParaRPr lang="de-DE"/>
+                    </a:p>
+                  </a:txBody>
+                  <a:tcPr/>
+                </a:tc>
+                <a:tc>
+                  <a:txBody>
+                    <a:bodyPr/>
+                    <a:lstStyle/>
+                    <a:p>
+                      <a:pPr algn="ctr"/>
+                      <a:r>
+                        <a:rPr lang="de-DE" sz="1000"/>
+                        <a:t>picture</a:t>
+                      </a:r>
+                    </a:p>
+                  </a:txBody>
+                  <a:tcPr marL="262" marR="262" marT="262" marB="262" anchor="ctr">
+                    <a:lnL>
+                      <a:noFill/>
+                    </a:lnL>
+                    <a:lnR>
+                      <a:noFill/>
+                    </a:lnR>
+                    <a:lnT>
+                      <a:noFill/>
+                    </a:lnT>
+                    <a:lnB>
+                      <a:noFill/>
+                    </a:lnB>
+                    <a:noFill/>
+                  </a:tcPr>
+                </a:tc>
+                <a:tc>
+                  <a:txBody>
+                    <a:bodyPr/>
+                    <a:lstStyle/>
+                    <a:p>
+                      <a:pPr algn="ctr"/>
+                      <a:endParaRPr lang="de-DE" sz="1000"/>
+                    </a:p>
+                  </a:txBody>
+                  <a:tcPr marL="262" marR="262" marT="262" marB="262">
+                    <a:lnL>
+                      <a:noFill/>
+                    </a:lnL>
+                    <a:lnR>
+                      <a:noFill/>
+                    </a:lnR>
+                    <a:lnT>
+                      <a:noFill/>
+                    </a:lnT>
+                    <a:lnB>
+                      <a:noFill/>
+                    </a:lnB>
+                    <a:noFill/>
+                  </a:tcPr>
+                </a:tc>
+                <a:tc>
+                  <a:txBody>
+                    <a:bodyPr/>
+                    <a:lstStyle/>
+                    <a:p>
+                      <a:pPr algn="ctr"/>
+                      <a:endParaRPr lang="de-DE" sz="1000"/>
+                    </a:p>
+                  </a:txBody>
+                  <a:tcPr marL="262" marR="262" marT="262" marB="262">
+                    <a:lnL>
+                      <a:noFill/>
+                    </a:lnL>
+                    <a:lnR>
+                      <a:noFill/>
+                    </a:lnR>
+                    <a:lnT>
+                      <a:noFill/>
+                    </a:lnT>
+                    <a:lnB>
+                      <a:noFill/>
+                    </a:lnB>
+                    <a:noFill/>
+                  </a:tcPr>
+                </a:tc>
+                <a:tc>
+                  <a:txBody>
+                    <a:bodyPr/>
+                    <a:lstStyle/>
+                    <a:p>
+                      <a:pPr algn="ctr"/>
+                      <a:endParaRPr lang="de-DE" sz="1000"/>
+                    </a:p>
+                  </a:txBody>
+                  <a:tcPr marL="262" marR="262" marT="262" marB="262">
+                    <a:lnL>
+                      <a:noFill/>
+                    </a:lnL>
+                    <a:lnR>
+                      <a:noFill/>
+                    </a:lnR>
+                    <a:lnT>
+                      <a:noFill/>
+                    </a:lnT>
+                    <a:lnB>
+                      <a:noFill/>
+                    </a:lnB>
+                    <a:noFill/>
+                  </a:tcPr>
+                </a:tc>
+                <a:extLst>
+                  <a:ext uri="{0D108BD9-81ED-4DB2-BD59-A6C34878D82A}">
+                    <a16:rowId xmlns:a16="http://schemas.microsoft.com/office/drawing/2014/main" val="2341084443"/>
+                  </a:ext>
+                </a:extLst>
+              </a:tr>
+              <a:tr h="80996">
+                <a:tc vMerge="1">
+                  <a:txBody>
+                    <a:bodyPr/>
+                    <a:lstStyle/>
+                    <a:p>
+                      <a:endParaRPr lang="de-DE"/>
+                    </a:p>
+                  </a:txBody>
+                  <a:tcPr/>
+                </a:tc>
+                <a:tc>
+                  <a:txBody>
+                    <a:bodyPr/>
+                    <a:lstStyle/>
+                    <a:p>
+                      <a:pPr algn="ctr"/>
+                      <a:r>
+                        <a:rPr lang="de-DE" sz="1000"/>
+                        <a:t>U-value</a:t>
+                      </a:r>
+                    </a:p>
+                  </a:txBody>
+                  <a:tcPr marL="262" marR="262" marT="262" marB="262" anchor="ctr">
+                    <a:lnL>
+                      <a:noFill/>
+                    </a:lnL>
+                    <a:lnR>
+                      <a:noFill/>
+                    </a:lnR>
+                    <a:lnT>
+                      <a:noFill/>
+                    </a:lnT>
+                    <a:lnB>
+                      <a:noFill/>
+                    </a:lnB>
+                    <a:noFill/>
+                  </a:tcPr>
+                </a:tc>
+                <a:tc>
+                  <a:txBody>
+                    <a:bodyPr/>
+                    <a:lstStyle/>
+                    <a:p>
+                      <a:pPr algn="ctr">
+                        <a:buNone/>
+                      </a:pPr>
+                      <a:r>
+                        <a:rPr lang="de-DE" sz="1000"/>
+                        <a:t>0.17 W/(m</a:t>
+                      </a:r>
+                      <a:r>
+                        <a:rPr lang="de-DE" sz="1000" baseline="30000"/>
+                        <a:t>2</a:t>
+                      </a:r>
+                      <a:r>
+                        <a:rPr lang="de-DE" sz="1000"/>
+                        <a:t>K)</a:t>
+                      </a:r>
+                    </a:p>
+                  </a:txBody>
+                  <a:tcPr marL="262" marR="262" marT="262" marB="262" anchor="ctr">
+                    <a:lnL>
+                      <a:noFill/>
+                    </a:lnL>
+                    <a:lnR>
+                      <a:noFill/>
+                    </a:lnR>
+                    <a:lnT>
+                      <a:noFill/>
+                    </a:lnT>
+                    <a:lnB>
+                      <a:noFill/>
+                    </a:lnB>
+                    <a:noFill/>
+                  </a:tcPr>
+                </a:tc>
+                <a:tc>
+                  <a:txBody>
+                    <a:bodyPr/>
+                    <a:lstStyle/>
+                    <a:p>
+                      <a:pPr algn="ctr">
+                        <a:buNone/>
+                      </a:pPr>
+                      <a:r>
+                        <a:rPr lang="de-DE" sz="1000"/>
+                        <a:t>0.15 W/(m</a:t>
+                      </a:r>
+                      <a:r>
+                        <a:rPr lang="de-DE" sz="1000" baseline="30000"/>
+                        <a:t>2</a:t>
+                      </a:r>
+                      <a:r>
+                        <a:rPr lang="de-DE" sz="1000"/>
+                        <a:t>K)</a:t>
+                      </a:r>
+                    </a:p>
+                  </a:txBody>
+                  <a:tcPr marL="262" marR="262" marT="262" marB="262" anchor="ctr">
+                    <a:lnL>
+                      <a:noFill/>
+                    </a:lnL>
+                    <a:lnR>
+                      <a:noFill/>
+                    </a:lnR>
+                    <a:lnT>
+                      <a:noFill/>
+                    </a:lnT>
+                    <a:lnB>
+                      <a:noFill/>
+                    </a:lnB>
+                    <a:noFill/>
+                  </a:tcPr>
+                </a:tc>
+                <a:tc>
+                  <a:txBody>
+                    <a:bodyPr/>
+                    <a:lstStyle/>
+                    <a:p>
+                      <a:pPr algn="ctr">
+                        <a:buNone/>
+                      </a:pPr>
+                      <a:endParaRPr lang="de-DE" sz="1000"/>
+                    </a:p>
+                  </a:txBody>
+                  <a:tcPr marL="262" marR="262" marT="262" marB="262" anchor="ctr">
+                    <a:lnL>
+                      <a:noFill/>
+                    </a:lnL>
+                    <a:lnR>
+                      <a:noFill/>
+                    </a:lnR>
+                    <a:lnT>
+                      <a:noFill/>
+                    </a:lnT>
+                    <a:lnB>
+                      <a:noFill/>
+                    </a:lnB>
+                    <a:noFill/>
+                  </a:tcPr>
+                </a:tc>
+                <a:extLst>
+                  <a:ext uri="{0D108BD9-81ED-4DB2-BD59-A6C34878D82A}">
+                    <a16:rowId xmlns:a16="http://schemas.microsoft.com/office/drawing/2014/main" val="440797925"/>
+                  </a:ext>
+                </a:extLst>
+              </a:tr>
+              <a:tr h="45789">
+                <a:tc rowSpan="4">
+                  <a:txBody>
+                    <a:bodyPr/>
+                    <a:lstStyle/>
+                    <a:p>
+                      <a:pPr algn="ctr"/>
+                      <a:r>
+                        <a:rPr lang="de-DE" sz="1000"/>
+                        <a:t>Window 1</a:t>
+                      </a:r>
+                    </a:p>
+                  </a:txBody>
+                  <a:tcPr marL="262" marR="262" marT="262" marB="262" anchor="ctr">
+                    <a:lnL>
+                      <a:noFill/>
+                    </a:lnL>
+                    <a:lnR>
+                      <a:noFill/>
+                    </a:lnR>
+                    <a:lnT>
+                      <a:noFill/>
+                    </a:lnT>
+                    <a:lnB>
+                      <a:noFill/>
+                    </a:lnB>
+                    <a:noFill/>
+                  </a:tcPr>
+                </a:tc>
+                <a:tc>
+                  <a:txBody>
+                    <a:bodyPr/>
+                    <a:lstStyle/>
+                    <a:p>
+                      <a:pPr algn="ctr"/>
+                      <a:r>
+                        <a:rPr lang="de-DE" sz="1000"/>
+                        <a:t>surface area</a:t>
+                      </a:r>
+                    </a:p>
+                  </a:txBody>
+                  <a:tcPr marL="262" marR="262" marT="262" marB="262" anchor="ctr">
+                    <a:lnL>
+                      <a:noFill/>
+                    </a:lnL>
+                    <a:lnR>
+                      <a:noFill/>
+                    </a:lnR>
+                    <a:lnT>
+                      <a:noFill/>
+                    </a:lnT>
+                    <a:lnB>
+                      <a:noFill/>
+                    </a:lnB>
+                    <a:noFill/>
+                  </a:tcPr>
+                </a:tc>
+                <a:tc>
+                  <a:txBody>
+                    <a:bodyPr/>
+                    <a:lstStyle/>
+                    <a:p>
+                      <a:pPr algn="ctr"/>
+                      <a:r>
+                        <a:rPr lang="de-DE" sz="1000"/>
+                        <a:t>42.0m</a:t>
+                      </a:r>
+                      <a:r>
+                        <a:rPr lang="de-DE" sz="1000" baseline="30000"/>
+                        <a:t>2</a:t>
+                      </a:r>
+                      <a:endParaRPr lang="de-DE" sz="1000"/>
+                    </a:p>
+                  </a:txBody>
+                  <a:tcPr marL="262" marR="262" marT="262" marB="262">
+                    <a:lnL>
+                      <a:noFill/>
+                    </a:lnL>
+                    <a:lnR>
+                      <a:noFill/>
+                    </a:lnR>
+                    <a:lnT>
+                      <a:noFill/>
+                    </a:lnT>
+                    <a:lnB>
+                      <a:noFill/>
+                    </a:lnB>
+                    <a:noFill/>
+                  </a:tcPr>
+                </a:tc>
+                <a:tc>
+                  <a:txBody>
+                    <a:bodyPr/>
+                    <a:lstStyle/>
+                    <a:p>
+                      <a:pPr algn="ctr"/>
+                      <a:r>
+                        <a:rPr lang="de-DE" sz="1000"/>
+                        <a:t>42.0 m</a:t>
+                      </a:r>
+                      <a:r>
+                        <a:rPr lang="de-DE" sz="1000" baseline="30000"/>
+                        <a:t>2</a:t>
+                      </a:r>
+                      <a:endParaRPr lang="de-DE" sz="1000"/>
+                    </a:p>
+                  </a:txBody>
+                  <a:tcPr marL="262" marR="262" marT="262" marB="262">
+                    <a:lnL>
+                      <a:noFill/>
+                    </a:lnL>
+                    <a:lnR>
+                      <a:noFill/>
+                    </a:lnR>
+                    <a:lnT>
+                      <a:noFill/>
+                    </a:lnT>
+                    <a:lnB>
+                      <a:noFill/>
+                    </a:lnB>
+                    <a:noFill/>
+                  </a:tcPr>
+                </a:tc>
+                <a:tc>
+                  <a:txBody>
+                    <a:bodyPr/>
+                    <a:lstStyle/>
+                    <a:p>
+                      <a:pPr algn="ctr"/>
+                      <a:endParaRPr lang="de-DE" sz="1000"/>
+                    </a:p>
+                  </a:txBody>
+                  <a:tcPr marL="262" marR="262" marT="262" marB="262">
+                    <a:lnL>
+                      <a:noFill/>
+                    </a:lnL>
+                    <a:lnR>
+                      <a:noFill/>
+                    </a:lnR>
+                    <a:lnT>
+                      <a:noFill/>
+                    </a:lnT>
+                    <a:lnB>
+                      <a:noFill/>
+                    </a:lnB>
+                    <a:noFill/>
+                  </a:tcPr>
+                </a:tc>
+                <a:extLst>
+                  <a:ext uri="{0D108BD9-81ED-4DB2-BD59-A6C34878D82A}">
+                    <a16:rowId xmlns:a16="http://schemas.microsoft.com/office/drawing/2014/main" val="3618656935"/>
+                  </a:ext>
+                </a:extLst>
+              </a:tr>
+              <a:tr h="146375">
+                <a:tc vMerge="1">
+                  <a:txBody>
+                    <a:bodyPr/>
+                    <a:lstStyle/>
+                    <a:p>
+                      <a:endParaRPr lang="de-DE"/>
+                    </a:p>
+                  </a:txBody>
+                  <a:tcPr/>
+                </a:tc>
+                <a:tc>
+                  <a:txBody>
+                    <a:bodyPr/>
+                    <a:lstStyle/>
+                    <a:p>
+                      <a:pPr algn="ctr"/>
+                      <a:endParaRPr lang="en-US" sz="1000" dirty="0"/>
+                    </a:p>
+                  </a:txBody>
+                  <a:tcPr marL="262" marR="262" marT="262" marB="262" anchor="ctr">
+                    <a:lnL>
+                      <a:noFill/>
+                    </a:lnL>
+                    <a:lnR>
+                      <a:noFill/>
+                    </a:lnR>
+                    <a:lnT>
+                      <a:noFill/>
+                    </a:lnT>
+                    <a:lnB>
+                      <a:noFill/>
+                    </a:lnB>
+                    <a:noFill/>
+                  </a:tcPr>
+                </a:tc>
+                <a:tc>
+                  <a:txBody>
+                    <a:bodyPr/>
+                    <a:lstStyle/>
+                    <a:p>
+                      <a:pPr algn="ctr"/>
+                      <a:endParaRPr lang="de-DE" sz="1000" dirty="0"/>
+                    </a:p>
+                  </a:txBody>
+                  <a:tcPr marL="262" marR="262" marT="262" marB="262">
+                    <a:lnL>
+                      <a:noFill/>
+                    </a:lnL>
+                    <a:lnR>
+                      <a:noFill/>
+                    </a:lnR>
+                    <a:lnT>
+                      <a:noFill/>
+                    </a:lnT>
+                    <a:lnB>
+                      <a:noFill/>
+                    </a:lnB>
+                    <a:noFill/>
+                  </a:tcPr>
+                </a:tc>
+                <a:tc>
+                  <a:txBody>
+                    <a:bodyPr/>
+                    <a:lstStyle/>
+                    <a:p>
+                      <a:pPr algn="ctr"/>
+                      <a:endParaRPr lang="de-DE" sz="1000" dirty="0"/>
+                    </a:p>
+                  </a:txBody>
+                  <a:tcPr marL="262" marR="262" marT="262" marB="262">
+                    <a:lnL>
+                      <a:noFill/>
+                    </a:lnL>
+                    <a:lnR>
+                      <a:noFill/>
+                    </a:lnR>
+                    <a:lnT>
+                      <a:noFill/>
+                    </a:lnT>
+                    <a:lnB>
+                      <a:noFill/>
+                    </a:lnB>
+                    <a:noFill/>
+                  </a:tcPr>
+                </a:tc>
+                <a:tc>
+                  <a:txBody>
+                    <a:bodyPr/>
+                    <a:lstStyle/>
+                    <a:p>
+                      <a:pPr algn="ctr"/>
+                      <a:endParaRPr lang="de-DE" sz="1000"/>
+                    </a:p>
+                  </a:txBody>
+                  <a:tcPr marL="262" marR="262" marT="262" marB="262">
+                    <a:lnL>
+                      <a:noFill/>
+                    </a:lnL>
+                    <a:lnR>
+                      <a:noFill/>
+                    </a:lnR>
+                    <a:lnT>
+                      <a:noFill/>
+                    </a:lnT>
+                    <a:lnB>
+                      <a:noFill/>
+                    </a:lnB>
+                    <a:noFill/>
+                  </a:tcPr>
+                </a:tc>
+                <a:extLst>
+                  <a:ext uri="{0D108BD9-81ED-4DB2-BD59-A6C34878D82A}">
+                    <a16:rowId xmlns:a16="http://schemas.microsoft.com/office/drawing/2014/main" val="3401175277"/>
+                  </a:ext>
+                </a:extLst>
+              </a:tr>
+              <a:tr h="0">
+                <a:tc vMerge="1">
+                  <a:txBody>
+                    <a:bodyPr/>
+                    <a:lstStyle/>
+                    <a:p>
+                      <a:endParaRPr lang="de-DE"/>
+                    </a:p>
+                  </a:txBody>
+                  <a:tcPr/>
+                </a:tc>
+                <a:tc>
+                  <a:txBody>
+                    <a:bodyPr/>
+                    <a:lstStyle/>
+                    <a:p>
+                      <a:pPr algn="ctr"/>
+                      <a:r>
+                        <a:rPr lang="de-DE" sz="1000"/>
+                        <a:t>picture</a:t>
+                      </a:r>
+                    </a:p>
+                  </a:txBody>
+                  <a:tcPr marL="262" marR="262" marT="262" marB="262" anchor="ctr">
+                    <a:lnL>
+                      <a:noFill/>
+                    </a:lnL>
+                    <a:lnR>
+                      <a:noFill/>
+                    </a:lnR>
+                    <a:lnT>
+                      <a:noFill/>
+                    </a:lnT>
+                    <a:lnB>
+                      <a:noFill/>
+                    </a:lnB>
+                    <a:noFill/>
+                  </a:tcPr>
+                </a:tc>
+                <a:tc>
+                  <a:txBody>
+                    <a:bodyPr/>
+                    <a:lstStyle/>
+                    <a:p>
+                      <a:pPr algn="ctr"/>
+                      <a:endParaRPr lang="de-DE" sz="1000"/>
+                    </a:p>
+                  </a:txBody>
+                  <a:tcPr marL="262" marR="262" marT="262" marB="262">
+                    <a:lnL>
+                      <a:noFill/>
+                    </a:lnL>
+                    <a:lnR>
+                      <a:noFill/>
+                    </a:lnR>
+                    <a:lnT>
+                      <a:noFill/>
+                    </a:lnT>
+                    <a:lnB>
+                      <a:noFill/>
+                    </a:lnB>
+                    <a:noFill/>
+                  </a:tcPr>
+                </a:tc>
+                <a:tc>
+                  <a:txBody>
+                    <a:bodyPr/>
+                    <a:lstStyle/>
+                    <a:p>
+                      <a:pPr algn="ctr"/>
+                      <a:endParaRPr lang="de-DE" sz="1000"/>
+                    </a:p>
+                  </a:txBody>
+                  <a:tcPr marL="262" marR="262" marT="262" marB="262">
+                    <a:lnL>
+                      <a:noFill/>
+                    </a:lnL>
+                    <a:lnR>
+                      <a:noFill/>
+                    </a:lnR>
+                    <a:lnT>
+                      <a:noFill/>
+                    </a:lnT>
+                    <a:lnB>
+                      <a:noFill/>
+                    </a:lnB>
+                    <a:noFill/>
+                  </a:tcPr>
+                </a:tc>
+                <a:tc>
+                  <a:txBody>
+                    <a:bodyPr/>
+                    <a:lstStyle/>
+                    <a:p>
+                      <a:pPr algn="ctr"/>
+                      <a:endParaRPr lang="de-DE" sz="1000"/>
+                    </a:p>
+                  </a:txBody>
+                  <a:tcPr marL="262" marR="262" marT="262" marB="262">
+                    <a:lnL>
+                      <a:noFill/>
+                    </a:lnL>
+                    <a:lnR>
+                      <a:noFill/>
+                    </a:lnR>
+                    <a:lnT>
+                      <a:noFill/>
+                    </a:lnT>
+                    <a:lnB>
+                      <a:noFill/>
+                    </a:lnB>
+                    <a:noFill/>
+                  </a:tcPr>
+                </a:tc>
+                <a:extLst>
+                  <a:ext uri="{0D108BD9-81ED-4DB2-BD59-A6C34878D82A}">
+                    <a16:rowId xmlns:a16="http://schemas.microsoft.com/office/drawing/2014/main" val="903480550"/>
+                  </a:ext>
+                </a:extLst>
+              </a:tr>
+              <a:tr h="80996">
+                <a:tc vMerge="1">
+                  <a:txBody>
+                    <a:bodyPr/>
+                    <a:lstStyle/>
+                    <a:p>
+                      <a:endParaRPr lang="de-DE"/>
+                    </a:p>
+                  </a:txBody>
+                  <a:tcPr/>
+                </a:tc>
+                <a:tc>
+                  <a:txBody>
+                    <a:bodyPr/>
+                    <a:lstStyle/>
+                    <a:p>
+                      <a:pPr algn="ctr"/>
+                      <a:r>
+                        <a:rPr lang="de-DE" sz="1000"/>
+                        <a:t>U-value</a:t>
+                      </a:r>
+                    </a:p>
+                  </a:txBody>
+                  <a:tcPr marL="262" marR="262" marT="262" marB="262" anchor="ctr">
+                    <a:lnL>
+                      <a:noFill/>
+                    </a:lnL>
+                    <a:lnR>
+                      <a:noFill/>
+                    </a:lnR>
+                    <a:lnT>
+                      <a:noFill/>
+                    </a:lnT>
+                    <a:lnB>
+                      <a:noFill/>
+                    </a:lnB>
+                    <a:noFill/>
+                  </a:tcPr>
+                </a:tc>
+                <a:tc>
+                  <a:txBody>
+                    <a:bodyPr/>
+                    <a:lstStyle/>
+                    <a:p>
+                      <a:pPr algn="ctr">
+                        <a:buNone/>
+                      </a:pPr>
+                      <a:r>
+                        <a:rPr lang="de-DE" sz="1000"/>
+                        <a:t>1.10 W/(m</a:t>
+                      </a:r>
+                      <a:r>
+                        <a:rPr lang="de-DE" sz="1000" baseline="30000"/>
+                        <a:t>2</a:t>
+                      </a:r>
+                      <a:r>
+                        <a:rPr lang="de-DE" sz="1000"/>
+                        <a:t>K)</a:t>
+                      </a:r>
+                    </a:p>
+                  </a:txBody>
+                  <a:tcPr marL="262" marR="262" marT="262" marB="262" anchor="ctr">
+                    <a:lnL>
+                      <a:noFill/>
+                    </a:lnL>
+                    <a:lnR>
+                      <a:noFill/>
+                    </a:lnR>
+                    <a:lnT>
+                      <a:noFill/>
+                    </a:lnT>
+                    <a:lnB>
+                      <a:noFill/>
+                    </a:lnB>
+                    <a:noFill/>
+                  </a:tcPr>
+                </a:tc>
+                <a:tc>
+                  <a:txBody>
+                    <a:bodyPr/>
+                    <a:lstStyle/>
+                    <a:p>
+                      <a:pPr algn="ctr">
+                        <a:buNone/>
+                      </a:pPr>
+                      <a:r>
+                        <a:rPr lang="de-DE" sz="1000"/>
+                        <a:t>1.10 W/(m</a:t>
+                      </a:r>
+                      <a:r>
+                        <a:rPr lang="de-DE" sz="1000" baseline="30000"/>
+                        <a:t>2</a:t>
+                      </a:r>
+                      <a:r>
+                        <a:rPr lang="de-DE" sz="1000"/>
+                        <a:t>K)</a:t>
+                      </a:r>
+                    </a:p>
+                  </a:txBody>
+                  <a:tcPr marL="262" marR="262" marT="262" marB="262" anchor="ctr">
+                    <a:lnL>
+                      <a:noFill/>
+                    </a:lnL>
+                    <a:lnR>
+                      <a:noFill/>
+                    </a:lnR>
+                    <a:lnT>
+                      <a:noFill/>
+                    </a:lnT>
+                    <a:lnB>
+                      <a:noFill/>
+                    </a:lnB>
+                    <a:noFill/>
+                  </a:tcPr>
+                </a:tc>
+                <a:tc>
+                  <a:txBody>
+                    <a:bodyPr/>
+                    <a:lstStyle/>
+                    <a:p>
+                      <a:pPr algn="ctr">
+                        <a:buNone/>
+                      </a:pPr>
+                      <a:endParaRPr lang="de-DE" sz="1000" dirty="0"/>
+                    </a:p>
+                  </a:txBody>
+                  <a:tcPr marL="262" marR="262" marT="262" marB="262" anchor="ctr">
+                    <a:lnL>
+                      <a:noFill/>
+                    </a:lnL>
+                    <a:lnR>
+                      <a:noFill/>
+                    </a:lnR>
+                    <a:lnT>
+                      <a:noFill/>
+                    </a:lnT>
+                    <a:lnB>
+                      <a:noFill/>
+                    </a:lnB>
+                    <a:noFill/>
+                  </a:tcPr>
+                </a:tc>
+                <a:extLst>
+                  <a:ext uri="{0D108BD9-81ED-4DB2-BD59-A6C34878D82A}">
+                    <a16:rowId xmlns:a16="http://schemas.microsoft.com/office/drawing/2014/main" val="4177455836"/>
+                  </a:ext>
+                </a:extLst>
+              </a:tr>
+            </a:tbl>
+          </a:graphicData>
+        </a:graphic>
+      </p:graphicFrame>
+    </p:spTree>
+    <p:extLst>
+      <p:ext uri="{BB962C8B-B14F-4D97-AF65-F5344CB8AC3E}">
+        <p14:creationId xmlns:p14="http://schemas.microsoft.com/office/powerpoint/2010/main" val="2652344543"/>
+      </p:ext>
+    </p:extLst>
+  </p:cSld>
+  <p:clrMapOvr>
+    <a:masterClrMapping/>
+  </p:clrMapOvr>
+</p:sld>
+</file>
+
+<file path=ppt/slides/slide22.xml><?xml version="1.0" encoding="utf-8"?>
 <p:sld xmlns:a="http://schemas.openxmlformats.org/drawingml/2006/main" xmlns:r="http://schemas.openxmlformats.org/officeDocument/2006/relationships" xmlns:p="http://schemas.openxmlformats.org/presentationml/2006/main">
   <p:cSld>
     <p:spTree>
@@ -15546,7 +19606,7 @@
 </p:sld>
 </file>
 
-<file path=ppt/slides/slide22.xml><?xml version="1.0" encoding="utf-8"?>
+<file path=ppt/slides/slide23.xml><?xml version="1.0" encoding="utf-8"?>
 <p:sld xmlns:a="http://schemas.openxmlformats.org/drawingml/2006/main" xmlns:r="http://schemas.openxmlformats.org/officeDocument/2006/relationships" xmlns:p="http://schemas.openxmlformats.org/presentationml/2006/main">
   <p:cSld>
     <p:spTree>
@@ -15649,7 +19709,7 @@
 </p:sld>
 </file>
 
-<file path=ppt/slides/slide23.xml><?xml version="1.0" encoding="utf-8"?>
+<file path=ppt/slides/slide24.xml><?xml version="1.0" encoding="utf-8"?>
 <p:sld xmlns:a="http://schemas.openxmlformats.org/drawingml/2006/main" xmlns:r="http://schemas.openxmlformats.org/officeDocument/2006/relationships" xmlns:p="http://schemas.openxmlformats.org/presentationml/2006/main">
   <p:cSld>
     <p:spTree>
@@ -15761,7 +19821,7 @@
 </p:sld>
 </file>
 
-<file path=ppt/slides/slide24.xml><?xml version="1.0" encoding="utf-8"?>
+<file path=ppt/slides/slide25.xml><?xml version="1.0" encoding="utf-8"?>
 <p:sld xmlns:a="http://schemas.openxmlformats.org/drawingml/2006/main" xmlns:r="http://schemas.openxmlformats.org/officeDocument/2006/relationships" xmlns:p="http://schemas.openxmlformats.org/presentationml/2006/main">
   <p:cSld>
     <p:spTree>
@@ -15868,7 +19928,7 @@
 </p:sld>
 </file>
 
-<file path=ppt/slides/slide25.xml><?xml version="1.0" encoding="utf-8"?>
+<file path=ppt/slides/slide26.xml><?xml version="1.0" encoding="utf-8"?>
 <p:sld xmlns:a="http://schemas.openxmlformats.org/drawingml/2006/main" xmlns:r="http://schemas.openxmlformats.org/officeDocument/2006/relationships" xmlns:p="http://schemas.openxmlformats.org/presentationml/2006/main">
   <p:cSld>
     <p:spTree>
@@ -15983,7 +20043,7 @@
 </p:sld>
 </file>
 
-<file path=ppt/slides/slide26.xml><?xml version="1.0" encoding="utf-8"?>
+<file path=ppt/slides/slide27.xml><?xml version="1.0" encoding="utf-8"?>
 <p:sld xmlns:a="http://schemas.openxmlformats.org/drawingml/2006/main" xmlns:r="http://schemas.openxmlformats.org/officeDocument/2006/relationships" xmlns:p="http://schemas.openxmlformats.org/presentationml/2006/main">
   <p:cSld>
     <p:spTree>

</xml_diff>

<commit_message>
more parameter updates and bar plot looks better?
I divided by the A_ground now for all Qs instead of normalizing them. I think the energy demand is per unit of living area
</commit_message>
<xml_diff>
--- a/presentation/heat.pptx
+++ b/presentation/heat.pptx
@@ -5,7 +5,7 @@
     <p:sldMasterId id="2147483648" r:id="rId1"/>
   </p:sldMasterIdLst>
   <p:notesMasterIdLst>
-    <p:notesMasterId r:id="rId29"/>
+    <p:notesMasterId r:id="rId32"/>
   </p:notesMasterIdLst>
   <p:sldIdLst>
     <p:sldId id="256" r:id="rId2"/>
@@ -27,14 +27,17 @@
     <p:sldId id="261" r:id="rId18"/>
     <p:sldId id="262" r:id="rId19"/>
     <p:sldId id="266" r:id="rId20"/>
-    <p:sldId id="281" r:id="rId21"/>
-    <p:sldId id="282" r:id="rId22"/>
-    <p:sldId id="267" r:id="rId23"/>
-    <p:sldId id="268" r:id="rId24"/>
-    <p:sldId id="263" r:id="rId25"/>
-    <p:sldId id="264" r:id="rId26"/>
-    <p:sldId id="269" r:id="rId27"/>
-    <p:sldId id="265" r:id="rId28"/>
+    <p:sldId id="283" r:id="rId21"/>
+    <p:sldId id="281" r:id="rId22"/>
+    <p:sldId id="284" r:id="rId23"/>
+    <p:sldId id="282" r:id="rId24"/>
+    <p:sldId id="267" r:id="rId25"/>
+    <p:sldId id="285" r:id="rId26"/>
+    <p:sldId id="268" r:id="rId27"/>
+    <p:sldId id="263" r:id="rId28"/>
+    <p:sldId id="264" r:id="rId29"/>
+    <p:sldId id="269" r:id="rId30"/>
+    <p:sldId id="265" r:id="rId31"/>
   </p:sldIdLst>
   <p:sldSz cx="12192000" cy="6858000"/>
   <p:notesSz cx="6858000" cy="9144000"/>
@@ -223,7 +226,7 @@
           <a:p>
             <a:fld id="{286B95F3-0557-304F-A425-74B74408DC2F}" type="datetimeFigureOut">
               <a:rPr lang="de-DE" smtClean="0"/>
-              <a:t>24.06.2025</a:t>
+              <a:t>26.06.2025</a:t>
             </a:fld>
             <a:endParaRPr lang="de-DE"/>
           </a:p>
@@ -1240,7 +1243,7 @@
           <a:p>
             <a:fld id="{04AD105E-1681-4427-A2A6-BE19936FDE9F}" type="datetimeFigureOut">
               <a:rPr lang="de-DE" smtClean="0"/>
-              <a:t>24.06.2025</a:t>
+              <a:t>26.06.2025</a:t>
             </a:fld>
             <a:endParaRPr lang="de-DE"/>
           </a:p>
@@ -1438,7 +1441,7 @@
           <a:p>
             <a:fld id="{04AD105E-1681-4427-A2A6-BE19936FDE9F}" type="datetimeFigureOut">
               <a:rPr lang="de-DE" smtClean="0"/>
-              <a:t>24.06.2025</a:t>
+              <a:t>26.06.2025</a:t>
             </a:fld>
             <a:endParaRPr lang="de-DE"/>
           </a:p>
@@ -1646,7 +1649,7 @@
           <a:p>
             <a:fld id="{04AD105E-1681-4427-A2A6-BE19936FDE9F}" type="datetimeFigureOut">
               <a:rPr lang="de-DE" smtClean="0"/>
-              <a:t>24.06.2025</a:t>
+              <a:t>26.06.2025</a:t>
             </a:fld>
             <a:endParaRPr lang="de-DE"/>
           </a:p>
@@ -1844,7 +1847,7 @@
           <a:p>
             <a:fld id="{04AD105E-1681-4427-A2A6-BE19936FDE9F}" type="datetimeFigureOut">
               <a:rPr lang="de-DE" smtClean="0"/>
-              <a:t>24.06.2025</a:t>
+              <a:t>26.06.2025</a:t>
             </a:fld>
             <a:endParaRPr lang="de-DE"/>
           </a:p>
@@ -2119,7 +2122,7 @@
           <a:p>
             <a:fld id="{04AD105E-1681-4427-A2A6-BE19936FDE9F}" type="datetimeFigureOut">
               <a:rPr lang="de-DE" smtClean="0"/>
-              <a:t>24.06.2025</a:t>
+              <a:t>26.06.2025</a:t>
             </a:fld>
             <a:endParaRPr lang="de-DE"/>
           </a:p>
@@ -2384,7 +2387,7 @@
           <a:p>
             <a:fld id="{04AD105E-1681-4427-A2A6-BE19936FDE9F}" type="datetimeFigureOut">
               <a:rPr lang="de-DE" smtClean="0"/>
-              <a:t>24.06.2025</a:t>
+              <a:t>26.06.2025</a:t>
             </a:fld>
             <a:endParaRPr lang="de-DE"/>
           </a:p>
@@ -2796,7 +2799,7 @@
           <a:p>
             <a:fld id="{04AD105E-1681-4427-A2A6-BE19936FDE9F}" type="datetimeFigureOut">
               <a:rPr lang="de-DE" smtClean="0"/>
-              <a:t>24.06.2025</a:t>
+              <a:t>26.06.2025</a:t>
             </a:fld>
             <a:endParaRPr lang="de-DE"/>
           </a:p>
@@ -2937,7 +2940,7 @@
           <a:p>
             <a:fld id="{04AD105E-1681-4427-A2A6-BE19936FDE9F}" type="datetimeFigureOut">
               <a:rPr lang="de-DE" smtClean="0"/>
-              <a:t>24.06.2025</a:t>
+              <a:t>26.06.2025</a:t>
             </a:fld>
             <a:endParaRPr lang="de-DE"/>
           </a:p>
@@ -3050,7 +3053,7 @@
           <a:p>
             <a:fld id="{04AD105E-1681-4427-A2A6-BE19936FDE9F}" type="datetimeFigureOut">
               <a:rPr lang="de-DE" smtClean="0"/>
-              <a:t>24.06.2025</a:t>
+              <a:t>26.06.2025</a:t>
             </a:fld>
             <a:endParaRPr lang="de-DE"/>
           </a:p>
@@ -3361,7 +3364,7 @@
           <a:p>
             <a:fld id="{04AD105E-1681-4427-A2A6-BE19936FDE9F}" type="datetimeFigureOut">
               <a:rPr lang="de-DE" smtClean="0"/>
-              <a:t>24.06.2025</a:t>
+              <a:t>26.06.2025</a:t>
             </a:fld>
             <a:endParaRPr lang="de-DE"/>
           </a:p>
@@ -3649,7 +3652,7 @@
           <a:p>
             <a:fld id="{04AD105E-1681-4427-A2A6-BE19936FDE9F}" type="datetimeFigureOut">
               <a:rPr lang="de-DE" smtClean="0"/>
-              <a:t>24.06.2025</a:t>
+              <a:t>26.06.2025</a:t>
             </a:fld>
             <a:endParaRPr lang="de-DE"/>
           </a:p>
@@ -3890,7 +3893,7 @@
           <a:p>
             <a:fld id="{04AD105E-1681-4427-A2A6-BE19936FDE9F}" type="datetimeFigureOut">
               <a:rPr lang="de-DE" smtClean="0"/>
-              <a:t>24.06.2025</a:t>
+              <a:t>26.06.2025</a:t>
             </a:fld>
             <a:endParaRPr lang="de-DE"/>
           </a:p>
@@ -11896,6 +11899,9 @@
             </a:r>
             <a:endParaRPr lang="de-DE" dirty="0"/>
           </a:p>
+          <a:p>
+            <a:endParaRPr lang="de-DE" dirty="0"/>
+          </a:p>
         </p:txBody>
       </p:sp>
     </p:spTree>
@@ -13458,6 +13464,223 @@
       </p:grpSpPr>
       <p:sp>
         <p:nvSpPr>
+          <p:cNvPr id="2" name="Title 1">
+            <a:extLst>
+              <a:ext uri="{FF2B5EF4-FFF2-40B4-BE49-F238E27FC236}">
+                <a16:creationId xmlns:a16="http://schemas.microsoft.com/office/drawing/2014/main" id="{9BAB473C-44F6-DE7B-9C03-86852693BC76}"/>
+              </a:ext>
+            </a:extLst>
+          </p:cNvPr>
+          <p:cNvSpPr>
+            <a:spLocks noGrp="1"/>
+          </p:cNvSpPr>
+          <p:nvPr>
+            <p:ph type="title"/>
+          </p:nvPr>
+        </p:nvSpPr>
+        <p:spPr/>
+        <p:txBody>
+          <a:bodyPr/>
+          <a:lstStyle/>
+          <a:p>
+            <a:r>
+              <a:rPr lang="de-DE" dirty="0"/>
+              <a:t>Tabula </a:t>
+            </a:r>
+            <a:r>
+              <a:rPr lang="de-DE" dirty="0" err="1"/>
+              <a:t>parameters</a:t>
+            </a:r>
+            <a:endParaRPr lang="de-DE" dirty="0"/>
+          </a:p>
+        </p:txBody>
+      </p:sp>
+      <p:sp>
+        <p:nvSpPr>
+          <p:cNvPr id="3" name="Content Placeholder 2">
+            <a:extLst>
+              <a:ext uri="{FF2B5EF4-FFF2-40B4-BE49-F238E27FC236}">
+                <a16:creationId xmlns:a16="http://schemas.microsoft.com/office/drawing/2014/main" id="{CA71C9FE-1838-32F5-D4D9-F3200037FC18}"/>
+              </a:ext>
+            </a:extLst>
+          </p:cNvPr>
+          <p:cNvSpPr>
+            <a:spLocks noGrp="1"/>
+          </p:cNvSpPr>
+          <p:nvPr>
+            <p:ph idx="1"/>
+          </p:nvPr>
+        </p:nvSpPr>
+        <p:spPr/>
+        <p:txBody>
+          <a:bodyPr/>
+          <a:lstStyle/>
+          <a:p>
+            <a:r>
+              <a:rPr lang="de-DE" dirty="0" err="1"/>
+              <a:t>How</a:t>
+            </a:r>
+            <a:r>
+              <a:rPr lang="de-DE" dirty="0"/>
+              <a:t> </a:t>
+            </a:r>
+            <a:r>
+              <a:rPr lang="de-DE" dirty="0" err="1"/>
+              <a:t>did</a:t>
+            </a:r>
+            <a:r>
+              <a:rPr lang="de-DE" dirty="0"/>
+              <a:t> </a:t>
+            </a:r>
+            <a:r>
+              <a:rPr lang="de-DE" dirty="0" err="1"/>
+              <a:t>we</a:t>
+            </a:r>
+            <a:r>
+              <a:rPr lang="de-DE" dirty="0"/>
+              <a:t> </a:t>
+            </a:r>
+            <a:r>
+              <a:rPr lang="de-DE" dirty="0" err="1"/>
+              <a:t>calculate</a:t>
+            </a:r>
+            <a:r>
+              <a:rPr lang="de-DE" dirty="0"/>
+              <a:t> </a:t>
+            </a:r>
+            <a:r>
+              <a:rPr lang="de-DE" dirty="0" err="1"/>
+              <a:t>building</a:t>
+            </a:r>
+            <a:r>
+              <a:rPr lang="de-DE" dirty="0"/>
+              <a:t> </a:t>
+            </a:r>
+            <a:r>
+              <a:rPr lang="de-DE" dirty="0" err="1"/>
+              <a:t>volume</a:t>
+            </a:r>
+            <a:r>
+              <a:rPr lang="de-DE" dirty="0"/>
+              <a:t>: V = ¼* </a:t>
+            </a:r>
+            <a:r>
+              <a:rPr lang="de-DE" dirty="0" err="1"/>
+              <a:t>A_walls</a:t>
+            </a:r>
+            <a:r>
+              <a:rPr lang="de-DE" dirty="0"/>
+              <a:t>*</a:t>
+            </a:r>
+            <a:r>
+              <a:rPr lang="de-DE" dirty="0" err="1"/>
+              <a:t>sqrt</a:t>
+            </a:r>
+            <a:r>
+              <a:rPr lang="de-DE" dirty="0"/>
+              <a:t>(</a:t>
+            </a:r>
+            <a:r>
+              <a:rPr lang="de-DE" dirty="0" err="1"/>
+              <a:t>A_ground</a:t>
+            </a:r>
+            <a:r>
+              <a:rPr lang="de-DE" dirty="0"/>
+              <a:t>)</a:t>
+            </a:r>
+          </a:p>
+          <a:p>
+            <a:r>
+              <a:rPr lang="de-DE" dirty="0" err="1"/>
+              <a:t>What</a:t>
+            </a:r>
+            <a:r>
+              <a:rPr lang="de-DE" dirty="0"/>
+              <a:t> </a:t>
+            </a:r>
+            <a:r>
+              <a:rPr lang="de-DE" dirty="0" err="1"/>
+              <a:t>processes</a:t>
+            </a:r>
+            <a:r>
+              <a:rPr lang="de-DE" dirty="0"/>
+              <a:t> </a:t>
+            </a:r>
+            <a:r>
+              <a:rPr lang="de-DE" dirty="0" err="1"/>
+              <a:t>were</a:t>
+            </a:r>
+            <a:r>
+              <a:rPr lang="de-DE" dirty="0"/>
+              <a:t> </a:t>
+            </a:r>
+            <a:r>
+              <a:rPr lang="de-DE" dirty="0" err="1"/>
+              <a:t>omitted</a:t>
+            </a:r>
+            <a:r>
+              <a:rPr lang="de-DE" dirty="0"/>
+              <a:t> (internal </a:t>
+            </a:r>
+            <a:r>
+              <a:rPr lang="de-DE" dirty="0" err="1"/>
+              <a:t>heating</a:t>
+            </a:r>
+            <a:r>
+              <a:rPr lang="de-DE" dirty="0"/>
+              <a:t> </a:t>
+            </a:r>
+            <a:r>
+              <a:rPr lang="de-DE" dirty="0" err="1"/>
+              <a:t>sources</a:t>
+            </a:r>
+            <a:r>
+              <a:rPr lang="de-DE" dirty="0"/>
+              <a:t>, solar, </a:t>
+            </a:r>
+            <a:r>
+              <a:rPr lang="de-DE" dirty="0" err="1"/>
+              <a:t>ventilation</a:t>
+            </a:r>
+            <a:r>
+              <a:rPr lang="de-DE" dirty="0"/>
+              <a:t>)</a:t>
+            </a:r>
+          </a:p>
+        </p:txBody>
+      </p:sp>
+    </p:spTree>
+    <p:extLst>
+      <p:ext uri="{BB962C8B-B14F-4D97-AF65-F5344CB8AC3E}">
+        <p14:creationId xmlns:p14="http://schemas.microsoft.com/office/powerpoint/2010/main" val="2218439923"/>
+      </p:ext>
+    </p:extLst>
+  </p:cSld>
+  <p:clrMapOvr>
+    <a:masterClrMapping/>
+  </p:clrMapOvr>
+</p:sld>
+</file>
+
+<file path=ppt/slides/slide21.xml><?xml version="1.0" encoding="utf-8"?>
+<p:sld xmlns:a="http://schemas.openxmlformats.org/drawingml/2006/main" xmlns:r="http://schemas.openxmlformats.org/officeDocument/2006/relationships" xmlns:p="http://schemas.openxmlformats.org/presentationml/2006/main">
+  <p:cSld>
+    <p:spTree>
+      <p:nvGrpSpPr>
+        <p:cNvPr id="1" name=""/>
+        <p:cNvGrpSpPr/>
+        <p:nvPr/>
+      </p:nvGrpSpPr>
+      <p:grpSpPr>
+        <a:xfrm>
+          <a:off x="0" y="0"/>
+          <a:ext cx="0" cy="0"/>
+          <a:chOff x="0" y="0"/>
+          <a:chExt cx="0" cy="0"/>
+        </a:xfrm>
+      </p:grpSpPr>
+      <p:sp>
+        <p:nvSpPr>
           <p:cNvPr id="2" name="Titel 1">
             <a:extLst>
               <a:ext uri="{FF2B5EF4-FFF2-40B4-BE49-F238E27FC236}">
@@ -13479,7 +13702,7 @@
           <a:p>
             <a:r>
               <a:rPr lang="de-DE" dirty="0"/>
-              <a:t>1948 </a:t>
+              <a:t>1978 </a:t>
             </a:r>
             <a:r>
               <a:rPr lang="de-DE" dirty="0" err="1"/>
@@ -13487,13 +13710,8 @@
             </a:r>
             <a:r>
               <a:rPr lang="de-DE" dirty="0"/>
-              <a:t> in 2015 </a:t>
-            </a:r>
-            <a:r>
-              <a:rPr lang="de-DE" dirty="0" err="1"/>
-              <a:t>winter</a:t>
-            </a:r>
-            <a:endParaRPr lang="de-DE" dirty="0"/>
+              <a:t> in 2015</a:t>
+            </a:r>
           </a:p>
         </p:txBody>
       </p:sp>
@@ -13513,10 +13731,15 @@
             <p:ph idx="1"/>
           </p:nvPr>
         </p:nvSpPr>
-        <p:spPr/>
+        <p:spPr>
+          <a:xfrm>
+            <a:off x="838200" y="2265362"/>
+            <a:ext cx="10515600" cy="4351338"/>
+          </a:xfrm>
+        </p:spPr>
         <p:txBody>
           <a:bodyPr>
-            <a:normAutofit/>
+            <a:normAutofit fontScale="77500" lnSpcReduction="20000"/>
           </a:bodyPr>
           <a:lstStyle/>
           <a:p>
@@ -13554,6 +13777,103 @@
           </a:p>
           <a:p>
             <a:endParaRPr lang="de-DE" dirty="0"/>
+          </a:p>
+          <a:p>
+            <a:endParaRPr lang="de-DE" dirty="0"/>
+          </a:p>
+          <a:p>
+            <a:endParaRPr lang="de-DE" dirty="0"/>
+          </a:p>
+          <a:p>
+            <a:pPr marL="0" indent="0">
+              <a:buNone/>
+            </a:pPr>
+            <a:r>
+              <a:rPr lang="de-DE" dirty="0" err="1"/>
+              <a:t>What‘s</a:t>
+            </a:r>
+            <a:r>
+              <a:rPr lang="de-DE" dirty="0"/>
+              <a:t> </a:t>
+            </a:r>
+            <a:r>
+              <a:rPr lang="de-DE" dirty="0" err="1"/>
+              <a:t>up</a:t>
+            </a:r>
+            <a:r>
+              <a:rPr lang="de-DE" dirty="0"/>
+              <a:t> </a:t>
+            </a:r>
+            <a:r>
+              <a:rPr lang="de-DE" dirty="0" err="1"/>
+              <a:t>with</a:t>
+            </a:r>
+            <a:r>
+              <a:rPr lang="de-DE" dirty="0"/>
+              <a:t> </a:t>
+            </a:r>
+            <a:r>
+              <a:rPr lang="de-DE" dirty="0" err="1"/>
+              <a:t>the</a:t>
+            </a:r>
+            <a:r>
+              <a:rPr lang="de-DE" dirty="0"/>
+              <a:t> </a:t>
+            </a:r>
+            <a:r>
+              <a:rPr lang="de-DE" dirty="0" err="1"/>
+              <a:t>window</a:t>
+            </a:r>
+            <a:r>
+              <a:rPr lang="de-DE" dirty="0"/>
+              <a:t>?</a:t>
+            </a:r>
+          </a:p>
+          <a:p>
+            <a:r>
+              <a:rPr lang="de-DE" dirty="0"/>
+              <a:t>And </a:t>
+            </a:r>
+            <a:r>
+              <a:rPr lang="de-DE" dirty="0" err="1"/>
+              <a:t>the</a:t>
+            </a:r>
+            <a:r>
+              <a:rPr lang="de-DE" dirty="0"/>
+              <a:t> </a:t>
+            </a:r>
+            <a:r>
+              <a:rPr lang="de-DE" dirty="0" err="1"/>
+              <a:t>heat</a:t>
+            </a:r>
+            <a:r>
+              <a:rPr lang="de-DE" dirty="0"/>
+              <a:t> pump </a:t>
+            </a:r>
+            <a:r>
+              <a:rPr lang="de-DE" dirty="0" err="1"/>
+              <a:t>used</a:t>
+            </a:r>
+            <a:r>
+              <a:rPr lang="de-DE" dirty="0"/>
+              <a:t> 119 kWh/(m^2 *a) (</a:t>
+            </a:r>
+            <a:r>
+              <a:rPr lang="de-DE" dirty="0" err="1"/>
+              <a:t>from</a:t>
+            </a:r>
+            <a:r>
+              <a:rPr lang="de-DE" dirty="0"/>
+              <a:t> Jan </a:t>
+            </a:r>
+            <a:r>
+              <a:rPr lang="de-DE" dirty="0" err="1"/>
+              <a:t>to</a:t>
+            </a:r>
+            <a:r>
+              <a:rPr lang="de-DE" dirty="0"/>
+              <a:t> Mar)</a:t>
+            </a:r>
           </a:p>
           <a:p>
             <a:endParaRPr lang="de-DE" dirty="0"/>
@@ -13752,77 +14072,70 @@
             </a:lvl9pPr>
           </a:lstStyle>
           <a:p>
-            <a:r>
-              <a:rPr lang="de-DE" dirty="0" err="1"/>
-              <a:t>Compare</a:t>
-            </a:r>
-            <a:r>
-              <a:rPr lang="de-DE" dirty="0"/>
-              <a:t> </a:t>
-            </a:r>
-            <a:r>
-              <a:rPr lang="de-DE" dirty="0" err="1"/>
-              <a:t>to</a:t>
-            </a:r>
-            <a:r>
-              <a:rPr lang="de-DE" dirty="0"/>
-              <a:t> 1978 </a:t>
-            </a:r>
-            <a:r>
-              <a:rPr lang="de-DE" dirty="0" err="1"/>
-              <a:t>winter</a:t>
-            </a:r>
-            <a:endParaRPr lang="de-DE" dirty="0"/>
-          </a:p>
-          <a:p>
-            <a:r>
-              <a:rPr lang="de-DE" dirty="0" err="1"/>
-              <a:t>Compare</a:t>
-            </a:r>
-            <a:r>
-              <a:rPr lang="de-DE" dirty="0"/>
-              <a:t> </a:t>
-            </a:r>
-            <a:r>
-              <a:rPr lang="de-DE" dirty="0" err="1"/>
-              <a:t>to</a:t>
-            </a:r>
-            <a:r>
-              <a:rPr lang="de-DE" dirty="0"/>
-              <a:t> </a:t>
-            </a:r>
-            <a:r>
-              <a:rPr lang="de-DE" dirty="0" err="1"/>
-              <a:t>the</a:t>
-            </a:r>
-            <a:r>
-              <a:rPr lang="de-DE" dirty="0"/>
-              <a:t> </a:t>
-            </a:r>
-            <a:r>
-              <a:rPr lang="de-DE" dirty="0" err="1"/>
-              <a:t>refurbished</a:t>
-            </a:r>
-            <a:r>
-              <a:rPr lang="de-DE" dirty="0"/>
-              <a:t> 1948 </a:t>
-            </a:r>
-            <a:r>
-              <a:rPr lang="de-DE" dirty="0" err="1"/>
-              <a:t>version</a:t>
-            </a:r>
-            <a:r>
-              <a:rPr lang="de-DE" dirty="0"/>
-              <a:t> </a:t>
-            </a:r>
-            <a:r>
-              <a:rPr lang="de-DE" dirty="0" err="1"/>
-              <a:t>winter</a:t>
-            </a:r>
             <a:endParaRPr lang="de-DE" dirty="0"/>
           </a:p>
         </p:txBody>
       </p:sp>
+      <p:pic>
+        <p:nvPicPr>
+          <p:cNvPr id="10" name="Picture 9">
+            <a:extLst>
+              <a:ext uri="{FF2B5EF4-FFF2-40B4-BE49-F238E27FC236}">
+                <a16:creationId xmlns:a16="http://schemas.microsoft.com/office/drawing/2014/main" id="{5A2EC2A4-C224-7DA7-E5F2-8DA0C3EF32BA}"/>
+              </a:ext>
+            </a:extLst>
+          </p:cNvPr>
+          <p:cNvPicPr>
+            <a:picLocks noChangeAspect="1"/>
+          </p:cNvPicPr>
+          <p:nvPr/>
+        </p:nvPicPr>
+        <p:blipFill>
+          <a:blip r:embed="rId2"/>
+          <a:stretch>
+            <a:fillRect/>
+          </a:stretch>
+        </p:blipFill>
+        <p:spPr>
+          <a:xfrm>
+            <a:off x="352300" y="1489777"/>
+            <a:ext cx="6031779" cy="3878446"/>
+          </a:xfrm>
+          <a:prstGeom prst="rect">
+            <a:avLst/>
+          </a:prstGeom>
+        </p:spPr>
+      </p:pic>
+      <p:pic>
+        <p:nvPicPr>
+          <p:cNvPr id="11" name="Picture 10">
+            <a:extLst>
+              <a:ext uri="{FF2B5EF4-FFF2-40B4-BE49-F238E27FC236}">
+                <a16:creationId xmlns:a16="http://schemas.microsoft.com/office/drawing/2014/main" id="{A8A11F4F-966A-2B96-9E19-B9556A394E38}"/>
+              </a:ext>
+            </a:extLst>
+          </p:cNvPr>
+          <p:cNvPicPr>
+            <a:picLocks noChangeAspect="1"/>
+          </p:cNvPicPr>
+          <p:nvPr/>
+        </p:nvPicPr>
+        <p:blipFill>
+          <a:blip r:embed="rId3"/>
+          <a:stretch>
+            <a:fillRect/>
+          </a:stretch>
+        </p:blipFill>
+        <p:spPr>
+          <a:xfrm>
+            <a:off x="4708979" y="1434398"/>
+            <a:ext cx="5438775" cy="3933825"/>
+          </a:xfrm>
+          <a:prstGeom prst="rect">
+            <a:avLst/>
+          </a:prstGeom>
+        </p:spPr>
+      </p:pic>
     </p:spTree>
     <p:extLst>
       <p:ext uri="{BB962C8B-B14F-4D97-AF65-F5344CB8AC3E}">
@@ -13836,7 +14149,497 @@
 </p:sld>
 </file>
 
-<file path=ppt/slides/slide21.xml><?xml version="1.0" encoding="utf-8"?>
+<file path=ppt/slides/slide22.xml><?xml version="1.0" encoding="utf-8"?>
+<p:sld xmlns:a="http://schemas.openxmlformats.org/drawingml/2006/main" xmlns:r="http://schemas.openxmlformats.org/officeDocument/2006/relationships" xmlns:p="http://schemas.openxmlformats.org/presentationml/2006/main">
+  <p:cSld>
+    <p:spTree>
+      <p:nvGrpSpPr>
+        <p:cNvPr id="1" name="">
+          <a:extLst>
+            <a:ext uri="{FF2B5EF4-FFF2-40B4-BE49-F238E27FC236}">
+              <a16:creationId xmlns:a16="http://schemas.microsoft.com/office/drawing/2014/main" id="{66DF2C2C-FDBD-4F77-E552-62B85C54CD42}"/>
+            </a:ext>
+          </a:extLst>
+        </p:cNvPr>
+        <p:cNvGrpSpPr/>
+        <p:nvPr/>
+      </p:nvGrpSpPr>
+      <p:grpSpPr>
+        <a:xfrm>
+          <a:off x="0" y="0"/>
+          <a:ext cx="0" cy="0"/>
+          <a:chOff x="0" y="0"/>
+          <a:chExt cx="0" cy="0"/>
+        </a:xfrm>
+      </p:grpSpPr>
+      <p:sp>
+        <p:nvSpPr>
+          <p:cNvPr id="2" name="Titel 1">
+            <a:extLst>
+              <a:ext uri="{FF2B5EF4-FFF2-40B4-BE49-F238E27FC236}">
+                <a16:creationId xmlns:a16="http://schemas.microsoft.com/office/drawing/2014/main" id="{52413383-3A85-C797-632F-B524F44A4C7A}"/>
+              </a:ext>
+            </a:extLst>
+          </p:cNvPr>
+          <p:cNvSpPr>
+            <a:spLocks noGrp="1"/>
+          </p:cNvSpPr>
+          <p:nvPr>
+            <p:ph type="title"/>
+          </p:nvPr>
+        </p:nvSpPr>
+        <p:spPr/>
+        <p:txBody>
+          <a:bodyPr/>
+          <a:lstStyle/>
+          <a:p>
+            <a:r>
+              <a:rPr lang="de-DE" dirty="0"/>
+              <a:t>1948 </a:t>
+            </a:r>
+            <a:r>
+              <a:rPr lang="de-DE" dirty="0" err="1"/>
+              <a:t>building</a:t>
+            </a:r>
+            <a:r>
+              <a:rPr lang="de-DE" dirty="0"/>
+              <a:t> in 2015</a:t>
+            </a:r>
+          </a:p>
+        </p:txBody>
+      </p:sp>
+      <p:sp>
+        <p:nvSpPr>
+          <p:cNvPr id="3" name="Inhaltsplatzhalter 2">
+            <a:extLst>
+              <a:ext uri="{FF2B5EF4-FFF2-40B4-BE49-F238E27FC236}">
+                <a16:creationId xmlns:a16="http://schemas.microsoft.com/office/drawing/2014/main" id="{E7579CFE-7072-603E-5DED-A548F6981184}"/>
+              </a:ext>
+            </a:extLst>
+          </p:cNvPr>
+          <p:cNvSpPr>
+            <a:spLocks noGrp="1"/>
+          </p:cNvSpPr>
+          <p:nvPr>
+            <p:ph idx="1"/>
+          </p:nvPr>
+        </p:nvSpPr>
+        <p:spPr>
+          <a:xfrm>
+            <a:off x="838200" y="2265362"/>
+            <a:ext cx="10515600" cy="4351338"/>
+          </a:xfrm>
+        </p:spPr>
+        <p:txBody>
+          <a:bodyPr>
+            <a:normAutofit fontScale="77500" lnSpcReduction="20000"/>
+          </a:bodyPr>
+          <a:lstStyle/>
+          <a:p>
+            <a:endParaRPr lang="de-DE" dirty="0"/>
+          </a:p>
+          <a:p>
+            <a:endParaRPr lang="de-DE" dirty="0">
+              <a:hlinkClick r:id="" action="ppaction://noaction"/>
+            </a:endParaRPr>
+          </a:p>
+          <a:p>
+            <a:endParaRPr lang="de-DE" dirty="0">
+              <a:hlinkClick r:id="" action="ppaction://noaction"/>
+            </a:endParaRPr>
+          </a:p>
+          <a:p>
+            <a:endParaRPr lang="de-DE" dirty="0">
+              <a:hlinkClick r:id="" action="ppaction://noaction"/>
+            </a:endParaRPr>
+          </a:p>
+          <a:p>
+            <a:endParaRPr lang="de-DE" dirty="0">
+              <a:hlinkClick r:id="" action="ppaction://noaction"/>
+            </a:endParaRPr>
+          </a:p>
+          <a:p>
+            <a:endParaRPr lang="de-DE" dirty="0">
+              <a:hlinkClick r:id="" action="ppaction://noaction"/>
+            </a:endParaRPr>
+          </a:p>
+          <a:p>
+            <a:endParaRPr lang="de-DE" dirty="0">
+              <a:hlinkClick r:id="" action="ppaction://noaction"/>
+            </a:endParaRPr>
+          </a:p>
+          <a:p>
+            <a:endParaRPr lang="de-DE" dirty="0"/>
+          </a:p>
+          <a:p>
+            <a:endParaRPr lang="de-DE" dirty="0"/>
+          </a:p>
+          <a:p>
+            <a:endParaRPr lang="de-DE" dirty="0"/>
+          </a:p>
+          <a:p>
+            <a:pPr marL="0" indent="0">
+              <a:buNone/>
+            </a:pPr>
+            <a:r>
+              <a:rPr lang="de-DE" dirty="0" err="1"/>
+              <a:t>What‘s</a:t>
+            </a:r>
+            <a:r>
+              <a:rPr lang="de-DE" dirty="0"/>
+              <a:t> </a:t>
+            </a:r>
+            <a:r>
+              <a:rPr lang="de-DE" dirty="0" err="1"/>
+              <a:t>up</a:t>
+            </a:r>
+            <a:r>
+              <a:rPr lang="de-DE" dirty="0"/>
+              <a:t> </a:t>
+            </a:r>
+            <a:r>
+              <a:rPr lang="de-DE" dirty="0" err="1"/>
+              <a:t>with</a:t>
+            </a:r>
+            <a:r>
+              <a:rPr lang="de-DE" dirty="0"/>
+              <a:t> </a:t>
+            </a:r>
+            <a:r>
+              <a:rPr lang="de-DE" dirty="0" err="1"/>
+              <a:t>the</a:t>
+            </a:r>
+            <a:r>
+              <a:rPr lang="de-DE" dirty="0"/>
+              <a:t> </a:t>
+            </a:r>
+            <a:r>
+              <a:rPr lang="de-DE" dirty="0" err="1"/>
+              <a:t>window</a:t>
+            </a:r>
+            <a:r>
+              <a:rPr lang="de-DE" dirty="0"/>
+              <a:t>?</a:t>
+            </a:r>
+          </a:p>
+          <a:p>
+            <a:r>
+              <a:rPr lang="de-DE" dirty="0"/>
+              <a:t>And </a:t>
+            </a:r>
+            <a:r>
+              <a:rPr lang="de-DE" dirty="0" err="1"/>
+              <a:t>the</a:t>
+            </a:r>
+            <a:r>
+              <a:rPr lang="de-DE" dirty="0"/>
+              <a:t> </a:t>
+            </a:r>
+            <a:r>
+              <a:rPr lang="de-DE" dirty="0" err="1"/>
+              <a:t>heat</a:t>
+            </a:r>
+            <a:r>
+              <a:rPr lang="de-DE" dirty="0"/>
+              <a:t> pump </a:t>
+            </a:r>
+            <a:r>
+              <a:rPr lang="de-DE" dirty="0" err="1"/>
+              <a:t>used</a:t>
+            </a:r>
+            <a:r>
+              <a:rPr lang="de-DE" dirty="0"/>
+              <a:t> 61 kWh/(m^2 *a) (</a:t>
+            </a:r>
+            <a:r>
+              <a:rPr lang="de-DE" dirty="0" err="1"/>
+              <a:t>from</a:t>
+            </a:r>
+            <a:r>
+              <a:rPr lang="de-DE" dirty="0"/>
+              <a:t> Jan </a:t>
+            </a:r>
+            <a:r>
+              <a:rPr lang="de-DE" dirty="0" err="1"/>
+              <a:t>to</a:t>
+            </a:r>
+            <a:r>
+              <a:rPr lang="de-DE" dirty="0"/>
+              <a:t> Mar)</a:t>
+            </a:r>
+          </a:p>
+        </p:txBody>
+      </p:sp>
+      <p:sp>
+        <p:nvSpPr>
+          <p:cNvPr id="5" name="Content Placeholder 4">
+            <a:extLst>
+              <a:ext uri="{FF2B5EF4-FFF2-40B4-BE49-F238E27FC236}">
+                <a16:creationId xmlns:a16="http://schemas.microsoft.com/office/drawing/2014/main" id="{B486AE52-0432-8620-E6D3-7B037C1F2F8F}"/>
+              </a:ext>
+            </a:extLst>
+          </p:cNvPr>
+          <p:cNvSpPr txBox="1">
+            <a:spLocks/>
+          </p:cNvSpPr>
+          <p:nvPr/>
+        </p:nvSpPr>
+        <p:spPr>
+          <a:xfrm>
+            <a:off x="990600" y="1978025"/>
+            <a:ext cx="10515600" cy="4351338"/>
+          </a:xfrm>
+          <a:prstGeom prst="rect">
+            <a:avLst/>
+          </a:prstGeom>
+        </p:spPr>
+        <p:txBody>
+          <a:bodyPr vert="horz" lIns="91440" tIns="45720" rIns="91440" bIns="45720" rtlCol="0">
+            <a:normAutofit/>
+          </a:bodyPr>
+          <a:lstStyle>
+            <a:lvl1pPr marL="228600" indent="-228600" algn="l" defTabSz="914400" rtl="0" eaLnBrk="1" latinLnBrk="0" hangingPunct="1">
+              <a:lnSpc>
+                <a:spcPct val="90000"/>
+              </a:lnSpc>
+              <a:spcBef>
+                <a:spcPts val="1000"/>
+              </a:spcBef>
+              <a:buFont typeface="Arial" panose="020B0604020202020204" pitchFamily="34" charset="0"/>
+              <a:buChar char="•"/>
+              <a:defRPr sz="2800" kern="1200">
+                <a:solidFill>
+                  <a:schemeClr val="tx1"/>
+                </a:solidFill>
+                <a:latin typeface="+mn-lt"/>
+                <a:ea typeface="+mn-ea"/>
+                <a:cs typeface="+mn-cs"/>
+              </a:defRPr>
+            </a:lvl1pPr>
+            <a:lvl2pPr marL="685800" indent="-228600" algn="l" defTabSz="914400" rtl="0" eaLnBrk="1" latinLnBrk="0" hangingPunct="1">
+              <a:lnSpc>
+                <a:spcPct val="90000"/>
+              </a:lnSpc>
+              <a:spcBef>
+                <a:spcPts val="500"/>
+              </a:spcBef>
+              <a:buFont typeface="Arial" panose="020B0604020202020204" pitchFamily="34" charset="0"/>
+              <a:buChar char="•"/>
+              <a:defRPr sz="2400" kern="1200">
+                <a:solidFill>
+                  <a:schemeClr val="tx1"/>
+                </a:solidFill>
+                <a:latin typeface="+mn-lt"/>
+                <a:ea typeface="+mn-ea"/>
+                <a:cs typeface="+mn-cs"/>
+              </a:defRPr>
+            </a:lvl2pPr>
+            <a:lvl3pPr marL="1143000" indent="-228600" algn="l" defTabSz="914400" rtl="0" eaLnBrk="1" latinLnBrk="0" hangingPunct="1">
+              <a:lnSpc>
+                <a:spcPct val="90000"/>
+              </a:lnSpc>
+              <a:spcBef>
+                <a:spcPts val="500"/>
+              </a:spcBef>
+              <a:buFont typeface="Arial" panose="020B0604020202020204" pitchFamily="34" charset="0"/>
+              <a:buChar char="•"/>
+              <a:defRPr sz="2000" kern="1200">
+                <a:solidFill>
+                  <a:schemeClr val="tx1"/>
+                </a:solidFill>
+                <a:latin typeface="+mn-lt"/>
+                <a:ea typeface="+mn-ea"/>
+                <a:cs typeface="+mn-cs"/>
+              </a:defRPr>
+            </a:lvl3pPr>
+            <a:lvl4pPr marL="1600200" indent="-228600" algn="l" defTabSz="914400" rtl="0" eaLnBrk="1" latinLnBrk="0" hangingPunct="1">
+              <a:lnSpc>
+                <a:spcPct val="90000"/>
+              </a:lnSpc>
+              <a:spcBef>
+                <a:spcPts val="500"/>
+              </a:spcBef>
+              <a:buFont typeface="Arial" panose="020B0604020202020204" pitchFamily="34" charset="0"/>
+              <a:buChar char="•"/>
+              <a:defRPr sz="1800" kern="1200">
+                <a:solidFill>
+                  <a:schemeClr val="tx1"/>
+                </a:solidFill>
+                <a:latin typeface="+mn-lt"/>
+                <a:ea typeface="+mn-ea"/>
+                <a:cs typeface="+mn-cs"/>
+              </a:defRPr>
+            </a:lvl4pPr>
+            <a:lvl5pPr marL="2057400" indent="-228600" algn="l" defTabSz="914400" rtl="0" eaLnBrk="1" latinLnBrk="0" hangingPunct="1">
+              <a:lnSpc>
+                <a:spcPct val="90000"/>
+              </a:lnSpc>
+              <a:spcBef>
+                <a:spcPts val="500"/>
+              </a:spcBef>
+              <a:buFont typeface="Arial" panose="020B0604020202020204" pitchFamily="34" charset="0"/>
+              <a:buChar char="•"/>
+              <a:defRPr sz="1800" kern="1200">
+                <a:solidFill>
+                  <a:schemeClr val="tx1"/>
+                </a:solidFill>
+                <a:latin typeface="+mn-lt"/>
+                <a:ea typeface="+mn-ea"/>
+                <a:cs typeface="+mn-cs"/>
+              </a:defRPr>
+            </a:lvl5pPr>
+            <a:lvl6pPr marL="2514600" indent="-228600" algn="l" defTabSz="914400" rtl="0" eaLnBrk="1" latinLnBrk="0" hangingPunct="1">
+              <a:lnSpc>
+                <a:spcPct val="90000"/>
+              </a:lnSpc>
+              <a:spcBef>
+                <a:spcPts val="500"/>
+              </a:spcBef>
+              <a:buFont typeface="Arial" panose="020B0604020202020204" pitchFamily="34" charset="0"/>
+              <a:buChar char="•"/>
+              <a:defRPr sz="1800" kern="1200">
+                <a:solidFill>
+                  <a:schemeClr val="tx1"/>
+                </a:solidFill>
+                <a:latin typeface="+mn-lt"/>
+                <a:ea typeface="+mn-ea"/>
+                <a:cs typeface="+mn-cs"/>
+              </a:defRPr>
+            </a:lvl6pPr>
+            <a:lvl7pPr marL="2971800" indent="-228600" algn="l" defTabSz="914400" rtl="0" eaLnBrk="1" latinLnBrk="0" hangingPunct="1">
+              <a:lnSpc>
+                <a:spcPct val="90000"/>
+              </a:lnSpc>
+              <a:spcBef>
+                <a:spcPts val="500"/>
+              </a:spcBef>
+              <a:buFont typeface="Arial" panose="020B0604020202020204" pitchFamily="34" charset="0"/>
+              <a:buChar char="•"/>
+              <a:defRPr sz="1800" kern="1200">
+                <a:solidFill>
+                  <a:schemeClr val="tx1"/>
+                </a:solidFill>
+                <a:latin typeface="+mn-lt"/>
+                <a:ea typeface="+mn-ea"/>
+                <a:cs typeface="+mn-cs"/>
+              </a:defRPr>
+            </a:lvl7pPr>
+            <a:lvl8pPr marL="3429000" indent="-228600" algn="l" defTabSz="914400" rtl="0" eaLnBrk="1" latinLnBrk="0" hangingPunct="1">
+              <a:lnSpc>
+                <a:spcPct val="90000"/>
+              </a:lnSpc>
+              <a:spcBef>
+                <a:spcPts val="500"/>
+              </a:spcBef>
+              <a:buFont typeface="Arial" panose="020B0604020202020204" pitchFamily="34" charset="0"/>
+              <a:buChar char="•"/>
+              <a:defRPr sz="1800" kern="1200">
+                <a:solidFill>
+                  <a:schemeClr val="tx1"/>
+                </a:solidFill>
+                <a:latin typeface="+mn-lt"/>
+                <a:ea typeface="+mn-ea"/>
+                <a:cs typeface="+mn-cs"/>
+              </a:defRPr>
+            </a:lvl8pPr>
+            <a:lvl9pPr marL="3886200" indent="-228600" algn="l" defTabSz="914400" rtl="0" eaLnBrk="1" latinLnBrk="0" hangingPunct="1">
+              <a:lnSpc>
+                <a:spcPct val="90000"/>
+              </a:lnSpc>
+              <a:spcBef>
+                <a:spcPts val="500"/>
+              </a:spcBef>
+              <a:buFont typeface="Arial" panose="020B0604020202020204" pitchFamily="34" charset="0"/>
+              <a:buChar char="•"/>
+              <a:defRPr sz="1800" kern="1200">
+                <a:solidFill>
+                  <a:schemeClr val="tx1"/>
+                </a:solidFill>
+                <a:latin typeface="+mn-lt"/>
+                <a:ea typeface="+mn-ea"/>
+                <a:cs typeface="+mn-cs"/>
+              </a:defRPr>
+            </a:lvl9pPr>
+          </a:lstStyle>
+          <a:p>
+            <a:endParaRPr lang="de-DE" dirty="0"/>
+          </a:p>
+        </p:txBody>
+      </p:sp>
+      <p:pic>
+        <p:nvPicPr>
+          <p:cNvPr id="4" name="Picture 3">
+            <a:extLst>
+              <a:ext uri="{FF2B5EF4-FFF2-40B4-BE49-F238E27FC236}">
+                <a16:creationId xmlns:a16="http://schemas.microsoft.com/office/drawing/2014/main" id="{2D25E299-4F79-AFED-7E12-901933990E19}"/>
+              </a:ext>
+            </a:extLst>
+          </p:cNvPr>
+          <p:cNvPicPr>
+            <a:picLocks noChangeAspect="1"/>
+          </p:cNvPicPr>
+          <p:nvPr/>
+        </p:nvPicPr>
+        <p:blipFill>
+          <a:blip r:embed="rId2"/>
+          <a:stretch>
+            <a:fillRect/>
+          </a:stretch>
+        </p:blipFill>
+        <p:spPr>
+          <a:xfrm>
+            <a:off x="762000" y="1318416"/>
+            <a:ext cx="6615554" cy="4221167"/>
+          </a:xfrm>
+          <a:prstGeom prst="rect">
+            <a:avLst/>
+          </a:prstGeom>
+        </p:spPr>
+      </p:pic>
+      <p:pic>
+        <p:nvPicPr>
+          <p:cNvPr id="10" name="Picture 9">
+            <a:extLst>
+              <a:ext uri="{FF2B5EF4-FFF2-40B4-BE49-F238E27FC236}">
+                <a16:creationId xmlns:a16="http://schemas.microsoft.com/office/drawing/2014/main" id="{99F5C98B-49CD-E32A-41BE-E60429C3327E}"/>
+              </a:ext>
+            </a:extLst>
+          </p:cNvPr>
+          <p:cNvPicPr>
+            <a:picLocks noChangeAspect="1"/>
+          </p:cNvPicPr>
+          <p:nvPr/>
+        </p:nvPicPr>
+        <p:blipFill>
+          <a:blip r:embed="rId3"/>
+          <a:stretch>
+            <a:fillRect/>
+          </a:stretch>
+        </p:blipFill>
+        <p:spPr>
+          <a:xfrm>
+            <a:off x="5637412" y="1807687"/>
+            <a:ext cx="5438775" cy="3933825"/>
+          </a:xfrm>
+          <a:prstGeom prst="rect">
+            <a:avLst/>
+          </a:prstGeom>
+        </p:spPr>
+      </p:pic>
+    </p:spTree>
+    <p:extLst>
+      <p:ext uri="{BB962C8B-B14F-4D97-AF65-F5344CB8AC3E}">
+        <p14:creationId xmlns:p14="http://schemas.microsoft.com/office/powerpoint/2010/main" val="1423096807"/>
+      </p:ext>
+    </p:extLst>
+  </p:cSld>
+  <p:clrMapOvr>
+    <a:masterClrMapping/>
+  </p:clrMapOvr>
+</p:sld>
+</file>
+
+<file path=ppt/slides/slide23.xml><?xml version="1.0" encoding="utf-8"?>
 <p:sld xmlns:a="http://schemas.openxmlformats.org/drawingml/2006/main" xmlns:r="http://schemas.openxmlformats.org/officeDocument/2006/relationships" xmlns:p="http://schemas.openxmlformats.org/presentationml/2006/main">
   <p:cSld>
     <p:spTree>
@@ -13894,28 +14697,343 @@
           </a:p>
         </p:txBody>
       </p:sp>
-      <p:sp>
-        <p:nvSpPr>
-          <p:cNvPr id="5" name="Content Placeholder 4">
+      <p:pic>
+        <p:nvPicPr>
+          <p:cNvPr id="4" name="Content Placeholder 3">
             <a:extLst>
               <a:ext uri="{FF2B5EF4-FFF2-40B4-BE49-F238E27FC236}">
-                <a16:creationId xmlns:a16="http://schemas.microsoft.com/office/drawing/2014/main" id="{446FB924-4AAC-874C-44A8-F732AE5E15E1}"/>
+                <a16:creationId xmlns:a16="http://schemas.microsoft.com/office/drawing/2014/main" id="{1B18ECA6-3601-92E2-1F5A-ED001B17B3F6}"/>
               </a:ext>
             </a:extLst>
           </p:cNvPr>
-          <p:cNvSpPr>
-            <a:spLocks noGrp="1"/>
-          </p:cNvSpPr>
+          <p:cNvPicPr>
+            <a:picLocks noGrp="1" noChangeAspect="1"/>
+          </p:cNvPicPr>
           <p:nvPr>
             <p:ph idx="1"/>
           </p:nvPr>
+        </p:nvPicPr>
+        <p:blipFill>
+          <a:blip r:embed="rId2"/>
+          <a:stretch>
+            <a:fillRect/>
+          </a:stretch>
+        </p:blipFill>
+        <p:spPr>
+          <a:xfrm>
+            <a:off x="611613" y="1462087"/>
+            <a:ext cx="6735173" cy="4351338"/>
+          </a:xfrm>
+        </p:spPr>
+      </p:pic>
+      <p:pic>
+        <p:nvPicPr>
+          <p:cNvPr id="7" name="Picture 6">
+            <a:extLst>
+              <a:ext uri="{FF2B5EF4-FFF2-40B4-BE49-F238E27FC236}">
+                <a16:creationId xmlns:a16="http://schemas.microsoft.com/office/drawing/2014/main" id="{1FD62D5F-8D4C-9470-8947-166F8BA9FD2F}"/>
+              </a:ext>
+            </a:extLst>
+          </p:cNvPr>
+          <p:cNvPicPr>
+            <a:picLocks noChangeAspect="1"/>
+          </p:cNvPicPr>
+          <p:nvPr/>
+        </p:nvPicPr>
+        <p:blipFill>
+          <a:blip r:embed="rId3"/>
+          <a:stretch>
+            <a:fillRect/>
+          </a:stretch>
+        </p:blipFill>
+        <p:spPr>
+          <a:xfrm>
+            <a:off x="5915025" y="1462087"/>
+            <a:ext cx="5438775" cy="3933825"/>
+          </a:xfrm>
+          <a:prstGeom prst="rect">
+            <a:avLst/>
+          </a:prstGeom>
+        </p:spPr>
+      </p:pic>
+      <p:sp>
+        <p:nvSpPr>
+          <p:cNvPr id="10" name="Inhaltsplatzhalter 2">
+            <a:extLst>
+              <a:ext uri="{FF2B5EF4-FFF2-40B4-BE49-F238E27FC236}">
+                <a16:creationId xmlns:a16="http://schemas.microsoft.com/office/drawing/2014/main" id="{A6C6EC30-6AD0-143A-01B2-D70B20BD91BA}"/>
+              </a:ext>
+            </a:extLst>
+          </p:cNvPr>
+          <p:cNvSpPr txBox="1">
+            <a:spLocks/>
+          </p:cNvSpPr>
+          <p:nvPr/>
         </p:nvSpPr>
-        <p:spPr/>
+        <p:spPr>
+          <a:xfrm>
+            <a:off x="838200" y="2265362"/>
+            <a:ext cx="10515600" cy="4351338"/>
+          </a:xfrm>
+          <a:prstGeom prst="rect">
+            <a:avLst/>
+          </a:prstGeom>
+        </p:spPr>
         <p:txBody>
-          <a:bodyPr/>
-          <a:lstStyle/>
+          <a:bodyPr vert="horz" lIns="91440" tIns="45720" rIns="91440" bIns="45720" rtlCol="0">
+            <a:normAutofit fontScale="85000" lnSpcReduction="20000"/>
+          </a:bodyPr>
+          <a:lstStyle>
+            <a:lvl1pPr marL="228600" indent="-228600" algn="l" defTabSz="914400" rtl="0" eaLnBrk="1" latinLnBrk="0" hangingPunct="1">
+              <a:lnSpc>
+                <a:spcPct val="90000"/>
+              </a:lnSpc>
+              <a:spcBef>
+                <a:spcPts val="1000"/>
+              </a:spcBef>
+              <a:buFont typeface="Arial" panose="020B0604020202020204" pitchFamily="34" charset="0"/>
+              <a:buChar char="•"/>
+              <a:defRPr sz="2800" kern="1200">
+                <a:solidFill>
+                  <a:schemeClr val="tx1"/>
+                </a:solidFill>
+                <a:latin typeface="+mn-lt"/>
+                <a:ea typeface="+mn-ea"/>
+                <a:cs typeface="+mn-cs"/>
+              </a:defRPr>
+            </a:lvl1pPr>
+            <a:lvl2pPr marL="685800" indent="-228600" algn="l" defTabSz="914400" rtl="0" eaLnBrk="1" latinLnBrk="0" hangingPunct="1">
+              <a:lnSpc>
+                <a:spcPct val="90000"/>
+              </a:lnSpc>
+              <a:spcBef>
+                <a:spcPts val="500"/>
+              </a:spcBef>
+              <a:buFont typeface="Arial" panose="020B0604020202020204" pitchFamily="34" charset="0"/>
+              <a:buChar char="•"/>
+              <a:defRPr sz="2400" kern="1200">
+                <a:solidFill>
+                  <a:schemeClr val="tx1"/>
+                </a:solidFill>
+                <a:latin typeface="+mn-lt"/>
+                <a:ea typeface="+mn-ea"/>
+                <a:cs typeface="+mn-cs"/>
+              </a:defRPr>
+            </a:lvl2pPr>
+            <a:lvl3pPr marL="1143000" indent="-228600" algn="l" defTabSz="914400" rtl="0" eaLnBrk="1" latinLnBrk="0" hangingPunct="1">
+              <a:lnSpc>
+                <a:spcPct val="90000"/>
+              </a:lnSpc>
+              <a:spcBef>
+                <a:spcPts val="500"/>
+              </a:spcBef>
+              <a:buFont typeface="Arial" panose="020B0604020202020204" pitchFamily="34" charset="0"/>
+              <a:buChar char="•"/>
+              <a:defRPr sz="2000" kern="1200">
+                <a:solidFill>
+                  <a:schemeClr val="tx1"/>
+                </a:solidFill>
+                <a:latin typeface="+mn-lt"/>
+                <a:ea typeface="+mn-ea"/>
+                <a:cs typeface="+mn-cs"/>
+              </a:defRPr>
+            </a:lvl3pPr>
+            <a:lvl4pPr marL="1600200" indent="-228600" algn="l" defTabSz="914400" rtl="0" eaLnBrk="1" latinLnBrk="0" hangingPunct="1">
+              <a:lnSpc>
+                <a:spcPct val="90000"/>
+              </a:lnSpc>
+              <a:spcBef>
+                <a:spcPts val="500"/>
+              </a:spcBef>
+              <a:buFont typeface="Arial" panose="020B0604020202020204" pitchFamily="34" charset="0"/>
+              <a:buChar char="•"/>
+              <a:defRPr sz="1800" kern="1200">
+                <a:solidFill>
+                  <a:schemeClr val="tx1"/>
+                </a:solidFill>
+                <a:latin typeface="+mn-lt"/>
+                <a:ea typeface="+mn-ea"/>
+                <a:cs typeface="+mn-cs"/>
+              </a:defRPr>
+            </a:lvl4pPr>
+            <a:lvl5pPr marL="2057400" indent="-228600" algn="l" defTabSz="914400" rtl="0" eaLnBrk="1" latinLnBrk="0" hangingPunct="1">
+              <a:lnSpc>
+                <a:spcPct val="90000"/>
+              </a:lnSpc>
+              <a:spcBef>
+                <a:spcPts val="500"/>
+              </a:spcBef>
+              <a:buFont typeface="Arial" panose="020B0604020202020204" pitchFamily="34" charset="0"/>
+              <a:buChar char="•"/>
+              <a:defRPr sz="1800" kern="1200">
+                <a:solidFill>
+                  <a:schemeClr val="tx1"/>
+                </a:solidFill>
+                <a:latin typeface="+mn-lt"/>
+                <a:ea typeface="+mn-ea"/>
+                <a:cs typeface="+mn-cs"/>
+              </a:defRPr>
+            </a:lvl5pPr>
+            <a:lvl6pPr marL="2514600" indent="-228600" algn="l" defTabSz="914400" rtl="0" eaLnBrk="1" latinLnBrk="0" hangingPunct="1">
+              <a:lnSpc>
+                <a:spcPct val="90000"/>
+              </a:lnSpc>
+              <a:spcBef>
+                <a:spcPts val="500"/>
+              </a:spcBef>
+              <a:buFont typeface="Arial" panose="020B0604020202020204" pitchFamily="34" charset="0"/>
+              <a:buChar char="•"/>
+              <a:defRPr sz="1800" kern="1200">
+                <a:solidFill>
+                  <a:schemeClr val="tx1"/>
+                </a:solidFill>
+                <a:latin typeface="+mn-lt"/>
+                <a:ea typeface="+mn-ea"/>
+                <a:cs typeface="+mn-cs"/>
+              </a:defRPr>
+            </a:lvl6pPr>
+            <a:lvl7pPr marL="2971800" indent="-228600" algn="l" defTabSz="914400" rtl="0" eaLnBrk="1" latinLnBrk="0" hangingPunct="1">
+              <a:lnSpc>
+                <a:spcPct val="90000"/>
+              </a:lnSpc>
+              <a:spcBef>
+                <a:spcPts val="500"/>
+              </a:spcBef>
+              <a:buFont typeface="Arial" panose="020B0604020202020204" pitchFamily="34" charset="0"/>
+              <a:buChar char="•"/>
+              <a:defRPr sz="1800" kern="1200">
+                <a:solidFill>
+                  <a:schemeClr val="tx1"/>
+                </a:solidFill>
+                <a:latin typeface="+mn-lt"/>
+                <a:ea typeface="+mn-ea"/>
+                <a:cs typeface="+mn-cs"/>
+              </a:defRPr>
+            </a:lvl7pPr>
+            <a:lvl8pPr marL="3429000" indent="-228600" algn="l" defTabSz="914400" rtl="0" eaLnBrk="1" latinLnBrk="0" hangingPunct="1">
+              <a:lnSpc>
+                <a:spcPct val="90000"/>
+              </a:lnSpc>
+              <a:spcBef>
+                <a:spcPts val="500"/>
+              </a:spcBef>
+              <a:buFont typeface="Arial" panose="020B0604020202020204" pitchFamily="34" charset="0"/>
+              <a:buChar char="•"/>
+              <a:defRPr sz="1800" kern="1200">
+                <a:solidFill>
+                  <a:schemeClr val="tx1"/>
+                </a:solidFill>
+                <a:latin typeface="+mn-lt"/>
+                <a:ea typeface="+mn-ea"/>
+                <a:cs typeface="+mn-cs"/>
+              </a:defRPr>
+            </a:lvl8pPr>
+            <a:lvl9pPr marL="3886200" indent="-228600" algn="l" defTabSz="914400" rtl="0" eaLnBrk="1" latinLnBrk="0" hangingPunct="1">
+              <a:lnSpc>
+                <a:spcPct val="90000"/>
+              </a:lnSpc>
+              <a:spcBef>
+                <a:spcPts val="500"/>
+              </a:spcBef>
+              <a:buFont typeface="Arial" panose="020B0604020202020204" pitchFamily="34" charset="0"/>
+              <a:buChar char="•"/>
+              <a:defRPr sz="1800" kern="1200">
+                <a:solidFill>
+                  <a:schemeClr val="tx1"/>
+                </a:solidFill>
+                <a:latin typeface="+mn-lt"/>
+                <a:ea typeface="+mn-ea"/>
+                <a:cs typeface="+mn-cs"/>
+              </a:defRPr>
+            </a:lvl9pPr>
+          </a:lstStyle>
           <a:p>
             <a:endParaRPr lang="de-DE" dirty="0"/>
+          </a:p>
+          <a:p>
+            <a:endParaRPr lang="de-DE" dirty="0">
+              <a:hlinkClick r:id="" action="ppaction://noaction"/>
+            </a:endParaRPr>
+          </a:p>
+          <a:p>
+            <a:endParaRPr lang="de-DE" dirty="0">
+              <a:hlinkClick r:id="" action="ppaction://noaction"/>
+            </a:endParaRPr>
+          </a:p>
+          <a:p>
+            <a:endParaRPr lang="de-DE" dirty="0">
+              <a:hlinkClick r:id="" action="ppaction://noaction"/>
+            </a:endParaRPr>
+          </a:p>
+          <a:p>
+            <a:endParaRPr lang="de-DE" dirty="0">
+              <a:hlinkClick r:id="" action="ppaction://noaction"/>
+            </a:endParaRPr>
+          </a:p>
+          <a:p>
+            <a:endParaRPr lang="de-DE" dirty="0">
+              <a:hlinkClick r:id="" action="ppaction://noaction"/>
+            </a:endParaRPr>
+          </a:p>
+          <a:p>
+            <a:endParaRPr lang="de-DE" dirty="0">
+              <a:hlinkClick r:id="" action="ppaction://noaction"/>
+            </a:endParaRPr>
+          </a:p>
+          <a:p>
+            <a:endParaRPr lang="de-DE" dirty="0"/>
+          </a:p>
+          <a:p>
+            <a:endParaRPr lang="de-DE" dirty="0"/>
+          </a:p>
+          <a:p>
+            <a:endParaRPr lang="de-DE" dirty="0"/>
+          </a:p>
+          <a:p>
+            <a:r>
+              <a:rPr lang="de-DE" dirty="0"/>
+              <a:t>And </a:t>
+            </a:r>
+            <a:r>
+              <a:rPr lang="de-DE" dirty="0" err="1"/>
+              <a:t>the</a:t>
+            </a:r>
+            <a:r>
+              <a:rPr lang="de-DE" dirty="0"/>
+              <a:t> </a:t>
+            </a:r>
+            <a:r>
+              <a:rPr lang="de-DE" dirty="0" err="1"/>
+              <a:t>heat</a:t>
+            </a:r>
+            <a:r>
+              <a:rPr lang="de-DE" dirty="0"/>
+              <a:t> pump </a:t>
+            </a:r>
+            <a:r>
+              <a:rPr lang="de-DE" dirty="0" err="1"/>
+              <a:t>used</a:t>
+            </a:r>
+            <a:r>
+              <a:rPr lang="de-DE" dirty="0"/>
+              <a:t> 42.83 kWh/(m^2 *a) (</a:t>
+            </a:r>
+            <a:r>
+              <a:rPr lang="de-DE" dirty="0" err="1"/>
+              <a:t>from</a:t>
+            </a:r>
+            <a:r>
+              <a:rPr lang="de-DE" dirty="0"/>
+              <a:t> Jan </a:t>
+            </a:r>
+            <a:r>
+              <a:rPr lang="de-DE" dirty="0" err="1"/>
+              <a:t>to</a:t>
+            </a:r>
+            <a:r>
+              <a:rPr lang="de-DE" dirty="0"/>
+              <a:t> Mar)</a:t>
+            </a:r>
           </a:p>
         </p:txBody>
       </p:sp>
@@ -13932,7 +15050,7 @@
 </p:sld>
 </file>
 
-<file path=ppt/slides/slide22.xml><?xml version="1.0" encoding="utf-8"?>
+<file path=ppt/slides/slide24.xml><?xml version="1.0" encoding="utf-8"?>
 <p:sld xmlns:a="http://schemas.openxmlformats.org/drawingml/2006/main" xmlns:r="http://schemas.openxmlformats.org/officeDocument/2006/relationships" xmlns:p="http://schemas.openxmlformats.org/presentationml/2006/main">
   <p:cSld>
     <p:spTree>
@@ -13972,7 +15090,7 @@
           <a:p>
             <a:r>
               <a:rPr lang="de-DE" dirty="0" err="1"/>
-              <a:t>Conclusions</a:t>
+              <a:t>A_ground</a:t>
             </a:r>
             <a:r>
               <a:rPr lang="de-DE" dirty="0"/>
@@ -13983,10 +15101,196 @@
       </p:sp>
       <p:sp>
         <p:nvSpPr>
-          <p:cNvPr id="3" name="Inhaltsplatzhalter 2">
+          <p:cNvPr id="7" name="TextBox 6">
             <a:extLst>
               <a:ext uri="{FF2B5EF4-FFF2-40B4-BE49-F238E27FC236}">
-                <a16:creationId xmlns:a16="http://schemas.microsoft.com/office/drawing/2014/main" id="{C8F56B68-4F2E-9C2D-9ADA-E1F95B4F0F97}"/>
+                <a16:creationId xmlns:a16="http://schemas.microsoft.com/office/drawing/2014/main" id="{F7C4736E-3CF2-1987-53C4-921A959DFBE2}"/>
+              </a:ext>
+            </a:extLst>
+          </p:cNvPr>
+          <p:cNvSpPr txBox="1"/>
+          <p:nvPr/>
+        </p:nvSpPr>
+        <p:spPr>
+          <a:xfrm>
+            <a:off x="678600" y="6115749"/>
+            <a:ext cx="11287800" cy="369332"/>
+          </a:xfrm>
+          <a:prstGeom prst="rect">
+            <a:avLst/>
+          </a:prstGeom>
+          <a:noFill/>
+        </p:spPr>
+        <p:txBody>
+          <a:bodyPr wrap="square">
+            <a:spAutoFit/>
+          </a:bodyPr>
+          <a:lstStyle/>
+          <a:p>
+            <a:r>
+              <a:rPr lang="de-DE" dirty="0" err="1"/>
+              <a:t>Is</a:t>
+            </a:r>
+            <a:r>
+              <a:rPr lang="de-DE" dirty="0"/>
+              <a:t> </a:t>
+            </a:r>
+            <a:r>
+              <a:rPr lang="de-DE" dirty="0" err="1"/>
+              <a:t>it</a:t>
+            </a:r>
+            <a:r>
+              <a:rPr lang="de-DE" dirty="0"/>
+              <a:t> per m^2 </a:t>
+            </a:r>
+            <a:r>
+              <a:rPr lang="de-DE" dirty="0" err="1"/>
+              <a:t>of</a:t>
+            </a:r>
+            <a:r>
+              <a:rPr lang="de-DE" dirty="0"/>
+              <a:t> </a:t>
+            </a:r>
+            <a:r>
+              <a:rPr lang="de-DE" dirty="0" err="1"/>
+              <a:t>component</a:t>
+            </a:r>
+            <a:r>
+              <a:rPr lang="de-DE" dirty="0"/>
+              <a:t> </a:t>
+            </a:r>
+            <a:r>
+              <a:rPr lang="de-DE" dirty="0" err="1"/>
+              <a:t>or</a:t>
+            </a:r>
+            <a:r>
+              <a:rPr lang="de-DE" dirty="0"/>
+              <a:t> per m^2 </a:t>
+            </a:r>
+            <a:r>
+              <a:rPr lang="de-DE" dirty="0" err="1"/>
+              <a:t>of</a:t>
+            </a:r>
+            <a:r>
+              <a:rPr lang="de-DE" dirty="0"/>
+              <a:t> </a:t>
+            </a:r>
+            <a:r>
+              <a:rPr lang="de-DE" dirty="0" err="1"/>
+              <a:t>living</a:t>
+            </a:r>
+            <a:r>
+              <a:rPr lang="de-DE" dirty="0"/>
+              <a:t> </a:t>
+            </a:r>
+            <a:r>
+              <a:rPr lang="de-DE" dirty="0" err="1"/>
+              <a:t>space</a:t>
+            </a:r>
+            <a:r>
+              <a:rPr lang="de-DE" dirty="0"/>
+              <a:t> </a:t>
+            </a:r>
+            <a:r>
+              <a:rPr lang="de-DE" dirty="0" err="1"/>
+              <a:t>A_ground</a:t>
+            </a:r>
+            <a:r>
+              <a:rPr lang="de-DE" dirty="0"/>
+              <a:t>?) </a:t>
+            </a:r>
+            <a:r>
+              <a:rPr lang="de-DE" dirty="0" err="1"/>
+              <a:t>Cause</a:t>
+            </a:r>
+            <a:r>
+              <a:rPr lang="de-DE" dirty="0"/>
+              <a:t> </a:t>
+            </a:r>
+            <a:r>
+              <a:rPr lang="de-DE" dirty="0" err="1"/>
+              <a:t>with</a:t>
+            </a:r>
+            <a:r>
+              <a:rPr lang="de-DE" dirty="0"/>
+              <a:t> </a:t>
+            </a:r>
+            <a:r>
+              <a:rPr lang="de-DE" dirty="0" err="1"/>
+              <a:t>A_ground</a:t>
+            </a:r>
+            <a:r>
+              <a:rPr lang="de-DE" dirty="0"/>
+              <a:t> </a:t>
+            </a:r>
+            <a:r>
+              <a:rPr lang="de-DE" dirty="0" err="1"/>
+              <a:t>is</a:t>
+            </a:r>
+            <a:r>
+              <a:rPr lang="de-DE" dirty="0"/>
+              <a:t> </a:t>
+            </a:r>
+            <a:r>
+              <a:rPr lang="de-DE" dirty="0" err="1"/>
+              <a:t>looks</a:t>
+            </a:r>
+            <a:r>
+              <a:rPr lang="de-DE" dirty="0"/>
+              <a:t> </a:t>
+            </a:r>
+            <a:r>
+              <a:rPr lang="de-DE" dirty="0" err="1"/>
+              <a:t>much</a:t>
+            </a:r>
+            <a:r>
+              <a:rPr lang="de-DE" dirty="0"/>
+              <a:t> </a:t>
+            </a:r>
+            <a:r>
+              <a:rPr lang="de-DE" dirty="0" err="1"/>
+              <a:t>better</a:t>
+            </a:r>
+            <a:endParaRPr lang="de-DE" dirty="0"/>
+          </a:p>
+        </p:txBody>
+      </p:sp>
+      <p:pic>
+        <p:nvPicPr>
+          <p:cNvPr id="8" name="Content Placeholder 3">
+            <a:extLst>
+              <a:ext uri="{FF2B5EF4-FFF2-40B4-BE49-F238E27FC236}">
+                <a16:creationId xmlns:a16="http://schemas.microsoft.com/office/drawing/2014/main" id="{7BD8DD98-F6C7-78F1-1461-6AC65F82AA63}"/>
+              </a:ext>
+            </a:extLst>
+          </p:cNvPr>
+          <p:cNvPicPr>
+            <a:picLocks noChangeAspect="1"/>
+          </p:cNvPicPr>
+          <p:nvPr/>
+        </p:nvPicPr>
+        <p:blipFill>
+          <a:blip r:embed="rId2"/>
+          <a:stretch>
+            <a:fillRect/>
+          </a:stretch>
+        </p:blipFill>
+        <p:spPr>
+          <a:xfrm>
+            <a:off x="611613" y="1462087"/>
+            <a:ext cx="6735173" cy="4351338"/>
+          </a:xfrm>
+          <a:prstGeom prst="rect">
+            <a:avLst/>
+          </a:prstGeom>
+        </p:spPr>
+      </p:pic>
+      <p:sp>
+        <p:nvSpPr>
+          <p:cNvPr id="10" name="Content Placeholder 9">
+            <a:extLst>
+              <a:ext uri="{FF2B5EF4-FFF2-40B4-BE49-F238E27FC236}">
+                <a16:creationId xmlns:a16="http://schemas.microsoft.com/office/drawing/2014/main" id="{1F52DAE0-9961-6B48-7EEE-520BB5186380}"/>
               </a:ext>
             </a:extLst>
           </p:cNvPr>
@@ -14006,6 +15310,36 @@
           </a:p>
         </p:txBody>
       </p:sp>
+      <p:pic>
+        <p:nvPicPr>
+          <p:cNvPr id="11" name="Content Placeholder 4">
+            <a:extLst>
+              <a:ext uri="{FF2B5EF4-FFF2-40B4-BE49-F238E27FC236}">
+                <a16:creationId xmlns:a16="http://schemas.microsoft.com/office/drawing/2014/main" id="{21465B75-B33E-9148-198D-D8E683884F79}"/>
+              </a:ext>
+            </a:extLst>
+          </p:cNvPr>
+          <p:cNvPicPr>
+            <a:picLocks noChangeAspect="1"/>
+          </p:cNvPicPr>
+          <p:nvPr/>
+        </p:nvPicPr>
+        <p:blipFill>
+          <a:blip r:embed="rId3"/>
+          <a:stretch>
+            <a:fillRect/>
+          </a:stretch>
+        </p:blipFill>
+        <p:spPr>
+          <a:xfrm>
+            <a:off x="5097306" y="1670843"/>
+            <a:ext cx="5438775" cy="3933825"/>
+          </a:xfrm>
+          <a:prstGeom prst="rect">
+            <a:avLst/>
+          </a:prstGeom>
+        </p:spPr>
+      </p:pic>
     </p:spTree>
     <p:extLst>
       <p:ext uri="{BB962C8B-B14F-4D97-AF65-F5344CB8AC3E}">
@@ -14019,7 +15353,90 @@
 </p:sld>
 </file>
 
-<file path=ppt/slides/slide23.xml><?xml version="1.0" encoding="utf-8"?>
+<file path=ppt/slides/slide25.xml><?xml version="1.0" encoding="utf-8"?>
+<p:sld xmlns:a="http://schemas.openxmlformats.org/drawingml/2006/main" xmlns:r="http://schemas.openxmlformats.org/officeDocument/2006/relationships" xmlns:p="http://schemas.openxmlformats.org/presentationml/2006/main">
+  <p:cSld>
+    <p:spTree>
+      <p:nvGrpSpPr>
+        <p:cNvPr id="1" name=""/>
+        <p:cNvGrpSpPr/>
+        <p:nvPr/>
+      </p:nvGrpSpPr>
+      <p:grpSpPr>
+        <a:xfrm>
+          <a:off x="0" y="0"/>
+          <a:ext cx="0" cy="0"/>
+          <a:chOff x="0" y="0"/>
+          <a:chExt cx="0" cy="0"/>
+        </a:xfrm>
+      </p:grpSpPr>
+      <p:sp>
+        <p:nvSpPr>
+          <p:cNvPr id="2" name="Title 1">
+            <a:extLst>
+              <a:ext uri="{FF2B5EF4-FFF2-40B4-BE49-F238E27FC236}">
+                <a16:creationId xmlns:a16="http://schemas.microsoft.com/office/drawing/2014/main" id="{EDAD4908-7DC4-F6F1-8CB6-D90C853C1499}"/>
+              </a:ext>
+            </a:extLst>
+          </p:cNvPr>
+          <p:cNvSpPr>
+            <a:spLocks noGrp="1"/>
+          </p:cNvSpPr>
+          <p:nvPr>
+            <p:ph type="title"/>
+          </p:nvPr>
+        </p:nvSpPr>
+        <p:spPr/>
+        <p:txBody>
+          <a:bodyPr/>
+          <a:lstStyle/>
+          <a:p>
+            <a:r>
+              <a:rPr lang="de-DE"/>
+              <a:t>Conclusions</a:t>
+            </a:r>
+          </a:p>
+        </p:txBody>
+      </p:sp>
+      <p:sp>
+        <p:nvSpPr>
+          <p:cNvPr id="3" name="Content Placeholder 2">
+            <a:extLst>
+              <a:ext uri="{FF2B5EF4-FFF2-40B4-BE49-F238E27FC236}">
+                <a16:creationId xmlns:a16="http://schemas.microsoft.com/office/drawing/2014/main" id="{60206787-A2B0-E3BC-BEAC-110650D1DF39}"/>
+              </a:ext>
+            </a:extLst>
+          </p:cNvPr>
+          <p:cNvSpPr>
+            <a:spLocks noGrp="1"/>
+          </p:cNvSpPr>
+          <p:nvPr>
+            <p:ph idx="1"/>
+          </p:nvPr>
+        </p:nvSpPr>
+        <p:spPr/>
+        <p:txBody>
+          <a:bodyPr/>
+          <a:lstStyle/>
+          <a:p>
+            <a:endParaRPr lang="de-DE"/>
+          </a:p>
+        </p:txBody>
+      </p:sp>
+    </p:spTree>
+    <p:extLst>
+      <p:ext uri="{BB962C8B-B14F-4D97-AF65-F5344CB8AC3E}">
+        <p14:creationId xmlns:p14="http://schemas.microsoft.com/office/powerpoint/2010/main" val="2874238928"/>
+      </p:ext>
+    </p:extLst>
+  </p:cSld>
+  <p:clrMapOvr>
+    <a:masterClrMapping/>
+  </p:clrMapOvr>
+</p:sld>
+</file>
+
+<file path=ppt/slides/slide26.xml><?xml version="1.0" encoding="utf-8"?>
 <p:sld xmlns:a="http://schemas.openxmlformats.org/drawingml/2006/main" xmlns:r="http://schemas.openxmlformats.org/officeDocument/2006/relationships" xmlns:p="http://schemas.openxmlformats.org/presentationml/2006/main">
   <p:cSld>
     <p:spTree>
@@ -14122,7 +15539,7 @@
 </p:sld>
 </file>
 
-<file path=ppt/slides/slide24.xml><?xml version="1.0" encoding="utf-8"?>
+<file path=ppt/slides/slide27.xml><?xml version="1.0" encoding="utf-8"?>
 <p:sld xmlns:a="http://schemas.openxmlformats.org/drawingml/2006/main" xmlns:r="http://schemas.openxmlformats.org/officeDocument/2006/relationships" xmlns:p="http://schemas.openxmlformats.org/presentationml/2006/main">
   <p:cSld>
     <p:spTree>
@@ -14234,7 +15651,7 @@
 </p:sld>
 </file>
 
-<file path=ppt/slides/slide25.xml><?xml version="1.0" encoding="utf-8"?>
+<file path=ppt/slides/slide28.xml><?xml version="1.0" encoding="utf-8"?>
 <p:sld xmlns:a="http://schemas.openxmlformats.org/drawingml/2006/main" xmlns:r="http://schemas.openxmlformats.org/officeDocument/2006/relationships" xmlns:p="http://schemas.openxmlformats.org/presentationml/2006/main">
   <p:cSld>
     <p:spTree>
@@ -14341,7 +15758,7 @@
 </p:sld>
 </file>
 
-<file path=ppt/slides/slide26.xml><?xml version="1.0" encoding="utf-8"?>
+<file path=ppt/slides/slide29.xml><?xml version="1.0" encoding="utf-8"?>
 <p:sld xmlns:a="http://schemas.openxmlformats.org/drawingml/2006/main" xmlns:r="http://schemas.openxmlformats.org/officeDocument/2006/relationships" xmlns:p="http://schemas.openxmlformats.org/presentationml/2006/main">
   <p:cSld>
     <p:spTree>
@@ -14447,89 +15864,6 @@
     <p:extLst>
       <p:ext uri="{BB962C8B-B14F-4D97-AF65-F5344CB8AC3E}">
         <p14:creationId xmlns:p14="http://schemas.microsoft.com/office/powerpoint/2010/main" val="3093946872"/>
-      </p:ext>
-    </p:extLst>
-  </p:cSld>
-  <p:clrMapOvr>
-    <a:masterClrMapping/>
-  </p:clrMapOvr>
-</p:sld>
-</file>
-
-<file path=ppt/slides/slide27.xml><?xml version="1.0" encoding="utf-8"?>
-<p:sld xmlns:a="http://schemas.openxmlformats.org/drawingml/2006/main" xmlns:r="http://schemas.openxmlformats.org/officeDocument/2006/relationships" xmlns:p="http://schemas.openxmlformats.org/presentationml/2006/main">
-  <p:cSld>
-    <p:spTree>
-      <p:nvGrpSpPr>
-        <p:cNvPr id="1" name=""/>
-        <p:cNvGrpSpPr/>
-        <p:nvPr/>
-      </p:nvGrpSpPr>
-      <p:grpSpPr>
-        <a:xfrm>
-          <a:off x="0" y="0"/>
-          <a:ext cx="0" cy="0"/>
-          <a:chOff x="0" y="0"/>
-          <a:chExt cx="0" cy="0"/>
-        </a:xfrm>
-      </p:grpSpPr>
-      <p:sp>
-        <p:nvSpPr>
-          <p:cNvPr id="2" name="Titel 1">
-            <a:extLst>
-              <a:ext uri="{FF2B5EF4-FFF2-40B4-BE49-F238E27FC236}">
-                <a16:creationId xmlns:a16="http://schemas.microsoft.com/office/drawing/2014/main" id="{12943DB5-FA81-0CBF-3951-A44F20013A41}"/>
-              </a:ext>
-            </a:extLst>
-          </p:cNvPr>
-          <p:cNvSpPr>
-            <a:spLocks noGrp="1"/>
-          </p:cNvSpPr>
-          <p:nvPr>
-            <p:ph type="title"/>
-          </p:nvPr>
-        </p:nvSpPr>
-        <p:spPr/>
-        <p:txBody>
-          <a:bodyPr/>
-          <a:lstStyle/>
-          <a:p>
-            <a:r>
-              <a:rPr lang="de-DE" dirty="0"/>
-              <a:t>A0 Poster</a:t>
-            </a:r>
-          </a:p>
-        </p:txBody>
-      </p:sp>
-      <p:sp>
-        <p:nvSpPr>
-          <p:cNvPr id="3" name="Inhaltsplatzhalter 2">
-            <a:extLst>
-              <a:ext uri="{FF2B5EF4-FFF2-40B4-BE49-F238E27FC236}">
-                <a16:creationId xmlns:a16="http://schemas.microsoft.com/office/drawing/2014/main" id="{3B85E411-A6F8-DDD7-A51E-7F514BB51D09}"/>
-              </a:ext>
-            </a:extLst>
-          </p:cNvPr>
-          <p:cNvSpPr>
-            <a:spLocks noGrp="1"/>
-          </p:cNvSpPr>
-          <p:nvPr>
-            <p:ph idx="1"/>
-          </p:nvPr>
-        </p:nvSpPr>
-        <p:spPr/>
-        <p:txBody>
-          <a:bodyPr/>
-          <a:lstStyle/>
-          <a:p>
-            <a:endParaRPr lang="de-DE"/>
-          </a:p>
-        </p:txBody>
-      </p:sp>
-    </p:spTree>
-    <p:extLst>
-      <p:ext uri="{BB962C8B-B14F-4D97-AF65-F5344CB8AC3E}">
-        <p14:creationId xmlns:p14="http://schemas.microsoft.com/office/powerpoint/2010/main" val="727708335"/>
       </p:ext>
     </p:extLst>
   </p:cSld>
@@ -14650,6 +15984,89 @@
     <p:extLst>
       <p:ext uri="{BB962C8B-B14F-4D97-AF65-F5344CB8AC3E}">
         <p14:creationId xmlns:p14="http://schemas.microsoft.com/office/powerpoint/2010/main" val="909868188"/>
+      </p:ext>
+    </p:extLst>
+  </p:cSld>
+  <p:clrMapOvr>
+    <a:masterClrMapping/>
+  </p:clrMapOvr>
+</p:sld>
+</file>
+
+<file path=ppt/slides/slide30.xml><?xml version="1.0" encoding="utf-8"?>
+<p:sld xmlns:a="http://schemas.openxmlformats.org/drawingml/2006/main" xmlns:r="http://schemas.openxmlformats.org/officeDocument/2006/relationships" xmlns:p="http://schemas.openxmlformats.org/presentationml/2006/main">
+  <p:cSld>
+    <p:spTree>
+      <p:nvGrpSpPr>
+        <p:cNvPr id="1" name=""/>
+        <p:cNvGrpSpPr/>
+        <p:nvPr/>
+      </p:nvGrpSpPr>
+      <p:grpSpPr>
+        <a:xfrm>
+          <a:off x="0" y="0"/>
+          <a:ext cx="0" cy="0"/>
+          <a:chOff x="0" y="0"/>
+          <a:chExt cx="0" cy="0"/>
+        </a:xfrm>
+      </p:grpSpPr>
+      <p:sp>
+        <p:nvSpPr>
+          <p:cNvPr id="2" name="Titel 1">
+            <a:extLst>
+              <a:ext uri="{FF2B5EF4-FFF2-40B4-BE49-F238E27FC236}">
+                <a16:creationId xmlns:a16="http://schemas.microsoft.com/office/drawing/2014/main" id="{12943DB5-FA81-0CBF-3951-A44F20013A41}"/>
+              </a:ext>
+            </a:extLst>
+          </p:cNvPr>
+          <p:cNvSpPr>
+            <a:spLocks noGrp="1"/>
+          </p:cNvSpPr>
+          <p:nvPr>
+            <p:ph type="title"/>
+          </p:nvPr>
+        </p:nvSpPr>
+        <p:spPr/>
+        <p:txBody>
+          <a:bodyPr/>
+          <a:lstStyle/>
+          <a:p>
+            <a:r>
+              <a:rPr lang="de-DE" dirty="0"/>
+              <a:t>A0 Poster</a:t>
+            </a:r>
+          </a:p>
+        </p:txBody>
+      </p:sp>
+      <p:sp>
+        <p:nvSpPr>
+          <p:cNvPr id="3" name="Inhaltsplatzhalter 2">
+            <a:extLst>
+              <a:ext uri="{FF2B5EF4-FFF2-40B4-BE49-F238E27FC236}">
+                <a16:creationId xmlns:a16="http://schemas.microsoft.com/office/drawing/2014/main" id="{3B85E411-A6F8-DDD7-A51E-7F514BB51D09}"/>
+              </a:ext>
+            </a:extLst>
+          </p:cNvPr>
+          <p:cNvSpPr>
+            <a:spLocks noGrp="1"/>
+          </p:cNvSpPr>
+          <p:nvPr>
+            <p:ph idx="1"/>
+          </p:nvPr>
+        </p:nvSpPr>
+        <p:spPr/>
+        <p:txBody>
+          <a:bodyPr/>
+          <a:lstStyle/>
+          <a:p>
+            <a:endParaRPr lang="de-DE"/>
+          </a:p>
+        </p:txBody>
+      </p:sp>
+    </p:spTree>
+    <p:extLst>
+      <p:ext uri="{BB962C8B-B14F-4D97-AF65-F5344CB8AC3E}">
+        <p14:creationId xmlns:p14="http://schemas.microsoft.com/office/powerpoint/2010/main" val="727708335"/>
       </p:ext>
     </p:extLst>
   </p:cSld>

</xml_diff>